<commit_message>
Minor changes of the presentation, mainly concerning the table of available constraint types.
</commit_message>
<xml_diff>
--- a/declarative-amsterdam-2020/an-introduction-to-greenfox/an-introduction-to-greenfox.pptx
+++ b/declarative-amsterdam-2020/an-introduction-to-greenfox/an-introduction-to-greenfox.pptx
@@ -5,10 +5,10 @@
     <p:sldMasterId id="2147483710" r:id="rId1"/>
   </p:sldMasterIdLst>
   <p:notesMasterIdLst>
-    <p:notesMasterId r:id="rId29"/>
+    <p:notesMasterId r:id="rId30"/>
   </p:notesMasterIdLst>
   <p:handoutMasterIdLst>
-    <p:handoutMasterId r:id="rId30"/>
+    <p:handoutMasterId r:id="rId31"/>
   </p:handoutMasterIdLst>
   <p:sldIdLst>
     <p:sldId id="925" r:id="rId2"/>
@@ -24,20 +24,21 @@
     <p:sldId id="1228" r:id="rId12"/>
     <p:sldId id="1229" r:id="rId13"/>
     <p:sldId id="1244" r:id="rId14"/>
-    <p:sldId id="1230" r:id="rId15"/>
-    <p:sldId id="1246" r:id="rId16"/>
-    <p:sldId id="1233" r:id="rId17"/>
-    <p:sldId id="1235" r:id="rId18"/>
-    <p:sldId id="1245" r:id="rId19"/>
-    <p:sldId id="1232" r:id="rId20"/>
-    <p:sldId id="1236" r:id="rId21"/>
-    <p:sldId id="1237" r:id="rId22"/>
-    <p:sldId id="1238" r:id="rId23"/>
-    <p:sldId id="1239" r:id="rId24"/>
-    <p:sldId id="1240" r:id="rId25"/>
-    <p:sldId id="1241" r:id="rId26"/>
-    <p:sldId id="1247" r:id="rId27"/>
-    <p:sldId id="1243" r:id="rId28"/>
+    <p:sldId id="1249" r:id="rId15"/>
+    <p:sldId id="1230" r:id="rId16"/>
+    <p:sldId id="1246" r:id="rId17"/>
+    <p:sldId id="1233" r:id="rId18"/>
+    <p:sldId id="1235" r:id="rId19"/>
+    <p:sldId id="1245" r:id="rId20"/>
+    <p:sldId id="1232" r:id="rId21"/>
+    <p:sldId id="1236" r:id="rId22"/>
+    <p:sldId id="1237" r:id="rId23"/>
+    <p:sldId id="1238" r:id="rId24"/>
+    <p:sldId id="1239" r:id="rId25"/>
+    <p:sldId id="1240" r:id="rId26"/>
+    <p:sldId id="1248" r:id="rId27"/>
+    <p:sldId id="1247" r:id="rId28"/>
+    <p:sldId id="1243" r:id="rId29"/>
   </p:sldIdLst>
   <p:sldSz cx="9144000" cy="6858000" type="screen4x3"/>
   <p:notesSz cx="6858000" cy="9945688"/>
@@ -1418,7 +1419,7 @@
               <a:pPr>
                 <a:defRPr/>
               </a:pPr>
-              <a:t>20</a:t>
+              <a:t>19</a:t>
             </a:fld>
             <a:endParaRPr lang="de-DE" altLang="de-DE"/>
           </a:p>
@@ -1427,7 +1428,7 @@
     </p:spTree>
     <p:extLst>
       <p:ext uri="{BB962C8B-B14F-4D97-AF65-F5344CB8AC3E}">
-        <p14:creationId xmlns:p14="http://schemas.microsoft.com/office/powerpoint/2010/main" val="630447322"/>
+        <p14:creationId xmlns:p14="http://schemas.microsoft.com/office/powerpoint/2010/main" val="3350540878"/>
       </p:ext>
     </p:extLst>
   </p:cSld>
@@ -1517,7 +1518,7 @@
     </p:spTree>
     <p:extLst>
       <p:ext uri="{BB962C8B-B14F-4D97-AF65-F5344CB8AC3E}">
-        <p14:creationId xmlns:p14="http://schemas.microsoft.com/office/powerpoint/2010/main" val="613354908"/>
+        <p14:creationId xmlns:p14="http://schemas.microsoft.com/office/powerpoint/2010/main" val="630447322"/>
       </p:ext>
     </p:extLst>
   </p:cSld>
@@ -1598,7 +1599,7 @@
               <a:pPr>
                 <a:defRPr/>
               </a:pPr>
-              <a:t>25</a:t>
+              <a:t>22</a:t>
             </a:fld>
             <a:endParaRPr lang="de-DE" altLang="de-DE"/>
           </a:p>
@@ -1607,7 +1608,97 @@
     </p:spTree>
     <p:extLst>
       <p:ext uri="{BB962C8B-B14F-4D97-AF65-F5344CB8AC3E}">
-        <p14:creationId xmlns:p14="http://schemas.microsoft.com/office/powerpoint/2010/main" val="3527862187"/>
+        <p14:creationId xmlns:p14="http://schemas.microsoft.com/office/powerpoint/2010/main" val="613354908"/>
+      </p:ext>
+    </p:extLst>
+  </p:cSld>
+  <p:clrMapOvr>
+    <a:masterClrMapping/>
+  </p:clrMapOvr>
+</p:notes>
+</file>
+
+<file path=ppt/notesSlides/notesSlide13.xml><?xml version="1.0" encoding="utf-8"?>
+<p:notes xmlns:a="http://schemas.openxmlformats.org/drawingml/2006/main" xmlns:r="http://schemas.openxmlformats.org/officeDocument/2006/relationships" xmlns:p="http://schemas.openxmlformats.org/presentationml/2006/main">
+  <p:cSld>
+    <p:spTree>
+      <p:nvGrpSpPr>
+        <p:cNvPr id="1" name=""/>
+        <p:cNvGrpSpPr/>
+        <p:nvPr/>
+      </p:nvGrpSpPr>
+      <p:grpSpPr>
+        <a:xfrm>
+          <a:off x="0" y="0"/>
+          <a:ext cx="0" cy="0"/>
+          <a:chOff x="0" y="0"/>
+          <a:chExt cx="0" cy="0"/>
+        </a:xfrm>
+      </p:grpSpPr>
+      <p:sp>
+        <p:nvSpPr>
+          <p:cNvPr id="2" name="Slide Image Placeholder 1"/>
+          <p:cNvSpPr>
+            <a:spLocks noGrp="1" noRot="1" noChangeAspect="1"/>
+          </p:cNvSpPr>
+          <p:nvPr>
+            <p:ph type="sldImg"/>
+          </p:nvPr>
+        </p:nvSpPr>
+        <p:spPr/>
+      </p:sp>
+      <p:sp>
+        <p:nvSpPr>
+          <p:cNvPr id="3" name="Notes Placeholder 2"/>
+          <p:cNvSpPr>
+            <a:spLocks noGrp="1"/>
+          </p:cNvSpPr>
+          <p:nvPr>
+            <p:ph type="body" idx="1"/>
+          </p:nvPr>
+        </p:nvSpPr>
+        <p:spPr/>
+        <p:txBody>
+          <a:bodyPr/>
+          <a:lstStyle/>
+          <a:p>
+            <a:endParaRPr lang="de-DE"/>
+          </a:p>
+        </p:txBody>
+      </p:sp>
+      <p:sp>
+        <p:nvSpPr>
+          <p:cNvPr id="4" name="Slide Number Placeholder 3"/>
+          <p:cNvSpPr>
+            <a:spLocks noGrp="1"/>
+          </p:cNvSpPr>
+          <p:nvPr>
+            <p:ph type="sldNum" sz="quarter" idx="10"/>
+          </p:nvPr>
+        </p:nvSpPr>
+        <p:spPr/>
+        <p:txBody>
+          <a:bodyPr/>
+          <a:lstStyle/>
+          <a:p>
+            <a:pPr>
+              <a:defRPr/>
+            </a:pPr>
+            <a:fld id="{C808F741-F631-4E00-8D1F-D4687A839150}" type="slidenum">
+              <a:rPr lang="de-DE" altLang="de-DE" smtClean="0"/>
+              <a:pPr>
+                <a:defRPr/>
+              </a:pPr>
+              <a:t>26</a:t>
+            </a:fld>
+            <a:endParaRPr lang="de-DE" altLang="de-DE"/>
+          </a:p>
+        </p:txBody>
+      </p:sp>
+    </p:spTree>
+    <p:extLst>
+      <p:ext uri="{BB962C8B-B14F-4D97-AF65-F5344CB8AC3E}">
+        <p14:creationId xmlns:p14="http://schemas.microsoft.com/office/powerpoint/2010/main" val="2536806369"/>
       </p:ext>
     </p:extLst>
   </p:cSld>
@@ -1967,7 +2058,7 @@
     </p:spTree>
     <p:extLst>
       <p:ext uri="{BB962C8B-B14F-4D97-AF65-F5344CB8AC3E}">
-        <p14:creationId xmlns:p14="http://schemas.microsoft.com/office/powerpoint/2010/main" val="3791317520"/>
+        <p14:creationId xmlns:p14="http://schemas.microsoft.com/office/powerpoint/2010/main" val="1501708957"/>
       </p:ext>
     </p:extLst>
   </p:cSld>
@@ -2057,7 +2148,7 @@
     </p:spTree>
     <p:extLst>
       <p:ext uri="{BB962C8B-B14F-4D97-AF65-F5344CB8AC3E}">
-        <p14:creationId xmlns:p14="http://schemas.microsoft.com/office/powerpoint/2010/main" val="3859908015"/>
+        <p14:creationId xmlns:p14="http://schemas.microsoft.com/office/powerpoint/2010/main" val="3791317520"/>
       </p:ext>
     </p:extLst>
   </p:cSld>
@@ -2147,7 +2238,7 @@
     </p:spTree>
     <p:extLst>
       <p:ext uri="{BB962C8B-B14F-4D97-AF65-F5344CB8AC3E}">
-        <p14:creationId xmlns:p14="http://schemas.microsoft.com/office/powerpoint/2010/main" val="3841554130"/>
+        <p14:creationId xmlns:p14="http://schemas.microsoft.com/office/powerpoint/2010/main" val="3859908015"/>
       </p:ext>
     </p:extLst>
   </p:cSld>
@@ -2237,7 +2328,7 @@
     </p:spTree>
     <p:extLst>
       <p:ext uri="{BB962C8B-B14F-4D97-AF65-F5344CB8AC3E}">
-        <p14:creationId xmlns:p14="http://schemas.microsoft.com/office/powerpoint/2010/main" val="1141762599"/>
+        <p14:creationId xmlns:p14="http://schemas.microsoft.com/office/powerpoint/2010/main" val="3841554130"/>
       </p:ext>
     </p:extLst>
   </p:cSld>
@@ -2327,7 +2418,7 @@
     </p:spTree>
     <p:extLst>
       <p:ext uri="{BB962C8B-B14F-4D97-AF65-F5344CB8AC3E}">
-        <p14:creationId xmlns:p14="http://schemas.microsoft.com/office/powerpoint/2010/main" val="3350540878"/>
+        <p14:creationId xmlns:p14="http://schemas.microsoft.com/office/powerpoint/2010/main" val="1141762599"/>
       </p:ext>
     </p:extLst>
   </p:cSld>
@@ -16349,13 +16440,6 @@
               </a:rPr>
               <a:t>Type, parameters, constraint component</a:t>
             </a:r>
-            <a:endParaRPr lang="de-DE" sz="2400" smtClean="0">
-              <a:solidFill>
-                <a:srgbClr val="006600"/>
-              </a:solidFill>
-              <a:latin typeface="Calibri Light" panose="020F0302020204030204" pitchFamily="34" charset="0"/>
-              <a:cs typeface="Calibri Light" panose="020F0302020204030204" pitchFamily="34" charset="0"/>
-            </a:endParaRPr>
           </a:p>
           <a:p>
             <a:pPr lvl="1"/>
@@ -16495,8 +16579,11 @@
                 <a:latin typeface="Calibri Light" panose="020F0302020204030204" pitchFamily="34" charset="0"/>
                 <a:cs typeface="Calibri Light" panose="020F0302020204030204" pitchFamily="34" charset="0"/>
               </a:rPr>
-              <a:t>Type:		  </a:t>
-            </a:r>
+              <a:t>Type:		      Value</a:t>
+            </a:r>
+          </a:p>
+          <a:p>
+            <a:pPr lvl="1"/>
             <a:r>
               <a:rPr lang="de-DE" sz="2000" smtClean="0">
                 <a:solidFill>
@@ -16505,21 +16592,18 @@
                 <a:latin typeface="Calibri Light" panose="020F0302020204030204" pitchFamily="34" charset="0"/>
                 <a:cs typeface="Calibri Light" panose="020F0302020204030204" pitchFamily="34" charset="0"/>
               </a:rPr>
-              <a:t>    </a:t>
-            </a:r>
-            <a:r>
-              <a:rPr lang="de-DE" sz="2000" smtClean="0">
+              <a:t>Parameters: 	      exprXP, </a:t>
+            </a:r>
+            <a:r>
+              <a:rPr lang="de-DE" sz="2000" u="sng" smtClean="0">
                 <a:solidFill>
                   <a:srgbClr val="006600"/>
                 </a:solidFill>
                 <a:latin typeface="Calibri Light" panose="020F0302020204030204" pitchFamily="34" charset="0"/>
                 <a:cs typeface="Calibri Light" panose="020F0302020204030204" pitchFamily="34" charset="0"/>
               </a:rPr>
-              <a:t>Value</a:t>
-            </a:r>
-          </a:p>
-          <a:p>
-            <a:pPr lvl="1"/>
+              <a:t>minCount</a:t>
+            </a:r>
             <a:r>
               <a:rPr lang="de-DE" sz="2000" smtClean="0">
                 <a:solidFill>
@@ -16528,8 +16612,11 @@
                 <a:latin typeface="Calibri Light" panose="020F0302020204030204" pitchFamily="34" charset="0"/>
                 <a:cs typeface="Calibri Light" panose="020F0302020204030204" pitchFamily="34" charset="0"/>
               </a:rPr>
-              <a:t>Parameters: 	 </a:t>
-            </a:r>
+              <a:t>, minCountMsg</a:t>
+            </a:r>
+          </a:p>
+          <a:p>
+            <a:pPr lvl="1"/>
             <a:r>
               <a:rPr lang="de-DE" sz="2000" smtClean="0">
                 <a:solidFill>
@@ -16538,8 +16625,11 @@
                 <a:latin typeface="Calibri Light" panose="020F0302020204030204" pitchFamily="34" charset="0"/>
                 <a:cs typeface="Calibri Light" panose="020F0302020204030204" pitchFamily="34" charset="0"/>
               </a:rPr>
-              <a:t>     </a:t>
-            </a:r>
+              <a:t>Key parameter:	      MinCount</a:t>
+            </a:r>
+          </a:p>
+          <a:p>
+            <a:pPr lvl="1"/>
             <a:r>
               <a:rPr lang="de-DE" sz="2000" smtClean="0">
                 <a:solidFill>
@@ -16548,93 +16638,7 @@
                 <a:latin typeface="Calibri Light" panose="020F0302020204030204" pitchFamily="34" charset="0"/>
                 <a:cs typeface="Calibri Light" panose="020F0302020204030204" pitchFamily="34" charset="0"/>
               </a:rPr>
-              <a:t>exprXP, </a:t>
-            </a:r>
-            <a:r>
-              <a:rPr lang="de-DE" sz="2000" u="sng" smtClean="0">
-                <a:solidFill>
-                  <a:srgbClr val="006600"/>
-                </a:solidFill>
-                <a:latin typeface="Calibri Light" panose="020F0302020204030204" pitchFamily="34" charset="0"/>
-                <a:cs typeface="Calibri Light" panose="020F0302020204030204" pitchFamily="34" charset="0"/>
-              </a:rPr>
-              <a:t>minCount</a:t>
-            </a:r>
-            <a:r>
-              <a:rPr lang="de-DE" sz="2000" smtClean="0">
-                <a:solidFill>
-                  <a:srgbClr val="006600"/>
-                </a:solidFill>
-                <a:latin typeface="Calibri Light" panose="020F0302020204030204" pitchFamily="34" charset="0"/>
-                <a:cs typeface="Calibri Light" panose="020F0302020204030204" pitchFamily="34" charset="0"/>
-              </a:rPr>
-              <a:t>, minCountMsg</a:t>
-            </a:r>
-          </a:p>
-          <a:p>
-            <a:pPr lvl="1"/>
-            <a:r>
-              <a:rPr lang="de-DE" sz="2000" smtClean="0">
-                <a:solidFill>
-                  <a:srgbClr val="006600"/>
-                </a:solidFill>
-                <a:latin typeface="Calibri Light" panose="020F0302020204030204" pitchFamily="34" charset="0"/>
-                <a:cs typeface="Calibri Light" panose="020F0302020204030204" pitchFamily="34" charset="0"/>
-              </a:rPr>
-              <a:t>Key parameter:</a:t>
-            </a:r>
-            <a:r>
-              <a:rPr lang="de-DE" sz="2000" smtClean="0">
-                <a:solidFill>
-                  <a:srgbClr val="006600"/>
-                </a:solidFill>
-                <a:latin typeface="Calibri Light" panose="020F0302020204030204" pitchFamily="34" charset="0"/>
-                <a:cs typeface="Calibri Light" panose="020F0302020204030204" pitchFamily="34" charset="0"/>
-              </a:rPr>
-              <a:t>	</a:t>
-            </a:r>
-            <a:r>
-              <a:rPr lang="de-DE" sz="2000" smtClean="0">
-                <a:solidFill>
-                  <a:srgbClr val="006600"/>
-                </a:solidFill>
-                <a:latin typeface="Calibri Light" panose="020F0302020204030204" pitchFamily="34" charset="0"/>
-                <a:cs typeface="Calibri Light" panose="020F0302020204030204" pitchFamily="34" charset="0"/>
-              </a:rPr>
-              <a:t>      </a:t>
-            </a:r>
-            <a:r>
-              <a:rPr lang="de-DE" sz="2000" smtClean="0">
-                <a:solidFill>
-                  <a:srgbClr val="006600"/>
-                </a:solidFill>
-                <a:latin typeface="Calibri Light" panose="020F0302020204030204" pitchFamily="34" charset="0"/>
-                <a:cs typeface="Calibri Light" panose="020F0302020204030204" pitchFamily="34" charset="0"/>
-              </a:rPr>
-              <a:t>MinCount</a:t>
-            </a:r>
-          </a:p>
-          <a:p>
-            <a:pPr lvl="1"/>
-            <a:r>
-              <a:rPr lang="de-DE" sz="2000" smtClean="0">
-                <a:solidFill>
-                  <a:srgbClr val="006600"/>
-                </a:solidFill>
-                <a:latin typeface="Calibri Light" panose="020F0302020204030204" pitchFamily="34" charset="0"/>
-                <a:cs typeface="Calibri Light" panose="020F0302020204030204" pitchFamily="34" charset="0"/>
-              </a:rPr>
-              <a:t>Constraint Component</a:t>
-            </a:r>
-            <a:r>
-              <a:rPr lang="de-DE" sz="2000" smtClean="0">
-                <a:solidFill>
-                  <a:srgbClr val="006600"/>
-                </a:solidFill>
-                <a:latin typeface="Calibri Light" panose="020F0302020204030204" pitchFamily="34" charset="0"/>
-                <a:cs typeface="Calibri Light" panose="020F0302020204030204" pitchFamily="34" charset="0"/>
-              </a:rPr>
-              <a:t>: ValueMinCount</a:t>
+              <a:t>Constraint Component: ValueMinCount</a:t>
             </a:r>
           </a:p>
         </p:txBody>
@@ -16767,17 +16771,7 @@
                 <a:latin typeface="Calibri Light" panose="020F0302020204030204" pitchFamily="34" charset="0"/>
                 <a:cs typeface="Calibri Light" panose="020F0302020204030204" pitchFamily="34" charset="0"/>
               </a:rPr>
-              <a:t>Example</a:t>
-            </a:r>
-            <a:r>
-              <a:rPr lang="de-DE" sz="2400" smtClean="0">
-                <a:solidFill>
-                  <a:srgbClr val="006600"/>
-                </a:solidFill>
-                <a:latin typeface="Calibri Light" panose="020F0302020204030204" pitchFamily="34" charset="0"/>
-                <a:cs typeface="Calibri Light" panose="020F0302020204030204" pitchFamily="34" charset="0"/>
-              </a:rPr>
-              <a:t>: Constraint #2</a:t>
+              <a:t>Example: Constraint #2</a:t>
             </a:r>
           </a:p>
           <a:p>
@@ -16833,35 +16827,8 @@
                 <a:latin typeface="Calibri Light" panose="020F0302020204030204" pitchFamily="34" charset="0"/>
                 <a:cs typeface="Calibri Light" panose="020F0302020204030204" pitchFamily="34" charset="0"/>
               </a:rPr>
-              <a:t>Key parameter:</a:t>
-            </a:r>
-            <a:r>
-              <a:rPr lang="de-DE" sz="2000" smtClean="0">
-                <a:solidFill>
-                  <a:srgbClr val="006600"/>
-                </a:solidFill>
-                <a:latin typeface="Calibri Light" panose="020F0302020204030204" pitchFamily="34" charset="0"/>
-                <a:cs typeface="Calibri Light" panose="020F0302020204030204" pitchFamily="34" charset="0"/>
-              </a:rPr>
-              <a:t>	     </a:t>
-            </a:r>
-            <a:r>
-              <a:rPr lang="de-DE" sz="2000" smtClean="0">
-                <a:solidFill>
-                  <a:srgbClr val="006600"/>
-                </a:solidFill>
-                <a:latin typeface="Calibri Light" panose="020F0302020204030204" pitchFamily="34" charset="0"/>
-                <a:cs typeface="Calibri Light" panose="020F0302020204030204" pitchFamily="34" charset="0"/>
-              </a:rPr>
-              <a:t>distinct</a:t>
-            </a:r>
-            <a:endParaRPr lang="de-DE" sz="2000" smtClean="0">
-              <a:solidFill>
-                <a:srgbClr val="006600"/>
-              </a:solidFill>
-              <a:latin typeface="Calibri Light" panose="020F0302020204030204" pitchFamily="34" charset="0"/>
-              <a:cs typeface="Calibri Light" panose="020F0302020204030204" pitchFamily="34" charset="0"/>
-            </a:endParaRPr>
+              <a:t>Key parameter:	     distinct</a:t>
+            </a:r>
           </a:p>
           <a:p>
             <a:pPr lvl="1"/>
@@ -17043,17 +17010,7 @@
                 <a:latin typeface="Calibri Light" panose="020F0302020204030204" pitchFamily="34" charset="0"/>
                 <a:cs typeface="Calibri Light" panose="020F0302020204030204" pitchFamily="34" charset="0"/>
               </a:rPr>
-              <a:t>Constraints </a:t>
-            </a:r>
-            <a:r>
-              <a:rPr lang="de-DE" smtClean="0">
-                <a:solidFill>
-                  <a:srgbClr val="006600"/>
-                </a:solidFill>
-                <a:latin typeface="Calibri Light" panose="020F0302020204030204" pitchFamily="34" charset="0"/>
-                <a:cs typeface="Calibri Light" panose="020F0302020204030204" pitchFamily="34" charset="0"/>
-              </a:rPr>
-              <a:t>IV</a:t>
+              <a:t>Constraints IV</a:t>
             </a:r>
             <a:endParaRPr lang="de-DE">
               <a:solidFill>
@@ -17099,13 +17056,6 @@
               </a:rPr>
               <a:t>Categorization:</a:t>
             </a:r>
-            <a:endParaRPr lang="de-DE" sz="2400" smtClean="0">
-              <a:solidFill>
-                <a:srgbClr val="006600"/>
-              </a:solidFill>
-              <a:latin typeface="Calibri Light" panose="020F0302020204030204" pitchFamily="34" charset="0"/>
-              <a:cs typeface="Calibri Light" panose="020F0302020204030204" pitchFamily="34" charset="0"/>
-            </a:endParaRPr>
           </a:p>
           <a:p>
             <a:pPr lvl="1"/>
@@ -17170,17 +17120,7 @@
                 <a:latin typeface="Calibri Light" panose="020F0302020204030204" pitchFamily="34" charset="0"/>
                 <a:cs typeface="Calibri Light" panose="020F0302020204030204" pitchFamily="34" charset="0"/>
               </a:rPr>
-              <a:t>. </a:t>
-            </a:r>
-            <a:r>
-              <a:rPr lang="de-DE" sz="2000">
-                <a:solidFill>
-                  <a:srgbClr val="006600"/>
-                </a:solidFill>
-                <a:latin typeface="Calibri Light" panose="020F0302020204030204" pitchFamily="34" charset="0"/>
-                <a:cs typeface="Calibri Light" panose="020F0302020204030204" pitchFamily="34" charset="0"/>
-              </a:rPr>
-              <a:t>&lt;</a:t>
+              <a:t>. &lt;</a:t>
             </a:r>
             <a:r>
               <a:rPr lang="de-DE" sz="2000" smtClean="0">
@@ -17287,13 +17227,6 @@
               </a:rPr>
               <a:t>		   e.g. &lt;foxvalue&gt;, &lt;foxvalueVair&gt;, &lt;links&gt;</a:t>
             </a:r>
-            <a:endParaRPr lang="de-DE" sz="2000" smtClean="0">
-              <a:solidFill>
-                <a:srgbClr val="006600"/>
-              </a:solidFill>
-              <a:latin typeface="Calibri Light" panose="020F0302020204030204" pitchFamily="34" charset="0"/>
-              <a:cs typeface="Calibri Light" panose="020F0302020204030204" pitchFamily="34" charset="0"/>
-            </a:endParaRPr>
           </a:p>
         </p:txBody>
       </p:sp>
@@ -17438,7 +17371,7 @@
                 <a:latin typeface="Calibri Light" panose="020F0302020204030204" pitchFamily="34" charset="0"/>
                 <a:cs typeface="Calibri Light" panose="020F0302020204030204" pitchFamily="34" charset="0"/>
               </a:rPr>
-              <a:t>Shapes</a:t>
+              <a:t>Constraint types</a:t>
             </a:r>
             <a:endParaRPr lang="de-DE">
               <a:solidFill>
@@ -17450,240 +17383,9 @@
           </a:p>
         </p:txBody>
       </p:sp>
-      <p:sp>
-        <p:nvSpPr>
-          <p:cNvPr id="3" name="Content Placeholder 2"/>
-          <p:cNvSpPr>
-            <a:spLocks noGrp="1"/>
-          </p:cNvSpPr>
-          <p:nvPr>
-            <p:ph idx="1"/>
-          </p:nvPr>
-        </p:nvSpPr>
-        <p:spPr/>
-        <p:txBody>
-          <a:bodyPr/>
-          <a:lstStyle/>
-          <a:p>
-            <a:r>
-              <a:rPr lang="de-DE" sz="2400" smtClean="0">
-                <a:solidFill>
-                  <a:srgbClr val="006600"/>
-                </a:solidFill>
-                <a:latin typeface="Calibri Light" panose="020F0302020204030204" pitchFamily="34" charset="0"/>
-                <a:cs typeface="Calibri Light" panose="020F0302020204030204" pitchFamily="34" charset="0"/>
-              </a:rPr>
-              <a:t>Shape is two things:</a:t>
-            </a:r>
-          </a:p>
-          <a:p>
-            <a:pPr lvl="1"/>
-            <a:r>
-              <a:rPr lang="de-DE" sz="2000" smtClean="0">
-                <a:solidFill>
-                  <a:srgbClr val="006600"/>
-                </a:solidFill>
-                <a:latin typeface="Calibri Light" panose="020F0302020204030204" pitchFamily="34" charset="0"/>
-                <a:cs typeface="Calibri Light" panose="020F0302020204030204" pitchFamily="34" charset="0"/>
-              </a:rPr>
-              <a:t>Set of </a:t>
-            </a:r>
-            <a:r>
-              <a:rPr lang="de-DE" sz="2000" u="sng" smtClean="0">
-                <a:solidFill>
-                  <a:srgbClr val="006600"/>
-                </a:solidFill>
-                <a:latin typeface="Calibri Light" panose="020F0302020204030204" pitchFamily="34" charset="0"/>
-                <a:cs typeface="Calibri Light" panose="020F0302020204030204" pitchFamily="34" charset="0"/>
-              </a:rPr>
-              <a:t>constraint</a:t>
-            </a:r>
-            <a:r>
-              <a:rPr lang="de-DE" sz="2000" smtClean="0">
-                <a:solidFill>
-                  <a:srgbClr val="006600"/>
-                </a:solidFill>
-                <a:latin typeface="Calibri Light" panose="020F0302020204030204" pitchFamily="34" charset="0"/>
-                <a:cs typeface="Calibri Light" panose="020F0302020204030204" pitchFamily="34" charset="0"/>
-              </a:rPr>
-              <a:t>s</a:t>
-            </a:r>
-          </a:p>
-          <a:p>
-            <a:pPr lvl="1"/>
-            <a:r>
-              <a:rPr lang="de-DE" sz="2000" u="sng" smtClean="0">
-                <a:solidFill>
-                  <a:srgbClr val="006600"/>
-                </a:solidFill>
-                <a:latin typeface="Calibri Light" panose="020F0302020204030204" pitchFamily="34" charset="0"/>
-                <a:cs typeface="Calibri Light" panose="020F0302020204030204" pitchFamily="34" charset="0"/>
-              </a:rPr>
-              <a:t>Target declaration</a:t>
-            </a:r>
-          </a:p>
-          <a:p>
-            <a:r>
-              <a:rPr lang="de-DE" sz="2400" smtClean="0">
-                <a:solidFill>
-                  <a:srgbClr val="006600"/>
-                </a:solidFill>
-                <a:latin typeface="Calibri Light" panose="020F0302020204030204" pitchFamily="34" charset="0"/>
-                <a:cs typeface="Calibri Light" panose="020F0302020204030204" pitchFamily="34" charset="0"/>
-              </a:rPr>
-              <a:t>Target declaration:</a:t>
-            </a:r>
-          </a:p>
-          <a:p>
-            <a:pPr marL="0" indent="0">
-              <a:buNone/>
-            </a:pPr>
-            <a:r>
-              <a:rPr lang="de-DE" sz="2400" i="1">
-                <a:solidFill>
-                  <a:srgbClr val="006600"/>
-                </a:solidFill>
-                <a:latin typeface="Calibri Light" panose="020F0302020204030204" pitchFamily="34" charset="0"/>
-                <a:cs typeface="Calibri Light" panose="020F0302020204030204" pitchFamily="34" charset="0"/>
-              </a:rPr>
-              <a:t> </a:t>
-            </a:r>
-            <a:r>
-              <a:rPr lang="de-DE" sz="2400" i="1" smtClean="0">
-                <a:solidFill>
-                  <a:srgbClr val="006600"/>
-                </a:solidFill>
-                <a:latin typeface="Calibri Light" panose="020F0302020204030204" pitchFamily="34" charset="0"/>
-                <a:cs typeface="Calibri Light" panose="020F0302020204030204" pitchFamily="34" charset="0"/>
-              </a:rPr>
-              <a:t>        „The constraints apply to these resources: (a selector)“ </a:t>
-            </a:r>
-          </a:p>
-          <a:p>
-            <a:r>
-              <a:rPr lang="de-DE" sz="2400" smtClean="0">
-                <a:solidFill>
-                  <a:srgbClr val="006600"/>
-                </a:solidFill>
-                <a:latin typeface="Calibri Light" panose="020F0302020204030204" pitchFamily="34" charset="0"/>
-                <a:cs typeface="Calibri Light" panose="020F0302020204030204" pitchFamily="34" charset="0"/>
-              </a:rPr>
-              <a:t>Schema representation of a shape: </a:t>
-            </a:r>
-            <a:r>
-              <a:rPr lang="de-DE" sz="2400" smtClean="0">
-                <a:solidFill>
-                  <a:srgbClr val="006600"/>
-                </a:solidFill>
-                <a:latin typeface="Courier New" panose="02070309020205020404" pitchFamily="49" charset="0"/>
-                <a:cs typeface="Courier New" panose="02070309020205020404" pitchFamily="49" charset="0"/>
-              </a:rPr>
-              <a:t>&lt;file&gt;</a:t>
-            </a:r>
-            <a:r>
-              <a:rPr lang="de-DE" sz="2400" smtClean="0">
-                <a:solidFill>
-                  <a:srgbClr val="006600"/>
-                </a:solidFill>
-                <a:latin typeface="Calibri Light" panose="020F0302020204030204" pitchFamily="34" charset="0"/>
-                <a:cs typeface="Calibri Light" panose="020F0302020204030204" pitchFamily="34" charset="0"/>
-              </a:rPr>
-              <a:t> or </a:t>
-            </a:r>
-            <a:r>
-              <a:rPr lang="de-DE" sz="2400" smtClean="0">
-                <a:solidFill>
-                  <a:srgbClr val="006600"/>
-                </a:solidFill>
-                <a:latin typeface="Courier New" panose="02070309020205020404" pitchFamily="49" charset="0"/>
-                <a:cs typeface="Courier New" panose="02070309020205020404" pitchFamily="49" charset="0"/>
-              </a:rPr>
-              <a:t>&lt;folder&gt;</a:t>
-            </a:r>
-          </a:p>
-          <a:p>
-            <a:pPr lvl="1"/>
-            <a:r>
-              <a:rPr lang="de-DE" sz="2000" smtClean="0">
-                <a:solidFill>
-                  <a:srgbClr val="006600"/>
-                </a:solidFill>
-                <a:latin typeface="Calibri Light" panose="020F0302020204030204" pitchFamily="34" charset="0"/>
-                <a:cs typeface="Calibri Light" panose="020F0302020204030204" pitchFamily="34" charset="0"/>
-              </a:rPr>
-              <a:t>Element name: 	the kind of resources</a:t>
-            </a:r>
-          </a:p>
-          <a:p>
-            <a:pPr lvl="1"/>
-            <a:r>
-              <a:rPr lang="de-DE" sz="2000" smtClean="0">
-                <a:solidFill>
-                  <a:srgbClr val="006600"/>
-                </a:solidFill>
-                <a:latin typeface="Calibri Light" panose="020F0302020204030204" pitchFamily="34" charset="0"/>
-                <a:cs typeface="Calibri Light" panose="020F0302020204030204" pitchFamily="34" charset="0"/>
-              </a:rPr>
-              <a:t>Attributes: 	target declaration</a:t>
-            </a:r>
-          </a:p>
-          <a:p>
-            <a:pPr lvl="1"/>
-            <a:r>
-              <a:rPr lang="de-DE" sz="2000" smtClean="0">
-                <a:solidFill>
-                  <a:srgbClr val="006600"/>
-                </a:solidFill>
-                <a:latin typeface="Calibri Light" panose="020F0302020204030204" pitchFamily="34" charset="0"/>
-                <a:cs typeface="Calibri Light" panose="020F0302020204030204" pitchFamily="34" charset="0"/>
-              </a:rPr>
-              <a:t>Child elements: 	constraints</a:t>
-            </a:r>
-          </a:p>
-          <a:p>
-            <a:endParaRPr lang="de-DE" sz="2400">
-              <a:solidFill>
-                <a:srgbClr val="006600"/>
-              </a:solidFill>
-              <a:latin typeface="Calibri Light" panose="020F0302020204030204" pitchFamily="34" charset="0"/>
-              <a:cs typeface="Calibri Light" panose="020F0302020204030204" pitchFamily="34" charset="0"/>
-            </a:endParaRPr>
-          </a:p>
-          <a:p>
-            <a:endParaRPr lang="de-DE" sz="2400" smtClean="0">
-              <a:solidFill>
-                <a:srgbClr val="006600"/>
-              </a:solidFill>
-              <a:latin typeface="Calibri Light" panose="020F0302020204030204" pitchFamily="34" charset="0"/>
-              <a:cs typeface="Calibri Light" panose="020F0302020204030204" pitchFamily="34" charset="0"/>
-            </a:endParaRPr>
-          </a:p>
-          <a:p>
-            <a:endParaRPr lang="de-DE" sz="2400" smtClean="0">
-              <a:solidFill>
-                <a:srgbClr val="006600"/>
-              </a:solidFill>
-              <a:latin typeface="Calibri Light" panose="020F0302020204030204" pitchFamily="34" charset="0"/>
-              <a:cs typeface="Calibri Light" panose="020F0302020204030204" pitchFamily="34" charset="0"/>
-            </a:endParaRPr>
-          </a:p>
-          <a:p>
-            <a:pPr marL="0" indent="0">
-              <a:buNone/>
-            </a:pPr>
-            <a:endParaRPr lang="de-DE">
-              <a:solidFill>
-                <a:srgbClr val="006600"/>
-              </a:solidFill>
-              <a:latin typeface="Calibri Light" panose="020F0302020204030204" pitchFamily="34" charset="0"/>
-              <a:cs typeface="Calibri Light" panose="020F0302020204030204" pitchFamily="34" charset="0"/>
-            </a:endParaRPr>
-          </a:p>
-        </p:txBody>
-      </p:sp>
       <p:pic>
         <p:nvPicPr>
-          <p:cNvPr id="9" name="Picture 8"/>
+          <p:cNvPr id="4" name="Picture 3"/>
           <p:cNvPicPr>
             <a:picLocks noChangeAspect="1"/>
           </p:cNvPicPr>
@@ -17697,8 +17399,8 @@
         </p:blipFill>
         <p:spPr>
           <a:xfrm>
-            <a:off x="655265" y="5373216"/>
-            <a:ext cx="7877175" cy="1200150"/>
+            <a:off x="665365" y="1700808"/>
+            <a:ext cx="7372350" cy="4991100"/>
           </a:xfrm>
           <a:prstGeom prst="rect">
             <a:avLst/>
@@ -17708,7 +17410,7 @@
     </p:spTree>
     <p:extLst>
       <p:ext uri="{BB962C8B-B14F-4D97-AF65-F5344CB8AC3E}">
-        <p14:creationId xmlns:p14="http://schemas.microsoft.com/office/powerpoint/2010/main" val="2636535453"/>
+        <p14:creationId xmlns:p14="http://schemas.microsoft.com/office/powerpoint/2010/main" val="1771703266"/>
       </p:ext>
     </p:extLst>
   </p:cSld>
@@ -17752,12 +17454,7 @@
             <p:ph type="title"/>
           </p:nvPr>
         </p:nvSpPr>
-        <p:spPr>
-          <a:xfrm>
-            <a:off x="457200" y="116632"/>
-            <a:ext cx="7543800" cy="1295400"/>
-          </a:xfrm>
-        </p:spPr>
+        <p:spPr/>
         <p:txBody>
           <a:bodyPr/>
           <a:lstStyle/>
@@ -17770,7 +17467,7 @@
                 <a:latin typeface="Calibri Light" panose="020F0302020204030204" pitchFamily="34" charset="0"/>
                 <a:cs typeface="Calibri Light" panose="020F0302020204030204" pitchFamily="34" charset="0"/>
               </a:rPr>
-              <a:t>Target declaration</a:t>
+              <a:t>Shapes</a:t>
             </a:r>
             <a:endParaRPr lang="de-DE">
               <a:solidFill>
@@ -17805,7 +17502,171 @@
                 <a:latin typeface="Calibri Light" panose="020F0302020204030204" pitchFamily="34" charset="0"/>
                 <a:cs typeface="Calibri Light" panose="020F0302020204030204" pitchFamily="34" charset="0"/>
               </a:rPr>
-              <a:t>A target declaration is a function:</a:t>
+              <a:t>Shape is two things:</a:t>
+            </a:r>
+          </a:p>
+          <a:p>
+            <a:pPr lvl="1"/>
+            <a:r>
+              <a:rPr lang="de-DE" sz="2000" smtClean="0">
+                <a:solidFill>
+                  <a:srgbClr val="006600"/>
+                </a:solidFill>
+                <a:latin typeface="Calibri Light" panose="020F0302020204030204" pitchFamily="34" charset="0"/>
+                <a:cs typeface="Calibri Light" panose="020F0302020204030204" pitchFamily="34" charset="0"/>
+              </a:rPr>
+              <a:t>Set of </a:t>
+            </a:r>
+            <a:r>
+              <a:rPr lang="de-DE" sz="2000" u="sng" smtClean="0">
+                <a:solidFill>
+                  <a:srgbClr val="006600"/>
+                </a:solidFill>
+                <a:latin typeface="Calibri Light" panose="020F0302020204030204" pitchFamily="34" charset="0"/>
+                <a:cs typeface="Calibri Light" panose="020F0302020204030204" pitchFamily="34" charset="0"/>
+              </a:rPr>
+              <a:t>constraint</a:t>
+            </a:r>
+            <a:r>
+              <a:rPr lang="de-DE" sz="2000" smtClean="0">
+                <a:solidFill>
+                  <a:srgbClr val="006600"/>
+                </a:solidFill>
+                <a:latin typeface="Calibri Light" panose="020F0302020204030204" pitchFamily="34" charset="0"/>
+                <a:cs typeface="Calibri Light" panose="020F0302020204030204" pitchFamily="34" charset="0"/>
+              </a:rPr>
+              <a:t>s</a:t>
+            </a:r>
+          </a:p>
+          <a:p>
+            <a:pPr lvl="1"/>
+            <a:r>
+              <a:rPr lang="de-DE" sz="2000" u="sng" smtClean="0">
+                <a:solidFill>
+                  <a:srgbClr val="006600"/>
+                </a:solidFill>
+                <a:latin typeface="Calibri Light" panose="020F0302020204030204" pitchFamily="34" charset="0"/>
+                <a:cs typeface="Calibri Light" panose="020F0302020204030204" pitchFamily="34" charset="0"/>
+              </a:rPr>
+              <a:t>Target declaration</a:t>
+            </a:r>
+          </a:p>
+          <a:p>
+            <a:r>
+              <a:rPr lang="de-DE" sz="2400" smtClean="0">
+                <a:solidFill>
+                  <a:srgbClr val="006600"/>
+                </a:solidFill>
+                <a:latin typeface="Calibri Light" panose="020F0302020204030204" pitchFamily="34" charset="0"/>
+                <a:cs typeface="Calibri Light" panose="020F0302020204030204" pitchFamily="34" charset="0"/>
+              </a:rPr>
+              <a:t>Target declaration:</a:t>
+            </a:r>
+          </a:p>
+          <a:p>
+            <a:pPr marL="0" indent="0">
+              <a:buNone/>
+            </a:pPr>
+            <a:r>
+              <a:rPr lang="de-DE" sz="2400" i="1">
+                <a:solidFill>
+                  <a:srgbClr val="006600"/>
+                </a:solidFill>
+                <a:latin typeface="Calibri Light" panose="020F0302020204030204" pitchFamily="34" charset="0"/>
+                <a:cs typeface="Calibri Light" panose="020F0302020204030204" pitchFamily="34" charset="0"/>
+              </a:rPr>
+              <a:t> </a:t>
+            </a:r>
+            <a:r>
+              <a:rPr lang="de-DE" sz="2400" i="1" smtClean="0">
+                <a:solidFill>
+                  <a:srgbClr val="006600"/>
+                </a:solidFill>
+                <a:latin typeface="Calibri Light" panose="020F0302020204030204" pitchFamily="34" charset="0"/>
+                <a:cs typeface="Calibri Light" panose="020F0302020204030204" pitchFamily="34" charset="0"/>
+              </a:rPr>
+              <a:t>        „The constraints apply to these resources: (a selector)“ </a:t>
+            </a:r>
+          </a:p>
+          <a:p>
+            <a:r>
+              <a:rPr lang="de-DE" sz="2400" smtClean="0">
+                <a:solidFill>
+                  <a:srgbClr val="006600"/>
+                </a:solidFill>
+                <a:latin typeface="Calibri Light" panose="020F0302020204030204" pitchFamily="34" charset="0"/>
+                <a:cs typeface="Calibri Light" panose="020F0302020204030204" pitchFamily="34" charset="0"/>
+              </a:rPr>
+              <a:t>Schema representation of a shape: </a:t>
+            </a:r>
+            <a:r>
+              <a:rPr lang="de-DE" sz="2400" smtClean="0">
+                <a:solidFill>
+                  <a:srgbClr val="006600"/>
+                </a:solidFill>
+                <a:latin typeface="Courier New" panose="02070309020205020404" pitchFamily="49" charset="0"/>
+                <a:cs typeface="Courier New" panose="02070309020205020404" pitchFamily="49" charset="0"/>
+              </a:rPr>
+              <a:t>&lt;file&gt;</a:t>
+            </a:r>
+            <a:r>
+              <a:rPr lang="de-DE" sz="2400" smtClean="0">
+                <a:solidFill>
+                  <a:srgbClr val="006600"/>
+                </a:solidFill>
+                <a:latin typeface="Calibri Light" panose="020F0302020204030204" pitchFamily="34" charset="0"/>
+                <a:cs typeface="Calibri Light" panose="020F0302020204030204" pitchFamily="34" charset="0"/>
+              </a:rPr>
+              <a:t> or </a:t>
+            </a:r>
+            <a:r>
+              <a:rPr lang="de-DE" sz="2400" smtClean="0">
+                <a:solidFill>
+                  <a:srgbClr val="006600"/>
+                </a:solidFill>
+                <a:latin typeface="Courier New" panose="02070309020205020404" pitchFamily="49" charset="0"/>
+                <a:cs typeface="Courier New" panose="02070309020205020404" pitchFamily="49" charset="0"/>
+              </a:rPr>
+              <a:t>&lt;folder&gt;</a:t>
+            </a:r>
+          </a:p>
+          <a:p>
+            <a:pPr lvl="1"/>
+            <a:r>
+              <a:rPr lang="de-DE" sz="2000" smtClean="0">
+                <a:solidFill>
+                  <a:srgbClr val="006600"/>
+                </a:solidFill>
+                <a:latin typeface="Calibri Light" panose="020F0302020204030204" pitchFamily="34" charset="0"/>
+                <a:cs typeface="Calibri Light" panose="020F0302020204030204" pitchFamily="34" charset="0"/>
+              </a:rPr>
+              <a:t>Element name: 	the kind of resources</a:t>
+            </a:r>
+          </a:p>
+          <a:p>
+            <a:pPr lvl="1"/>
+            <a:r>
+              <a:rPr lang="de-DE" sz="2000" smtClean="0">
+                <a:solidFill>
+                  <a:srgbClr val="006600"/>
+                </a:solidFill>
+                <a:latin typeface="Calibri Light" panose="020F0302020204030204" pitchFamily="34" charset="0"/>
+                <a:cs typeface="Calibri Light" panose="020F0302020204030204" pitchFamily="34" charset="0"/>
+              </a:rPr>
+              <a:t>Attributes: 	target declaration</a:t>
+            </a:r>
+          </a:p>
+          <a:p>
+            <a:pPr lvl="1"/>
+            <a:r>
+              <a:rPr lang="de-DE" sz="2000" smtClean="0">
+                <a:solidFill>
+                  <a:srgbClr val="006600"/>
+                </a:solidFill>
+                <a:latin typeface="Calibri Light" panose="020F0302020204030204" pitchFamily="34" charset="0"/>
+                <a:cs typeface="Calibri Light" panose="020F0302020204030204" pitchFamily="34" charset="0"/>
+              </a:rPr>
+              <a:t>Child elements: 	constraints</a:t>
             </a:r>
           </a:p>
           <a:p>
@@ -17827,15 +17688,6 @@
             </a:endParaRPr>
           </a:p>
           <a:p>
-            <a:endParaRPr lang="de-DE" sz="2400">
-              <a:solidFill>
-                <a:srgbClr val="006600"/>
-              </a:solidFill>
-              <a:latin typeface="Calibri Light" panose="020F0302020204030204" pitchFamily="34" charset="0"/>
-              <a:cs typeface="Calibri Light" panose="020F0302020204030204" pitchFamily="34" charset="0"/>
-            </a:endParaRPr>
-          </a:p>
-          <a:p>
             <a:endParaRPr lang="de-DE" sz="2400" smtClean="0">
               <a:solidFill>
                 <a:srgbClr val="006600"/>
@@ -17845,7 +17697,10 @@
             </a:endParaRPr>
           </a:p>
           <a:p>
-            <a:endParaRPr lang="de-DE" sz="2400">
+            <a:pPr marL="0" indent="0">
+              <a:buNone/>
+            </a:pPr>
+            <a:endParaRPr lang="de-DE">
               <a:solidFill>
                 <a:srgbClr val="006600"/>
               </a:solidFill>
@@ -17853,216 +17708,11 @@
               <a:cs typeface="Calibri Light" panose="020F0302020204030204" pitchFamily="34" charset="0"/>
             </a:endParaRPr>
           </a:p>
-          <a:p>
-            <a:endParaRPr lang="de-DE" sz="2400" smtClean="0">
-              <a:solidFill>
-                <a:srgbClr val="006600"/>
-              </a:solidFill>
-              <a:latin typeface="Calibri Light" panose="020F0302020204030204" pitchFamily="34" charset="0"/>
-              <a:cs typeface="Calibri Light" panose="020F0302020204030204" pitchFamily="34" charset="0"/>
-            </a:endParaRPr>
-          </a:p>
-          <a:p>
-            <a:r>
-              <a:rPr lang="de-DE" sz="2400" smtClean="0">
-                <a:solidFill>
-                  <a:srgbClr val="006600"/>
-                </a:solidFill>
-                <a:latin typeface="Calibri Light" panose="020F0302020204030204" pitchFamily="34" charset="0"/>
-                <a:cs typeface="Calibri Light" panose="020F0302020204030204" pitchFamily="34" charset="0"/>
-              </a:rPr>
-              <a:t>Schema representation: attributes of the shape element</a:t>
-            </a:r>
-          </a:p>
-        </p:txBody>
-      </p:sp>
-      <p:sp>
-        <p:nvSpPr>
-          <p:cNvPr id="5" name="TextBox 4"/>
-          <p:cNvSpPr txBox="1"/>
-          <p:nvPr/>
-        </p:nvSpPr>
-        <p:spPr>
-          <a:xfrm>
-            <a:off x="323528" y="2276872"/>
-            <a:ext cx="8820472" cy="2308324"/>
-          </a:xfrm>
-          <a:prstGeom prst="rect">
-            <a:avLst/>
-          </a:prstGeom>
-          <a:noFill/>
-        </p:spPr>
-        <p:txBody>
-          <a:bodyPr wrap="square" rtlCol="0">
-            <a:spAutoFit/>
-          </a:bodyPr>
-          <a:lstStyle/>
-          <a:p>
-            <a:pPr marL="0" indent="0">
-              <a:buNone/>
-            </a:pPr>
-            <a:r>
-              <a:rPr lang="de-DE" sz="2400" b="0">
-                <a:solidFill>
-                  <a:srgbClr val="006600"/>
-                </a:solidFill>
-                <a:latin typeface="Calibri Light" panose="020F0302020204030204" pitchFamily="34" charset="0"/>
-                <a:cs typeface="Calibri Light" panose="020F0302020204030204" pitchFamily="34" charset="0"/>
-              </a:rPr>
-              <a:t>	Maps a </a:t>
-            </a:r>
-            <a:r>
-              <a:rPr lang="de-DE" sz="2400" b="0" u="sng">
-                <a:solidFill>
-                  <a:srgbClr val="006600"/>
-                </a:solidFill>
-                <a:latin typeface="Calibri Light" panose="020F0302020204030204" pitchFamily="34" charset="0"/>
-                <a:cs typeface="Calibri Light" panose="020F0302020204030204" pitchFamily="34" charset="0"/>
-              </a:rPr>
-              <a:t>resource</a:t>
-            </a:r>
-            <a:r>
-              <a:rPr lang="de-DE" sz="2400" b="0">
-                <a:solidFill>
-                  <a:srgbClr val="006600"/>
-                </a:solidFill>
-                <a:latin typeface="Calibri Light" panose="020F0302020204030204" pitchFamily="34" charset="0"/>
-                <a:cs typeface="Calibri Light" panose="020F0302020204030204" pitchFamily="34" charset="0"/>
-              </a:rPr>
-              <a:t> to a </a:t>
-            </a:r>
-            <a:r>
-              <a:rPr lang="de-DE" sz="2400" b="0" u="sng" smtClean="0">
-                <a:solidFill>
-                  <a:srgbClr val="006600"/>
-                </a:solidFill>
-                <a:latin typeface="Calibri Light" panose="020F0302020204030204" pitchFamily="34" charset="0"/>
-                <a:cs typeface="Calibri Light" panose="020F0302020204030204" pitchFamily="34" charset="0"/>
-              </a:rPr>
-              <a:t>set of resources</a:t>
-            </a:r>
-          </a:p>
-          <a:p>
-            <a:pPr marL="0" indent="0">
-              <a:buNone/>
-            </a:pPr>
-            <a:endParaRPr lang="de-DE" sz="2400" b="0" u="sng">
-              <a:solidFill>
-                <a:srgbClr val="006600"/>
-              </a:solidFill>
-              <a:latin typeface="Calibri Light" panose="020F0302020204030204" pitchFamily="34" charset="0"/>
-              <a:cs typeface="Calibri Light" panose="020F0302020204030204" pitchFamily="34" charset="0"/>
-            </a:endParaRPr>
-          </a:p>
-          <a:p>
-            <a:pPr marL="0" indent="0">
-              <a:buNone/>
-            </a:pPr>
-            <a:r>
-              <a:rPr lang="de-DE" sz="2400" b="0">
-                <a:solidFill>
-                  <a:srgbClr val="006600"/>
-                </a:solidFill>
-                <a:latin typeface="Calibri Light" panose="020F0302020204030204" pitchFamily="34" charset="0"/>
-                <a:cs typeface="Calibri Light" panose="020F0302020204030204" pitchFamily="34" charset="0"/>
-              </a:rPr>
-              <a:t>	</a:t>
-            </a:r>
-            <a:r>
-              <a:rPr lang="de-DE" sz="2400" b="0" smtClean="0">
-                <a:solidFill>
-                  <a:srgbClr val="006600"/>
-                </a:solidFill>
-                <a:latin typeface="Calibri Light" panose="020F0302020204030204" pitchFamily="34" charset="0"/>
-                <a:cs typeface="Calibri Light" panose="020F0302020204030204" pitchFamily="34" charset="0"/>
-              </a:rPr>
-              <a:t>    * Input resource = </a:t>
-            </a:r>
-          </a:p>
-          <a:p>
-            <a:pPr marL="0" indent="0">
-              <a:buNone/>
-            </a:pPr>
-            <a:r>
-              <a:rPr lang="de-DE" sz="2400" b="0">
-                <a:solidFill>
-                  <a:srgbClr val="006600"/>
-                </a:solidFill>
-                <a:latin typeface="Calibri Light" panose="020F0302020204030204" pitchFamily="34" charset="0"/>
-                <a:cs typeface="Calibri Light" panose="020F0302020204030204" pitchFamily="34" charset="0"/>
-              </a:rPr>
-              <a:t> </a:t>
-            </a:r>
-            <a:r>
-              <a:rPr lang="de-DE" sz="2400" b="0" smtClean="0">
-                <a:solidFill>
-                  <a:srgbClr val="006600"/>
-                </a:solidFill>
-                <a:latin typeface="Calibri Light" panose="020F0302020204030204" pitchFamily="34" charset="0"/>
-                <a:cs typeface="Calibri Light" panose="020F0302020204030204" pitchFamily="34" charset="0"/>
-              </a:rPr>
-              <a:t>          		a resource from the target of the parent shape</a:t>
-            </a:r>
-            <a:endParaRPr lang="de-DE" sz="2400" b="0" i="1" smtClean="0">
-              <a:solidFill>
-                <a:srgbClr val="006600"/>
-              </a:solidFill>
-              <a:latin typeface="Calibri Light" panose="020F0302020204030204" pitchFamily="34" charset="0"/>
-              <a:cs typeface="Calibri Light" panose="020F0302020204030204" pitchFamily="34" charset="0"/>
-            </a:endParaRPr>
-          </a:p>
-          <a:p>
-            <a:pPr marL="0" indent="0">
-              <a:buNone/>
-            </a:pPr>
-            <a:r>
-              <a:rPr lang="de-DE" sz="2400" b="0" smtClean="0">
-                <a:solidFill>
-                  <a:srgbClr val="006600"/>
-                </a:solidFill>
-                <a:latin typeface="Calibri Light" panose="020F0302020204030204" pitchFamily="34" charset="0"/>
-                <a:cs typeface="Calibri Light" panose="020F0302020204030204" pitchFamily="34" charset="0"/>
-              </a:rPr>
-              <a:t>	    * Output resources=</a:t>
-            </a:r>
-          </a:p>
-          <a:p>
-            <a:pPr marL="0" indent="0">
-              <a:buNone/>
-            </a:pPr>
-            <a:r>
-              <a:rPr lang="de-DE" sz="2400" b="0">
-                <a:solidFill>
-                  <a:srgbClr val="006600"/>
-                </a:solidFill>
-                <a:latin typeface="Calibri Light" panose="020F0302020204030204" pitchFamily="34" charset="0"/>
-                <a:cs typeface="Calibri Light" panose="020F0302020204030204" pitchFamily="34" charset="0"/>
-              </a:rPr>
-              <a:t>	</a:t>
-            </a:r>
-            <a:r>
-              <a:rPr lang="de-DE" sz="2400" b="0" smtClean="0">
-                <a:solidFill>
-                  <a:srgbClr val="006600"/>
-                </a:solidFill>
-                <a:latin typeface="Calibri Light" panose="020F0302020204030204" pitchFamily="34" charset="0"/>
-                <a:cs typeface="Calibri Light" panose="020F0302020204030204" pitchFamily="34" charset="0"/>
-              </a:rPr>
-              <a:t>	the target of this shape</a:t>
-            </a:r>
-            <a:endParaRPr lang="de-DE" sz="2400" b="0">
-              <a:solidFill>
-                <a:srgbClr val="006600"/>
-              </a:solidFill>
-              <a:latin typeface="Calibri Light" panose="020F0302020204030204" pitchFamily="34" charset="0"/>
-              <a:cs typeface="Calibri Light" panose="020F0302020204030204" pitchFamily="34" charset="0"/>
-            </a:endParaRPr>
-          </a:p>
         </p:txBody>
       </p:sp>
       <p:pic>
         <p:nvPicPr>
-          <p:cNvPr id="7" name="Picture 6"/>
+          <p:cNvPr id="9" name="Picture 8"/>
           <p:cNvPicPr>
             <a:picLocks noChangeAspect="1"/>
           </p:cNvPicPr>
@@ -18076,8 +17726,8 @@
         </p:blipFill>
         <p:spPr>
           <a:xfrm>
-            <a:off x="1190625" y="5517232"/>
-            <a:ext cx="6762750" cy="857250"/>
+            <a:off x="655265" y="5373216"/>
+            <a:ext cx="7877175" cy="1200150"/>
           </a:xfrm>
           <a:prstGeom prst="rect">
             <a:avLst/>
@@ -18087,7 +17737,7 @@
     </p:spTree>
     <p:extLst>
       <p:ext uri="{BB962C8B-B14F-4D97-AF65-F5344CB8AC3E}">
-        <p14:creationId xmlns:p14="http://schemas.microsoft.com/office/powerpoint/2010/main" val="2133009858"/>
+        <p14:creationId xmlns:p14="http://schemas.microsoft.com/office/powerpoint/2010/main" val="2636535453"/>
       </p:ext>
     </p:extLst>
   </p:cSld>
@@ -18149,7 +17799,7 @@
                 <a:latin typeface="Calibri Light" panose="020F0302020204030204" pitchFamily="34" charset="0"/>
                 <a:cs typeface="Calibri Light" panose="020F0302020204030204" pitchFamily="34" charset="0"/>
               </a:rPr>
-              <a:t>Link definition</a:t>
+              <a:t>Target declaration</a:t>
             </a:r>
             <a:endParaRPr lang="de-DE">
               <a:solidFill>
@@ -18184,7 +17834,7 @@
                 <a:latin typeface="Calibri Light" panose="020F0302020204030204" pitchFamily="34" charset="0"/>
                 <a:cs typeface="Calibri Light" panose="020F0302020204030204" pitchFamily="34" charset="0"/>
               </a:rPr>
-              <a:t>A Link Definition is a function:</a:t>
+              <a:t>A target declaration is a function:</a:t>
             </a:r>
           </a:p>
           <a:p>
@@ -18206,44 +17856,6 @@
             </a:endParaRPr>
           </a:p>
           <a:p>
-            <a:r>
-              <a:rPr lang="de-DE" sz="2400" smtClean="0">
-                <a:solidFill>
-                  <a:srgbClr val="006600"/>
-                </a:solidFill>
-                <a:latin typeface="Calibri Light" panose="020F0302020204030204" pitchFamily="34" charset="0"/>
-                <a:cs typeface="Calibri Light" panose="020F0302020204030204" pitchFamily="34" charset="0"/>
-              </a:rPr>
-              <a:t>Schema representation: </a:t>
-            </a:r>
-          </a:p>
-          <a:p>
-            <a:pPr lvl="1"/>
-            <a:r>
-              <a:rPr lang="de-DE" sz="2000" smtClean="0">
-                <a:solidFill>
-                  <a:srgbClr val="006600"/>
-                </a:solidFill>
-                <a:latin typeface="Calibri Light" panose="020F0302020204030204" pitchFamily="34" charset="0"/>
-                <a:cs typeface="Calibri Light" panose="020F0302020204030204" pitchFamily="34" charset="0"/>
-              </a:rPr>
-              <a:t>Either:	&lt;linkDef&gt; element</a:t>
-            </a:r>
-          </a:p>
-          <a:p>
-            <a:pPr lvl="1"/>
-            <a:r>
-              <a:rPr lang="de-DE" sz="2000" smtClean="0">
-                <a:solidFill>
-                  <a:srgbClr val="006600"/>
-                </a:solidFill>
-                <a:latin typeface="Calibri Light" panose="020F0302020204030204" pitchFamily="34" charset="0"/>
-                <a:cs typeface="Calibri Light" panose="020F0302020204030204" pitchFamily="34" charset="0"/>
-              </a:rPr>
-              <a:t>Or:	Attributes and child elements of a „link using element“</a:t>
-            </a:r>
-          </a:p>
-          <a:p>
             <a:endParaRPr lang="de-DE" sz="2400">
               <a:solidFill>
                 <a:srgbClr val="006600"/>
@@ -18253,6 +17865,33 @@
             </a:endParaRPr>
           </a:p>
           <a:p>
+            <a:endParaRPr lang="de-DE" sz="2400" smtClean="0">
+              <a:solidFill>
+                <a:srgbClr val="006600"/>
+              </a:solidFill>
+              <a:latin typeface="Calibri Light" panose="020F0302020204030204" pitchFamily="34" charset="0"/>
+              <a:cs typeface="Calibri Light" panose="020F0302020204030204" pitchFamily="34" charset="0"/>
+            </a:endParaRPr>
+          </a:p>
+          <a:p>
+            <a:endParaRPr lang="de-DE" sz="2400">
+              <a:solidFill>
+                <a:srgbClr val="006600"/>
+              </a:solidFill>
+              <a:latin typeface="Calibri Light" panose="020F0302020204030204" pitchFamily="34" charset="0"/>
+              <a:cs typeface="Calibri Light" panose="020F0302020204030204" pitchFamily="34" charset="0"/>
+            </a:endParaRPr>
+          </a:p>
+          <a:p>
+            <a:endParaRPr lang="de-DE" sz="2400" smtClean="0">
+              <a:solidFill>
+                <a:srgbClr val="006600"/>
+              </a:solidFill>
+              <a:latin typeface="Calibri Light" panose="020F0302020204030204" pitchFamily="34" charset="0"/>
+              <a:cs typeface="Calibri Light" panose="020F0302020204030204" pitchFamily="34" charset="0"/>
+            </a:endParaRPr>
+          </a:p>
+          <a:p>
             <a:r>
               <a:rPr lang="de-DE" sz="2400" smtClean="0">
                 <a:solidFill>
@@ -18261,69 +17900,7 @@
                 <a:latin typeface="Calibri Light" panose="020F0302020204030204" pitchFamily="34" charset="0"/>
                 <a:cs typeface="Calibri Light" panose="020F0302020204030204" pitchFamily="34" charset="0"/>
               </a:rPr>
-              <a:t>Link using elements:</a:t>
-            </a:r>
-          </a:p>
-          <a:p>
-            <a:pPr lvl="1"/>
-            <a:r>
-              <a:rPr lang="de-DE" sz="2000" smtClean="0">
-                <a:solidFill>
-                  <a:srgbClr val="006600"/>
-                </a:solidFill>
-                <a:latin typeface="Calibri Light" panose="020F0302020204030204" pitchFamily="34" charset="0"/>
-                <a:cs typeface="Calibri Light" panose="020F0302020204030204" pitchFamily="34" charset="0"/>
-              </a:rPr>
-              <a:t>Shapes			&lt;file&gt;, &lt;folder&gt;</a:t>
-            </a:r>
-          </a:p>
-          <a:p>
-            <a:pPr lvl="1"/>
-            <a:r>
-              <a:rPr lang="de-DE" sz="2000" smtClean="0">
-                <a:solidFill>
-                  <a:srgbClr val="006600"/>
-                </a:solidFill>
-                <a:latin typeface="Calibri Light" panose="020F0302020204030204" pitchFamily="34" charset="0"/>
-                <a:cs typeface="Calibri Light" panose="020F0302020204030204" pitchFamily="34" charset="0"/>
-              </a:rPr>
-              <a:t>Links constraint		&lt;links&gt;</a:t>
-            </a:r>
-          </a:p>
-          <a:p>
-            <a:pPr lvl="1"/>
-            <a:r>
-              <a:rPr lang="de-DE" sz="2000" smtClean="0">
-                <a:solidFill>
-                  <a:srgbClr val="006600"/>
-                </a:solidFill>
-                <a:latin typeface="Calibri Light" panose="020F0302020204030204" pitchFamily="34" charset="0"/>
-                <a:cs typeface="Calibri Light" panose="020F0302020204030204" pitchFamily="34" charset="0"/>
-              </a:rPr>
-              <a:t>Binary			&lt;valueCompared</a:t>
-            </a:r>
-            <a:r>
-              <a:rPr lang="de-DE" sz="2000" smtClean="0">
-                <a:solidFill>
-                  <a:srgbClr val="006600"/>
-                </a:solidFill>
-                <a:latin typeface="Calibri Light" panose="020F0302020204030204" pitchFamily="34" charset="0"/>
-                <a:cs typeface="Calibri Light" panose="020F0302020204030204" pitchFamily="34" charset="0"/>
-              </a:rPr>
-              <a:t>&gt;, &lt;docSimilar&gt;, … </a:t>
-            </a:r>
-          </a:p>
-          <a:p>
-            <a:pPr lvl="1"/>
-            <a:r>
-              <a:rPr lang="de-DE" sz="2000" smtClean="0">
-                <a:solidFill>
-                  <a:srgbClr val="006600"/>
-                </a:solidFill>
-                <a:latin typeface="Calibri Light" panose="020F0302020204030204" pitchFamily="34" charset="0"/>
-                <a:cs typeface="Calibri Light" panose="020F0302020204030204" pitchFamily="34" charset="0"/>
-              </a:rPr>
-              <a:t>Hyperdoc constraints	&lt;hyperdocTree&gt;</a:t>
+              <a:t>Schema representation: attributes of the shape element</a:t>
             </a:r>
           </a:p>
         </p:txBody>
@@ -18337,7 +17914,7 @@
         <p:spPr>
           <a:xfrm>
             <a:off x="323528" y="2276872"/>
-            <a:ext cx="8820472" cy="461665"/>
+            <a:ext cx="8820472" cy="2308324"/>
           </a:xfrm>
           <a:prstGeom prst="rect">
             <a:avLst/>
@@ -18394,12 +17971,152 @@
               <a:t>set of resources</a:t>
             </a:r>
           </a:p>
+          <a:p>
+            <a:pPr marL="0" indent="0">
+              <a:buNone/>
+            </a:pPr>
+            <a:endParaRPr lang="de-DE" sz="2400" b="0" u="sng">
+              <a:solidFill>
+                <a:srgbClr val="006600"/>
+              </a:solidFill>
+              <a:latin typeface="Calibri Light" panose="020F0302020204030204" pitchFamily="34" charset="0"/>
+              <a:cs typeface="Calibri Light" panose="020F0302020204030204" pitchFamily="34" charset="0"/>
+            </a:endParaRPr>
+          </a:p>
+          <a:p>
+            <a:pPr marL="0" indent="0">
+              <a:buNone/>
+            </a:pPr>
+            <a:r>
+              <a:rPr lang="de-DE" sz="2400" b="0">
+                <a:solidFill>
+                  <a:srgbClr val="006600"/>
+                </a:solidFill>
+                <a:latin typeface="Calibri Light" panose="020F0302020204030204" pitchFamily="34" charset="0"/>
+                <a:cs typeface="Calibri Light" panose="020F0302020204030204" pitchFamily="34" charset="0"/>
+              </a:rPr>
+              <a:t>	</a:t>
+            </a:r>
+            <a:r>
+              <a:rPr lang="de-DE" sz="2400" b="0" smtClean="0">
+                <a:solidFill>
+                  <a:srgbClr val="006600"/>
+                </a:solidFill>
+                <a:latin typeface="Calibri Light" panose="020F0302020204030204" pitchFamily="34" charset="0"/>
+                <a:cs typeface="Calibri Light" panose="020F0302020204030204" pitchFamily="34" charset="0"/>
+              </a:rPr>
+              <a:t>    * Input resource = </a:t>
+            </a:r>
+          </a:p>
+          <a:p>
+            <a:pPr marL="0" indent="0">
+              <a:buNone/>
+            </a:pPr>
+            <a:r>
+              <a:rPr lang="de-DE" sz="2400" b="0">
+                <a:solidFill>
+                  <a:srgbClr val="006600"/>
+                </a:solidFill>
+                <a:latin typeface="Calibri Light" panose="020F0302020204030204" pitchFamily="34" charset="0"/>
+                <a:cs typeface="Calibri Light" panose="020F0302020204030204" pitchFamily="34" charset="0"/>
+              </a:rPr>
+              <a:t> </a:t>
+            </a:r>
+            <a:r>
+              <a:rPr lang="de-DE" sz="2400" b="0" smtClean="0">
+                <a:solidFill>
+                  <a:srgbClr val="006600"/>
+                </a:solidFill>
+                <a:latin typeface="Calibri Light" panose="020F0302020204030204" pitchFamily="34" charset="0"/>
+                <a:cs typeface="Calibri Light" panose="020F0302020204030204" pitchFamily="34" charset="0"/>
+              </a:rPr>
+              <a:t>          		a resource from the target of the parent shape</a:t>
+            </a:r>
+            <a:endParaRPr lang="de-DE" sz="2400" b="0" i="1" smtClean="0">
+              <a:solidFill>
+                <a:srgbClr val="006600"/>
+              </a:solidFill>
+              <a:latin typeface="Calibri Light" panose="020F0302020204030204" pitchFamily="34" charset="0"/>
+              <a:cs typeface="Calibri Light" panose="020F0302020204030204" pitchFamily="34" charset="0"/>
+            </a:endParaRPr>
+          </a:p>
+          <a:p>
+            <a:pPr marL="0" indent="0">
+              <a:buNone/>
+            </a:pPr>
+            <a:r>
+              <a:rPr lang="de-DE" sz="2400" b="0" smtClean="0">
+                <a:solidFill>
+                  <a:srgbClr val="006600"/>
+                </a:solidFill>
+                <a:latin typeface="Calibri Light" panose="020F0302020204030204" pitchFamily="34" charset="0"/>
+                <a:cs typeface="Calibri Light" panose="020F0302020204030204" pitchFamily="34" charset="0"/>
+              </a:rPr>
+              <a:t>	    * Output resources=</a:t>
+            </a:r>
+          </a:p>
+          <a:p>
+            <a:pPr marL="0" indent="0">
+              <a:buNone/>
+            </a:pPr>
+            <a:r>
+              <a:rPr lang="de-DE" sz="2400" b="0">
+                <a:solidFill>
+                  <a:srgbClr val="006600"/>
+                </a:solidFill>
+                <a:latin typeface="Calibri Light" panose="020F0302020204030204" pitchFamily="34" charset="0"/>
+                <a:cs typeface="Calibri Light" panose="020F0302020204030204" pitchFamily="34" charset="0"/>
+              </a:rPr>
+              <a:t>	</a:t>
+            </a:r>
+            <a:r>
+              <a:rPr lang="de-DE" sz="2400" b="0" smtClean="0">
+                <a:solidFill>
+                  <a:srgbClr val="006600"/>
+                </a:solidFill>
+                <a:latin typeface="Calibri Light" panose="020F0302020204030204" pitchFamily="34" charset="0"/>
+                <a:cs typeface="Calibri Light" panose="020F0302020204030204" pitchFamily="34" charset="0"/>
+              </a:rPr>
+              <a:t>	the target of this shape</a:t>
+            </a:r>
+            <a:endParaRPr lang="de-DE" sz="2400" b="0">
+              <a:solidFill>
+                <a:srgbClr val="006600"/>
+              </a:solidFill>
+              <a:latin typeface="Calibri Light" panose="020F0302020204030204" pitchFamily="34" charset="0"/>
+              <a:cs typeface="Calibri Light" panose="020F0302020204030204" pitchFamily="34" charset="0"/>
+            </a:endParaRPr>
+          </a:p>
         </p:txBody>
       </p:sp>
+      <p:pic>
+        <p:nvPicPr>
+          <p:cNvPr id="7" name="Picture 6"/>
+          <p:cNvPicPr>
+            <a:picLocks noChangeAspect="1"/>
+          </p:cNvPicPr>
+          <p:nvPr/>
+        </p:nvPicPr>
+        <p:blipFill>
+          <a:blip r:embed="rId3"/>
+          <a:stretch>
+            <a:fillRect/>
+          </a:stretch>
+        </p:blipFill>
+        <p:spPr>
+          <a:xfrm>
+            <a:off x="1190625" y="5517232"/>
+            <a:ext cx="6762750" cy="857250"/>
+          </a:xfrm>
+          <a:prstGeom prst="rect">
+            <a:avLst/>
+          </a:prstGeom>
+        </p:spPr>
+      </p:pic>
     </p:spTree>
     <p:extLst>
       <p:ext uri="{BB962C8B-B14F-4D97-AF65-F5344CB8AC3E}">
-        <p14:creationId xmlns:p14="http://schemas.microsoft.com/office/powerpoint/2010/main" val="3416836337"/>
+        <p14:creationId xmlns:p14="http://schemas.microsoft.com/office/powerpoint/2010/main" val="2133009858"/>
       </p:ext>
     </p:extLst>
   </p:cSld>
@@ -18461,29 +18178,9 @@
                 <a:latin typeface="Calibri Light" panose="020F0302020204030204" pitchFamily="34" charset="0"/>
                 <a:cs typeface="Calibri Light" panose="020F0302020204030204" pitchFamily="34" charset="0"/>
               </a:rPr>
-              <a:t>Link </a:t>
-            </a:r>
-            <a:r>
-              <a:rPr lang="de-DE" smtClean="0">
-                <a:solidFill>
-                  <a:srgbClr val="006600"/>
-                </a:solidFill>
-                <a:latin typeface="Calibri Light" panose="020F0302020204030204" pitchFamily="34" charset="0"/>
-                <a:cs typeface="Calibri Light" panose="020F0302020204030204" pitchFamily="34" charset="0"/>
-              </a:rPr>
-              <a:t>Definition: </a:t>
-            </a:r>
-            <a:r>
-              <a:rPr lang="de-DE" i="1" smtClean="0">
-                <a:solidFill>
-                  <a:srgbClr val="006600"/>
-                </a:solidFill>
-                <a:latin typeface="Calibri Light" panose="020F0302020204030204" pitchFamily="34" charset="0"/>
-                <a:cs typeface="Calibri Light" panose="020F0302020204030204" pitchFamily="34" charset="0"/>
-              </a:rPr>
-              <a:t>connector types</a:t>
-            </a:r>
-            <a:endParaRPr lang="de-DE" i="1">
+              <a:t>Link definition</a:t>
+            </a:r>
+            <a:endParaRPr lang="de-DE">
               <a:solidFill>
                 <a:srgbClr val="006600"/>
               </a:solidFill>
@@ -18493,40 +18190,173 @@
           </a:p>
         </p:txBody>
       </p:sp>
-      <p:pic>
-        <p:nvPicPr>
-          <p:cNvPr id="5" name="Picture 4"/>
-          <p:cNvPicPr>
-            <a:picLocks noChangeAspect="1"/>
-          </p:cNvPicPr>
-          <p:nvPr/>
-        </p:nvPicPr>
-        <p:blipFill>
-          <a:blip r:embed="rId3"/>
-          <a:stretch>
-            <a:fillRect/>
-          </a:stretch>
-        </p:blipFill>
-        <p:spPr>
-          <a:xfrm>
-            <a:off x="395536" y="2479898"/>
-            <a:ext cx="7343775" cy="3181350"/>
-          </a:xfrm>
-          <a:prstGeom prst="rect">
-            <a:avLst/>
-          </a:prstGeom>
-        </p:spPr>
-      </p:pic>
       <p:sp>
         <p:nvSpPr>
-          <p:cNvPr id="7" name="TextBox 6"/>
+          <p:cNvPr id="3" name="Content Placeholder 2"/>
+          <p:cNvSpPr>
+            <a:spLocks noGrp="1"/>
+          </p:cNvSpPr>
+          <p:nvPr>
+            <p:ph idx="1"/>
+          </p:nvPr>
+        </p:nvSpPr>
+        <p:spPr/>
+        <p:txBody>
+          <a:bodyPr/>
+          <a:lstStyle/>
+          <a:p>
+            <a:r>
+              <a:rPr lang="de-DE" sz="2400" smtClean="0">
+                <a:solidFill>
+                  <a:srgbClr val="006600"/>
+                </a:solidFill>
+                <a:latin typeface="Calibri Light" panose="020F0302020204030204" pitchFamily="34" charset="0"/>
+                <a:cs typeface="Calibri Light" panose="020F0302020204030204" pitchFamily="34" charset="0"/>
+              </a:rPr>
+              <a:t>A Link Definition is a function:</a:t>
+            </a:r>
+          </a:p>
+          <a:p>
+            <a:endParaRPr lang="de-DE" sz="2400">
+              <a:solidFill>
+                <a:srgbClr val="006600"/>
+              </a:solidFill>
+              <a:latin typeface="Calibri Light" panose="020F0302020204030204" pitchFamily="34" charset="0"/>
+              <a:cs typeface="Calibri Light" panose="020F0302020204030204" pitchFamily="34" charset="0"/>
+            </a:endParaRPr>
+          </a:p>
+          <a:p>
+            <a:endParaRPr lang="de-DE" sz="2400" smtClean="0">
+              <a:solidFill>
+                <a:srgbClr val="006600"/>
+              </a:solidFill>
+              <a:latin typeface="Calibri Light" panose="020F0302020204030204" pitchFamily="34" charset="0"/>
+              <a:cs typeface="Calibri Light" panose="020F0302020204030204" pitchFamily="34" charset="0"/>
+            </a:endParaRPr>
+          </a:p>
+          <a:p>
+            <a:r>
+              <a:rPr lang="de-DE" sz="2400" smtClean="0">
+                <a:solidFill>
+                  <a:srgbClr val="006600"/>
+                </a:solidFill>
+                <a:latin typeface="Calibri Light" panose="020F0302020204030204" pitchFamily="34" charset="0"/>
+                <a:cs typeface="Calibri Light" panose="020F0302020204030204" pitchFamily="34" charset="0"/>
+              </a:rPr>
+              <a:t>Schema representation: </a:t>
+            </a:r>
+          </a:p>
+          <a:p>
+            <a:pPr lvl="1"/>
+            <a:r>
+              <a:rPr lang="de-DE" sz="2000" smtClean="0">
+                <a:solidFill>
+                  <a:srgbClr val="006600"/>
+                </a:solidFill>
+                <a:latin typeface="Calibri Light" panose="020F0302020204030204" pitchFamily="34" charset="0"/>
+                <a:cs typeface="Calibri Light" panose="020F0302020204030204" pitchFamily="34" charset="0"/>
+              </a:rPr>
+              <a:t>Either:	&lt;linkDef&gt; element</a:t>
+            </a:r>
+          </a:p>
+          <a:p>
+            <a:pPr lvl="1"/>
+            <a:r>
+              <a:rPr lang="de-DE" sz="2000" smtClean="0">
+                <a:solidFill>
+                  <a:srgbClr val="006600"/>
+                </a:solidFill>
+                <a:latin typeface="Calibri Light" panose="020F0302020204030204" pitchFamily="34" charset="0"/>
+                <a:cs typeface="Calibri Light" panose="020F0302020204030204" pitchFamily="34" charset="0"/>
+              </a:rPr>
+              <a:t>Or:	Attributes and child elements of a „link using element“</a:t>
+            </a:r>
+          </a:p>
+          <a:p>
+            <a:endParaRPr lang="de-DE" sz="2400">
+              <a:solidFill>
+                <a:srgbClr val="006600"/>
+              </a:solidFill>
+              <a:latin typeface="Calibri Light" panose="020F0302020204030204" pitchFamily="34" charset="0"/>
+              <a:cs typeface="Calibri Light" panose="020F0302020204030204" pitchFamily="34" charset="0"/>
+            </a:endParaRPr>
+          </a:p>
+          <a:p>
+            <a:r>
+              <a:rPr lang="de-DE" sz="2400" smtClean="0">
+                <a:solidFill>
+                  <a:srgbClr val="006600"/>
+                </a:solidFill>
+                <a:latin typeface="Calibri Light" panose="020F0302020204030204" pitchFamily="34" charset="0"/>
+                <a:cs typeface="Calibri Light" panose="020F0302020204030204" pitchFamily="34" charset="0"/>
+              </a:rPr>
+              <a:t>Link using elements:</a:t>
+            </a:r>
+          </a:p>
+          <a:p>
+            <a:pPr lvl="1"/>
+            <a:r>
+              <a:rPr lang="de-DE" sz="2000" smtClean="0">
+                <a:solidFill>
+                  <a:srgbClr val="006600"/>
+                </a:solidFill>
+                <a:latin typeface="Calibri Light" panose="020F0302020204030204" pitchFamily="34" charset="0"/>
+                <a:cs typeface="Calibri Light" panose="020F0302020204030204" pitchFamily="34" charset="0"/>
+              </a:rPr>
+              <a:t>Shapes			&lt;file&gt;, &lt;folder&gt;</a:t>
+            </a:r>
+          </a:p>
+          <a:p>
+            <a:pPr lvl="1"/>
+            <a:r>
+              <a:rPr lang="de-DE" sz="2000" smtClean="0">
+                <a:solidFill>
+                  <a:srgbClr val="006600"/>
+                </a:solidFill>
+                <a:latin typeface="Calibri Light" panose="020F0302020204030204" pitchFamily="34" charset="0"/>
+                <a:cs typeface="Calibri Light" panose="020F0302020204030204" pitchFamily="34" charset="0"/>
+              </a:rPr>
+              <a:t>Links constraint		&lt;links&gt;</a:t>
+            </a:r>
+          </a:p>
+          <a:p>
+            <a:pPr lvl="1"/>
+            <a:r>
+              <a:rPr lang="de-DE" sz="2000" smtClean="0">
+                <a:solidFill>
+                  <a:srgbClr val="006600"/>
+                </a:solidFill>
+                <a:latin typeface="Calibri Light" panose="020F0302020204030204" pitchFamily="34" charset="0"/>
+                <a:cs typeface="Calibri Light" panose="020F0302020204030204" pitchFamily="34" charset="0"/>
+              </a:rPr>
+              <a:t>Binary			&lt;valueCompared&gt;, &lt;docSimilar&gt;, … </a:t>
+            </a:r>
+          </a:p>
+          <a:p>
+            <a:pPr lvl="1"/>
+            <a:r>
+              <a:rPr lang="de-DE" sz="2000" smtClean="0">
+                <a:solidFill>
+                  <a:srgbClr val="006600"/>
+                </a:solidFill>
+                <a:latin typeface="Calibri Light" panose="020F0302020204030204" pitchFamily="34" charset="0"/>
+                <a:cs typeface="Calibri Light" panose="020F0302020204030204" pitchFamily="34" charset="0"/>
+              </a:rPr>
+              <a:t>Hyperdoc constraints	&lt;hyperdocTree&gt;</a:t>
+            </a:r>
+          </a:p>
+        </p:txBody>
+      </p:sp>
+      <p:sp>
+        <p:nvSpPr>
+          <p:cNvPr id="5" name="TextBox 4"/>
           <p:cNvSpPr txBox="1"/>
           <p:nvPr/>
         </p:nvSpPr>
         <p:spPr>
           <a:xfrm>
-            <a:off x="467544" y="1988840"/>
-            <a:ext cx="2553904" cy="461665"/>
+            <a:off x="323528" y="2276872"/>
+            <a:ext cx="8820472" cy="461665"/>
           </a:xfrm>
           <a:prstGeom prst="rect">
             <a:avLst/>
@@ -18534,113 +18364,61 @@
           <a:noFill/>
         </p:spPr>
         <p:txBody>
-          <a:bodyPr wrap="none" rtlCol="0">
+          <a:bodyPr wrap="square" rtlCol="0">
             <a:spAutoFit/>
           </a:bodyPr>
           <a:lstStyle/>
           <a:p>
-            <a:r>
-              <a:rPr lang="de-DE" sz="2400" smtClean="0">
+            <a:pPr marL="0" indent="0">
+              <a:buNone/>
+            </a:pPr>
+            <a:r>
+              <a:rPr lang="de-DE" sz="2400" b="0">
                 <a:solidFill>
                   <a:srgbClr val="006600"/>
                 </a:solidFill>
-                <a:latin typeface="Bradley Hand ITC" panose="03070402050302030203" pitchFamily="66" charset="0"/>
-              </a:rPr>
-              <a:t>Connecter: foxpath</a:t>
-            </a:r>
-            <a:endParaRPr lang="de-DE" sz="2400">
-              <a:solidFill>
-                <a:srgbClr val="006600"/>
-              </a:solidFill>
-              <a:latin typeface="Bradley Hand ITC" panose="03070402050302030203" pitchFamily="66" charset="0"/>
-            </a:endParaRPr>
-          </a:p>
-        </p:txBody>
-      </p:sp>
-      <p:sp>
-        <p:nvSpPr>
-          <p:cNvPr id="8" name="TextBox 7"/>
-          <p:cNvSpPr txBox="1"/>
-          <p:nvPr/>
-        </p:nvSpPr>
-        <p:spPr>
-          <a:xfrm>
-            <a:off x="467544" y="3303646"/>
-            <a:ext cx="3518912" cy="461665"/>
-          </a:xfrm>
-          <a:prstGeom prst="rect">
-            <a:avLst/>
-          </a:prstGeom>
-          <a:noFill/>
-        </p:spPr>
-        <p:txBody>
-          <a:bodyPr wrap="none" rtlCol="0">
-            <a:spAutoFit/>
-          </a:bodyPr>
-          <a:lstStyle/>
-          <a:p>
-            <a:r>
-              <a:rPr lang="de-DE" sz="2400" smtClean="0">
+                <a:latin typeface="Calibri Light" panose="020F0302020204030204" pitchFamily="34" charset="0"/>
+                <a:cs typeface="Calibri Light" panose="020F0302020204030204" pitchFamily="34" charset="0"/>
+              </a:rPr>
+              <a:t>	Maps a </a:t>
+            </a:r>
+            <a:r>
+              <a:rPr lang="de-DE" sz="2400" b="0" u="sng">
                 <a:solidFill>
                   <a:srgbClr val="006600"/>
                 </a:solidFill>
-                <a:latin typeface="Bradley Hand ITC" panose="03070402050302030203" pitchFamily="66" charset="0"/>
-              </a:rPr>
-              <a:t>Connecter: href-expression</a:t>
-            </a:r>
-            <a:endParaRPr lang="de-DE" sz="2400">
-              <a:solidFill>
-                <a:srgbClr val="006600"/>
-              </a:solidFill>
-              <a:latin typeface="Bradley Hand ITC" panose="03070402050302030203" pitchFamily="66" charset="0"/>
-            </a:endParaRPr>
-          </a:p>
-        </p:txBody>
-      </p:sp>
-      <p:sp>
-        <p:nvSpPr>
-          <p:cNvPr id="9" name="TextBox 8"/>
-          <p:cNvSpPr txBox="1"/>
-          <p:nvPr/>
-        </p:nvSpPr>
-        <p:spPr>
-          <a:xfrm>
-            <a:off x="467544" y="4551511"/>
-            <a:ext cx="3661580" cy="461665"/>
-          </a:xfrm>
-          <a:prstGeom prst="rect">
-            <a:avLst/>
-          </a:prstGeom>
-          <a:noFill/>
-        </p:spPr>
-        <p:txBody>
-          <a:bodyPr wrap="none" rtlCol="0">
-            <a:spAutoFit/>
-          </a:bodyPr>
-          <a:lstStyle/>
-          <a:p>
-            <a:r>
-              <a:rPr lang="de-DE" sz="2400" smtClean="0">
+                <a:latin typeface="Calibri Light" panose="020F0302020204030204" pitchFamily="34" charset="0"/>
+                <a:cs typeface="Calibri Light" panose="020F0302020204030204" pitchFamily="34" charset="0"/>
+              </a:rPr>
+              <a:t>resource</a:t>
+            </a:r>
+            <a:r>
+              <a:rPr lang="de-DE" sz="2400" b="0">
                 <a:solidFill>
                   <a:srgbClr val="006600"/>
                 </a:solidFill>
-                <a:latin typeface="Bradley Hand ITC" panose="03070402050302030203" pitchFamily="66" charset="0"/>
-              </a:rPr>
-              <a:t>Connecter: URI-expression</a:t>
-            </a:r>
-            <a:endParaRPr lang="de-DE" sz="2400">
-              <a:solidFill>
-                <a:srgbClr val="006600"/>
-              </a:solidFill>
-              <a:latin typeface="Bradley Hand ITC" panose="03070402050302030203" pitchFamily="66" charset="0"/>
-            </a:endParaRPr>
+                <a:latin typeface="Calibri Light" panose="020F0302020204030204" pitchFamily="34" charset="0"/>
+                <a:cs typeface="Calibri Light" panose="020F0302020204030204" pitchFamily="34" charset="0"/>
+              </a:rPr>
+              <a:t> to a </a:t>
+            </a:r>
+            <a:r>
+              <a:rPr lang="de-DE" sz="2400" b="0" u="sng" smtClean="0">
+                <a:solidFill>
+                  <a:srgbClr val="006600"/>
+                </a:solidFill>
+                <a:latin typeface="Calibri Light" panose="020F0302020204030204" pitchFamily="34" charset="0"/>
+                <a:cs typeface="Calibri Light" panose="020F0302020204030204" pitchFamily="34" charset="0"/>
+              </a:rPr>
+              <a:t>set of resources</a:t>
+            </a:r>
           </a:p>
         </p:txBody>
       </p:sp>
     </p:spTree>
     <p:extLst>
       <p:ext uri="{BB962C8B-B14F-4D97-AF65-F5344CB8AC3E}">
-        <p14:creationId xmlns:p14="http://schemas.microsoft.com/office/powerpoint/2010/main" val="3365601398"/>
+        <p14:creationId xmlns:p14="http://schemas.microsoft.com/office/powerpoint/2010/main" val="3416836337"/>
       </p:ext>
     </p:extLst>
   </p:cSld>
@@ -18702,17 +18480,238 @@
                 <a:latin typeface="Calibri Light" panose="020F0302020204030204" pitchFamily="34" charset="0"/>
                 <a:cs typeface="Calibri Light" panose="020F0302020204030204" pitchFamily="34" charset="0"/>
               </a:rPr>
-              <a:t>Global Link Definitions </a:t>
-            </a:r>
-            <a:r>
-              <a:rPr lang="de-DE" smtClean="0">
+              <a:t>Link Definition: </a:t>
+            </a:r>
+            <a:r>
+              <a:rPr lang="de-DE" i="1" smtClean="0">
                 <a:solidFill>
                   <a:srgbClr val="006600"/>
                 </a:solidFill>
                 <a:latin typeface="Calibri Light" panose="020F0302020204030204" pitchFamily="34" charset="0"/>
                 <a:cs typeface="Calibri Light" panose="020F0302020204030204" pitchFamily="34" charset="0"/>
               </a:rPr>
-              <a:t>&lt;linkDef&gt;</a:t>
+              <a:t>connector types</a:t>
+            </a:r>
+            <a:endParaRPr lang="de-DE" i="1">
+              <a:solidFill>
+                <a:srgbClr val="006600"/>
+              </a:solidFill>
+              <a:latin typeface="Calibri Light" panose="020F0302020204030204" pitchFamily="34" charset="0"/>
+              <a:cs typeface="Calibri Light" panose="020F0302020204030204" pitchFamily="34" charset="0"/>
+            </a:endParaRPr>
+          </a:p>
+        </p:txBody>
+      </p:sp>
+      <p:pic>
+        <p:nvPicPr>
+          <p:cNvPr id="5" name="Picture 4"/>
+          <p:cNvPicPr>
+            <a:picLocks noChangeAspect="1"/>
+          </p:cNvPicPr>
+          <p:nvPr/>
+        </p:nvPicPr>
+        <p:blipFill>
+          <a:blip r:embed="rId3"/>
+          <a:stretch>
+            <a:fillRect/>
+          </a:stretch>
+        </p:blipFill>
+        <p:spPr>
+          <a:xfrm>
+            <a:off x="395536" y="2479898"/>
+            <a:ext cx="7343775" cy="3181350"/>
+          </a:xfrm>
+          <a:prstGeom prst="rect">
+            <a:avLst/>
+          </a:prstGeom>
+        </p:spPr>
+      </p:pic>
+      <p:sp>
+        <p:nvSpPr>
+          <p:cNvPr id="7" name="TextBox 6"/>
+          <p:cNvSpPr txBox="1"/>
+          <p:nvPr/>
+        </p:nvSpPr>
+        <p:spPr>
+          <a:xfrm>
+            <a:off x="467544" y="1988840"/>
+            <a:ext cx="2553904" cy="461665"/>
+          </a:xfrm>
+          <a:prstGeom prst="rect">
+            <a:avLst/>
+          </a:prstGeom>
+          <a:noFill/>
+        </p:spPr>
+        <p:txBody>
+          <a:bodyPr wrap="none" rtlCol="0">
+            <a:spAutoFit/>
+          </a:bodyPr>
+          <a:lstStyle/>
+          <a:p>
+            <a:r>
+              <a:rPr lang="de-DE" sz="2400" smtClean="0">
+                <a:solidFill>
+                  <a:srgbClr val="006600"/>
+                </a:solidFill>
+                <a:latin typeface="Bradley Hand ITC" panose="03070402050302030203" pitchFamily="66" charset="0"/>
+              </a:rPr>
+              <a:t>Connecter: foxpath</a:t>
+            </a:r>
+            <a:endParaRPr lang="de-DE" sz="2400">
+              <a:solidFill>
+                <a:srgbClr val="006600"/>
+              </a:solidFill>
+              <a:latin typeface="Bradley Hand ITC" panose="03070402050302030203" pitchFamily="66" charset="0"/>
+            </a:endParaRPr>
+          </a:p>
+        </p:txBody>
+      </p:sp>
+      <p:sp>
+        <p:nvSpPr>
+          <p:cNvPr id="8" name="TextBox 7"/>
+          <p:cNvSpPr txBox="1"/>
+          <p:nvPr/>
+        </p:nvSpPr>
+        <p:spPr>
+          <a:xfrm>
+            <a:off x="467544" y="3303646"/>
+            <a:ext cx="3518912" cy="461665"/>
+          </a:xfrm>
+          <a:prstGeom prst="rect">
+            <a:avLst/>
+          </a:prstGeom>
+          <a:noFill/>
+        </p:spPr>
+        <p:txBody>
+          <a:bodyPr wrap="none" rtlCol="0">
+            <a:spAutoFit/>
+          </a:bodyPr>
+          <a:lstStyle/>
+          <a:p>
+            <a:r>
+              <a:rPr lang="de-DE" sz="2400" smtClean="0">
+                <a:solidFill>
+                  <a:srgbClr val="006600"/>
+                </a:solidFill>
+                <a:latin typeface="Bradley Hand ITC" panose="03070402050302030203" pitchFamily="66" charset="0"/>
+              </a:rPr>
+              <a:t>Connecter: href-expression</a:t>
+            </a:r>
+            <a:endParaRPr lang="de-DE" sz="2400">
+              <a:solidFill>
+                <a:srgbClr val="006600"/>
+              </a:solidFill>
+              <a:latin typeface="Bradley Hand ITC" panose="03070402050302030203" pitchFamily="66" charset="0"/>
+            </a:endParaRPr>
+          </a:p>
+        </p:txBody>
+      </p:sp>
+      <p:sp>
+        <p:nvSpPr>
+          <p:cNvPr id="9" name="TextBox 8"/>
+          <p:cNvSpPr txBox="1"/>
+          <p:nvPr/>
+        </p:nvSpPr>
+        <p:spPr>
+          <a:xfrm>
+            <a:off x="467544" y="4551511"/>
+            <a:ext cx="3661580" cy="461665"/>
+          </a:xfrm>
+          <a:prstGeom prst="rect">
+            <a:avLst/>
+          </a:prstGeom>
+          <a:noFill/>
+        </p:spPr>
+        <p:txBody>
+          <a:bodyPr wrap="none" rtlCol="0">
+            <a:spAutoFit/>
+          </a:bodyPr>
+          <a:lstStyle/>
+          <a:p>
+            <a:r>
+              <a:rPr lang="de-DE" sz="2400" smtClean="0">
+                <a:solidFill>
+                  <a:srgbClr val="006600"/>
+                </a:solidFill>
+                <a:latin typeface="Bradley Hand ITC" panose="03070402050302030203" pitchFamily="66" charset="0"/>
+              </a:rPr>
+              <a:t>Connecter: URI-expression</a:t>
+            </a:r>
+            <a:endParaRPr lang="de-DE" sz="2400">
+              <a:solidFill>
+                <a:srgbClr val="006600"/>
+              </a:solidFill>
+              <a:latin typeface="Bradley Hand ITC" panose="03070402050302030203" pitchFamily="66" charset="0"/>
+            </a:endParaRPr>
+          </a:p>
+        </p:txBody>
+      </p:sp>
+    </p:spTree>
+    <p:extLst>
+      <p:ext uri="{BB962C8B-B14F-4D97-AF65-F5344CB8AC3E}">
+        <p14:creationId xmlns:p14="http://schemas.microsoft.com/office/powerpoint/2010/main" val="3365601398"/>
+      </p:ext>
+    </p:extLst>
+  </p:cSld>
+  <p:clrMapOvr>
+    <a:masterClrMapping/>
+  </p:clrMapOvr>
+  <p:timing>
+    <p:tnLst>
+      <p:par>
+        <p:cTn id="1" dur="indefinite" restart="never" nodeType="tmRoot"/>
+      </p:par>
+    </p:tnLst>
+  </p:timing>
+</p:sld>
+</file>
+
+<file path=ppt/slides/slide19.xml><?xml version="1.0" encoding="utf-8"?>
+<p:sld xmlns:a="http://schemas.openxmlformats.org/drawingml/2006/main" xmlns:r="http://schemas.openxmlformats.org/officeDocument/2006/relationships" xmlns:p="http://schemas.openxmlformats.org/presentationml/2006/main">
+  <p:cSld>
+    <p:spTree>
+      <p:nvGrpSpPr>
+        <p:cNvPr id="1" name=""/>
+        <p:cNvGrpSpPr/>
+        <p:nvPr/>
+      </p:nvGrpSpPr>
+      <p:grpSpPr>
+        <a:xfrm>
+          <a:off x="0" y="0"/>
+          <a:ext cx="0" cy="0"/>
+          <a:chOff x="0" y="0"/>
+          <a:chExt cx="0" cy="0"/>
+        </a:xfrm>
+      </p:grpSpPr>
+      <p:sp>
+        <p:nvSpPr>
+          <p:cNvPr id="2" name="Title 1"/>
+          <p:cNvSpPr>
+            <a:spLocks noGrp="1"/>
+          </p:cNvSpPr>
+          <p:nvPr>
+            <p:ph type="title"/>
+          </p:nvPr>
+        </p:nvSpPr>
+        <p:spPr>
+          <a:xfrm>
+            <a:off x="457200" y="116632"/>
+            <a:ext cx="7543800" cy="1295400"/>
+          </a:xfrm>
+        </p:spPr>
+        <p:txBody>
+          <a:bodyPr/>
+          <a:lstStyle/>
+          <a:p>
+            <a:r>
+              <a:rPr lang="de-DE" smtClean="0">
+                <a:solidFill>
+                  <a:srgbClr val="006600"/>
+                </a:solidFill>
+                <a:latin typeface="Calibri Light" panose="020F0302020204030204" pitchFamily="34" charset="0"/>
+                <a:cs typeface="Calibri Light" panose="020F0302020204030204" pitchFamily="34" charset="0"/>
+              </a:rPr>
+              <a:t>Global Link Definitions &lt;linkDef&gt;</a:t>
             </a:r>
             <a:endParaRPr lang="de-DE">
               <a:solidFill>
@@ -18872,7 +18871,435 @@
 </p:sld>
 </file>
 
-<file path=ppt/slides/slide19.xml><?xml version="1.0" encoding="utf-8"?>
+<file path=ppt/slides/slide2.xml><?xml version="1.0" encoding="utf-8"?>
+<p:sld xmlns:a="http://schemas.openxmlformats.org/drawingml/2006/main" xmlns:r="http://schemas.openxmlformats.org/officeDocument/2006/relationships" xmlns:p="http://schemas.openxmlformats.org/presentationml/2006/main">
+  <p:cSld>
+    <p:spTree>
+      <p:nvGrpSpPr>
+        <p:cNvPr id="1" name=""/>
+        <p:cNvGrpSpPr/>
+        <p:nvPr/>
+      </p:nvGrpSpPr>
+      <p:grpSpPr>
+        <a:xfrm>
+          <a:off x="0" y="0"/>
+          <a:ext cx="0" cy="0"/>
+          <a:chOff x="0" y="0"/>
+          <a:chExt cx="0" cy="0"/>
+        </a:xfrm>
+      </p:grpSpPr>
+      <p:sp>
+        <p:nvSpPr>
+          <p:cNvPr id="2" name="Title 1"/>
+          <p:cNvSpPr>
+            <a:spLocks noGrp="1"/>
+          </p:cNvSpPr>
+          <p:nvPr>
+            <p:ph type="title"/>
+          </p:nvPr>
+        </p:nvSpPr>
+        <p:spPr/>
+        <p:txBody>
+          <a:bodyPr/>
+          <a:lstStyle/>
+          <a:p>
+            <a:r>
+              <a:rPr lang="de-DE" smtClean="0">
+                <a:solidFill>
+                  <a:srgbClr val="006600"/>
+                </a:solidFill>
+                <a:latin typeface="Calibri Light" panose="020F0302020204030204" pitchFamily="34" charset="0"/>
+                <a:cs typeface="Calibri Light" panose="020F0302020204030204" pitchFamily="34" charset="0"/>
+              </a:rPr>
+              <a:t>File system tree validation</a:t>
+            </a:r>
+            <a:endParaRPr lang="de-DE">
+              <a:solidFill>
+                <a:srgbClr val="006600"/>
+              </a:solidFill>
+              <a:latin typeface="Calibri Light" panose="020F0302020204030204" pitchFamily="34" charset="0"/>
+              <a:cs typeface="Calibri Light" panose="020F0302020204030204" pitchFamily="34" charset="0"/>
+            </a:endParaRPr>
+          </a:p>
+        </p:txBody>
+      </p:sp>
+      <p:sp>
+        <p:nvSpPr>
+          <p:cNvPr id="4" name="Date Placeholder 3"/>
+          <p:cNvSpPr>
+            <a:spLocks noGrp="1"/>
+          </p:cNvSpPr>
+          <p:nvPr>
+            <p:ph type="dt" sz="half" idx="10"/>
+          </p:nvPr>
+        </p:nvSpPr>
+        <p:spPr/>
+        <p:txBody>
+          <a:bodyPr/>
+          <a:lstStyle/>
+          <a:p>
+            <a:pPr>
+              <a:defRPr/>
+            </a:pPr>
+            <a:r>
+              <a:rPr lang="de-DE" altLang="de-DE" smtClean="0"/>
+              <a:t>2020-10-08</a:t>
+            </a:r>
+            <a:endParaRPr lang="de-DE" altLang="en-US"/>
+          </a:p>
+        </p:txBody>
+      </p:sp>
+      <p:sp>
+        <p:nvSpPr>
+          <p:cNvPr id="5" name="Footer Placeholder 4"/>
+          <p:cNvSpPr>
+            <a:spLocks noGrp="1"/>
+          </p:cNvSpPr>
+          <p:nvPr>
+            <p:ph type="ftr" sz="quarter" idx="11"/>
+          </p:nvPr>
+        </p:nvSpPr>
+        <p:spPr/>
+        <p:txBody>
+          <a:bodyPr/>
+          <a:lstStyle/>
+          <a:p>
+            <a:pPr>
+              <a:defRPr/>
+            </a:pPr>
+            <a:r>
+              <a:rPr lang="de-DE" altLang="en-US" smtClean="0"/>
+              <a:t>Greenfox</a:t>
+            </a:r>
+            <a:endParaRPr lang="de-DE" altLang="en-US"/>
+          </a:p>
+        </p:txBody>
+      </p:sp>
+      <p:sp>
+        <p:nvSpPr>
+          <p:cNvPr id="6" name="Slide Number Placeholder 5"/>
+          <p:cNvSpPr>
+            <a:spLocks noGrp="1"/>
+          </p:cNvSpPr>
+          <p:nvPr>
+            <p:ph type="sldNum" sz="quarter" idx="12"/>
+          </p:nvPr>
+        </p:nvSpPr>
+        <p:spPr/>
+        <p:txBody>
+          <a:bodyPr/>
+          <a:lstStyle/>
+          <a:p>
+            <a:pPr>
+              <a:defRPr/>
+            </a:pPr>
+            <a:fld id="{F031B2F4-27D1-4E53-97CF-1947CD75B185}" type="slidenum">
+              <a:rPr lang="de-DE" altLang="en-US" smtClean="0"/>
+              <a:pPr>
+                <a:defRPr/>
+              </a:pPr>
+              <a:t>2</a:t>
+            </a:fld>
+            <a:endParaRPr lang="de-DE" altLang="en-US"/>
+          </a:p>
+        </p:txBody>
+      </p:sp>
+      <p:sp>
+        <p:nvSpPr>
+          <p:cNvPr id="7" name="TextBox 6"/>
+          <p:cNvSpPr txBox="1"/>
+          <p:nvPr/>
+        </p:nvSpPr>
+        <p:spPr>
+          <a:xfrm>
+            <a:off x="767467" y="1771025"/>
+            <a:ext cx="7893979" cy="1015663"/>
+          </a:xfrm>
+          <a:prstGeom prst="rect">
+            <a:avLst/>
+          </a:prstGeom>
+          <a:noFill/>
+        </p:spPr>
+        <p:txBody>
+          <a:bodyPr wrap="square" rtlCol="0">
+            <a:spAutoFit/>
+          </a:bodyPr>
+          <a:lstStyle/>
+          <a:p>
+            <a:r>
+              <a:rPr lang="de-DE" sz="2000" smtClean="0">
+                <a:solidFill>
+                  <a:srgbClr val="006600"/>
+                </a:solidFill>
+                <a:latin typeface="Calibri Light" panose="020F0302020204030204" pitchFamily="34" charset="0"/>
+                <a:cs typeface="Calibri Light" panose="020F0302020204030204" pitchFamily="34" charset="0"/>
+              </a:rPr>
+              <a:t>File system tree</a:t>
+            </a:r>
+            <a:r>
+              <a:rPr lang="de-DE" sz="2000" smtClean="0">
+                <a:latin typeface="Calibri Light" panose="020F0302020204030204" pitchFamily="34" charset="0"/>
+                <a:cs typeface="Calibri Light" panose="020F0302020204030204" pitchFamily="34" charset="0"/>
+              </a:rPr>
+              <a:t> =</a:t>
+            </a:r>
+          </a:p>
+          <a:p>
+            <a:r>
+              <a:rPr lang="de-DE" sz="2000" smtClean="0">
+                <a:latin typeface="Calibri Light" panose="020F0302020204030204" pitchFamily="34" charset="0"/>
+                <a:cs typeface="Calibri Light" panose="020F0302020204030204" pitchFamily="34" charset="0"/>
+              </a:rPr>
+              <a:t>   some folder +</a:t>
+            </a:r>
+          </a:p>
+          <a:p>
+            <a:r>
+              <a:rPr lang="de-DE" sz="2000" smtClean="0">
+                <a:latin typeface="Calibri Light" panose="020F0302020204030204" pitchFamily="34" charset="0"/>
+                <a:cs typeface="Calibri Light" panose="020F0302020204030204" pitchFamily="34" charset="0"/>
+              </a:rPr>
+              <a:t>     all folders/files directly or indirectly contained</a:t>
+            </a:r>
+          </a:p>
+        </p:txBody>
+      </p:sp>
+      <p:sp>
+        <p:nvSpPr>
+          <p:cNvPr id="8" name="TextBox 7"/>
+          <p:cNvSpPr txBox="1"/>
+          <p:nvPr/>
+        </p:nvSpPr>
+        <p:spPr>
+          <a:xfrm>
+            <a:off x="792900" y="2906282"/>
+            <a:ext cx="8243596" cy="1015663"/>
+          </a:xfrm>
+          <a:prstGeom prst="rect">
+            <a:avLst/>
+          </a:prstGeom>
+          <a:noFill/>
+        </p:spPr>
+        <p:txBody>
+          <a:bodyPr wrap="square" rtlCol="0">
+            <a:spAutoFit/>
+          </a:bodyPr>
+          <a:lstStyle/>
+          <a:p>
+            <a:r>
+              <a:rPr lang="de-DE" sz="2000" smtClean="0">
+                <a:solidFill>
+                  <a:srgbClr val="006600"/>
+                </a:solidFill>
+                <a:latin typeface="Calibri Light" panose="020F0302020204030204" pitchFamily="34" charset="0"/>
+                <a:cs typeface="Calibri Light" panose="020F0302020204030204" pitchFamily="34" charset="0"/>
+              </a:rPr>
+              <a:t>Validation</a:t>
+            </a:r>
+            <a:r>
+              <a:rPr lang="de-DE" sz="2000" smtClean="0">
+                <a:latin typeface="Calibri Light" panose="020F0302020204030204" pitchFamily="34" charset="0"/>
+                <a:cs typeface="Calibri Light" panose="020F0302020204030204" pitchFamily="34" charset="0"/>
+              </a:rPr>
+              <a:t> =</a:t>
+            </a:r>
+          </a:p>
+          <a:p>
+            <a:r>
+              <a:rPr lang="de-DE" sz="2000" smtClean="0">
+                <a:latin typeface="Calibri Light" panose="020F0302020204030204" pitchFamily="34" charset="0"/>
+                <a:cs typeface="Calibri Light" panose="020F0302020204030204" pitchFamily="34" charset="0"/>
+              </a:rPr>
+              <a:t>   check: conformance to a set of constraints =</a:t>
+            </a:r>
+          </a:p>
+          <a:p>
+            <a:r>
+              <a:rPr lang="de-DE" sz="2000">
+                <a:latin typeface="Calibri Light" panose="020F0302020204030204" pitchFamily="34" charset="0"/>
+                <a:cs typeface="Calibri Light" panose="020F0302020204030204" pitchFamily="34" charset="0"/>
+              </a:rPr>
+              <a:t> </a:t>
+            </a:r>
+            <a:r>
+              <a:rPr lang="de-DE" sz="2000" smtClean="0">
+                <a:latin typeface="Calibri Light" panose="020F0302020204030204" pitchFamily="34" charset="0"/>
+                <a:cs typeface="Calibri Light" panose="020F0302020204030204" pitchFamily="34" charset="0"/>
+              </a:rPr>
+              <a:t>    a „schema“</a:t>
+            </a:r>
+          </a:p>
+        </p:txBody>
+      </p:sp>
+      <p:sp>
+        <p:nvSpPr>
+          <p:cNvPr id="9" name="TextBox 8"/>
+          <p:cNvSpPr txBox="1"/>
+          <p:nvPr/>
+        </p:nvSpPr>
+        <p:spPr>
+          <a:xfrm>
+            <a:off x="808922" y="4049079"/>
+            <a:ext cx="8243596" cy="1015663"/>
+          </a:xfrm>
+          <a:prstGeom prst="rect">
+            <a:avLst/>
+          </a:prstGeom>
+          <a:noFill/>
+        </p:spPr>
+        <p:txBody>
+          <a:bodyPr wrap="square" rtlCol="0">
+            <a:spAutoFit/>
+          </a:bodyPr>
+          <a:lstStyle/>
+          <a:p>
+            <a:r>
+              <a:rPr lang="de-DE" sz="2000" smtClean="0">
+                <a:solidFill>
+                  <a:srgbClr val="006600"/>
+                </a:solidFill>
+                <a:latin typeface="Calibri Light" panose="020F0302020204030204" pitchFamily="34" charset="0"/>
+                <a:cs typeface="Calibri Light" panose="020F0302020204030204" pitchFamily="34" charset="0"/>
+              </a:rPr>
+              <a:t>Validation result</a:t>
+            </a:r>
+            <a:r>
+              <a:rPr lang="de-DE" sz="2000" smtClean="0">
+                <a:latin typeface="Calibri Light" panose="020F0302020204030204" pitchFamily="34" charset="0"/>
+                <a:cs typeface="Calibri Light" panose="020F0302020204030204" pitchFamily="34" charset="0"/>
+              </a:rPr>
+              <a:t> =</a:t>
+            </a:r>
+          </a:p>
+          <a:p>
+            <a:r>
+              <a:rPr lang="de-DE" sz="2000" smtClean="0">
+                <a:latin typeface="Calibri Light" panose="020F0302020204030204" pitchFamily="34" charset="0"/>
+                <a:cs typeface="Calibri Light" panose="020F0302020204030204" pitchFamily="34" charset="0"/>
+              </a:rPr>
+              <a:t>   the outcome of one check:</a:t>
+            </a:r>
+          </a:p>
+          <a:p>
+            <a:r>
+              <a:rPr lang="de-DE" sz="2000" smtClean="0">
+                <a:latin typeface="Calibri Light" panose="020F0302020204030204" pitchFamily="34" charset="0"/>
+                <a:cs typeface="Calibri Light" panose="020F0302020204030204" pitchFamily="34" charset="0"/>
+              </a:rPr>
+              <a:t>     </a:t>
+            </a:r>
+            <a:r>
+              <a:rPr lang="de-DE" sz="2000" i="1" smtClean="0">
+                <a:latin typeface="Calibri Light" panose="020F0302020204030204" pitchFamily="34" charset="0"/>
+                <a:cs typeface="Calibri Light" panose="020F0302020204030204" pitchFamily="34" charset="0"/>
+              </a:rPr>
+              <a:t>single resource</a:t>
+            </a:r>
+            <a:r>
+              <a:rPr lang="de-DE" sz="2000" smtClean="0">
+                <a:latin typeface="Calibri Light" panose="020F0302020204030204" pitchFamily="34" charset="0"/>
+                <a:cs typeface="Calibri Light" panose="020F0302020204030204" pitchFamily="34" charset="0"/>
+              </a:rPr>
+              <a:t> checked against a </a:t>
+            </a:r>
+            <a:r>
+              <a:rPr lang="de-DE" sz="2000" i="1" smtClean="0">
+                <a:latin typeface="Calibri Light" panose="020F0302020204030204" pitchFamily="34" charset="0"/>
+                <a:cs typeface="Calibri Light" panose="020F0302020204030204" pitchFamily="34" charset="0"/>
+              </a:rPr>
+              <a:t>single constraint</a:t>
+            </a:r>
+          </a:p>
+        </p:txBody>
+      </p:sp>
+      <p:sp>
+        <p:nvSpPr>
+          <p:cNvPr id="10" name="TextBox 9"/>
+          <p:cNvSpPr txBox="1"/>
+          <p:nvPr/>
+        </p:nvSpPr>
+        <p:spPr>
+          <a:xfrm>
+            <a:off x="811562" y="5229200"/>
+            <a:ext cx="8243596" cy="1015663"/>
+          </a:xfrm>
+          <a:prstGeom prst="rect">
+            <a:avLst/>
+          </a:prstGeom>
+          <a:noFill/>
+        </p:spPr>
+        <p:txBody>
+          <a:bodyPr wrap="square" rtlCol="0">
+            <a:spAutoFit/>
+          </a:bodyPr>
+          <a:lstStyle/>
+          <a:p>
+            <a:r>
+              <a:rPr lang="de-DE" sz="2000" smtClean="0">
+                <a:solidFill>
+                  <a:srgbClr val="006600"/>
+                </a:solidFill>
+                <a:latin typeface="Calibri Light" panose="020F0302020204030204" pitchFamily="34" charset="0"/>
+                <a:cs typeface="Calibri Light" panose="020F0302020204030204" pitchFamily="34" charset="0"/>
+              </a:rPr>
+              <a:t>Validation report</a:t>
+            </a:r>
+            <a:r>
+              <a:rPr lang="de-DE" sz="2000" smtClean="0">
+                <a:latin typeface="Calibri Light" panose="020F0302020204030204" pitchFamily="34" charset="0"/>
+                <a:cs typeface="Calibri Light" panose="020F0302020204030204" pitchFamily="34" charset="0"/>
+              </a:rPr>
+              <a:t> =</a:t>
+            </a:r>
+          </a:p>
+          <a:p>
+            <a:r>
+              <a:rPr lang="de-DE" sz="2000" smtClean="0">
+                <a:latin typeface="Calibri Light" panose="020F0302020204030204" pitchFamily="34" charset="0"/>
+                <a:cs typeface="Calibri Light" panose="020F0302020204030204" pitchFamily="34" charset="0"/>
+              </a:rPr>
+              <a:t>   collected validation results,</a:t>
+            </a:r>
+          </a:p>
+          <a:p>
+            <a:r>
+              <a:rPr lang="de-DE" sz="2000">
+                <a:latin typeface="Calibri Light" panose="020F0302020204030204" pitchFamily="34" charset="0"/>
+                <a:cs typeface="Calibri Light" panose="020F0302020204030204" pitchFamily="34" charset="0"/>
+              </a:rPr>
+              <a:t> </a:t>
+            </a:r>
+            <a:r>
+              <a:rPr lang="de-DE" sz="2000" smtClean="0">
+                <a:latin typeface="Calibri Light" panose="020F0302020204030204" pitchFamily="34" charset="0"/>
+                <a:cs typeface="Calibri Light" panose="020F0302020204030204" pitchFamily="34" charset="0"/>
+              </a:rPr>
+              <a:t>    mapped to something palatable</a:t>
+            </a:r>
+          </a:p>
+        </p:txBody>
+      </p:sp>
+    </p:spTree>
+    <p:extLst>
+      <p:ext uri="{BB962C8B-B14F-4D97-AF65-F5344CB8AC3E}">
+        <p14:creationId xmlns:p14="http://schemas.microsoft.com/office/powerpoint/2010/main" val="2241998578"/>
+      </p:ext>
+    </p:extLst>
+  </p:cSld>
+  <p:clrMapOvr>
+    <a:masterClrMapping/>
+  </p:clrMapOvr>
+  <p:timing>
+    <p:tnLst>
+      <p:par>
+        <p:cTn id="1" dur="indefinite" restart="never" nodeType="tmRoot"/>
+      </p:par>
+    </p:tnLst>
+  </p:timing>
+</p:sld>
+</file>
+
+<file path=ppt/slides/slide20.xml><?xml version="1.0" encoding="utf-8"?>
 <p:sld xmlns:a="http://schemas.openxmlformats.org/drawingml/2006/main" xmlns:r="http://schemas.openxmlformats.org/officeDocument/2006/relationships" xmlns:p="http://schemas.openxmlformats.org/presentationml/2006/main">
   <p:cSld>
     <p:spTree>
@@ -18964,7 +19391,7 @@
               <a:pPr>
                 <a:defRPr/>
               </a:pPr>
-              <a:t>19</a:t>
+              <a:t>20</a:t>
             </a:fld>
             <a:endParaRPr lang="de-DE" altLang="en-US"/>
           </a:p>
@@ -18998,17 +19425,7 @@
                 <a:latin typeface="Calibri Light" panose="020F0302020204030204" pitchFamily="34" charset="0"/>
                 <a:cs typeface="Calibri Light" panose="020F0302020204030204" pitchFamily="34" charset="0"/>
               </a:rPr>
-              <a:t>Target </a:t>
-            </a:r>
-            <a:r>
-              <a:rPr lang="de-DE" smtClean="0">
-                <a:solidFill>
-                  <a:srgbClr val="006600"/>
-                </a:solidFill>
-                <a:latin typeface="Calibri Light" panose="020F0302020204030204" pitchFamily="34" charset="0"/>
-                <a:cs typeface="Calibri Light" panose="020F0302020204030204" pitchFamily="34" charset="0"/>
-              </a:rPr>
-              <a:t>Declaration </a:t>
+              <a:t>Target Declaration </a:t>
             </a:r>
             <a:r>
               <a:rPr lang="de-DE" i="1" smtClean="0">
@@ -19223,670 +19640,6 @@
     <p:extLst>
       <p:ext uri="{BB962C8B-B14F-4D97-AF65-F5344CB8AC3E}">
         <p14:creationId xmlns:p14="http://schemas.microsoft.com/office/powerpoint/2010/main" val="1574885656"/>
-      </p:ext>
-    </p:extLst>
-  </p:cSld>
-  <p:clrMapOvr>
-    <a:masterClrMapping/>
-  </p:clrMapOvr>
-  <p:timing>
-    <p:tnLst>
-      <p:par>
-        <p:cTn id="1" dur="indefinite" restart="never" nodeType="tmRoot"/>
-      </p:par>
-    </p:tnLst>
-  </p:timing>
-</p:sld>
-</file>
-
-<file path=ppt/slides/slide2.xml><?xml version="1.0" encoding="utf-8"?>
-<p:sld xmlns:a="http://schemas.openxmlformats.org/drawingml/2006/main" xmlns:r="http://schemas.openxmlformats.org/officeDocument/2006/relationships" xmlns:p="http://schemas.openxmlformats.org/presentationml/2006/main">
-  <p:cSld>
-    <p:spTree>
-      <p:nvGrpSpPr>
-        <p:cNvPr id="1" name=""/>
-        <p:cNvGrpSpPr/>
-        <p:nvPr/>
-      </p:nvGrpSpPr>
-      <p:grpSpPr>
-        <a:xfrm>
-          <a:off x="0" y="0"/>
-          <a:ext cx="0" cy="0"/>
-          <a:chOff x="0" y="0"/>
-          <a:chExt cx="0" cy="0"/>
-        </a:xfrm>
-      </p:grpSpPr>
-      <p:sp>
-        <p:nvSpPr>
-          <p:cNvPr id="2" name="Title 1"/>
-          <p:cNvSpPr>
-            <a:spLocks noGrp="1"/>
-          </p:cNvSpPr>
-          <p:nvPr>
-            <p:ph type="title"/>
-          </p:nvPr>
-        </p:nvSpPr>
-        <p:spPr/>
-        <p:txBody>
-          <a:bodyPr/>
-          <a:lstStyle/>
-          <a:p>
-            <a:r>
-              <a:rPr lang="de-DE" smtClean="0">
-                <a:solidFill>
-                  <a:srgbClr val="006600"/>
-                </a:solidFill>
-                <a:latin typeface="Calibri Light" panose="020F0302020204030204" pitchFamily="34" charset="0"/>
-                <a:cs typeface="Calibri Light" panose="020F0302020204030204" pitchFamily="34" charset="0"/>
-              </a:rPr>
-              <a:t>File system tree validation</a:t>
-            </a:r>
-            <a:endParaRPr lang="de-DE">
-              <a:solidFill>
-                <a:srgbClr val="006600"/>
-              </a:solidFill>
-              <a:latin typeface="Calibri Light" panose="020F0302020204030204" pitchFamily="34" charset="0"/>
-              <a:cs typeface="Calibri Light" panose="020F0302020204030204" pitchFamily="34" charset="0"/>
-            </a:endParaRPr>
-          </a:p>
-        </p:txBody>
-      </p:sp>
-      <p:sp>
-        <p:nvSpPr>
-          <p:cNvPr id="4" name="Date Placeholder 3"/>
-          <p:cNvSpPr>
-            <a:spLocks noGrp="1"/>
-          </p:cNvSpPr>
-          <p:nvPr>
-            <p:ph type="dt" sz="half" idx="10"/>
-          </p:nvPr>
-        </p:nvSpPr>
-        <p:spPr/>
-        <p:txBody>
-          <a:bodyPr/>
-          <a:lstStyle/>
-          <a:p>
-            <a:pPr>
-              <a:defRPr/>
-            </a:pPr>
-            <a:r>
-              <a:rPr lang="de-DE" altLang="de-DE" smtClean="0"/>
-              <a:t>2020-10-08</a:t>
-            </a:r>
-            <a:endParaRPr lang="de-DE" altLang="en-US"/>
-          </a:p>
-        </p:txBody>
-      </p:sp>
-      <p:sp>
-        <p:nvSpPr>
-          <p:cNvPr id="5" name="Footer Placeholder 4"/>
-          <p:cNvSpPr>
-            <a:spLocks noGrp="1"/>
-          </p:cNvSpPr>
-          <p:nvPr>
-            <p:ph type="ftr" sz="quarter" idx="11"/>
-          </p:nvPr>
-        </p:nvSpPr>
-        <p:spPr/>
-        <p:txBody>
-          <a:bodyPr/>
-          <a:lstStyle/>
-          <a:p>
-            <a:pPr>
-              <a:defRPr/>
-            </a:pPr>
-            <a:r>
-              <a:rPr lang="de-DE" altLang="en-US" smtClean="0"/>
-              <a:t>Greenfox</a:t>
-            </a:r>
-            <a:endParaRPr lang="de-DE" altLang="en-US"/>
-          </a:p>
-        </p:txBody>
-      </p:sp>
-      <p:sp>
-        <p:nvSpPr>
-          <p:cNvPr id="6" name="Slide Number Placeholder 5"/>
-          <p:cNvSpPr>
-            <a:spLocks noGrp="1"/>
-          </p:cNvSpPr>
-          <p:nvPr>
-            <p:ph type="sldNum" sz="quarter" idx="12"/>
-          </p:nvPr>
-        </p:nvSpPr>
-        <p:spPr/>
-        <p:txBody>
-          <a:bodyPr/>
-          <a:lstStyle/>
-          <a:p>
-            <a:pPr>
-              <a:defRPr/>
-            </a:pPr>
-            <a:fld id="{F031B2F4-27D1-4E53-97CF-1947CD75B185}" type="slidenum">
-              <a:rPr lang="de-DE" altLang="en-US" smtClean="0"/>
-              <a:pPr>
-                <a:defRPr/>
-              </a:pPr>
-              <a:t>2</a:t>
-            </a:fld>
-            <a:endParaRPr lang="de-DE" altLang="en-US"/>
-          </a:p>
-        </p:txBody>
-      </p:sp>
-      <p:sp>
-        <p:nvSpPr>
-          <p:cNvPr id="7" name="TextBox 6"/>
-          <p:cNvSpPr txBox="1"/>
-          <p:nvPr/>
-        </p:nvSpPr>
-        <p:spPr>
-          <a:xfrm>
-            <a:off x="767467" y="1771025"/>
-            <a:ext cx="7893979" cy="1015663"/>
-          </a:xfrm>
-          <a:prstGeom prst="rect">
-            <a:avLst/>
-          </a:prstGeom>
-          <a:noFill/>
-        </p:spPr>
-        <p:txBody>
-          <a:bodyPr wrap="square" rtlCol="0">
-            <a:spAutoFit/>
-          </a:bodyPr>
-          <a:lstStyle/>
-          <a:p>
-            <a:r>
-              <a:rPr lang="de-DE" sz="2000" smtClean="0">
-                <a:solidFill>
-                  <a:srgbClr val="006600"/>
-                </a:solidFill>
-                <a:latin typeface="Calibri Light" panose="020F0302020204030204" pitchFamily="34" charset="0"/>
-                <a:cs typeface="Calibri Light" panose="020F0302020204030204" pitchFamily="34" charset="0"/>
-              </a:rPr>
-              <a:t>File system tree</a:t>
-            </a:r>
-            <a:r>
-              <a:rPr lang="de-DE" sz="2000" smtClean="0">
-                <a:latin typeface="Calibri Light" panose="020F0302020204030204" pitchFamily="34" charset="0"/>
-                <a:cs typeface="Calibri Light" panose="020F0302020204030204" pitchFamily="34" charset="0"/>
-              </a:rPr>
-              <a:t> =</a:t>
-            </a:r>
-          </a:p>
-          <a:p>
-            <a:r>
-              <a:rPr lang="de-DE" sz="2000" smtClean="0">
-                <a:latin typeface="Calibri Light" panose="020F0302020204030204" pitchFamily="34" charset="0"/>
-                <a:cs typeface="Calibri Light" panose="020F0302020204030204" pitchFamily="34" charset="0"/>
-              </a:rPr>
-              <a:t>   some folder +</a:t>
-            </a:r>
-          </a:p>
-          <a:p>
-            <a:r>
-              <a:rPr lang="de-DE" sz="2000" smtClean="0">
-                <a:latin typeface="Calibri Light" panose="020F0302020204030204" pitchFamily="34" charset="0"/>
-                <a:cs typeface="Calibri Light" panose="020F0302020204030204" pitchFamily="34" charset="0"/>
-              </a:rPr>
-              <a:t>     all folders/files directly or indirectly contained</a:t>
-            </a:r>
-          </a:p>
-        </p:txBody>
-      </p:sp>
-      <p:sp>
-        <p:nvSpPr>
-          <p:cNvPr id="8" name="TextBox 7"/>
-          <p:cNvSpPr txBox="1"/>
-          <p:nvPr/>
-        </p:nvSpPr>
-        <p:spPr>
-          <a:xfrm>
-            <a:off x="792900" y="2906282"/>
-            <a:ext cx="8243596" cy="1015663"/>
-          </a:xfrm>
-          <a:prstGeom prst="rect">
-            <a:avLst/>
-          </a:prstGeom>
-          <a:noFill/>
-        </p:spPr>
-        <p:txBody>
-          <a:bodyPr wrap="square" rtlCol="0">
-            <a:spAutoFit/>
-          </a:bodyPr>
-          <a:lstStyle/>
-          <a:p>
-            <a:r>
-              <a:rPr lang="de-DE" sz="2000" smtClean="0">
-                <a:solidFill>
-                  <a:srgbClr val="006600"/>
-                </a:solidFill>
-                <a:latin typeface="Calibri Light" panose="020F0302020204030204" pitchFamily="34" charset="0"/>
-                <a:cs typeface="Calibri Light" panose="020F0302020204030204" pitchFamily="34" charset="0"/>
-              </a:rPr>
-              <a:t>Validation</a:t>
-            </a:r>
-            <a:r>
-              <a:rPr lang="de-DE" sz="2000" smtClean="0">
-                <a:latin typeface="Calibri Light" panose="020F0302020204030204" pitchFamily="34" charset="0"/>
-                <a:cs typeface="Calibri Light" panose="020F0302020204030204" pitchFamily="34" charset="0"/>
-              </a:rPr>
-              <a:t> =</a:t>
-            </a:r>
-          </a:p>
-          <a:p>
-            <a:r>
-              <a:rPr lang="de-DE" sz="2000" smtClean="0">
-                <a:latin typeface="Calibri Light" panose="020F0302020204030204" pitchFamily="34" charset="0"/>
-                <a:cs typeface="Calibri Light" panose="020F0302020204030204" pitchFamily="34" charset="0"/>
-              </a:rPr>
-              <a:t>   check: conformance to a set of constraints =</a:t>
-            </a:r>
-          </a:p>
-          <a:p>
-            <a:r>
-              <a:rPr lang="de-DE" sz="2000">
-                <a:latin typeface="Calibri Light" panose="020F0302020204030204" pitchFamily="34" charset="0"/>
-                <a:cs typeface="Calibri Light" panose="020F0302020204030204" pitchFamily="34" charset="0"/>
-              </a:rPr>
-              <a:t> </a:t>
-            </a:r>
-            <a:r>
-              <a:rPr lang="de-DE" sz="2000" smtClean="0">
-                <a:latin typeface="Calibri Light" panose="020F0302020204030204" pitchFamily="34" charset="0"/>
-                <a:cs typeface="Calibri Light" panose="020F0302020204030204" pitchFamily="34" charset="0"/>
-              </a:rPr>
-              <a:t>    a „schema“</a:t>
-            </a:r>
-          </a:p>
-        </p:txBody>
-      </p:sp>
-      <p:sp>
-        <p:nvSpPr>
-          <p:cNvPr id="9" name="TextBox 8"/>
-          <p:cNvSpPr txBox="1"/>
-          <p:nvPr/>
-        </p:nvSpPr>
-        <p:spPr>
-          <a:xfrm>
-            <a:off x="808922" y="4049079"/>
-            <a:ext cx="8243596" cy="1015663"/>
-          </a:xfrm>
-          <a:prstGeom prst="rect">
-            <a:avLst/>
-          </a:prstGeom>
-          <a:noFill/>
-        </p:spPr>
-        <p:txBody>
-          <a:bodyPr wrap="square" rtlCol="0">
-            <a:spAutoFit/>
-          </a:bodyPr>
-          <a:lstStyle/>
-          <a:p>
-            <a:r>
-              <a:rPr lang="de-DE" sz="2000" smtClean="0">
-                <a:solidFill>
-                  <a:srgbClr val="006600"/>
-                </a:solidFill>
-                <a:latin typeface="Calibri Light" panose="020F0302020204030204" pitchFamily="34" charset="0"/>
-                <a:cs typeface="Calibri Light" panose="020F0302020204030204" pitchFamily="34" charset="0"/>
-              </a:rPr>
-              <a:t>Validation result</a:t>
-            </a:r>
-            <a:r>
-              <a:rPr lang="de-DE" sz="2000" smtClean="0">
-                <a:latin typeface="Calibri Light" panose="020F0302020204030204" pitchFamily="34" charset="0"/>
-                <a:cs typeface="Calibri Light" panose="020F0302020204030204" pitchFamily="34" charset="0"/>
-              </a:rPr>
-              <a:t> =</a:t>
-            </a:r>
-          </a:p>
-          <a:p>
-            <a:r>
-              <a:rPr lang="de-DE" sz="2000" smtClean="0">
-                <a:latin typeface="Calibri Light" panose="020F0302020204030204" pitchFamily="34" charset="0"/>
-                <a:cs typeface="Calibri Light" panose="020F0302020204030204" pitchFamily="34" charset="0"/>
-              </a:rPr>
-              <a:t>   the outcome of one check:</a:t>
-            </a:r>
-          </a:p>
-          <a:p>
-            <a:r>
-              <a:rPr lang="de-DE" sz="2000" smtClean="0">
-                <a:latin typeface="Calibri Light" panose="020F0302020204030204" pitchFamily="34" charset="0"/>
-                <a:cs typeface="Calibri Light" panose="020F0302020204030204" pitchFamily="34" charset="0"/>
-              </a:rPr>
-              <a:t>     </a:t>
-            </a:r>
-            <a:r>
-              <a:rPr lang="de-DE" sz="2000" i="1" smtClean="0">
-                <a:latin typeface="Calibri Light" panose="020F0302020204030204" pitchFamily="34" charset="0"/>
-                <a:cs typeface="Calibri Light" panose="020F0302020204030204" pitchFamily="34" charset="0"/>
-              </a:rPr>
-              <a:t>single resource</a:t>
-            </a:r>
-            <a:r>
-              <a:rPr lang="de-DE" sz="2000" smtClean="0">
-                <a:latin typeface="Calibri Light" panose="020F0302020204030204" pitchFamily="34" charset="0"/>
-                <a:cs typeface="Calibri Light" panose="020F0302020204030204" pitchFamily="34" charset="0"/>
-              </a:rPr>
-              <a:t> checked against a </a:t>
-            </a:r>
-            <a:r>
-              <a:rPr lang="de-DE" sz="2000" i="1" smtClean="0">
-                <a:latin typeface="Calibri Light" panose="020F0302020204030204" pitchFamily="34" charset="0"/>
-                <a:cs typeface="Calibri Light" panose="020F0302020204030204" pitchFamily="34" charset="0"/>
-              </a:rPr>
-              <a:t>single constraint</a:t>
-            </a:r>
-          </a:p>
-        </p:txBody>
-      </p:sp>
-      <p:sp>
-        <p:nvSpPr>
-          <p:cNvPr id="10" name="TextBox 9"/>
-          <p:cNvSpPr txBox="1"/>
-          <p:nvPr/>
-        </p:nvSpPr>
-        <p:spPr>
-          <a:xfrm>
-            <a:off x="811562" y="5229200"/>
-            <a:ext cx="8243596" cy="1015663"/>
-          </a:xfrm>
-          <a:prstGeom prst="rect">
-            <a:avLst/>
-          </a:prstGeom>
-          <a:noFill/>
-        </p:spPr>
-        <p:txBody>
-          <a:bodyPr wrap="square" rtlCol="0">
-            <a:spAutoFit/>
-          </a:bodyPr>
-          <a:lstStyle/>
-          <a:p>
-            <a:r>
-              <a:rPr lang="de-DE" sz="2000" smtClean="0">
-                <a:solidFill>
-                  <a:srgbClr val="006600"/>
-                </a:solidFill>
-                <a:latin typeface="Calibri Light" panose="020F0302020204030204" pitchFamily="34" charset="0"/>
-                <a:cs typeface="Calibri Light" panose="020F0302020204030204" pitchFamily="34" charset="0"/>
-              </a:rPr>
-              <a:t>Validation report</a:t>
-            </a:r>
-            <a:r>
-              <a:rPr lang="de-DE" sz="2000" smtClean="0">
-                <a:latin typeface="Calibri Light" panose="020F0302020204030204" pitchFamily="34" charset="0"/>
-                <a:cs typeface="Calibri Light" panose="020F0302020204030204" pitchFamily="34" charset="0"/>
-              </a:rPr>
-              <a:t> =</a:t>
-            </a:r>
-          </a:p>
-          <a:p>
-            <a:r>
-              <a:rPr lang="de-DE" sz="2000" smtClean="0">
-                <a:latin typeface="Calibri Light" panose="020F0302020204030204" pitchFamily="34" charset="0"/>
-                <a:cs typeface="Calibri Light" panose="020F0302020204030204" pitchFamily="34" charset="0"/>
-              </a:rPr>
-              <a:t>   collected validation results,</a:t>
-            </a:r>
-          </a:p>
-          <a:p>
-            <a:r>
-              <a:rPr lang="de-DE" sz="2000">
-                <a:latin typeface="Calibri Light" panose="020F0302020204030204" pitchFamily="34" charset="0"/>
-                <a:cs typeface="Calibri Light" panose="020F0302020204030204" pitchFamily="34" charset="0"/>
-              </a:rPr>
-              <a:t> </a:t>
-            </a:r>
-            <a:r>
-              <a:rPr lang="de-DE" sz="2000" smtClean="0">
-                <a:latin typeface="Calibri Light" panose="020F0302020204030204" pitchFamily="34" charset="0"/>
-                <a:cs typeface="Calibri Light" panose="020F0302020204030204" pitchFamily="34" charset="0"/>
-              </a:rPr>
-              <a:t>    mapped to something palatable</a:t>
-            </a:r>
-          </a:p>
-        </p:txBody>
-      </p:sp>
-    </p:spTree>
-    <p:extLst>
-      <p:ext uri="{BB962C8B-B14F-4D97-AF65-F5344CB8AC3E}">
-        <p14:creationId xmlns:p14="http://schemas.microsoft.com/office/powerpoint/2010/main" val="2241998578"/>
-      </p:ext>
-    </p:extLst>
-  </p:cSld>
-  <p:clrMapOvr>
-    <a:masterClrMapping/>
-  </p:clrMapOvr>
-  <p:timing>
-    <p:tnLst>
-      <p:par>
-        <p:cTn id="1" dur="indefinite" restart="never" nodeType="tmRoot"/>
-      </p:par>
-    </p:tnLst>
-  </p:timing>
-</p:sld>
-</file>
-
-<file path=ppt/slides/slide20.xml><?xml version="1.0" encoding="utf-8"?>
-<p:sld xmlns:a="http://schemas.openxmlformats.org/drawingml/2006/main" xmlns:r="http://schemas.openxmlformats.org/officeDocument/2006/relationships" xmlns:p="http://schemas.openxmlformats.org/presentationml/2006/main">
-  <p:cSld>
-    <p:spTree>
-      <p:nvGrpSpPr>
-        <p:cNvPr id="1" name=""/>
-        <p:cNvGrpSpPr/>
-        <p:nvPr/>
-      </p:nvGrpSpPr>
-      <p:grpSpPr>
-        <a:xfrm>
-          <a:off x="0" y="0"/>
-          <a:ext cx="0" cy="0"/>
-          <a:chOff x="0" y="0"/>
-          <a:chExt cx="0" cy="0"/>
-        </a:xfrm>
-      </p:grpSpPr>
-      <p:sp>
-        <p:nvSpPr>
-          <p:cNvPr id="2" name="Title 1"/>
-          <p:cNvSpPr>
-            <a:spLocks noGrp="1"/>
-          </p:cNvSpPr>
-          <p:nvPr>
-            <p:ph type="title"/>
-          </p:nvPr>
-        </p:nvSpPr>
-        <p:spPr>
-          <a:xfrm>
-            <a:off x="457200" y="116632"/>
-            <a:ext cx="7543800" cy="1295400"/>
-          </a:xfrm>
-        </p:spPr>
-        <p:txBody>
-          <a:bodyPr/>
-          <a:lstStyle/>
-          <a:p>
-            <a:r>
-              <a:rPr lang="de-DE" smtClean="0">
-                <a:solidFill>
-                  <a:srgbClr val="006600"/>
-                </a:solidFill>
-                <a:latin typeface="Calibri Light" panose="020F0302020204030204" pitchFamily="34" charset="0"/>
-                <a:cs typeface="Calibri Light" panose="020F0302020204030204" pitchFamily="34" charset="0"/>
-              </a:rPr>
-              <a:t>Link </a:t>
-            </a:r>
-            <a:r>
-              <a:rPr lang="de-DE" smtClean="0">
-                <a:solidFill>
-                  <a:srgbClr val="006600"/>
-                </a:solidFill>
-                <a:latin typeface="Calibri Light" panose="020F0302020204030204" pitchFamily="34" charset="0"/>
-                <a:cs typeface="Calibri Light" panose="020F0302020204030204" pitchFamily="34" charset="0"/>
-              </a:rPr>
-              <a:t>constraints</a:t>
-            </a:r>
-            <a:endParaRPr lang="de-DE">
-              <a:solidFill>
-                <a:srgbClr val="006600"/>
-              </a:solidFill>
-              <a:latin typeface="Calibri Light" panose="020F0302020204030204" pitchFamily="34" charset="0"/>
-              <a:cs typeface="Calibri Light" panose="020F0302020204030204" pitchFamily="34" charset="0"/>
-            </a:endParaRPr>
-          </a:p>
-        </p:txBody>
-      </p:sp>
-      <p:pic>
-        <p:nvPicPr>
-          <p:cNvPr id="5" name="Picture 4"/>
-          <p:cNvPicPr>
-            <a:picLocks noChangeAspect="1"/>
-          </p:cNvPicPr>
-          <p:nvPr/>
-        </p:nvPicPr>
-        <p:blipFill>
-          <a:blip r:embed="rId3"/>
-          <a:stretch>
-            <a:fillRect/>
-          </a:stretch>
-        </p:blipFill>
-        <p:spPr>
-          <a:xfrm>
-            <a:off x="467544" y="2420888"/>
-            <a:ext cx="4638675" cy="2505075"/>
-          </a:xfrm>
-          <a:prstGeom prst="rect">
-            <a:avLst/>
-          </a:prstGeom>
-        </p:spPr>
-      </p:pic>
-      <p:sp>
-        <p:nvSpPr>
-          <p:cNvPr id="6" name="TextBox 5"/>
-          <p:cNvSpPr txBox="1"/>
-          <p:nvPr/>
-        </p:nvSpPr>
-        <p:spPr>
-          <a:xfrm>
-            <a:off x="467544" y="1988840"/>
-            <a:ext cx="7795724" cy="461665"/>
-          </a:xfrm>
-          <a:prstGeom prst="rect">
-            <a:avLst/>
-          </a:prstGeom>
-          <a:noFill/>
-        </p:spPr>
-        <p:txBody>
-          <a:bodyPr wrap="none" rtlCol="0">
-            <a:spAutoFit/>
-          </a:bodyPr>
-          <a:lstStyle/>
-          <a:p>
-            <a:r>
-              <a:rPr lang="de-DE" sz="2400" b="0" smtClean="0">
-                <a:solidFill>
-                  <a:srgbClr val="006600"/>
-                </a:solidFill>
-                <a:latin typeface="Bradley Hand ITC" panose="03070402050302030203" pitchFamily="66" charset="0"/>
-              </a:rPr>
-              <a:t>Links </a:t>
-            </a:r>
-            <a:r>
-              <a:rPr lang="de-DE" sz="2400" smtClean="0">
-                <a:solidFill>
-                  <a:srgbClr val="006600"/>
-                </a:solidFill>
-                <a:latin typeface="Bradley Hand ITC" panose="03070402050302030203" pitchFamily="66" charset="0"/>
-              </a:rPr>
-              <a:t>resolvable</a:t>
-            </a:r>
-            <a:r>
-              <a:rPr lang="de-DE" sz="2400" b="0" smtClean="0">
-                <a:solidFill>
-                  <a:srgbClr val="006600"/>
-                </a:solidFill>
-                <a:latin typeface="Bradley Hand ITC" panose="03070402050302030203" pitchFamily="66" charset="0"/>
-              </a:rPr>
-              <a:t> and yield </a:t>
-            </a:r>
-            <a:r>
-              <a:rPr lang="de-DE" sz="2400" smtClean="0">
-                <a:solidFill>
-                  <a:srgbClr val="006600"/>
-                </a:solidFill>
-                <a:latin typeface="Bradley Hand ITC" panose="03070402050302030203" pitchFamily="66" charset="0"/>
-              </a:rPr>
-              <a:t>at least one</a:t>
-            </a:r>
-            <a:r>
-              <a:rPr lang="de-DE" sz="2400" b="0" smtClean="0">
-                <a:solidFill>
-                  <a:srgbClr val="006600"/>
-                </a:solidFill>
-                <a:latin typeface="Bradley Hand ITC" panose="03070402050302030203" pitchFamily="66" charset="0"/>
-              </a:rPr>
-              <a:t> link target resource</a:t>
-            </a:r>
-            <a:endParaRPr lang="de-DE" sz="2400" b="0">
-              <a:solidFill>
-                <a:srgbClr val="006600"/>
-              </a:solidFill>
-              <a:latin typeface="Bradley Hand ITC" panose="03070402050302030203" pitchFamily="66" charset="0"/>
-            </a:endParaRPr>
-          </a:p>
-        </p:txBody>
-      </p:sp>
-      <p:sp>
-        <p:nvSpPr>
-          <p:cNvPr id="8" name="TextBox 7"/>
-          <p:cNvSpPr txBox="1"/>
-          <p:nvPr/>
-        </p:nvSpPr>
-        <p:spPr>
-          <a:xfrm>
-            <a:off x="471456" y="3831431"/>
-            <a:ext cx="4413388" cy="461665"/>
-          </a:xfrm>
-          <a:prstGeom prst="rect">
-            <a:avLst/>
-          </a:prstGeom>
-          <a:noFill/>
-        </p:spPr>
-        <p:txBody>
-          <a:bodyPr wrap="none" rtlCol="0">
-            <a:spAutoFit/>
-          </a:bodyPr>
-          <a:lstStyle/>
-          <a:p>
-            <a:r>
-              <a:rPr lang="de-DE" sz="2400" smtClean="0">
-                <a:solidFill>
-                  <a:srgbClr val="006600"/>
-                </a:solidFill>
-                <a:latin typeface="Bradley Hand ITC" panose="03070402050302030203" pitchFamily="66" charset="0"/>
-              </a:rPr>
-              <a:t>Exactly one</a:t>
-            </a:r>
-            <a:r>
-              <a:rPr lang="de-DE" sz="2400" b="0" smtClean="0">
-                <a:solidFill>
-                  <a:srgbClr val="006600"/>
-                </a:solidFill>
-                <a:latin typeface="Bradley Hand ITC" panose="03070402050302030203" pitchFamily="66" charset="0"/>
-              </a:rPr>
-              <a:t> link target resource</a:t>
-            </a:r>
-            <a:endParaRPr lang="de-DE" sz="2400" b="0">
-              <a:solidFill>
-                <a:srgbClr val="006600"/>
-              </a:solidFill>
-              <a:latin typeface="Bradley Hand ITC" panose="03070402050302030203" pitchFamily="66" charset="0"/>
-            </a:endParaRPr>
-          </a:p>
-        </p:txBody>
-      </p:sp>
-    </p:spTree>
-    <p:extLst>
-      <p:ext uri="{BB962C8B-B14F-4D97-AF65-F5344CB8AC3E}">
-        <p14:creationId xmlns:p14="http://schemas.microsoft.com/office/powerpoint/2010/main" val="1732630876"/>
       </p:ext>
     </p:extLst>
   </p:cSld>
@@ -19948,6 +19701,232 @@
                 <a:latin typeface="Calibri Light" panose="020F0302020204030204" pitchFamily="34" charset="0"/>
                 <a:cs typeface="Calibri Light" panose="020F0302020204030204" pitchFamily="34" charset="0"/>
               </a:rPr>
+              <a:t>Link constraints</a:t>
+            </a:r>
+            <a:endParaRPr lang="de-DE">
+              <a:solidFill>
+                <a:srgbClr val="006600"/>
+              </a:solidFill>
+              <a:latin typeface="Calibri Light" panose="020F0302020204030204" pitchFamily="34" charset="0"/>
+              <a:cs typeface="Calibri Light" panose="020F0302020204030204" pitchFamily="34" charset="0"/>
+            </a:endParaRPr>
+          </a:p>
+        </p:txBody>
+      </p:sp>
+      <p:pic>
+        <p:nvPicPr>
+          <p:cNvPr id="5" name="Picture 4"/>
+          <p:cNvPicPr>
+            <a:picLocks noChangeAspect="1"/>
+          </p:cNvPicPr>
+          <p:nvPr/>
+        </p:nvPicPr>
+        <p:blipFill>
+          <a:blip r:embed="rId3"/>
+          <a:stretch>
+            <a:fillRect/>
+          </a:stretch>
+        </p:blipFill>
+        <p:spPr>
+          <a:xfrm>
+            <a:off x="467544" y="2420888"/>
+            <a:ext cx="4638675" cy="2505075"/>
+          </a:xfrm>
+          <a:prstGeom prst="rect">
+            <a:avLst/>
+          </a:prstGeom>
+        </p:spPr>
+      </p:pic>
+      <p:sp>
+        <p:nvSpPr>
+          <p:cNvPr id="6" name="TextBox 5"/>
+          <p:cNvSpPr txBox="1"/>
+          <p:nvPr/>
+        </p:nvSpPr>
+        <p:spPr>
+          <a:xfrm>
+            <a:off x="467544" y="1988840"/>
+            <a:ext cx="7795724" cy="461665"/>
+          </a:xfrm>
+          <a:prstGeom prst="rect">
+            <a:avLst/>
+          </a:prstGeom>
+          <a:noFill/>
+        </p:spPr>
+        <p:txBody>
+          <a:bodyPr wrap="none" rtlCol="0">
+            <a:spAutoFit/>
+          </a:bodyPr>
+          <a:lstStyle/>
+          <a:p>
+            <a:r>
+              <a:rPr lang="de-DE" sz="2400" b="0" smtClean="0">
+                <a:solidFill>
+                  <a:srgbClr val="006600"/>
+                </a:solidFill>
+                <a:latin typeface="Bradley Hand ITC" panose="03070402050302030203" pitchFamily="66" charset="0"/>
+              </a:rPr>
+              <a:t>Links </a:t>
+            </a:r>
+            <a:r>
+              <a:rPr lang="de-DE" sz="2400" smtClean="0">
+                <a:solidFill>
+                  <a:srgbClr val="006600"/>
+                </a:solidFill>
+                <a:latin typeface="Bradley Hand ITC" panose="03070402050302030203" pitchFamily="66" charset="0"/>
+              </a:rPr>
+              <a:t>resolvable</a:t>
+            </a:r>
+            <a:r>
+              <a:rPr lang="de-DE" sz="2400" b="0" smtClean="0">
+                <a:solidFill>
+                  <a:srgbClr val="006600"/>
+                </a:solidFill>
+                <a:latin typeface="Bradley Hand ITC" panose="03070402050302030203" pitchFamily="66" charset="0"/>
+              </a:rPr>
+              <a:t> and yield </a:t>
+            </a:r>
+            <a:r>
+              <a:rPr lang="de-DE" sz="2400" smtClean="0">
+                <a:solidFill>
+                  <a:srgbClr val="006600"/>
+                </a:solidFill>
+                <a:latin typeface="Bradley Hand ITC" panose="03070402050302030203" pitchFamily="66" charset="0"/>
+              </a:rPr>
+              <a:t>at least one</a:t>
+            </a:r>
+            <a:r>
+              <a:rPr lang="de-DE" sz="2400" b="0" smtClean="0">
+                <a:solidFill>
+                  <a:srgbClr val="006600"/>
+                </a:solidFill>
+                <a:latin typeface="Bradley Hand ITC" panose="03070402050302030203" pitchFamily="66" charset="0"/>
+              </a:rPr>
+              <a:t> link target resource</a:t>
+            </a:r>
+            <a:endParaRPr lang="de-DE" sz="2400" b="0">
+              <a:solidFill>
+                <a:srgbClr val="006600"/>
+              </a:solidFill>
+              <a:latin typeface="Bradley Hand ITC" panose="03070402050302030203" pitchFamily="66" charset="0"/>
+            </a:endParaRPr>
+          </a:p>
+        </p:txBody>
+      </p:sp>
+      <p:sp>
+        <p:nvSpPr>
+          <p:cNvPr id="8" name="TextBox 7"/>
+          <p:cNvSpPr txBox="1"/>
+          <p:nvPr/>
+        </p:nvSpPr>
+        <p:spPr>
+          <a:xfrm>
+            <a:off x="471456" y="3831431"/>
+            <a:ext cx="4413388" cy="461665"/>
+          </a:xfrm>
+          <a:prstGeom prst="rect">
+            <a:avLst/>
+          </a:prstGeom>
+          <a:noFill/>
+        </p:spPr>
+        <p:txBody>
+          <a:bodyPr wrap="none" rtlCol="0">
+            <a:spAutoFit/>
+          </a:bodyPr>
+          <a:lstStyle/>
+          <a:p>
+            <a:r>
+              <a:rPr lang="de-DE" sz="2400" smtClean="0">
+                <a:solidFill>
+                  <a:srgbClr val="006600"/>
+                </a:solidFill>
+                <a:latin typeface="Bradley Hand ITC" panose="03070402050302030203" pitchFamily="66" charset="0"/>
+              </a:rPr>
+              <a:t>Exactly one</a:t>
+            </a:r>
+            <a:r>
+              <a:rPr lang="de-DE" sz="2400" b="0" smtClean="0">
+                <a:solidFill>
+                  <a:srgbClr val="006600"/>
+                </a:solidFill>
+                <a:latin typeface="Bradley Hand ITC" panose="03070402050302030203" pitchFamily="66" charset="0"/>
+              </a:rPr>
+              <a:t> link target resource</a:t>
+            </a:r>
+            <a:endParaRPr lang="de-DE" sz="2400" b="0">
+              <a:solidFill>
+                <a:srgbClr val="006600"/>
+              </a:solidFill>
+              <a:latin typeface="Bradley Hand ITC" panose="03070402050302030203" pitchFamily="66" charset="0"/>
+            </a:endParaRPr>
+          </a:p>
+        </p:txBody>
+      </p:sp>
+    </p:spTree>
+    <p:extLst>
+      <p:ext uri="{BB962C8B-B14F-4D97-AF65-F5344CB8AC3E}">
+        <p14:creationId xmlns:p14="http://schemas.microsoft.com/office/powerpoint/2010/main" val="1732630876"/>
+      </p:ext>
+    </p:extLst>
+  </p:cSld>
+  <p:clrMapOvr>
+    <a:masterClrMapping/>
+  </p:clrMapOvr>
+  <p:timing>
+    <p:tnLst>
+      <p:par>
+        <p:cTn id="1" dur="indefinite" restart="never" nodeType="tmRoot"/>
+      </p:par>
+    </p:tnLst>
+  </p:timing>
+</p:sld>
+</file>
+
+<file path=ppt/slides/slide22.xml><?xml version="1.0" encoding="utf-8"?>
+<p:sld xmlns:a="http://schemas.openxmlformats.org/drawingml/2006/main" xmlns:r="http://schemas.openxmlformats.org/officeDocument/2006/relationships" xmlns:p="http://schemas.openxmlformats.org/presentationml/2006/main">
+  <p:cSld>
+    <p:spTree>
+      <p:nvGrpSpPr>
+        <p:cNvPr id="1" name=""/>
+        <p:cNvGrpSpPr/>
+        <p:nvPr/>
+      </p:nvGrpSpPr>
+      <p:grpSpPr>
+        <a:xfrm>
+          <a:off x="0" y="0"/>
+          <a:ext cx="0" cy="0"/>
+          <a:chOff x="0" y="0"/>
+          <a:chExt cx="0" cy="0"/>
+        </a:xfrm>
+      </p:grpSpPr>
+      <p:sp>
+        <p:nvSpPr>
+          <p:cNvPr id="2" name="Title 1"/>
+          <p:cNvSpPr>
+            <a:spLocks noGrp="1"/>
+          </p:cNvSpPr>
+          <p:nvPr>
+            <p:ph type="title"/>
+          </p:nvPr>
+        </p:nvSpPr>
+        <p:spPr>
+          <a:xfrm>
+            <a:off x="457200" y="116632"/>
+            <a:ext cx="7543800" cy="1295400"/>
+          </a:xfrm>
+        </p:spPr>
+        <p:txBody>
+          <a:bodyPr/>
+          <a:lstStyle/>
+          <a:p>
+            <a:r>
+              <a:rPr lang="de-DE" smtClean="0">
+                <a:solidFill>
+                  <a:srgbClr val="006600"/>
+                </a:solidFill>
+                <a:latin typeface="Calibri Light" panose="020F0302020204030204" pitchFamily="34" charset="0"/>
+                <a:cs typeface="Calibri Light" panose="020F0302020204030204" pitchFamily="34" charset="0"/>
+              </a:rPr>
               <a:t>Link using elements: </a:t>
             </a:r>
             <a:br>
@@ -19977,17 +19956,7 @@
                 <a:latin typeface="Calibri Light" panose="020F0302020204030204" pitchFamily="34" charset="0"/>
                 <a:cs typeface="Calibri Light" panose="020F0302020204030204" pitchFamily="34" charset="0"/>
               </a:rPr>
-              <a:t>  </a:t>
-            </a:r>
-            <a:r>
-              <a:rPr lang="de-DE" smtClean="0">
-                <a:solidFill>
-                  <a:srgbClr val="006600"/>
-                </a:solidFill>
-                <a:latin typeface="Calibri Light" panose="020F0302020204030204" pitchFamily="34" charset="0"/>
-                <a:cs typeface="Calibri Light" panose="020F0302020204030204" pitchFamily="34" charset="0"/>
-              </a:rPr>
-              <a:t>binary constraints</a:t>
+              <a:t>  binary constraints</a:t>
             </a:r>
             <a:endParaRPr lang="de-DE">
               <a:solidFill>
@@ -20123,291 +20092,6 @@
 </p:sld>
 </file>
 
-<file path=ppt/slides/slide22.xml><?xml version="1.0" encoding="utf-8"?>
-<p:sld xmlns:a="http://schemas.openxmlformats.org/drawingml/2006/main" xmlns:r="http://schemas.openxmlformats.org/officeDocument/2006/relationships" xmlns:p="http://schemas.openxmlformats.org/presentationml/2006/main">
-  <p:cSld>
-    <p:spTree>
-      <p:nvGrpSpPr>
-        <p:cNvPr id="1" name=""/>
-        <p:cNvGrpSpPr/>
-        <p:nvPr/>
-      </p:nvGrpSpPr>
-      <p:grpSpPr>
-        <a:xfrm>
-          <a:off x="0" y="0"/>
-          <a:ext cx="0" cy="0"/>
-          <a:chOff x="0" y="0"/>
-          <a:chExt cx="0" cy="0"/>
-        </a:xfrm>
-      </p:grpSpPr>
-      <p:sp>
-        <p:nvSpPr>
-          <p:cNvPr id="2" name="Title 1"/>
-          <p:cNvSpPr>
-            <a:spLocks noGrp="1"/>
-          </p:cNvSpPr>
-          <p:nvPr>
-            <p:ph type="title"/>
-          </p:nvPr>
-        </p:nvSpPr>
-        <p:spPr/>
-        <p:txBody>
-          <a:bodyPr/>
-          <a:lstStyle/>
-          <a:p>
-            <a:r>
-              <a:rPr lang="de-DE" smtClean="0">
-                <a:solidFill>
-                  <a:srgbClr val="006600"/>
-                </a:solidFill>
-                <a:latin typeface="Calibri Light" panose="020F0302020204030204" pitchFamily="34" charset="0"/>
-                <a:cs typeface="Calibri Light" panose="020F0302020204030204" pitchFamily="34" charset="0"/>
-              </a:rPr>
-              <a:t>Results &amp; Reports</a:t>
-            </a:r>
-            <a:endParaRPr lang="de-DE">
-              <a:solidFill>
-                <a:srgbClr val="006600"/>
-              </a:solidFill>
-              <a:latin typeface="Calibri Light" panose="020F0302020204030204" pitchFamily="34" charset="0"/>
-              <a:cs typeface="Calibri Light" panose="020F0302020204030204" pitchFamily="34" charset="0"/>
-            </a:endParaRPr>
-          </a:p>
-        </p:txBody>
-      </p:sp>
-      <p:sp>
-        <p:nvSpPr>
-          <p:cNvPr id="3" name="Content Placeholder 2"/>
-          <p:cNvSpPr>
-            <a:spLocks noGrp="1"/>
-          </p:cNvSpPr>
-          <p:nvPr>
-            <p:ph idx="1"/>
-          </p:nvPr>
-        </p:nvSpPr>
-        <p:spPr/>
-        <p:txBody>
-          <a:bodyPr/>
-          <a:lstStyle/>
-          <a:p>
-            <a:r>
-              <a:rPr lang="de-DE" sz="2400" smtClean="0">
-                <a:solidFill>
-                  <a:srgbClr val="006600"/>
-                </a:solidFill>
-                <a:latin typeface="Calibri Light" panose="020F0302020204030204" pitchFamily="34" charset="0"/>
-                <a:cs typeface="Calibri Light" panose="020F0302020204030204" pitchFamily="34" charset="0"/>
-              </a:rPr>
-              <a:t>Validation result =</a:t>
-            </a:r>
-          </a:p>
-          <a:p>
-            <a:pPr marL="0" indent="0">
-              <a:buNone/>
-            </a:pPr>
-            <a:r>
-              <a:rPr lang="de-DE" sz="2400" smtClean="0">
-                <a:solidFill>
-                  <a:srgbClr val="006600"/>
-                </a:solidFill>
-                <a:latin typeface="Calibri Light" panose="020F0302020204030204" pitchFamily="34" charset="0"/>
-                <a:cs typeface="Calibri Light" panose="020F0302020204030204" pitchFamily="34" charset="0"/>
-              </a:rPr>
-              <a:t>Outcome of checking a single resource against a single constraint</a:t>
-            </a:r>
-          </a:p>
-          <a:p>
-            <a:r>
-              <a:rPr lang="de-DE" sz="2400" smtClean="0">
-                <a:solidFill>
-                  <a:srgbClr val="006600"/>
-                </a:solidFill>
-                <a:latin typeface="Calibri Light" panose="020F0302020204030204" pitchFamily="34" charset="0"/>
-                <a:cs typeface="Calibri Light" panose="020F0302020204030204" pitchFamily="34" charset="0"/>
-              </a:rPr>
-              <a:t>XML element &lt;red&gt;, &lt;green&gt;</a:t>
-            </a:r>
-          </a:p>
-          <a:p>
-            <a:r>
-              <a:rPr lang="de-DE" sz="2400" smtClean="0">
-                <a:solidFill>
-                  <a:srgbClr val="006600"/>
-                </a:solidFill>
-                <a:latin typeface="Calibri Light" panose="020F0302020204030204" pitchFamily="34" charset="0"/>
-                <a:cs typeface="Calibri Light" panose="020F0302020204030204" pitchFamily="34" charset="0"/>
-              </a:rPr>
-              <a:t>Attributes and child elements …</a:t>
-            </a:r>
-          </a:p>
-          <a:p>
-            <a:pPr lvl="1"/>
-            <a:r>
-              <a:rPr lang="de-DE" sz="2000" smtClean="0">
-                <a:solidFill>
-                  <a:srgbClr val="006600"/>
-                </a:solidFill>
-                <a:latin typeface="Calibri Light" panose="020F0302020204030204" pitchFamily="34" charset="0"/>
-                <a:cs typeface="Calibri Light" panose="020F0302020204030204" pitchFamily="34" charset="0"/>
-              </a:rPr>
-              <a:t>Identify the resource</a:t>
-            </a:r>
-          </a:p>
-          <a:p>
-            <a:pPr lvl="1"/>
-            <a:r>
-              <a:rPr lang="de-DE" sz="2000" smtClean="0">
-                <a:solidFill>
-                  <a:srgbClr val="006600"/>
-                </a:solidFill>
-                <a:latin typeface="Calibri Light" panose="020F0302020204030204" pitchFamily="34" charset="0"/>
-                <a:cs typeface="Calibri Light" panose="020F0302020204030204" pitchFamily="34" charset="0"/>
-              </a:rPr>
-              <a:t>Identify the constraint component</a:t>
-            </a:r>
-          </a:p>
-          <a:p>
-            <a:pPr lvl="1"/>
-            <a:r>
-              <a:rPr lang="de-DE" sz="2000" smtClean="0">
-                <a:solidFill>
-                  <a:srgbClr val="006600"/>
-                </a:solidFill>
-                <a:latin typeface="Calibri Light" panose="020F0302020204030204" pitchFamily="34" charset="0"/>
-                <a:cs typeface="Calibri Light" panose="020F0302020204030204" pitchFamily="34" charset="0"/>
-              </a:rPr>
-              <a:t>Constraint location in the schema</a:t>
-            </a:r>
-          </a:p>
-          <a:p>
-            <a:pPr lvl="1"/>
-            <a:r>
-              <a:rPr lang="de-DE" sz="2000" smtClean="0">
-                <a:solidFill>
-                  <a:srgbClr val="006600"/>
-                </a:solidFill>
-                <a:latin typeface="Calibri Light" panose="020F0302020204030204" pitchFamily="34" charset="0"/>
-                <a:cs typeface="Calibri Light" panose="020F0302020204030204" pitchFamily="34" charset="0"/>
-              </a:rPr>
-              <a:t>Selected constraint parameters</a:t>
-            </a:r>
-          </a:p>
-          <a:p>
-            <a:pPr lvl="1"/>
-            <a:r>
-              <a:rPr lang="de-DE" sz="2000" smtClean="0">
-                <a:solidFill>
-                  <a:srgbClr val="006600"/>
-                </a:solidFill>
-                <a:latin typeface="Calibri Light" panose="020F0302020204030204" pitchFamily="34" charset="0"/>
-                <a:cs typeface="Calibri Light" panose="020F0302020204030204" pitchFamily="34" charset="0"/>
-              </a:rPr>
-              <a:t>Observations</a:t>
-            </a:r>
-          </a:p>
-        </p:txBody>
-      </p:sp>
-      <p:sp>
-        <p:nvSpPr>
-          <p:cNvPr id="4" name="Date Placeholder 3"/>
-          <p:cNvSpPr>
-            <a:spLocks noGrp="1"/>
-          </p:cNvSpPr>
-          <p:nvPr>
-            <p:ph type="dt" sz="half" idx="10"/>
-          </p:nvPr>
-        </p:nvSpPr>
-        <p:spPr/>
-        <p:txBody>
-          <a:bodyPr/>
-          <a:lstStyle/>
-          <a:p>
-            <a:pPr>
-              <a:defRPr/>
-            </a:pPr>
-            <a:r>
-              <a:rPr lang="de-DE" altLang="de-DE" smtClean="0"/>
-              <a:t>2020-10-08</a:t>
-            </a:r>
-            <a:endParaRPr lang="de-DE" altLang="en-US"/>
-          </a:p>
-        </p:txBody>
-      </p:sp>
-      <p:sp>
-        <p:nvSpPr>
-          <p:cNvPr id="5" name="Footer Placeholder 4"/>
-          <p:cNvSpPr>
-            <a:spLocks noGrp="1"/>
-          </p:cNvSpPr>
-          <p:nvPr>
-            <p:ph type="ftr" sz="quarter" idx="11"/>
-          </p:nvPr>
-        </p:nvSpPr>
-        <p:spPr/>
-        <p:txBody>
-          <a:bodyPr/>
-          <a:lstStyle/>
-          <a:p>
-            <a:pPr>
-              <a:defRPr/>
-            </a:pPr>
-            <a:r>
-              <a:rPr lang="de-DE" altLang="en-US" smtClean="0"/>
-              <a:t>Greenfox</a:t>
-            </a:r>
-            <a:endParaRPr lang="de-DE" altLang="en-US"/>
-          </a:p>
-        </p:txBody>
-      </p:sp>
-      <p:sp>
-        <p:nvSpPr>
-          <p:cNvPr id="6" name="Slide Number Placeholder 5"/>
-          <p:cNvSpPr>
-            <a:spLocks noGrp="1"/>
-          </p:cNvSpPr>
-          <p:nvPr>
-            <p:ph type="sldNum" sz="quarter" idx="12"/>
-          </p:nvPr>
-        </p:nvSpPr>
-        <p:spPr/>
-        <p:txBody>
-          <a:bodyPr/>
-          <a:lstStyle/>
-          <a:p>
-            <a:pPr>
-              <a:defRPr/>
-            </a:pPr>
-            <a:fld id="{F031B2F4-27D1-4E53-97CF-1947CD75B185}" type="slidenum">
-              <a:rPr lang="de-DE" altLang="en-US" smtClean="0"/>
-              <a:pPr>
-                <a:defRPr/>
-              </a:pPr>
-              <a:t>22</a:t>
-            </a:fld>
-            <a:endParaRPr lang="de-DE" altLang="en-US"/>
-          </a:p>
-        </p:txBody>
-      </p:sp>
-    </p:spTree>
-    <p:extLst>
-      <p:ext uri="{BB962C8B-B14F-4D97-AF65-F5344CB8AC3E}">
-        <p14:creationId xmlns:p14="http://schemas.microsoft.com/office/powerpoint/2010/main" val="3238852986"/>
-      </p:ext>
-    </p:extLst>
-  </p:cSld>
-  <p:clrMapOvr>
-    <a:masterClrMapping/>
-  </p:clrMapOvr>
-  <p:timing>
-    <p:tnLst>
-      <p:par>
-        <p:cTn id="1" dur="indefinite" restart="never" nodeType="tmRoot"/>
-      </p:par>
-    </p:tnLst>
-  </p:timing>
-</p:sld>
-</file>
-
 <file path=ppt/slides/slide23.xml><?xml version="1.0" encoding="utf-8"?>
 <p:sld xmlns:a="http://schemas.openxmlformats.org/drawingml/2006/main" xmlns:r="http://schemas.openxmlformats.org/officeDocument/2006/relationships" xmlns:p="http://schemas.openxmlformats.org/presentationml/2006/main">
   <p:cSld>
@@ -20448,7 +20132,7 @@
                 <a:latin typeface="Calibri Light" panose="020F0302020204030204" pitchFamily="34" charset="0"/>
                 <a:cs typeface="Calibri Light" panose="020F0302020204030204" pitchFamily="34" charset="0"/>
               </a:rPr>
-              <a:t>Validation result: example</a:t>
+              <a:t>Results &amp; Reports</a:t>
             </a:r>
             <a:endParaRPr lang="de-DE">
               <a:solidFill>
@@ -20457,6 +20141,138 @@
               <a:latin typeface="Calibri Light" panose="020F0302020204030204" pitchFamily="34" charset="0"/>
               <a:cs typeface="Calibri Light" panose="020F0302020204030204" pitchFamily="34" charset="0"/>
             </a:endParaRPr>
+          </a:p>
+        </p:txBody>
+      </p:sp>
+      <p:sp>
+        <p:nvSpPr>
+          <p:cNvPr id="3" name="Content Placeholder 2"/>
+          <p:cNvSpPr>
+            <a:spLocks noGrp="1"/>
+          </p:cNvSpPr>
+          <p:nvPr>
+            <p:ph idx="1"/>
+          </p:nvPr>
+        </p:nvSpPr>
+        <p:spPr/>
+        <p:txBody>
+          <a:bodyPr/>
+          <a:lstStyle/>
+          <a:p>
+            <a:r>
+              <a:rPr lang="de-DE" sz="2400" smtClean="0">
+                <a:solidFill>
+                  <a:srgbClr val="006600"/>
+                </a:solidFill>
+                <a:latin typeface="Calibri Light" panose="020F0302020204030204" pitchFamily="34" charset="0"/>
+                <a:cs typeface="Calibri Light" panose="020F0302020204030204" pitchFamily="34" charset="0"/>
+              </a:rPr>
+              <a:t>Validation result =</a:t>
+            </a:r>
+          </a:p>
+          <a:p>
+            <a:pPr marL="0" indent="0">
+              <a:buNone/>
+            </a:pPr>
+            <a:r>
+              <a:rPr lang="de-DE" sz="2400" smtClean="0">
+                <a:solidFill>
+                  <a:srgbClr val="006600"/>
+                </a:solidFill>
+                <a:latin typeface="Calibri Light" panose="020F0302020204030204" pitchFamily="34" charset="0"/>
+                <a:cs typeface="Calibri Light" panose="020F0302020204030204" pitchFamily="34" charset="0"/>
+              </a:rPr>
+              <a:t>Outcome of checking a single resource against a single constraint</a:t>
+            </a:r>
+          </a:p>
+          <a:p>
+            <a:r>
+              <a:rPr lang="de-DE" sz="2400" smtClean="0">
+                <a:solidFill>
+                  <a:srgbClr val="006600"/>
+                </a:solidFill>
+                <a:latin typeface="Calibri Light" panose="020F0302020204030204" pitchFamily="34" charset="0"/>
+                <a:cs typeface="Calibri Light" panose="020F0302020204030204" pitchFamily="34" charset="0"/>
+              </a:rPr>
+              <a:t>XML element &lt;red&gt;, &lt;green&gt;</a:t>
+            </a:r>
+          </a:p>
+          <a:p>
+            <a:r>
+              <a:rPr lang="de-DE" sz="2400" smtClean="0">
+                <a:solidFill>
+                  <a:srgbClr val="006600"/>
+                </a:solidFill>
+                <a:latin typeface="Calibri Light" panose="020F0302020204030204" pitchFamily="34" charset="0"/>
+                <a:cs typeface="Calibri Light" panose="020F0302020204030204" pitchFamily="34" charset="0"/>
+              </a:rPr>
+              <a:t>Attributes and child elements …</a:t>
+            </a:r>
+          </a:p>
+          <a:p>
+            <a:pPr lvl="1"/>
+            <a:r>
+              <a:rPr lang="de-DE" sz="2000" smtClean="0">
+                <a:solidFill>
+                  <a:srgbClr val="006600"/>
+                </a:solidFill>
+                <a:latin typeface="Calibri Light" panose="020F0302020204030204" pitchFamily="34" charset="0"/>
+                <a:cs typeface="Calibri Light" panose="020F0302020204030204" pitchFamily="34" charset="0"/>
+              </a:rPr>
+              <a:t>Identify the resource</a:t>
+            </a:r>
+          </a:p>
+          <a:p>
+            <a:pPr lvl="1"/>
+            <a:r>
+              <a:rPr lang="de-DE" sz="2000" smtClean="0">
+                <a:solidFill>
+                  <a:srgbClr val="006600"/>
+                </a:solidFill>
+                <a:latin typeface="Calibri Light" panose="020F0302020204030204" pitchFamily="34" charset="0"/>
+                <a:cs typeface="Calibri Light" panose="020F0302020204030204" pitchFamily="34" charset="0"/>
+              </a:rPr>
+              <a:t>Identify the constraint component</a:t>
+            </a:r>
+          </a:p>
+          <a:p>
+            <a:pPr lvl="1"/>
+            <a:r>
+              <a:rPr lang="de-DE" sz="2000" smtClean="0">
+                <a:solidFill>
+                  <a:srgbClr val="006600"/>
+                </a:solidFill>
+                <a:latin typeface="Calibri Light" panose="020F0302020204030204" pitchFamily="34" charset="0"/>
+                <a:cs typeface="Calibri Light" panose="020F0302020204030204" pitchFamily="34" charset="0"/>
+              </a:rPr>
+              <a:t>Constraint location in the schema</a:t>
+            </a:r>
+          </a:p>
+          <a:p>
+            <a:pPr lvl="1"/>
+            <a:r>
+              <a:rPr lang="de-DE" sz="2000" smtClean="0">
+                <a:solidFill>
+                  <a:srgbClr val="006600"/>
+                </a:solidFill>
+                <a:latin typeface="Calibri Light" panose="020F0302020204030204" pitchFamily="34" charset="0"/>
+                <a:cs typeface="Calibri Light" panose="020F0302020204030204" pitchFamily="34" charset="0"/>
+              </a:rPr>
+              <a:t>Selected constraint parameters</a:t>
+            </a:r>
+          </a:p>
+          <a:p>
+            <a:pPr lvl="1"/>
+            <a:r>
+              <a:rPr lang="de-DE" sz="2000" smtClean="0">
+                <a:solidFill>
+                  <a:srgbClr val="006600"/>
+                </a:solidFill>
+                <a:latin typeface="Calibri Light" panose="020F0302020204030204" pitchFamily="34" charset="0"/>
+                <a:cs typeface="Calibri Light" panose="020F0302020204030204" pitchFamily="34" charset="0"/>
+              </a:rPr>
+              <a:t>Observations</a:t>
+            </a:r>
           </a:p>
         </p:txBody>
       </p:sp>
@@ -20541,34 +20357,10 @@
           </a:p>
         </p:txBody>
       </p:sp>
-      <p:pic>
-        <p:nvPicPr>
-          <p:cNvPr id="3" name="Picture 2"/>
-          <p:cNvPicPr>
-            <a:picLocks noChangeAspect="1"/>
-          </p:cNvPicPr>
-          <p:nvPr/>
-        </p:nvPicPr>
-        <p:blipFill>
-          <a:blip r:embed="rId2"/>
-          <a:stretch>
-            <a:fillRect/>
-          </a:stretch>
-        </p:blipFill>
-        <p:spPr>
-          <a:xfrm>
-            <a:off x="0" y="2060676"/>
-            <a:ext cx="9144000" cy="3168524"/>
-          </a:xfrm>
-          <a:prstGeom prst="rect">
-            <a:avLst/>
-          </a:prstGeom>
-        </p:spPr>
-      </p:pic>
     </p:spTree>
     <p:extLst>
       <p:ext uri="{BB962C8B-B14F-4D97-AF65-F5344CB8AC3E}">
-        <p14:creationId xmlns:p14="http://schemas.microsoft.com/office/powerpoint/2010/main" val="2475524279"/>
+        <p14:creationId xmlns:p14="http://schemas.microsoft.com/office/powerpoint/2010/main" val="3238852986"/>
       </p:ext>
     </p:extLst>
   </p:cSld>
@@ -20625,7 +20417,7 @@
                 <a:latin typeface="Calibri Light" panose="020F0302020204030204" pitchFamily="34" charset="0"/>
                 <a:cs typeface="Calibri Light" panose="020F0302020204030204" pitchFamily="34" charset="0"/>
               </a:rPr>
-              <a:t>Validation report: example</a:t>
+              <a:t>Validation result: example</a:t>
             </a:r>
             <a:endParaRPr lang="de-DE">
               <a:solidFill>
@@ -20720,7 +20512,7 @@
       </p:sp>
       <p:pic>
         <p:nvPicPr>
-          <p:cNvPr id="8" name="Picture 7"/>
+          <p:cNvPr id="3" name="Picture 2"/>
           <p:cNvPicPr>
             <a:picLocks noChangeAspect="1"/>
           </p:cNvPicPr>
@@ -20734,8 +20526,8 @@
         </p:blipFill>
         <p:spPr>
           <a:xfrm>
-            <a:off x="575736" y="1916832"/>
-            <a:ext cx="8100720" cy="4752528"/>
+            <a:off x="0" y="2060676"/>
+            <a:ext cx="9144000" cy="3168524"/>
           </a:xfrm>
           <a:prstGeom prst="rect">
             <a:avLst/>
@@ -20745,7 +20537,7 @@
     </p:spTree>
     <p:extLst>
       <p:ext uri="{BB962C8B-B14F-4D97-AF65-F5344CB8AC3E}">
-        <p14:creationId xmlns:p14="http://schemas.microsoft.com/office/powerpoint/2010/main" val="2621163427"/>
+        <p14:creationId xmlns:p14="http://schemas.microsoft.com/office/powerpoint/2010/main" val="2475524279"/>
       </p:ext>
     </p:extLst>
   </p:cSld>
@@ -20802,7 +20594,7 @@
                 <a:latin typeface="Calibri Light" panose="020F0302020204030204" pitchFamily="34" charset="0"/>
                 <a:cs typeface="Calibri Light" panose="020F0302020204030204" pitchFamily="34" charset="0"/>
               </a:rPr>
-              <a:t>Constraint types</a:t>
+              <a:t>Validation report: example</a:t>
             </a:r>
             <a:endParaRPr lang="de-DE">
               <a:solidFill>
@@ -20814,24 +20606,105 @@
           </a:p>
         </p:txBody>
       </p:sp>
+      <p:sp>
+        <p:nvSpPr>
+          <p:cNvPr id="4" name="Date Placeholder 3"/>
+          <p:cNvSpPr>
+            <a:spLocks noGrp="1"/>
+          </p:cNvSpPr>
+          <p:nvPr>
+            <p:ph type="dt" sz="half" idx="10"/>
+          </p:nvPr>
+        </p:nvSpPr>
+        <p:spPr/>
+        <p:txBody>
+          <a:bodyPr/>
+          <a:lstStyle/>
+          <a:p>
+            <a:pPr>
+              <a:defRPr/>
+            </a:pPr>
+            <a:r>
+              <a:rPr lang="de-DE" altLang="de-DE" smtClean="0"/>
+              <a:t>2020-10-08</a:t>
+            </a:r>
+            <a:endParaRPr lang="de-DE" altLang="en-US"/>
+          </a:p>
+        </p:txBody>
+      </p:sp>
+      <p:sp>
+        <p:nvSpPr>
+          <p:cNvPr id="5" name="Footer Placeholder 4"/>
+          <p:cNvSpPr>
+            <a:spLocks noGrp="1"/>
+          </p:cNvSpPr>
+          <p:nvPr>
+            <p:ph type="ftr" sz="quarter" idx="11"/>
+          </p:nvPr>
+        </p:nvSpPr>
+        <p:spPr/>
+        <p:txBody>
+          <a:bodyPr/>
+          <a:lstStyle/>
+          <a:p>
+            <a:pPr>
+              <a:defRPr/>
+            </a:pPr>
+            <a:r>
+              <a:rPr lang="de-DE" altLang="en-US" smtClean="0"/>
+              <a:t>Greenfox</a:t>
+            </a:r>
+            <a:endParaRPr lang="de-DE" altLang="en-US"/>
+          </a:p>
+        </p:txBody>
+      </p:sp>
+      <p:sp>
+        <p:nvSpPr>
+          <p:cNvPr id="6" name="Slide Number Placeholder 5"/>
+          <p:cNvSpPr>
+            <a:spLocks noGrp="1"/>
+          </p:cNvSpPr>
+          <p:nvPr>
+            <p:ph type="sldNum" sz="quarter" idx="12"/>
+          </p:nvPr>
+        </p:nvSpPr>
+        <p:spPr/>
+        <p:txBody>
+          <a:bodyPr/>
+          <a:lstStyle/>
+          <a:p>
+            <a:pPr>
+              <a:defRPr/>
+            </a:pPr>
+            <a:fld id="{F031B2F4-27D1-4E53-97CF-1947CD75B185}" type="slidenum">
+              <a:rPr lang="de-DE" altLang="en-US" smtClean="0"/>
+              <a:pPr>
+                <a:defRPr/>
+              </a:pPr>
+              <a:t>25</a:t>
+            </a:fld>
+            <a:endParaRPr lang="de-DE" altLang="en-US"/>
+          </a:p>
+        </p:txBody>
+      </p:sp>
       <p:pic>
         <p:nvPicPr>
-          <p:cNvPr id="3" name="Picture 2"/>
+          <p:cNvPr id="8" name="Picture 7"/>
           <p:cNvPicPr>
             <a:picLocks noChangeAspect="1"/>
           </p:cNvPicPr>
           <p:nvPr/>
         </p:nvPicPr>
         <p:blipFill>
-          <a:blip r:embed="rId3"/>
+          <a:blip r:embed="rId2"/>
           <a:stretch>
             <a:fillRect/>
           </a:stretch>
         </p:blipFill>
         <p:spPr>
           <a:xfrm>
-            <a:off x="757758" y="1563347"/>
-            <a:ext cx="7126610" cy="5276955"/>
+            <a:off x="575736" y="1916832"/>
+            <a:ext cx="8100720" cy="4752528"/>
           </a:xfrm>
           <a:prstGeom prst="rect">
             <a:avLst/>
@@ -20841,7 +20714,7 @@
     </p:spTree>
     <p:extLst>
       <p:ext uri="{BB962C8B-B14F-4D97-AF65-F5344CB8AC3E}">
-        <p14:creationId xmlns:p14="http://schemas.microsoft.com/office/powerpoint/2010/main" val="3807217074"/>
+        <p14:creationId xmlns:p14="http://schemas.microsoft.com/office/powerpoint/2010/main" val="2621163427"/>
       </p:ext>
     </p:extLst>
   </p:cSld>
@@ -20898,6 +20771,102 @@
                 <a:latin typeface="Calibri Light" panose="020F0302020204030204" pitchFamily="34" charset="0"/>
                 <a:cs typeface="Calibri Light" panose="020F0302020204030204" pitchFamily="34" charset="0"/>
               </a:rPr>
+              <a:t>Constraint types</a:t>
+            </a:r>
+            <a:endParaRPr lang="de-DE">
+              <a:solidFill>
+                <a:srgbClr val="006600"/>
+              </a:solidFill>
+              <a:latin typeface="Calibri Light" panose="020F0302020204030204" pitchFamily="34" charset="0"/>
+              <a:cs typeface="Calibri Light" panose="020F0302020204030204" pitchFamily="34" charset="0"/>
+            </a:endParaRPr>
+          </a:p>
+        </p:txBody>
+      </p:sp>
+      <p:pic>
+        <p:nvPicPr>
+          <p:cNvPr id="4" name="Picture 3"/>
+          <p:cNvPicPr>
+            <a:picLocks noChangeAspect="1"/>
+          </p:cNvPicPr>
+          <p:nvPr/>
+        </p:nvPicPr>
+        <p:blipFill>
+          <a:blip r:embed="rId3"/>
+          <a:stretch>
+            <a:fillRect/>
+          </a:stretch>
+        </p:blipFill>
+        <p:spPr>
+          <a:xfrm>
+            <a:off x="665365" y="1700808"/>
+            <a:ext cx="7372350" cy="4991100"/>
+          </a:xfrm>
+          <a:prstGeom prst="rect">
+            <a:avLst/>
+          </a:prstGeom>
+        </p:spPr>
+      </p:pic>
+    </p:spTree>
+    <p:extLst>
+      <p:ext uri="{BB962C8B-B14F-4D97-AF65-F5344CB8AC3E}">
+        <p14:creationId xmlns:p14="http://schemas.microsoft.com/office/powerpoint/2010/main" val="3640919414"/>
+      </p:ext>
+    </p:extLst>
+  </p:cSld>
+  <p:clrMapOvr>
+    <a:masterClrMapping/>
+  </p:clrMapOvr>
+  <p:timing>
+    <p:tnLst>
+      <p:par>
+        <p:cTn id="1" dur="indefinite" restart="never" nodeType="tmRoot"/>
+      </p:par>
+    </p:tnLst>
+  </p:timing>
+</p:sld>
+</file>
+
+<file path=ppt/slides/slide27.xml><?xml version="1.0" encoding="utf-8"?>
+<p:sld xmlns:a="http://schemas.openxmlformats.org/drawingml/2006/main" xmlns:r="http://schemas.openxmlformats.org/officeDocument/2006/relationships" xmlns:p="http://schemas.openxmlformats.org/presentationml/2006/main">
+  <p:cSld>
+    <p:spTree>
+      <p:nvGrpSpPr>
+        <p:cNvPr id="1" name=""/>
+        <p:cNvGrpSpPr/>
+        <p:nvPr/>
+      </p:nvGrpSpPr>
+      <p:grpSpPr>
+        <a:xfrm>
+          <a:off x="0" y="0"/>
+          <a:ext cx="0" cy="0"/>
+          <a:chOff x="0" y="0"/>
+          <a:chExt cx="0" cy="0"/>
+        </a:xfrm>
+      </p:grpSpPr>
+      <p:sp>
+        <p:nvSpPr>
+          <p:cNvPr id="2" name="Title 1"/>
+          <p:cNvSpPr>
+            <a:spLocks noGrp="1"/>
+          </p:cNvSpPr>
+          <p:nvPr>
+            <p:ph type="title"/>
+          </p:nvPr>
+        </p:nvSpPr>
+        <p:spPr/>
+        <p:txBody>
+          <a:bodyPr/>
+          <a:lstStyle/>
+          <a:p>
+            <a:r>
+              <a:rPr lang="de-DE" smtClean="0">
+                <a:solidFill>
+                  <a:srgbClr val="006600"/>
+                </a:solidFill>
+                <a:latin typeface="Calibri Light" panose="020F0302020204030204" pitchFamily="34" charset="0"/>
+                <a:cs typeface="Calibri Light" panose="020F0302020204030204" pitchFamily="34" charset="0"/>
+              </a:rPr>
               <a:t>What have you missed?</a:t>
             </a:r>
             <a:endParaRPr lang="de-DE">
@@ -21069,7 +21038,7 @@
               <a:pPr>
                 <a:defRPr/>
               </a:pPr>
-              <a:t>26</a:t>
+              <a:t>27</a:t>
             </a:fld>
             <a:endParaRPr lang="de-DE" altLang="en-US"/>
           </a:p>
@@ -21088,7 +21057,7 @@
 </p:sld>
 </file>
 
-<file path=ppt/slides/slide27.xml><?xml version="1.0" encoding="utf-8"?>
+<file path=ppt/slides/slide28.xml><?xml version="1.0" encoding="utf-8"?>
 <p:sld xmlns:a="http://schemas.openxmlformats.org/drawingml/2006/main" xmlns:r="http://schemas.openxmlformats.org/officeDocument/2006/relationships" xmlns:p="http://schemas.openxmlformats.org/presentationml/2006/main">
   <p:cSld>
     <p:spTree>
@@ -21244,7 +21213,7 @@
               <a:pPr>
                 <a:defRPr/>
               </a:pPr>
-              <a:t>27</a:t>
+              <a:t>28</a:t>
             </a:fld>
             <a:endParaRPr lang="de-DE" altLang="en-US"/>
           </a:p>
@@ -21301,13 +21270,7 @@
               <a:rPr lang="de-DE" smtClean="0">
                 <a:latin typeface="Bradley Hand ITC" panose="03070402050302030203" pitchFamily="66" charset="0"/>
               </a:rPr>
-              <a:t>(Jodle returning to Prague, straight to the pencil of </a:t>
-            </a:r>
-            <a:r>
-              <a:rPr lang="de-DE" smtClean="0">
-                <a:latin typeface="Bradley Hand ITC" panose="03070402050302030203" pitchFamily="66" charset="0"/>
-              </a:rPr>
-              <a:t>Cédric Philippe)</a:t>
+              <a:t>(Jodle returning to Prague, straight to the pencil of Cédric Philippe)</a:t>
             </a:r>
           </a:p>
           <a:p>
@@ -21322,13 +21285,6 @@
               </a:rPr>
               <a:t>http://cedricphilippe.com/section_me.html</a:t>
             </a:r>
-            <a:endParaRPr lang="de-DE">
-              <a:solidFill>
-                <a:srgbClr val="006600"/>
-              </a:solidFill>
-              <a:latin typeface="Calibri Light" panose="020F0302020204030204" pitchFamily="34" charset="0"/>
-              <a:cs typeface="Calibri Light" panose="020F0302020204030204" pitchFamily="34" charset="0"/>
-            </a:endParaRPr>
           </a:p>
         </p:txBody>
       </p:sp>
@@ -21474,21 +21430,7 @@
                 <a:latin typeface="Calibri Light" panose="020F0302020204030204" pitchFamily="34" charset="0"/>
                 <a:cs typeface="Calibri Light" panose="020F0302020204030204" pitchFamily="34" charset="0"/>
               </a:rPr>
-              <a:t>             </a:t>
-            </a:r>
-            <a:r>
-              <a:rPr lang="de-DE" sz="2000" smtClean="0">
-                <a:latin typeface="Calibri Light" panose="020F0302020204030204" pitchFamily="34" charset="0"/>
-                <a:cs typeface="Calibri Light" panose="020F0302020204030204" pitchFamily="34" charset="0"/>
-              </a:rPr>
-              <a:t>   (</a:t>
-            </a:r>
-            <a:r>
-              <a:rPr lang="de-DE" sz="2000" smtClean="0">
-                <a:latin typeface="Calibri Light" panose="020F0302020204030204" pitchFamily="34" charset="0"/>
-                <a:cs typeface="Calibri Light" panose="020F0302020204030204" pitchFamily="34" charset="0"/>
-              </a:rPr>
-              <a:t>XSD, RelaxNG, JSON Schema, SHACL, …)</a:t>
+              <a:t>                (XSD, RelaxNG, JSON Schema, SHACL, …)</a:t>
             </a:r>
           </a:p>
           <a:p>
@@ -22512,6 +22454,55 @@
           </a:p>
         </p:txBody>
       </p:sp>
+      <p:sp>
+        <p:nvSpPr>
+          <p:cNvPr id="3" name="TextBox 2"/>
+          <p:cNvSpPr txBox="1"/>
+          <p:nvPr/>
+        </p:nvSpPr>
+        <p:spPr>
+          <a:xfrm>
+            <a:off x="1008924" y="5589240"/>
+            <a:ext cx="6968574" cy="369332"/>
+          </a:xfrm>
+          <a:prstGeom prst="rect">
+            <a:avLst/>
+          </a:prstGeom>
+          <a:noFill/>
+        </p:spPr>
+        <p:txBody>
+          <a:bodyPr wrap="none" rtlCol="0">
+            <a:spAutoFit/>
+          </a:bodyPr>
+          <a:lstStyle/>
+          <a:p>
+            <a:r>
+              <a:rPr lang="de-DE" i="1" smtClean="0"/>
+              <a:t> Source </a:t>
+            </a:r>
+            <a:r>
+              <a:rPr lang="de-DE" i="1"/>
+              <a:t>of all airport data</a:t>
+            </a:r>
+            <a:r>
+              <a:rPr lang="de-DE" i="1"/>
+              <a:t>:</a:t>
+            </a:r>
+            <a:r>
+              <a:rPr lang="de-DE"/>
+              <a:t> </a:t>
+            </a:r>
+            <a:r>
+              <a:rPr lang="de-DE" smtClean="0"/>
+              <a:t>     https</a:t>
+            </a:r>
+            <a:r>
+              <a:rPr lang="de-DE"/>
+              <a:t>://openflights.org/data.html</a:t>
+            </a:r>
+          </a:p>
+        </p:txBody>
+      </p:sp>
     </p:spTree>
     <p:extLst>
       <p:ext uri="{BB962C8B-B14F-4D97-AF65-F5344CB8AC3E}">
@@ -22759,13 +22750,7 @@
               <a:rPr lang="de-DE" smtClean="0">
                 <a:latin typeface="Bradley Hand ITC" panose="03070402050302030203" pitchFamily="66" charset="0"/>
               </a:rPr>
-              <a:t>(Jodle will join us, coming straight from the pencil of </a:t>
-            </a:r>
-            <a:r>
-              <a:rPr lang="de-DE" smtClean="0">
-                <a:latin typeface="Bradley Hand ITC" panose="03070402050302030203" pitchFamily="66" charset="0"/>
-              </a:rPr>
-              <a:t>Cédric Philippe)</a:t>
+              <a:t>(Jodle will join us, coming straight from the pencil of Cédric Philippe)</a:t>
             </a:r>
           </a:p>
           <a:p>
@@ -22780,13 +22765,6 @@
               </a:rPr>
               <a:t>http://cedricphilippe.com/section_me.html</a:t>
             </a:r>
-            <a:endParaRPr lang="de-DE">
-              <a:solidFill>
-                <a:srgbClr val="006600"/>
-              </a:solidFill>
-              <a:latin typeface="Calibri Light" panose="020F0302020204030204" pitchFamily="34" charset="0"/>
-              <a:cs typeface="Calibri Light" panose="020F0302020204030204" pitchFamily="34" charset="0"/>
-            </a:endParaRPr>
           </a:p>
         </p:txBody>
       </p:sp>

</xml_diff>

<commit_message>
More minor changes of the presentation, adding a slide "Things only mentioned".
</commit_message>
<xml_diff>
--- a/declarative-amsterdam-2020/an-introduction-to-greenfox/an-introduction-to-greenfox.pptx
+++ b/declarative-amsterdam-2020/an-introduction-to-greenfox/an-introduction-to-greenfox.pptx
@@ -5,10 +5,10 @@
     <p:sldMasterId id="2147483710" r:id="rId1"/>
   </p:sldMasterIdLst>
   <p:notesMasterIdLst>
-    <p:notesMasterId r:id="rId30"/>
+    <p:notesMasterId r:id="rId31"/>
   </p:notesMasterIdLst>
   <p:handoutMasterIdLst>
-    <p:handoutMasterId r:id="rId31"/>
+    <p:handoutMasterId r:id="rId32"/>
   </p:handoutMasterIdLst>
   <p:sldIdLst>
     <p:sldId id="925" r:id="rId2"/>
@@ -38,7 +38,8 @@
     <p:sldId id="1240" r:id="rId26"/>
     <p:sldId id="1248" r:id="rId27"/>
     <p:sldId id="1247" r:id="rId28"/>
-    <p:sldId id="1243" r:id="rId29"/>
+    <p:sldId id="1250" r:id="rId29"/>
+    <p:sldId id="1243" r:id="rId30"/>
   </p:sldIdLst>
   <p:sldSz cx="9144000" cy="6858000" type="screen4x3"/>
   <p:notesSz cx="6858000" cy="9945688"/>
@@ -17734,6 +17735,35 @@
           </a:prstGeom>
         </p:spPr>
       </p:pic>
+      <p:sp>
+        <p:nvSpPr>
+          <p:cNvPr id="4" name="Slide Number Placeholder 3"/>
+          <p:cNvSpPr>
+            <a:spLocks noGrp="1"/>
+          </p:cNvSpPr>
+          <p:nvPr>
+            <p:ph type="sldNum" sz="quarter" idx="12"/>
+          </p:nvPr>
+        </p:nvSpPr>
+        <p:spPr/>
+        <p:txBody>
+          <a:bodyPr/>
+          <a:lstStyle/>
+          <a:p>
+            <a:pPr>
+              <a:defRPr/>
+            </a:pPr>
+            <a:fld id="{F031B2F4-27D1-4E53-97CF-1947CD75B185}" type="slidenum">
+              <a:rPr lang="de-DE" altLang="en-US" smtClean="0"/>
+              <a:pPr>
+                <a:defRPr/>
+              </a:pPr>
+              <a:t>15</a:t>
+            </a:fld>
+            <a:endParaRPr lang="de-DE" altLang="en-US"/>
+          </a:p>
+        </p:txBody>
+      </p:sp>
     </p:spTree>
     <p:extLst>
       <p:ext uri="{BB962C8B-B14F-4D97-AF65-F5344CB8AC3E}">
@@ -18113,6 +18143,35 @@
           </a:prstGeom>
         </p:spPr>
       </p:pic>
+      <p:sp>
+        <p:nvSpPr>
+          <p:cNvPr id="4" name="Slide Number Placeholder 3"/>
+          <p:cNvSpPr>
+            <a:spLocks noGrp="1"/>
+          </p:cNvSpPr>
+          <p:nvPr>
+            <p:ph type="sldNum" sz="quarter" idx="12"/>
+          </p:nvPr>
+        </p:nvSpPr>
+        <p:spPr/>
+        <p:txBody>
+          <a:bodyPr/>
+          <a:lstStyle/>
+          <a:p>
+            <a:pPr>
+              <a:defRPr/>
+            </a:pPr>
+            <a:fld id="{F031B2F4-27D1-4E53-97CF-1947CD75B185}" type="slidenum">
+              <a:rPr lang="de-DE" altLang="en-US" smtClean="0"/>
+              <a:pPr>
+                <a:defRPr/>
+              </a:pPr>
+              <a:t>16</a:t>
+            </a:fld>
+            <a:endParaRPr lang="de-DE" altLang="en-US"/>
+          </a:p>
+        </p:txBody>
+      </p:sp>
     </p:spTree>
     <p:extLst>
       <p:ext uri="{BB962C8B-B14F-4D97-AF65-F5344CB8AC3E}">
@@ -18412,6 +18471,35 @@
               </a:rPr>
               <a:t>set of resources</a:t>
             </a:r>
+          </a:p>
+        </p:txBody>
+      </p:sp>
+      <p:sp>
+        <p:nvSpPr>
+          <p:cNvPr id="4" name="Slide Number Placeholder 3"/>
+          <p:cNvSpPr>
+            <a:spLocks noGrp="1"/>
+          </p:cNvSpPr>
+          <p:nvPr>
+            <p:ph type="sldNum" sz="quarter" idx="12"/>
+          </p:nvPr>
+        </p:nvSpPr>
+        <p:spPr/>
+        <p:txBody>
+          <a:bodyPr/>
+          <a:lstStyle/>
+          <a:p>
+            <a:pPr>
+              <a:defRPr/>
+            </a:pPr>
+            <a:fld id="{F031B2F4-27D1-4E53-97CF-1947CD75B185}" type="slidenum">
+              <a:rPr lang="de-DE" altLang="en-US" smtClean="0"/>
+              <a:pPr>
+                <a:defRPr/>
+              </a:pPr>
+              <a:t>17</a:t>
+            </a:fld>
+            <a:endParaRPr lang="de-DE" altLang="en-US"/>
           </a:p>
         </p:txBody>
       </p:sp>
@@ -18643,6 +18731,35 @@
               </a:solidFill>
               <a:latin typeface="Bradley Hand ITC" panose="03070402050302030203" pitchFamily="66" charset="0"/>
             </a:endParaRPr>
+          </a:p>
+        </p:txBody>
+      </p:sp>
+      <p:sp>
+        <p:nvSpPr>
+          <p:cNvPr id="3" name="Slide Number Placeholder 2"/>
+          <p:cNvSpPr>
+            <a:spLocks noGrp="1"/>
+          </p:cNvSpPr>
+          <p:nvPr>
+            <p:ph type="sldNum" sz="quarter" idx="12"/>
+          </p:nvPr>
+        </p:nvSpPr>
+        <p:spPr/>
+        <p:txBody>
+          <a:bodyPr/>
+          <a:lstStyle/>
+          <a:p>
+            <a:pPr>
+              <a:defRPr/>
+            </a:pPr>
+            <a:fld id="{F031B2F4-27D1-4E53-97CF-1947CD75B185}" type="slidenum">
+              <a:rPr lang="de-DE" altLang="en-US" smtClean="0"/>
+              <a:pPr>
+                <a:defRPr/>
+              </a:pPr>
+              <a:t>18</a:t>
+            </a:fld>
+            <a:endParaRPr lang="de-DE" altLang="en-US"/>
           </a:p>
         </p:txBody>
       </p:sp>
@@ -18851,6 +18968,35 @@
           </a:p>
         </p:txBody>
       </p:sp>
+      <p:sp>
+        <p:nvSpPr>
+          <p:cNvPr id="3" name="Slide Number Placeholder 2"/>
+          <p:cNvSpPr>
+            <a:spLocks noGrp="1"/>
+          </p:cNvSpPr>
+          <p:nvPr>
+            <p:ph type="sldNum" sz="quarter" idx="12"/>
+          </p:nvPr>
+        </p:nvSpPr>
+        <p:spPr/>
+        <p:txBody>
+          <a:bodyPr/>
+          <a:lstStyle/>
+          <a:p>
+            <a:pPr>
+              <a:defRPr/>
+            </a:pPr>
+            <a:fld id="{F031B2F4-27D1-4E53-97CF-1947CD75B185}" type="slidenum">
+              <a:rPr lang="de-DE" altLang="en-US" smtClean="0"/>
+              <a:pPr>
+                <a:defRPr/>
+              </a:pPr>
+              <a:t>19</a:t>
+            </a:fld>
+            <a:endParaRPr lang="de-DE" altLang="en-US"/>
+          </a:p>
+        </p:txBody>
+      </p:sp>
     </p:spTree>
     <p:extLst>
       <p:ext uri="{BB962C8B-B14F-4D97-AF65-F5344CB8AC3E}">
@@ -19862,6 +20008,35 @@
           </a:p>
         </p:txBody>
       </p:sp>
+      <p:sp>
+        <p:nvSpPr>
+          <p:cNvPr id="3" name="Slide Number Placeholder 2"/>
+          <p:cNvSpPr>
+            <a:spLocks noGrp="1"/>
+          </p:cNvSpPr>
+          <p:nvPr>
+            <p:ph type="sldNum" sz="quarter" idx="12"/>
+          </p:nvPr>
+        </p:nvSpPr>
+        <p:spPr/>
+        <p:txBody>
+          <a:bodyPr/>
+          <a:lstStyle/>
+          <a:p>
+            <a:pPr>
+              <a:defRPr/>
+            </a:pPr>
+            <a:fld id="{F031B2F4-27D1-4E53-97CF-1947CD75B185}" type="slidenum">
+              <a:rPr lang="de-DE" altLang="en-US" smtClean="0"/>
+              <a:pPr>
+                <a:defRPr/>
+              </a:pPr>
+              <a:t>21</a:t>
+            </a:fld>
+            <a:endParaRPr lang="de-DE" altLang="en-US"/>
+          </a:p>
+        </p:txBody>
+      </p:sp>
     </p:spTree>
     <p:extLst>
       <p:ext uri="{BB962C8B-B14F-4D97-AF65-F5344CB8AC3E}">
@@ -20069,6 +20244,87 @@
               </a:solidFill>
               <a:latin typeface="Bradley Hand ITC" panose="03070402050302030203" pitchFamily="66" charset="0"/>
             </a:endParaRPr>
+          </a:p>
+        </p:txBody>
+      </p:sp>
+      <p:sp>
+        <p:nvSpPr>
+          <p:cNvPr id="3" name="Date Placeholder 2"/>
+          <p:cNvSpPr>
+            <a:spLocks noGrp="1"/>
+          </p:cNvSpPr>
+          <p:nvPr>
+            <p:ph type="dt" sz="half" idx="10"/>
+          </p:nvPr>
+        </p:nvSpPr>
+        <p:spPr/>
+        <p:txBody>
+          <a:bodyPr/>
+          <a:lstStyle/>
+          <a:p>
+            <a:pPr>
+              <a:defRPr/>
+            </a:pPr>
+            <a:r>
+              <a:rPr lang="de-DE" altLang="de-DE" smtClean="0"/>
+              <a:t>2020-10-08</a:t>
+            </a:r>
+            <a:endParaRPr lang="de-DE" altLang="en-US"/>
+          </a:p>
+        </p:txBody>
+      </p:sp>
+      <p:sp>
+        <p:nvSpPr>
+          <p:cNvPr id="5" name="Footer Placeholder 4"/>
+          <p:cNvSpPr>
+            <a:spLocks noGrp="1"/>
+          </p:cNvSpPr>
+          <p:nvPr>
+            <p:ph type="ftr" sz="quarter" idx="11"/>
+          </p:nvPr>
+        </p:nvSpPr>
+        <p:spPr/>
+        <p:txBody>
+          <a:bodyPr/>
+          <a:lstStyle/>
+          <a:p>
+            <a:pPr>
+              <a:defRPr/>
+            </a:pPr>
+            <a:r>
+              <a:rPr lang="de-DE" altLang="en-US" smtClean="0"/>
+              <a:t>Greenfox</a:t>
+            </a:r>
+            <a:endParaRPr lang="de-DE" altLang="en-US"/>
+          </a:p>
+        </p:txBody>
+      </p:sp>
+      <p:sp>
+        <p:nvSpPr>
+          <p:cNvPr id="8" name="Slide Number Placeholder 7"/>
+          <p:cNvSpPr>
+            <a:spLocks noGrp="1"/>
+          </p:cNvSpPr>
+          <p:nvPr>
+            <p:ph type="sldNum" sz="quarter" idx="12"/>
+          </p:nvPr>
+        </p:nvSpPr>
+        <p:spPr/>
+        <p:txBody>
+          <a:bodyPr/>
+          <a:lstStyle/>
+          <a:p>
+            <a:pPr>
+              <a:defRPr/>
+            </a:pPr>
+            <a:fld id="{F031B2F4-27D1-4E53-97CF-1947CD75B185}" type="slidenum">
+              <a:rPr lang="de-DE" altLang="en-US" smtClean="0"/>
+              <a:pPr>
+                <a:defRPr/>
+              </a:pPr>
+              <a:t>22</a:t>
+            </a:fld>
+            <a:endParaRPr lang="de-DE" altLang="en-US"/>
           </a:p>
         </p:txBody>
       </p:sp>
@@ -20867,9 +21123,38 @@
                 <a:latin typeface="Calibri Light" panose="020F0302020204030204" pitchFamily="34" charset="0"/>
                 <a:cs typeface="Calibri Light" panose="020F0302020204030204" pitchFamily="34" charset="0"/>
               </a:rPr>
-              <a:t>What have you missed?</a:t>
-            </a:r>
-            <a:endParaRPr lang="de-DE">
+              <a:t>Important, but only mentioned</a:t>
+            </a:r>
+            <a:br>
+              <a:rPr lang="de-DE" smtClean="0">
+                <a:solidFill>
+                  <a:srgbClr val="006600"/>
+                </a:solidFill>
+                <a:latin typeface="Calibri Light" panose="020F0302020204030204" pitchFamily="34" charset="0"/>
+                <a:cs typeface="Calibri Light" panose="020F0302020204030204" pitchFamily="34" charset="0"/>
+              </a:rPr>
+            </a:br>
+            <a:r>
+              <a:rPr lang="de-DE" i="1">
+                <a:solidFill>
+                  <a:srgbClr val="006600"/>
+                </a:solidFill>
+                <a:latin typeface="Calibri Light" panose="020F0302020204030204" pitchFamily="34" charset="0"/>
+                <a:cs typeface="Calibri Light" panose="020F0302020204030204" pitchFamily="34" charset="0"/>
+              </a:rPr>
+              <a:t> </a:t>
+            </a:r>
+            <a:r>
+              <a:rPr lang="de-DE" i="1" smtClean="0">
+                <a:solidFill>
+                  <a:srgbClr val="006600"/>
+                </a:solidFill>
+                <a:latin typeface="Calibri Light" panose="020F0302020204030204" pitchFamily="34" charset="0"/>
+                <a:cs typeface="Calibri Light" panose="020F0302020204030204" pitchFamily="34" charset="0"/>
+              </a:rPr>
+              <a:t>   (see paper for details)</a:t>
+            </a:r>
+            <a:endParaRPr lang="de-DE" i="1">
               <a:solidFill>
                 <a:srgbClr val="006600"/>
               </a:solidFill>
@@ -20889,74 +21174,93 @@
             <p:ph idx="1"/>
           </p:nvPr>
         </p:nvSpPr>
-        <p:spPr/>
+        <p:spPr>
+          <a:xfrm>
+            <a:off x="457200" y="1719263"/>
+            <a:ext cx="8686800" cy="4411662"/>
+          </a:xfrm>
+        </p:spPr>
         <p:txBody>
           <a:bodyPr/>
           <a:lstStyle/>
           <a:p>
             <a:r>
-              <a:rPr lang="de-DE" smtClean="0">
+              <a:rPr lang="de-DE" sz="2400">
+                <a:latin typeface="Courier New" panose="02070309020205020404" pitchFamily="49" charset="0"/>
+                <a:cs typeface="Courier New" panose="02070309020205020404" pitchFamily="49" charset="0"/>
+              </a:rPr>
+              <a:t>&lt;focusNode&gt;</a:t>
+            </a:r>
+            <a:r>
+              <a:rPr lang="de-DE" sz="2800">
                 <a:latin typeface="Calibri Light" panose="020F0302020204030204" pitchFamily="34" charset="0"/>
                 <a:cs typeface="Calibri Light" panose="020F0302020204030204" pitchFamily="34" charset="0"/>
               </a:rPr>
-              <a:t>Composite schemas – no imports yet</a:t>
-            </a:r>
-          </a:p>
-          <a:p>
-            <a:r>
-              <a:rPr lang="de-DE" smtClean="0">
+              <a:t> - changing evaluation context</a:t>
+            </a:r>
+          </a:p>
+          <a:p>
+            <a:r>
+              <a:rPr lang="de-DE" sz="2800">
                 <a:latin typeface="Calibri Light" panose="020F0302020204030204" pitchFamily="34" charset="0"/>
                 <a:cs typeface="Calibri Light" panose="020F0302020204030204" pitchFamily="34" charset="0"/>
               </a:rPr>
-              <a:t>Variables declared within the schema</a:t>
-            </a:r>
-          </a:p>
-          <a:p>
-            <a:r>
-              <a:rPr lang="de-DE" smtClean="0">
+              <a:t>Variable bindings in XPath and Foxpath (e.g. </a:t>
+            </a:r>
+            <a:r>
+              <a:rPr lang="de-DE" sz="2400">
+                <a:latin typeface="Courier New" panose="02070309020205020404" pitchFamily="49" charset="0"/>
+                <a:cs typeface="Courier New" panose="02070309020205020404" pitchFamily="49" charset="0"/>
+              </a:rPr>
+              <a:t>$fileName</a:t>
+            </a:r>
+            <a:r>
+              <a:rPr lang="de-DE" sz="2800">
                 <a:latin typeface="Calibri Light" panose="020F0302020204030204" pitchFamily="34" charset="0"/>
                 <a:cs typeface="Calibri Light" panose="020F0302020204030204" pitchFamily="34" charset="0"/>
               </a:rPr>
-              <a:t>Formated validation results </a:t>
-            </a:r>
-          </a:p>
-          <a:p>
-            <a:r>
-              <a:rPr lang="de-DE" smtClean="0">
+              <a:t>)</a:t>
+            </a:r>
+          </a:p>
+          <a:p>
+            <a:r>
+              <a:rPr lang="de-DE" sz="2800" smtClean="0">
                 <a:latin typeface="Calibri Light" panose="020F0302020204030204" pitchFamily="34" charset="0"/>
                 <a:cs typeface="Calibri Light" panose="020F0302020204030204" pitchFamily="34" charset="0"/>
               </a:rPr>
-              <a:t>Support for …</a:t>
+              <a:t>Dealing with archives</a:t>
+            </a:r>
+          </a:p>
+          <a:p>
+            <a:r>
+              <a:rPr lang="de-DE" sz="2800" smtClean="0">
+                <a:latin typeface="Calibri Light" panose="020F0302020204030204" pitchFamily="34" charset="0"/>
+                <a:cs typeface="Calibri Light" panose="020F0302020204030204" pitchFamily="34" charset="0"/>
+              </a:rPr>
+              <a:t>JSON, CSV, HTML, .txt – see also </a:t>
+            </a:r>
+            <a:r>
+              <a:rPr lang="de-DE" sz="2800" i="1" smtClean="0">
+                <a:latin typeface="Calibri Light" panose="020F0302020204030204" pitchFamily="34" charset="0"/>
+                <a:cs typeface="Calibri Light" panose="020F0302020204030204" pitchFamily="34" charset="0"/>
+              </a:rPr>
+              <a:t>demo-mediatype</a:t>
+            </a:r>
+          </a:p>
+          <a:p>
+            <a:r>
+              <a:rPr lang="de-DE" sz="2800">
+                <a:latin typeface="Calibri Light" panose="020F0302020204030204" pitchFamily="34" charset="0"/>
+                <a:cs typeface="Calibri Light" panose="020F0302020204030204" pitchFamily="34" charset="0"/>
+              </a:rPr>
+              <a:t>Context &amp; schema parameters</a:t>
             </a:r>
           </a:p>
           <a:p>
             <a:pPr marL="0" indent="0">
               <a:buNone/>
             </a:pPr>
-            <a:r>
-              <a:rPr lang="de-DE">
-                <a:latin typeface="Calibri Light" panose="020F0302020204030204" pitchFamily="34" charset="0"/>
-                <a:cs typeface="Calibri Light" panose="020F0302020204030204" pitchFamily="34" charset="0"/>
-              </a:rPr>
-              <a:t>	</a:t>
-            </a:r>
-            <a:r>
-              <a:rPr lang="de-DE" smtClean="0">
-                <a:latin typeface="Calibri Light" panose="020F0302020204030204" pitchFamily="34" charset="0"/>
-                <a:cs typeface="Calibri Light" panose="020F0302020204030204" pitchFamily="34" charset="0"/>
-              </a:rPr>
-              <a:t>schematron, JSON Schema, SHACL</a:t>
-            </a:r>
-          </a:p>
-          <a:p>
-            <a:r>
-              <a:rPr lang="de-DE" smtClean="0">
-                <a:latin typeface="Calibri Light" panose="020F0302020204030204" pitchFamily="34" charset="0"/>
-                <a:cs typeface="Calibri Light" panose="020F0302020204030204" pitchFamily="34" charset="0"/>
-              </a:rPr>
-              <a:t>Please fill in here: ______________________</a:t>
-            </a:r>
-            <a:endParaRPr lang="de-DE">
+            <a:endParaRPr lang="de-DE" sz="2800" i="1" smtClean="0">
               <a:latin typeface="Calibri Light" panose="020F0302020204030204" pitchFamily="34" charset="0"/>
               <a:cs typeface="Calibri Light" panose="020F0302020204030204" pitchFamily="34" charset="0"/>
             </a:endParaRPr>
@@ -21084,56 +21388,111 @@
             <p:ph type="title"/>
           </p:nvPr>
         </p:nvSpPr>
-        <p:spPr>
-          <a:xfrm>
-            <a:off x="539552" y="405408"/>
-            <a:ext cx="7543800" cy="1295400"/>
-          </a:xfrm>
-        </p:spPr>
+        <p:spPr/>
         <p:txBody>
           <a:bodyPr/>
           <a:lstStyle/>
           <a:p>
-            <a:pPr algn="ctr"/>
             <a:r>
               <a:rPr lang="de-DE" smtClean="0">
                 <a:solidFill>
-                  <a:schemeClr val="bg1">
-                    <a:lumMod val="50000"/>
-                  </a:schemeClr>
-                </a:solidFill>
-                <a:latin typeface="Bradley Hand ITC" panose="03070402050302030203" pitchFamily="66" charset="0"/>
-              </a:rPr>
-              <a:t>Thank you, Jodle and all others,</a:t>
-            </a:r>
-            <a:br>
-              <a:rPr lang="de-DE" smtClean="0">
-                <a:solidFill>
-                  <a:schemeClr val="bg1">
-                    <a:lumMod val="50000"/>
-                  </a:schemeClr>
-                </a:solidFill>
-                <a:latin typeface="Bradley Hand ITC" panose="03070402050302030203" pitchFamily="66" charset="0"/>
-              </a:rPr>
-            </a:br>
-            <a:r>
-              <a:rPr lang="de-DE" smtClean="0">
-                <a:solidFill>
-                  <a:schemeClr val="bg1">
-                    <a:lumMod val="50000"/>
-                  </a:schemeClr>
-                </a:solidFill>
-                <a:latin typeface="Bradley Hand ITC" panose="03070402050302030203" pitchFamily="66" charset="0"/>
-              </a:rPr>
-              <a:t>for your kind attention!</a:t>
+                  <a:srgbClr val="006600"/>
+                </a:solidFill>
+                <a:latin typeface="Calibri Light" panose="020F0302020204030204" pitchFamily="34" charset="0"/>
+                <a:cs typeface="Calibri Light" panose="020F0302020204030204" pitchFamily="34" charset="0"/>
+              </a:rPr>
+              <a:t>What have you missed?</a:t>
             </a:r>
             <a:endParaRPr lang="de-DE">
               <a:solidFill>
-                <a:schemeClr val="bg1">
-                  <a:lumMod val="50000"/>
-                </a:schemeClr>
+                <a:srgbClr val="006600"/>
               </a:solidFill>
-              <a:latin typeface="Bradley Hand ITC" panose="03070402050302030203" pitchFamily="66" charset="0"/>
+              <a:latin typeface="Calibri Light" panose="020F0302020204030204" pitchFamily="34" charset="0"/>
+              <a:cs typeface="Calibri Light" panose="020F0302020204030204" pitchFamily="34" charset="0"/>
+            </a:endParaRPr>
+          </a:p>
+        </p:txBody>
+      </p:sp>
+      <p:sp>
+        <p:nvSpPr>
+          <p:cNvPr id="3" name="Content Placeholder 2"/>
+          <p:cNvSpPr>
+            <a:spLocks noGrp="1"/>
+          </p:cNvSpPr>
+          <p:nvPr>
+            <p:ph idx="1"/>
+          </p:nvPr>
+        </p:nvSpPr>
+        <p:spPr/>
+        <p:txBody>
+          <a:bodyPr/>
+          <a:lstStyle/>
+          <a:p>
+            <a:r>
+              <a:rPr lang="de-DE" smtClean="0">
+                <a:latin typeface="Calibri Light" panose="020F0302020204030204" pitchFamily="34" charset="0"/>
+                <a:cs typeface="Calibri Light" panose="020F0302020204030204" pitchFamily="34" charset="0"/>
+              </a:rPr>
+              <a:t>Composite schemas – no imports yet</a:t>
+            </a:r>
+          </a:p>
+          <a:p>
+            <a:r>
+              <a:rPr lang="de-DE" smtClean="0">
+                <a:latin typeface="Calibri Light" panose="020F0302020204030204" pitchFamily="34" charset="0"/>
+                <a:cs typeface="Calibri Light" panose="020F0302020204030204" pitchFamily="34" charset="0"/>
+              </a:rPr>
+              <a:t>Variables declared within the schema</a:t>
+            </a:r>
+          </a:p>
+          <a:p>
+            <a:r>
+              <a:rPr lang="de-DE" smtClean="0">
+                <a:latin typeface="Calibri Light" panose="020F0302020204030204" pitchFamily="34" charset="0"/>
+                <a:cs typeface="Calibri Light" panose="020F0302020204030204" pitchFamily="34" charset="0"/>
+              </a:rPr>
+              <a:t>Formated validation results </a:t>
+            </a:r>
+          </a:p>
+          <a:p>
+            <a:r>
+              <a:rPr lang="de-DE" smtClean="0">
+                <a:latin typeface="Calibri Light" panose="020F0302020204030204" pitchFamily="34" charset="0"/>
+                <a:cs typeface="Calibri Light" panose="020F0302020204030204" pitchFamily="34" charset="0"/>
+              </a:rPr>
+              <a:t>Support for …</a:t>
+            </a:r>
+          </a:p>
+          <a:p>
+            <a:pPr marL="0" indent="0">
+              <a:buNone/>
+            </a:pPr>
+            <a:r>
+              <a:rPr lang="de-DE">
+                <a:latin typeface="Calibri Light" panose="020F0302020204030204" pitchFamily="34" charset="0"/>
+                <a:cs typeface="Calibri Light" panose="020F0302020204030204" pitchFamily="34" charset="0"/>
+              </a:rPr>
+              <a:t>	</a:t>
+            </a:r>
+            <a:r>
+              <a:rPr lang="de-DE" smtClean="0">
+                <a:latin typeface="Calibri Light" panose="020F0302020204030204" pitchFamily="34" charset="0"/>
+                <a:cs typeface="Calibri Light" panose="020F0302020204030204" pitchFamily="34" charset="0"/>
+              </a:rPr>
+              <a:t>schematron, JSON Schema, SHACL</a:t>
+            </a:r>
+          </a:p>
+          <a:p>
+            <a:r>
+              <a:rPr lang="de-DE" smtClean="0">
+                <a:latin typeface="Calibri Light" panose="020F0302020204030204" pitchFamily="34" charset="0"/>
+                <a:cs typeface="Calibri Light" panose="020F0302020204030204" pitchFamily="34" charset="0"/>
+              </a:rPr>
+              <a:t>Please fill in here: ______________________</a:t>
+            </a:r>
+            <a:endParaRPr lang="de-DE">
+              <a:latin typeface="Calibri Light" panose="020F0302020204030204" pitchFamily="34" charset="0"/>
+              <a:cs typeface="Calibri Light" panose="020F0302020204030204" pitchFamily="34" charset="0"/>
             </a:endParaRPr>
           </a:p>
         </p:txBody>
@@ -21214,6 +21573,181 @@
                 <a:defRPr/>
               </a:pPr>
               <a:t>28</a:t>
+            </a:fld>
+            <a:endParaRPr lang="de-DE" altLang="en-US"/>
+          </a:p>
+        </p:txBody>
+      </p:sp>
+    </p:spTree>
+    <p:extLst>
+      <p:ext uri="{BB962C8B-B14F-4D97-AF65-F5344CB8AC3E}">
+        <p14:creationId xmlns:p14="http://schemas.microsoft.com/office/powerpoint/2010/main" val="3062403288"/>
+      </p:ext>
+    </p:extLst>
+  </p:cSld>
+  <p:clrMapOvr>
+    <a:masterClrMapping/>
+  </p:clrMapOvr>
+</p:sld>
+</file>
+
+<file path=ppt/slides/slide29.xml><?xml version="1.0" encoding="utf-8"?>
+<p:sld xmlns:a="http://schemas.openxmlformats.org/drawingml/2006/main" xmlns:r="http://schemas.openxmlformats.org/officeDocument/2006/relationships" xmlns:p="http://schemas.openxmlformats.org/presentationml/2006/main">
+  <p:cSld>
+    <p:spTree>
+      <p:nvGrpSpPr>
+        <p:cNvPr id="1" name=""/>
+        <p:cNvGrpSpPr/>
+        <p:nvPr/>
+      </p:nvGrpSpPr>
+      <p:grpSpPr>
+        <a:xfrm>
+          <a:off x="0" y="0"/>
+          <a:ext cx="0" cy="0"/>
+          <a:chOff x="0" y="0"/>
+          <a:chExt cx="0" cy="0"/>
+        </a:xfrm>
+      </p:grpSpPr>
+      <p:sp>
+        <p:nvSpPr>
+          <p:cNvPr id="2" name="Title 1"/>
+          <p:cNvSpPr>
+            <a:spLocks noGrp="1"/>
+          </p:cNvSpPr>
+          <p:nvPr>
+            <p:ph type="title"/>
+          </p:nvPr>
+        </p:nvSpPr>
+        <p:spPr>
+          <a:xfrm>
+            <a:off x="539552" y="405408"/>
+            <a:ext cx="7543800" cy="1295400"/>
+          </a:xfrm>
+        </p:spPr>
+        <p:txBody>
+          <a:bodyPr/>
+          <a:lstStyle/>
+          <a:p>
+            <a:pPr algn="ctr"/>
+            <a:r>
+              <a:rPr lang="de-DE" smtClean="0">
+                <a:solidFill>
+                  <a:schemeClr val="bg1">
+                    <a:lumMod val="50000"/>
+                  </a:schemeClr>
+                </a:solidFill>
+                <a:latin typeface="Bradley Hand ITC" panose="03070402050302030203" pitchFamily="66" charset="0"/>
+              </a:rPr>
+              <a:t>Thank you, Jodle and all others,</a:t>
+            </a:r>
+            <a:br>
+              <a:rPr lang="de-DE" smtClean="0">
+                <a:solidFill>
+                  <a:schemeClr val="bg1">
+                    <a:lumMod val="50000"/>
+                  </a:schemeClr>
+                </a:solidFill>
+                <a:latin typeface="Bradley Hand ITC" panose="03070402050302030203" pitchFamily="66" charset="0"/>
+              </a:rPr>
+            </a:br>
+            <a:r>
+              <a:rPr lang="de-DE" smtClean="0">
+                <a:solidFill>
+                  <a:schemeClr val="bg1">
+                    <a:lumMod val="50000"/>
+                  </a:schemeClr>
+                </a:solidFill>
+                <a:latin typeface="Bradley Hand ITC" panose="03070402050302030203" pitchFamily="66" charset="0"/>
+              </a:rPr>
+              <a:t>for your kind attention!</a:t>
+            </a:r>
+            <a:endParaRPr lang="de-DE">
+              <a:solidFill>
+                <a:schemeClr val="bg1">
+                  <a:lumMod val="50000"/>
+                </a:schemeClr>
+              </a:solidFill>
+              <a:latin typeface="Bradley Hand ITC" panose="03070402050302030203" pitchFamily="66" charset="0"/>
+            </a:endParaRPr>
+          </a:p>
+        </p:txBody>
+      </p:sp>
+      <p:sp>
+        <p:nvSpPr>
+          <p:cNvPr id="4" name="Date Placeholder 3"/>
+          <p:cNvSpPr>
+            <a:spLocks noGrp="1"/>
+          </p:cNvSpPr>
+          <p:nvPr>
+            <p:ph type="dt" sz="half" idx="10"/>
+          </p:nvPr>
+        </p:nvSpPr>
+        <p:spPr/>
+        <p:txBody>
+          <a:bodyPr/>
+          <a:lstStyle/>
+          <a:p>
+            <a:pPr>
+              <a:defRPr/>
+            </a:pPr>
+            <a:r>
+              <a:rPr lang="de-DE" altLang="de-DE" smtClean="0"/>
+              <a:t>2020-10-08</a:t>
+            </a:r>
+            <a:endParaRPr lang="de-DE" altLang="en-US"/>
+          </a:p>
+        </p:txBody>
+      </p:sp>
+      <p:sp>
+        <p:nvSpPr>
+          <p:cNvPr id="5" name="Footer Placeholder 4"/>
+          <p:cNvSpPr>
+            <a:spLocks noGrp="1"/>
+          </p:cNvSpPr>
+          <p:nvPr>
+            <p:ph type="ftr" sz="quarter" idx="11"/>
+          </p:nvPr>
+        </p:nvSpPr>
+        <p:spPr/>
+        <p:txBody>
+          <a:bodyPr/>
+          <a:lstStyle/>
+          <a:p>
+            <a:pPr>
+              <a:defRPr/>
+            </a:pPr>
+            <a:r>
+              <a:rPr lang="de-DE" altLang="en-US" smtClean="0"/>
+              <a:t>Greenfox</a:t>
+            </a:r>
+            <a:endParaRPr lang="de-DE" altLang="en-US"/>
+          </a:p>
+        </p:txBody>
+      </p:sp>
+      <p:sp>
+        <p:nvSpPr>
+          <p:cNvPr id="6" name="Slide Number Placeholder 5"/>
+          <p:cNvSpPr>
+            <a:spLocks noGrp="1"/>
+          </p:cNvSpPr>
+          <p:nvPr>
+            <p:ph type="sldNum" sz="quarter" idx="12"/>
+          </p:nvPr>
+        </p:nvSpPr>
+        <p:spPr/>
+        <p:txBody>
+          <a:bodyPr/>
+          <a:lstStyle/>
+          <a:p>
+            <a:pPr>
+              <a:defRPr/>
+            </a:pPr>
+            <a:fld id="{F031B2F4-27D1-4E53-97CF-1947CD75B185}" type="slidenum">
+              <a:rPr lang="de-DE" altLang="en-US" smtClean="0"/>
+              <a:pPr>
+                <a:defRPr/>
+              </a:pPr>
+              <a:t>29</a:t>
             </a:fld>
             <a:endParaRPr lang="de-DE" altLang="en-US"/>
           </a:p>
@@ -22060,6 +22594,24 @@
           <a:bodyPr/>
           <a:lstStyle/>
           <a:p>
+            <a:endParaRPr lang="de-DE" smtClean="0">
+              <a:solidFill>
+                <a:srgbClr val="006600"/>
+              </a:solidFill>
+              <a:latin typeface="Calibri Light" panose="020F0302020204030204" pitchFamily="34" charset="0"/>
+              <a:cs typeface="Calibri Light" panose="020F0302020204030204" pitchFamily="34" charset="0"/>
+            </a:endParaRPr>
+          </a:p>
+          <a:p>
+            <a:endParaRPr lang="de-DE">
+              <a:solidFill>
+                <a:srgbClr val="006600"/>
+              </a:solidFill>
+              <a:latin typeface="Calibri Light" panose="020F0302020204030204" pitchFamily="34" charset="0"/>
+              <a:cs typeface="Calibri Light" panose="020F0302020204030204" pitchFamily="34" charset="0"/>
+            </a:endParaRPr>
+          </a:p>
+          <a:p>
             <a:r>
               <a:rPr lang="de-DE" smtClean="0">
                 <a:solidFill>
@@ -22068,10 +22620,8 @@
                 <a:latin typeface="Calibri Light" panose="020F0302020204030204" pitchFamily="34" charset="0"/>
                 <a:cs typeface="Calibri Light" panose="020F0302020204030204" pitchFamily="34" charset="0"/>
               </a:rPr>
-              <a:t>Guided tour – hands-on impressions</a:t>
-            </a:r>
-          </a:p>
-          <a:p>
+              <a:t>Guided </a:t>
+            </a:r>
             <a:r>
               <a:rPr lang="de-DE" smtClean="0">
                 <a:solidFill>
@@ -22080,7 +22630,7 @@
                 <a:latin typeface="Calibri Light" panose="020F0302020204030204" pitchFamily="34" charset="0"/>
                 <a:cs typeface="Calibri Light" panose="020F0302020204030204" pitchFamily="34" charset="0"/>
               </a:rPr>
-              <a:t>Big Picture – concepts and major features</a:t>
+              <a:t>tour – hands-on impressions</a:t>
             </a:r>
           </a:p>
           <a:p>
@@ -22092,7 +22642,7 @@
                 <a:latin typeface="Calibri Light" panose="020F0302020204030204" pitchFamily="34" charset="0"/>
                 <a:cs typeface="Calibri Light" panose="020F0302020204030204" pitchFamily="34" charset="0"/>
               </a:rPr>
-              <a:t>Overview of available constraint types</a:t>
+              <a:t>Big Picture – concepts and major features</a:t>
             </a:r>
           </a:p>
           <a:p>
@@ -22104,19 +22654,7 @@
                 <a:latin typeface="Calibri Light" panose="020F0302020204030204" pitchFamily="34" charset="0"/>
                 <a:cs typeface="Calibri Light" panose="020F0302020204030204" pitchFamily="34" charset="0"/>
               </a:rPr>
-              <a:t>Zooming in - look at a few constraint types</a:t>
-            </a:r>
-          </a:p>
-          <a:p>
-            <a:r>
-              <a:rPr lang="de-DE" smtClean="0">
-                <a:solidFill>
-                  <a:srgbClr val="006600"/>
-                </a:solidFill>
-                <a:latin typeface="Calibri Light" panose="020F0302020204030204" pitchFamily="34" charset="0"/>
-                <a:cs typeface="Calibri Light" panose="020F0302020204030204" pitchFamily="34" charset="0"/>
-              </a:rPr>
-              <a:t>What now – an outlook</a:t>
+              <a:t>Overview of available constraint types</a:t>
             </a:r>
           </a:p>
           <a:p>
@@ -22482,11 +23020,7 @@
             </a:r>
             <a:r>
               <a:rPr lang="de-DE" i="1"/>
-              <a:t>of all airport data</a:t>
-            </a:r>
-            <a:r>
-              <a:rPr lang="de-DE" i="1"/>
-              <a:t>:</a:t>
+              <a:t>of all airport data:</a:t>
             </a:r>
             <a:r>
               <a:rPr lang="de-DE"/>

</xml_diff>

<commit_message>
Added a teaser for the amazing fox.
</commit_message>
<xml_diff>
--- a/declarative-amsterdam-2020/an-introduction-to-greenfox/an-introduction-to-greenfox.pptx
+++ b/declarative-amsterdam-2020/an-introduction-to-greenfox/an-introduction-to-greenfox.pptx
@@ -5,10 +5,10 @@
     <p:sldMasterId id="2147483710" r:id="rId1"/>
   </p:sldMasterIdLst>
   <p:notesMasterIdLst>
-    <p:notesMasterId r:id="rId31"/>
+    <p:notesMasterId r:id="rId32"/>
   </p:notesMasterIdLst>
   <p:handoutMasterIdLst>
-    <p:handoutMasterId r:id="rId32"/>
+    <p:handoutMasterId r:id="rId33"/>
   </p:handoutMasterIdLst>
   <p:sldIdLst>
     <p:sldId id="925" r:id="rId2"/>
@@ -33,13 +33,14 @@
     <p:sldId id="1232" r:id="rId21"/>
     <p:sldId id="1236" r:id="rId22"/>
     <p:sldId id="1237" r:id="rId23"/>
-    <p:sldId id="1238" r:id="rId24"/>
-    <p:sldId id="1239" r:id="rId25"/>
-    <p:sldId id="1240" r:id="rId26"/>
-    <p:sldId id="1248" r:id="rId27"/>
-    <p:sldId id="1247" r:id="rId28"/>
-    <p:sldId id="1250" r:id="rId29"/>
-    <p:sldId id="1243" r:id="rId30"/>
+    <p:sldId id="1251" r:id="rId24"/>
+    <p:sldId id="1238" r:id="rId25"/>
+    <p:sldId id="1239" r:id="rId26"/>
+    <p:sldId id="1240" r:id="rId27"/>
+    <p:sldId id="1248" r:id="rId28"/>
+    <p:sldId id="1247" r:id="rId29"/>
+    <p:sldId id="1250" r:id="rId30"/>
+    <p:sldId id="1243" r:id="rId31"/>
   </p:sldIdLst>
   <p:sldSz cx="9144000" cy="6858000" type="screen4x3"/>
   <p:notesSz cx="6858000" cy="9945688"/>
@@ -1690,7 +1691,97 @@
               <a:pPr>
                 <a:defRPr/>
               </a:pPr>
-              <a:t>26</a:t>
+              <a:t>23</a:t>
+            </a:fld>
+            <a:endParaRPr lang="de-DE" altLang="de-DE"/>
+          </a:p>
+        </p:txBody>
+      </p:sp>
+    </p:spTree>
+    <p:extLst>
+      <p:ext uri="{BB962C8B-B14F-4D97-AF65-F5344CB8AC3E}">
+        <p14:creationId xmlns:p14="http://schemas.microsoft.com/office/powerpoint/2010/main" val="3575266712"/>
+      </p:ext>
+    </p:extLst>
+  </p:cSld>
+  <p:clrMapOvr>
+    <a:masterClrMapping/>
+  </p:clrMapOvr>
+</p:notes>
+</file>
+
+<file path=ppt/notesSlides/notesSlide14.xml><?xml version="1.0" encoding="utf-8"?>
+<p:notes xmlns:a="http://schemas.openxmlformats.org/drawingml/2006/main" xmlns:r="http://schemas.openxmlformats.org/officeDocument/2006/relationships" xmlns:p="http://schemas.openxmlformats.org/presentationml/2006/main">
+  <p:cSld>
+    <p:spTree>
+      <p:nvGrpSpPr>
+        <p:cNvPr id="1" name=""/>
+        <p:cNvGrpSpPr/>
+        <p:nvPr/>
+      </p:nvGrpSpPr>
+      <p:grpSpPr>
+        <a:xfrm>
+          <a:off x="0" y="0"/>
+          <a:ext cx="0" cy="0"/>
+          <a:chOff x="0" y="0"/>
+          <a:chExt cx="0" cy="0"/>
+        </a:xfrm>
+      </p:grpSpPr>
+      <p:sp>
+        <p:nvSpPr>
+          <p:cNvPr id="2" name="Slide Image Placeholder 1"/>
+          <p:cNvSpPr>
+            <a:spLocks noGrp="1" noRot="1" noChangeAspect="1"/>
+          </p:cNvSpPr>
+          <p:nvPr>
+            <p:ph type="sldImg"/>
+          </p:nvPr>
+        </p:nvSpPr>
+        <p:spPr/>
+      </p:sp>
+      <p:sp>
+        <p:nvSpPr>
+          <p:cNvPr id="3" name="Notes Placeholder 2"/>
+          <p:cNvSpPr>
+            <a:spLocks noGrp="1"/>
+          </p:cNvSpPr>
+          <p:nvPr>
+            <p:ph type="body" idx="1"/>
+          </p:nvPr>
+        </p:nvSpPr>
+        <p:spPr/>
+        <p:txBody>
+          <a:bodyPr/>
+          <a:lstStyle/>
+          <a:p>
+            <a:endParaRPr lang="de-DE"/>
+          </a:p>
+        </p:txBody>
+      </p:sp>
+      <p:sp>
+        <p:nvSpPr>
+          <p:cNvPr id="4" name="Slide Number Placeholder 3"/>
+          <p:cNvSpPr>
+            <a:spLocks noGrp="1"/>
+          </p:cNvSpPr>
+          <p:nvPr>
+            <p:ph type="sldNum" sz="quarter" idx="10"/>
+          </p:nvPr>
+        </p:nvSpPr>
+        <p:spPr/>
+        <p:txBody>
+          <a:bodyPr/>
+          <a:lstStyle/>
+          <a:p>
+            <a:pPr>
+              <a:defRPr/>
+            </a:pPr>
+            <a:fld id="{C808F741-F631-4E00-8D1F-D4687A839150}" type="slidenum">
+              <a:rPr lang="de-DE" altLang="de-DE" smtClean="0"/>
+              <a:pPr>
+                <a:defRPr/>
+              </a:pPr>
+              <a:t>27</a:t>
             </a:fld>
             <a:endParaRPr lang="de-DE" altLang="de-DE"/>
           </a:p>
@@ -20375,22 +20466,27 @@
             <p:ph type="title"/>
           </p:nvPr>
         </p:nvSpPr>
-        <p:spPr/>
+        <p:spPr>
+          <a:xfrm>
+            <a:off x="457200" y="116632"/>
+            <a:ext cx="7543800" cy="1295400"/>
+          </a:xfrm>
+        </p:spPr>
         <p:txBody>
           <a:bodyPr/>
           <a:lstStyle/>
           <a:p>
             <a:r>
-              <a:rPr lang="de-DE" smtClean="0">
+              <a:rPr lang="de-DE" i="1" smtClean="0">
                 <a:solidFill>
                   <a:srgbClr val="006600"/>
                 </a:solidFill>
                 <a:latin typeface="Calibri Light" panose="020F0302020204030204" pitchFamily="34" charset="0"/>
                 <a:cs typeface="Calibri Light" panose="020F0302020204030204" pitchFamily="34" charset="0"/>
               </a:rPr>
-              <a:t>Results &amp; Reports</a:t>
-            </a:r>
-            <a:endParaRPr lang="de-DE">
+              <a:t>Intermezzo (interfoxo)</a:t>
+            </a:r>
+            <a:endParaRPr lang="de-DE" i="1">
               <a:solidFill>
                 <a:srgbClr val="006600"/>
               </a:solidFill>
@@ -20415,18 +20511,6 @@
           <a:bodyPr/>
           <a:lstStyle/>
           <a:p>
-            <a:r>
-              <a:rPr lang="de-DE" sz="2400" smtClean="0">
-                <a:solidFill>
-                  <a:srgbClr val="006600"/>
-                </a:solidFill>
-                <a:latin typeface="Calibri Light" panose="020F0302020204030204" pitchFamily="34" charset="0"/>
-                <a:cs typeface="Calibri Light" panose="020F0302020204030204" pitchFamily="34" charset="0"/>
-              </a:rPr>
-              <a:t>Validation result =</a:t>
-            </a:r>
-          </a:p>
-          <a:p>
             <a:pPr marL="0" indent="0">
               <a:buNone/>
             </a:pPr>
@@ -20438,22 +20522,18 @@
                 <a:latin typeface="Calibri Light" panose="020F0302020204030204" pitchFamily="34" charset="0"/>
                 <a:cs typeface="Calibri Light" panose="020F0302020204030204" pitchFamily="34" charset="0"/>
               </a:rPr>
-              <a:t>Outcome of checking a single resource against a single constraint</a:t>
-            </a:r>
-          </a:p>
-          <a:p>
+              <a:t>Please take note of </a:t>
+            </a:r>
             <a:r>
               <a:rPr lang="de-DE" sz="2400" smtClean="0">
                 <a:solidFill>
-                  <a:srgbClr val="006600"/>
+                  <a:srgbClr val="CC6600"/>
                 </a:solidFill>
                 <a:latin typeface="Calibri Light" panose="020F0302020204030204" pitchFamily="34" charset="0"/>
                 <a:cs typeface="Calibri Light" panose="020F0302020204030204" pitchFamily="34" charset="0"/>
               </a:rPr>
-              <a:t>XML element &lt;red&gt;, &lt;green&gt;</a:t>
-            </a:r>
-          </a:p>
-          <a:p>
+              <a:t>the amazing fox</a:t>
+            </a:r>
             <a:r>
               <a:rPr lang="de-DE" sz="2400" smtClean="0">
                 <a:solidFill>
@@ -20462,11 +20542,25 @@
                 <a:latin typeface="Calibri Light" panose="020F0302020204030204" pitchFamily="34" charset="0"/>
                 <a:cs typeface="Calibri Light" panose="020F0302020204030204" pitchFamily="34" charset="0"/>
               </a:rPr>
-              <a:t>Attributes and child elements …</a:t>
-            </a:r>
-          </a:p>
-          <a:p>
-            <a:pPr lvl="1"/>
+              <a:t> – take a look at</a:t>
+            </a:r>
+          </a:p>
+          <a:p>
+            <a:pPr marL="0" indent="0">
+              <a:buNone/>
+            </a:pPr>
+            <a:endParaRPr lang="de-DE" sz="2400" smtClean="0">
+              <a:solidFill>
+                <a:srgbClr val="006600"/>
+              </a:solidFill>
+              <a:latin typeface="Calibri Light" panose="020F0302020204030204" pitchFamily="34" charset="0"/>
+              <a:cs typeface="Calibri Light" panose="020F0302020204030204" pitchFamily="34" charset="0"/>
+            </a:endParaRPr>
+          </a:p>
+          <a:p>
+            <a:pPr marL="0" indent="0">
+              <a:buNone/>
+            </a:pPr>
             <a:r>
               <a:rPr lang="de-DE" sz="2000" smtClean="0">
                 <a:solidFill>
@@ -20475,148 +20569,416 @@
                 <a:latin typeface="Calibri Light" panose="020F0302020204030204" pitchFamily="34" charset="0"/>
                 <a:cs typeface="Calibri Light" panose="020F0302020204030204" pitchFamily="34" charset="0"/>
               </a:rPr>
-              <a:t>Identify the resource</a:t>
-            </a:r>
-          </a:p>
-          <a:p>
-            <a:pPr lvl="1"/>
-            <a:r>
-              <a:rPr lang="de-DE" sz="2000" smtClean="0">
-                <a:solidFill>
-                  <a:srgbClr val="006600"/>
-                </a:solidFill>
-                <a:latin typeface="Calibri Light" panose="020F0302020204030204" pitchFamily="34" charset="0"/>
-                <a:cs typeface="Calibri Light" panose="020F0302020204030204" pitchFamily="34" charset="0"/>
-              </a:rPr>
-              <a:t>Identify the constraint component</a:t>
-            </a:r>
-          </a:p>
-          <a:p>
-            <a:pPr lvl="1"/>
-            <a:r>
-              <a:rPr lang="de-DE" sz="2000" smtClean="0">
-                <a:solidFill>
-                  <a:srgbClr val="006600"/>
-                </a:solidFill>
-                <a:latin typeface="Calibri Light" panose="020F0302020204030204" pitchFamily="34" charset="0"/>
-                <a:cs typeface="Calibri Light" panose="020F0302020204030204" pitchFamily="34" charset="0"/>
-              </a:rPr>
-              <a:t>Constraint location in the schema</a:t>
-            </a:r>
-          </a:p>
-          <a:p>
-            <a:pPr lvl="1"/>
-            <a:r>
-              <a:rPr lang="de-DE" sz="2000" smtClean="0">
-                <a:solidFill>
-                  <a:srgbClr val="006600"/>
-                </a:solidFill>
-                <a:latin typeface="Calibri Light" panose="020F0302020204030204" pitchFamily="34" charset="0"/>
-                <a:cs typeface="Calibri Light" panose="020F0302020204030204" pitchFamily="34" charset="0"/>
-              </a:rPr>
-              <a:t>Selected constraint parameters</a:t>
-            </a:r>
-          </a:p>
-          <a:p>
-            <a:pPr lvl="1"/>
-            <a:r>
-              <a:rPr lang="de-DE" sz="2000" smtClean="0">
-                <a:solidFill>
-                  <a:srgbClr val="006600"/>
-                </a:solidFill>
-                <a:latin typeface="Calibri Light" panose="020F0302020204030204" pitchFamily="34" charset="0"/>
-                <a:cs typeface="Calibri Light" panose="020F0302020204030204" pitchFamily="34" charset="0"/>
-              </a:rPr>
-              <a:t>Observations</a:t>
-            </a:r>
+              <a:t>$greenfox/declarative-amsterdam-2020/the-amazing-fox/the-amazing-fox.txt</a:t>
+            </a:r>
+            <a:endParaRPr lang="de-DE" sz="2000" smtClean="0">
+              <a:solidFill>
+                <a:srgbClr val="006600"/>
+              </a:solidFill>
+              <a:latin typeface="Calibri Light" panose="020F0302020204030204" pitchFamily="34" charset="0"/>
+              <a:cs typeface="Calibri Light" panose="020F0302020204030204" pitchFamily="34" charset="0"/>
+            </a:endParaRPr>
           </a:p>
         </p:txBody>
       </p:sp>
       <p:sp>
         <p:nvSpPr>
-          <p:cNvPr id="4" name="Date Placeholder 3"/>
-          <p:cNvSpPr>
-            <a:spLocks noGrp="1"/>
-          </p:cNvSpPr>
-          <p:nvPr>
-            <p:ph type="dt" sz="half" idx="10"/>
-          </p:nvPr>
+          <p:cNvPr id="8" name="TextBox 7"/>
+          <p:cNvSpPr txBox="1"/>
+          <p:nvPr/>
         </p:nvSpPr>
-        <p:spPr/>
+        <p:spPr>
+          <a:xfrm>
+            <a:off x="456583" y="3573016"/>
+            <a:ext cx="8454559" cy="3108543"/>
+          </a:xfrm>
+          <a:prstGeom prst="rect">
+            <a:avLst/>
+          </a:prstGeom>
+          <a:noFill/>
+        </p:spPr>
         <p:txBody>
-          <a:bodyPr/>
+          <a:bodyPr wrap="none" rtlCol="0">
+            <a:spAutoFit/>
+          </a:bodyPr>
           <a:lstStyle/>
           <a:p>
-            <a:pPr>
-              <a:defRPr/>
-            </a:pPr>
-            <a:r>
-              <a:rPr lang="de-DE" altLang="de-DE" smtClean="0"/>
-              <a:t>2020-10-08</a:t>
-            </a:r>
-            <a:endParaRPr lang="de-DE" altLang="en-US"/>
+            <a:r>
+              <a:rPr lang="de-DE" b="0" smtClean="0">
+                <a:solidFill>
+                  <a:srgbClr val="006600"/>
+                </a:solidFill>
+                <a:latin typeface="Calibri Light" panose="020F0302020204030204" pitchFamily="34" charset="0"/>
+                <a:cs typeface="Calibri Light" panose="020F0302020204030204" pitchFamily="34" charset="0"/>
+              </a:rPr>
+              <a:t>For example, node tree and file system navigation can be freely mixed, e.g.</a:t>
+            </a:r>
+          </a:p>
+          <a:p>
+            <a:endParaRPr lang="de-DE">
+              <a:solidFill>
+                <a:srgbClr val="006600"/>
+              </a:solidFill>
+              <a:latin typeface="Calibri Light" panose="020F0302020204030204" pitchFamily="34" charset="0"/>
+              <a:cs typeface="Calibri Light" panose="020F0302020204030204" pitchFamily="34" charset="0"/>
+            </a:endParaRPr>
+          </a:p>
+          <a:p>
+            <a:r>
+              <a:rPr lang="de-DE" sz="1600" b="0" smtClean="0">
+                <a:solidFill>
+                  <a:srgbClr val="C00000"/>
+                </a:solidFill>
+                <a:latin typeface="Courier New" panose="02070309020205020404" pitchFamily="49" charset="0"/>
+                <a:cs typeface="Courier New" panose="02070309020205020404" pitchFamily="49" charset="0"/>
+              </a:rPr>
+              <a:t>    fox</a:t>
+            </a:r>
+            <a:r>
+              <a:rPr lang="de-DE" sz="1600" b="0" smtClean="0">
+                <a:solidFill>
+                  <a:srgbClr val="006600"/>
+                </a:solidFill>
+                <a:latin typeface="Courier New" panose="02070309020205020404" pitchFamily="49" charset="0"/>
+                <a:cs typeface="Courier New" panose="02070309020205020404" pitchFamily="49" charset="0"/>
+              </a:rPr>
+              <a:t> </a:t>
+            </a:r>
+            <a:r>
+              <a:rPr lang="de-DE" sz="1600" b="0">
+                <a:solidFill>
+                  <a:srgbClr val="006600"/>
+                </a:solidFill>
+                <a:latin typeface="Courier New" panose="02070309020205020404" pitchFamily="49" charset="0"/>
+                <a:cs typeface="Courier New" panose="02070309020205020404" pitchFamily="49" charset="0"/>
+              </a:rPr>
+              <a:t>"ancestor~::decl*</a:t>
+            </a:r>
+            <a:r>
+              <a:rPr lang="de-DE" sz="1600" b="0">
+                <a:solidFill>
+                  <a:srgbClr val="C00000"/>
+                </a:solidFill>
+                <a:latin typeface="Courier New" panose="02070309020205020404" pitchFamily="49" charset="0"/>
+                <a:cs typeface="Courier New" panose="02070309020205020404" pitchFamily="49" charset="0"/>
+              </a:rPr>
+              <a:t>//</a:t>
+            </a:r>
+            <a:r>
+              <a:rPr lang="de-DE" sz="1600" b="0">
+                <a:solidFill>
+                  <a:srgbClr val="006600"/>
+                </a:solidFill>
+                <a:latin typeface="Courier New" panose="02070309020205020404" pitchFamily="49" charset="0"/>
+                <a:cs typeface="Courier New" panose="02070309020205020404" pitchFamily="49" charset="0"/>
+              </a:rPr>
+              <a:t>*.gfox.xml[</a:t>
+            </a:r>
+            <a:r>
+              <a:rPr lang="de-DE" sz="1600" b="0">
+                <a:solidFill>
+                  <a:srgbClr val="C00000"/>
+                </a:solidFill>
+                <a:latin typeface="Courier New" panose="02070309020205020404" pitchFamily="49" charset="0"/>
+                <a:cs typeface="Courier New" panose="02070309020205020404" pitchFamily="49" charset="0"/>
+              </a:rPr>
+              <a:t>\\</a:t>
+            </a:r>
+            <a:r>
+              <a:rPr lang="de-DE" sz="1600" b="0">
+                <a:solidFill>
+                  <a:srgbClr val="006600"/>
+                </a:solidFill>
+                <a:latin typeface="Courier New" panose="02070309020205020404" pitchFamily="49" charset="0"/>
+                <a:cs typeface="Courier New" panose="02070309020205020404" pitchFamily="49" charset="0"/>
+              </a:rPr>
+              <a:t>*:</a:t>
+            </a:r>
+            <a:r>
+              <a:rPr lang="de-DE" sz="1600" b="0">
+                <a:solidFill>
+                  <a:srgbClr val="006600"/>
+                </a:solidFill>
+                <a:latin typeface="Courier New" panose="02070309020205020404" pitchFamily="49" charset="0"/>
+                <a:cs typeface="Courier New" panose="02070309020205020404" pitchFamily="49" charset="0"/>
+              </a:rPr>
+              <a:t>docSimilar</a:t>
+            </a:r>
+            <a:r>
+              <a:rPr lang="de-DE" sz="1600" b="0" smtClean="0">
+                <a:solidFill>
+                  <a:srgbClr val="006600"/>
+                </a:solidFill>
+                <a:latin typeface="Courier New" panose="02070309020205020404" pitchFamily="49" charset="0"/>
+                <a:cs typeface="Courier New" panose="02070309020205020404" pitchFamily="49" charset="0"/>
+              </a:rPr>
+              <a:t>]"</a:t>
+            </a:r>
+          </a:p>
+          <a:p>
+            <a:endParaRPr lang="de-DE" b="0">
+              <a:solidFill>
+                <a:srgbClr val="006600"/>
+              </a:solidFill>
+              <a:latin typeface="Courier New" panose="02070309020205020404" pitchFamily="49" charset="0"/>
+              <a:cs typeface="Courier New" panose="02070309020205020404" pitchFamily="49" charset="0"/>
+            </a:endParaRPr>
+          </a:p>
+          <a:p>
+            <a:r>
+              <a:rPr lang="de-DE" b="0" smtClean="0">
+                <a:solidFill>
+                  <a:srgbClr val="006600"/>
+                </a:solidFill>
+                <a:latin typeface="Calibri Light" panose="020F0302020204030204" pitchFamily="34" charset="0"/>
+                <a:cs typeface="Calibri Light" panose="020F0302020204030204" pitchFamily="34" charset="0"/>
+              </a:rPr>
+              <a:t>selects files based on their structured XML content. Or</a:t>
+            </a:r>
+          </a:p>
+          <a:p>
+            <a:endParaRPr lang="de-DE" b="0">
+              <a:solidFill>
+                <a:srgbClr val="006600"/>
+              </a:solidFill>
+              <a:latin typeface="Calibri Light" panose="020F0302020204030204" pitchFamily="34" charset="0"/>
+              <a:cs typeface="Calibri Light" panose="020F0302020204030204" pitchFamily="34" charset="0"/>
+            </a:endParaRPr>
+          </a:p>
+          <a:p>
+            <a:r>
+              <a:rPr lang="de-DE" sz="1600" b="0" smtClean="0">
+                <a:solidFill>
+                  <a:srgbClr val="C00000"/>
+                </a:solidFill>
+                <a:latin typeface="Courier New" panose="02070309020205020404" pitchFamily="49" charset="0"/>
+                <a:cs typeface="Courier New" panose="02070309020205020404" pitchFamily="49" charset="0"/>
+              </a:rPr>
+              <a:t>    fox</a:t>
+            </a:r>
+            <a:r>
+              <a:rPr lang="de-DE" sz="1600" b="0" smtClean="0">
+                <a:solidFill>
+                  <a:srgbClr val="006600"/>
+                </a:solidFill>
+                <a:latin typeface="Courier New" panose="02070309020205020404" pitchFamily="49" charset="0"/>
+                <a:cs typeface="Courier New" panose="02070309020205020404" pitchFamily="49" charset="0"/>
+              </a:rPr>
+              <a:t> </a:t>
+            </a:r>
+            <a:r>
+              <a:rPr lang="de-DE" sz="1600" b="0">
+                <a:solidFill>
+                  <a:srgbClr val="006600"/>
+                </a:solidFill>
+                <a:latin typeface="Courier New" panose="02070309020205020404" pitchFamily="49" charset="0"/>
+                <a:cs typeface="Courier New" panose="02070309020205020404" pitchFamily="49" charset="0"/>
+              </a:rPr>
+              <a:t>"ancestor~::decl*</a:t>
+            </a:r>
+            <a:r>
+              <a:rPr lang="de-DE" sz="1600" b="0">
+                <a:solidFill>
+                  <a:srgbClr val="C00000"/>
+                </a:solidFill>
+                <a:latin typeface="Courier New" panose="02070309020205020404" pitchFamily="49" charset="0"/>
+                <a:cs typeface="Courier New" panose="02070309020205020404" pitchFamily="49" charset="0"/>
+              </a:rPr>
+              <a:t>//</a:t>
+            </a:r>
+            <a:r>
+              <a:rPr lang="de-DE" sz="1600" b="0">
+                <a:solidFill>
+                  <a:srgbClr val="006600"/>
+                </a:solidFill>
+                <a:latin typeface="Courier New" panose="02070309020205020404" pitchFamily="49" charset="0"/>
+                <a:cs typeface="Courier New" panose="02070309020205020404" pitchFamily="49" charset="0"/>
+              </a:rPr>
+              <a:t>airport-*.json</a:t>
+            </a:r>
+            <a:r>
+              <a:rPr lang="de-DE" sz="1600" b="0">
+                <a:solidFill>
+                  <a:srgbClr val="C00000"/>
+                </a:solidFill>
+                <a:latin typeface="Courier New" panose="02070309020205020404" pitchFamily="49" charset="0"/>
+                <a:cs typeface="Courier New" panose="02070309020205020404" pitchFamily="49" charset="0"/>
+              </a:rPr>
+              <a:t>/</a:t>
+            </a:r>
+            <a:r>
+              <a:rPr lang="de-DE" sz="1600" b="0">
+                <a:solidFill>
+                  <a:srgbClr val="006600"/>
+                </a:solidFill>
+                <a:latin typeface="Courier New" panose="02070309020205020404" pitchFamily="49" charset="0"/>
+                <a:cs typeface="Courier New" panose="02070309020205020404" pitchFamily="49" charset="0"/>
+              </a:rPr>
+              <a:t>jdoc(.)[</a:t>
+            </a:r>
+            <a:r>
+              <a:rPr lang="de-DE" sz="1600" b="0">
+                <a:solidFill>
+                  <a:srgbClr val="C00000"/>
+                </a:solidFill>
+                <a:latin typeface="Courier New" panose="02070309020205020404" pitchFamily="49" charset="0"/>
+                <a:cs typeface="Courier New" panose="02070309020205020404" pitchFamily="49" charset="0"/>
+              </a:rPr>
+              <a:t>\\</a:t>
+            </a:r>
+            <a:r>
+              <a:rPr lang="de-DE" sz="1600" b="0">
+                <a:solidFill>
+                  <a:srgbClr val="006600"/>
+                </a:solidFill>
+                <a:latin typeface="Courier New" panose="02070309020205020404" pitchFamily="49" charset="0"/>
+                <a:cs typeface="Courier New" panose="02070309020205020404" pitchFamily="49" charset="0"/>
+              </a:rPr>
+              <a:t>iata eq </a:t>
+            </a:r>
+            <a:r>
+              <a:rPr lang="de-DE" sz="1600" b="0">
+                <a:solidFill>
+                  <a:srgbClr val="006600"/>
+                </a:solidFill>
+                <a:latin typeface="Courier New" panose="02070309020205020404" pitchFamily="49" charset="0"/>
+                <a:cs typeface="Courier New" panose="02070309020205020404" pitchFamily="49" charset="0"/>
+              </a:rPr>
+              <a:t>'WAT</a:t>
+            </a:r>
+            <a:r>
+              <a:rPr lang="de-DE" sz="1600" b="0" smtClean="0">
+                <a:solidFill>
+                  <a:srgbClr val="006600"/>
+                </a:solidFill>
+                <a:latin typeface="Courier New" panose="02070309020205020404" pitchFamily="49" charset="0"/>
+                <a:cs typeface="Courier New" panose="02070309020205020404" pitchFamily="49" charset="0"/>
+              </a:rPr>
+              <a:t>']"</a:t>
+            </a:r>
+          </a:p>
+          <a:p>
+            <a:endParaRPr lang="de-DE" b="0">
+              <a:solidFill>
+                <a:srgbClr val="006600"/>
+              </a:solidFill>
+              <a:latin typeface="Calibri Light" panose="020F0302020204030204" pitchFamily="34" charset="0"/>
+              <a:cs typeface="Calibri Light" panose="020F0302020204030204" pitchFamily="34" charset="0"/>
+            </a:endParaRPr>
+          </a:p>
+          <a:p>
+            <a:r>
+              <a:rPr lang="de-DE" b="0" smtClean="0">
+                <a:solidFill>
+                  <a:srgbClr val="006600"/>
+                </a:solidFill>
+                <a:latin typeface="Calibri Light" panose="020F0302020204030204" pitchFamily="34" charset="0"/>
+                <a:cs typeface="Calibri Light" panose="020F0302020204030204" pitchFamily="34" charset="0"/>
+              </a:rPr>
+              <a:t>selects files base on their structured JSON content.</a:t>
+            </a:r>
+            <a:endParaRPr lang="de-DE" b="0">
+              <a:solidFill>
+                <a:srgbClr val="006600"/>
+              </a:solidFill>
+              <a:latin typeface="Calibri Light" panose="020F0302020204030204" pitchFamily="34" charset="0"/>
+              <a:cs typeface="Calibri Light" panose="020F0302020204030204" pitchFamily="34" charset="0"/>
+            </a:endParaRPr>
+          </a:p>
+          <a:p>
+            <a:endParaRPr lang="de-DE" b="0">
+              <a:solidFill>
+                <a:srgbClr val="006600"/>
+              </a:solidFill>
+              <a:latin typeface="Courier New" panose="02070309020205020404" pitchFamily="49" charset="0"/>
+              <a:cs typeface="Courier New" panose="02070309020205020404" pitchFamily="49" charset="0"/>
+            </a:endParaRPr>
+          </a:p>
+          <a:p>
+            <a:endParaRPr lang="de-DE"/>
           </a:p>
         </p:txBody>
       </p:sp>
       <p:sp>
         <p:nvSpPr>
-          <p:cNvPr id="5" name="Footer Placeholder 4"/>
-          <p:cNvSpPr>
-            <a:spLocks noGrp="1"/>
-          </p:cNvSpPr>
-          <p:nvPr>
-            <p:ph type="ftr" sz="quarter" idx="11"/>
-          </p:nvPr>
+          <p:cNvPr id="9" name="TextBox 8"/>
+          <p:cNvSpPr txBox="1"/>
+          <p:nvPr/>
         </p:nvSpPr>
-        <p:spPr/>
+        <p:spPr>
+          <a:xfrm>
+            <a:off x="-1332656" y="6309320"/>
+            <a:ext cx="72008" cy="369332"/>
+          </a:xfrm>
+          <a:prstGeom prst="rect">
+            <a:avLst/>
+          </a:prstGeom>
+          <a:noFill/>
+        </p:spPr>
         <p:txBody>
-          <a:bodyPr/>
+          <a:bodyPr wrap="square" rtlCol="0">
+            <a:spAutoFit/>
+          </a:bodyPr>
           <a:lstStyle/>
           <a:p>
-            <a:pPr>
-              <a:defRPr/>
-            </a:pPr>
-            <a:r>
-              <a:rPr lang="de-DE" altLang="en-US" smtClean="0"/>
-              <a:t>Greenfox</a:t>
-            </a:r>
-            <a:endParaRPr lang="de-DE" altLang="en-US"/>
+            <a:endParaRPr lang="de-DE"/>
           </a:p>
         </p:txBody>
       </p:sp>
       <p:sp>
         <p:nvSpPr>
-          <p:cNvPr id="6" name="Slide Number Placeholder 5"/>
-          <p:cNvSpPr>
-            <a:spLocks noGrp="1"/>
-          </p:cNvSpPr>
-          <p:nvPr>
-            <p:ph type="sldNum" sz="quarter" idx="12"/>
-          </p:nvPr>
+          <p:cNvPr id="10" name="TextBox 9"/>
+          <p:cNvSpPr txBox="1"/>
+          <p:nvPr/>
         </p:nvSpPr>
-        <p:spPr/>
+        <p:spPr>
+          <a:xfrm>
+            <a:off x="179512" y="6307723"/>
+            <a:ext cx="8933215" cy="338554"/>
+          </a:xfrm>
+          <a:prstGeom prst="rect">
+            <a:avLst/>
+          </a:prstGeom>
+          <a:noFill/>
+        </p:spPr>
         <p:txBody>
-          <a:bodyPr/>
+          <a:bodyPr wrap="none" rtlCol="0">
+            <a:spAutoFit/>
+          </a:bodyPr>
           <a:lstStyle/>
           <a:p>
-            <a:pPr>
-              <a:defRPr/>
-            </a:pPr>
-            <a:fld id="{F031B2F4-27D1-4E53-97CF-1947CD75B185}" type="slidenum">
-              <a:rPr lang="de-DE" altLang="en-US" smtClean="0"/>
-              <a:pPr>
-                <a:defRPr/>
-              </a:pPr>
-              <a:t>23</a:t>
-            </a:fld>
-            <a:endParaRPr lang="de-DE" altLang="en-US"/>
+            <a:r>
+              <a:rPr lang="de-DE" sz="1600" smtClean="0">
+                <a:latin typeface="Calibri Light" panose="020F0302020204030204" pitchFamily="34" charset="0"/>
+                <a:cs typeface="Calibri Light" panose="020F0302020204030204" pitchFamily="34" charset="0"/>
+              </a:rPr>
+              <a:t>NOTE: In Greenfox, the roles of / and \ are reversed. If you use fox with option </a:t>
+            </a:r>
+            <a:r>
+              <a:rPr lang="de-DE" sz="1600" smtClean="0">
+                <a:latin typeface="Courier New" panose="02070309020205020404" pitchFamily="49" charset="0"/>
+                <a:cs typeface="Courier New" panose="02070309020205020404" pitchFamily="49" charset="0"/>
+              </a:rPr>
+              <a:t>–b</a:t>
+            </a:r>
+            <a:r>
+              <a:rPr lang="de-DE" sz="1600" smtClean="0">
+                <a:latin typeface="Calibri Light" panose="020F0302020204030204" pitchFamily="34" charset="0"/>
+                <a:cs typeface="Calibri Light" panose="020F0302020204030204" pitchFamily="34" charset="0"/>
+              </a:rPr>
+              <a:t>, it behaves like Greenfox.</a:t>
+            </a:r>
+            <a:endParaRPr lang="de-DE" sz="1600">
+              <a:latin typeface="Calibri Light" panose="020F0302020204030204" pitchFamily="34" charset="0"/>
+              <a:cs typeface="Calibri Light" panose="020F0302020204030204" pitchFamily="34" charset="0"/>
+            </a:endParaRPr>
           </a:p>
         </p:txBody>
       </p:sp>
     </p:spTree>
     <p:extLst>
       <p:ext uri="{BB962C8B-B14F-4D97-AF65-F5344CB8AC3E}">
-        <p14:creationId xmlns:p14="http://schemas.microsoft.com/office/powerpoint/2010/main" val="3238852986"/>
+        <p14:creationId xmlns:p14="http://schemas.microsoft.com/office/powerpoint/2010/main" val="3709630287"/>
       </p:ext>
     </p:extLst>
   </p:cSld>
@@ -20673,7 +21035,7 @@
                 <a:latin typeface="Calibri Light" panose="020F0302020204030204" pitchFamily="34" charset="0"/>
                 <a:cs typeface="Calibri Light" panose="020F0302020204030204" pitchFamily="34" charset="0"/>
               </a:rPr>
-              <a:t>Validation result: example</a:t>
+              <a:t>Results &amp; Reports</a:t>
             </a:r>
             <a:endParaRPr lang="de-DE">
               <a:solidFill>
@@ -20682,6 +21044,138 @@
               <a:latin typeface="Calibri Light" panose="020F0302020204030204" pitchFamily="34" charset="0"/>
               <a:cs typeface="Calibri Light" panose="020F0302020204030204" pitchFamily="34" charset="0"/>
             </a:endParaRPr>
+          </a:p>
+        </p:txBody>
+      </p:sp>
+      <p:sp>
+        <p:nvSpPr>
+          <p:cNvPr id="3" name="Content Placeholder 2"/>
+          <p:cNvSpPr>
+            <a:spLocks noGrp="1"/>
+          </p:cNvSpPr>
+          <p:nvPr>
+            <p:ph idx="1"/>
+          </p:nvPr>
+        </p:nvSpPr>
+        <p:spPr/>
+        <p:txBody>
+          <a:bodyPr/>
+          <a:lstStyle/>
+          <a:p>
+            <a:r>
+              <a:rPr lang="de-DE" sz="2400" smtClean="0">
+                <a:solidFill>
+                  <a:srgbClr val="006600"/>
+                </a:solidFill>
+                <a:latin typeface="Calibri Light" panose="020F0302020204030204" pitchFamily="34" charset="0"/>
+                <a:cs typeface="Calibri Light" panose="020F0302020204030204" pitchFamily="34" charset="0"/>
+              </a:rPr>
+              <a:t>Validation result =</a:t>
+            </a:r>
+          </a:p>
+          <a:p>
+            <a:pPr marL="0" indent="0">
+              <a:buNone/>
+            </a:pPr>
+            <a:r>
+              <a:rPr lang="de-DE" sz="2400" smtClean="0">
+                <a:solidFill>
+                  <a:srgbClr val="006600"/>
+                </a:solidFill>
+                <a:latin typeface="Calibri Light" panose="020F0302020204030204" pitchFamily="34" charset="0"/>
+                <a:cs typeface="Calibri Light" panose="020F0302020204030204" pitchFamily="34" charset="0"/>
+              </a:rPr>
+              <a:t>Outcome of checking a single resource against a single constraint</a:t>
+            </a:r>
+          </a:p>
+          <a:p>
+            <a:r>
+              <a:rPr lang="de-DE" sz="2400" smtClean="0">
+                <a:solidFill>
+                  <a:srgbClr val="006600"/>
+                </a:solidFill>
+                <a:latin typeface="Calibri Light" panose="020F0302020204030204" pitchFamily="34" charset="0"/>
+                <a:cs typeface="Calibri Light" panose="020F0302020204030204" pitchFamily="34" charset="0"/>
+              </a:rPr>
+              <a:t>XML element &lt;red&gt;, &lt;green&gt;</a:t>
+            </a:r>
+          </a:p>
+          <a:p>
+            <a:r>
+              <a:rPr lang="de-DE" sz="2400" smtClean="0">
+                <a:solidFill>
+                  <a:srgbClr val="006600"/>
+                </a:solidFill>
+                <a:latin typeface="Calibri Light" panose="020F0302020204030204" pitchFamily="34" charset="0"/>
+                <a:cs typeface="Calibri Light" panose="020F0302020204030204" pitchFamily="34" charset="0"/>
+              </a:rPr>
+              <a:t>Attributes and child elements …</a:t>
+            </a:r>
+          </a:p>
+          <a:p>
+            <a:pPr lvl="1"/>
+            <a:r>
+              <a:rPr lang="de-DE" sz="2000" smtClean="0">
+                <a:solidFill>
+                  <a:srgbClr val="006600"/>
+                </a:solidFill>
+                <a:latin typeface="Calibri Light" panose="020F0302020204030204" pitchFamily="34" charset="0"/>
+                <a:cs typeface="Calibri Light" panose="020F0302020204030204" pitchFamily="34" charset="0"/>
+              </a:rPr>
+              <a:t>Identify the resource</a:t>
+            </a:r>
+          </a:p>
+          <a:p>
+            <a:pPr lvl="1"/>
+            <a:r>
+              <a:rPr lang="de-DE" sz="2000" smtClean="0">
+                <a:solidFill>
+                  <a:srgbClr val="006600"/>
+                </a:solidFill>
+                <a:latin typeface="Calibri Light" panose="020F0302020204030204" pitchFamily="34" charset="0"/>
+                <a:cs typeface="Calibri Light" panose="020F0302020204030204" pitchFamily="34" charset="0"/>
+              </a:rPr>
+              <a:t>Identify the constraint component</a:t>
+            </a:r>
+          </a:p>
+          <a:p>
+            <a:pPr lvl="1"/>
+            <a:r>
+              <a:rPr lang="de-DE" sz="2000" smtClean="0">
+                <a:solidFill>
+                  <a:srgbClr val="006600"/>
+                </a:solidFill>
+                <a:latin typeface="Calibri Light" panose="020F0302020204030204" pitchFamily="34" charset="0"/>
+                <a:cs typeface="Calibri Light" panose="020F0302020204030204" pitchFamily="34" charset="0"/>
+              </a:rPr>
+              <a:t>Constraint location in the schema</a:t>
+            </a:r>
+          </a:p>
+          <a:p>
+            <a:pPr lvl="1"/>
+            <a:r>
+              <a:rPr lang="de-DE" sz="2000" smtClean="0">
+                <a:solidFill>
+                  <a:srgbClr val="006600"/>
+                </a:solidFill>
+                <a:latin typeface="Calibri Light" panose="020F0302020204030204" pitchFamily="34" charset="0"/>
+                <a:cs typeface="Calibri Light" panose="020F0302020204030204" pitchFamily="34" charset="0"/>
+              </a:rPr>
+              <a:t>Selected constraint parameters</a:t>
+            </a:r>
+          </a:p>
+          <a:p>
+            <a:pPr lvl="1"/>
+            <a:r>
+              <a:rPr lang="de-DE" sz="2000" smtClean="0">
+                <a:solidFill>
+                  <a:srgbClr val="006600"/>
+                </a:solidFill>
+                <a:latin typeface="Calibri Light" panose="020F0302020204030204" pitchFamily="34" charset="0"/>
+                <a:cs typeface="Calibri Light" panose="020F0302020204030204" pitchFamily="34" charset="0"/>
+              </a:rPr>
+              <a:t>Observations</a:t>
+            </a:r>
           </a:p>
         </p:txBody>
       </p:sp>
@@ -20766,34 +21260,10 @@
           </a:p>
         </p:txBody>
       </p:sp>
-      <p:pic>
-        <p:nvPicPr>
-          <p:cNvPr id="3" name="Picture 2"/>
-          <p:cNvPicPr>
-            <a:picLocks noChangeAspect="1"/>
-          </p:cNvPicPr>
-          <p:nvPr/>
-        </p:nvPicPr>
-        <p:blipFill>
-          <a:blip r:embed="rId2"/>
-          <a:stretch>
-            <a:fillRect/>
-          </a:stretch>
-        </p:blipFill>
-        <p:spPr>
-          <a:xfrm>
-            <a:off x="0" y="2060676"/>
-            <a:ext cx="9144000" cy="3168524"/>
-          </a:xfrm>
-          <a:prstGeom prst="rect">
-            <a:avLst/>
-          </a:prstGeom>
-        </p:spPr>
-      </p:pic>
     </p:spTree>
     <p:extLst>
       <p:ext uri="{BB962C8B-B14F-4D97-AF65-F5344CB8AC3E}">
-        <p14:creationId xmlns:p14="http://schemas.microsoft.com/office/powerpoint/2010/main" val="2475524279"/>
+        <p14:creationId xmlns:p14="http://schemas.microsoft.com/office/powerpoint/2010/main" val="3238852986"/>
       </p:ext>
     </p:extLst>
   </p:cSld>
@@ -20850,7 +21320,7 @@
                 <a:latin typeface="Calibri Light" panose="020F0302020204030204" pitchFamily="34" charset="0"/>
                 <a:cs typeface="Calibri Light" panose="020F0302020204030204" pitchFamily="34" charset="0"/>
               </a:rPr>
-              <a:t>Validation report: example</a:t>
+              <a:t>Validation result: example</a:t>
             </a:r>
             <a:endParaRPr lang="de-DE">
               <a:solidFill>
@@ -20945,7 +21415,7 @@
       </p:sp>
       <p:pic>
         <p:nvPicPr>
-          <p:cNvPr id="8" name="Picture 7"/>
+          <p:cNvPr id="3" name="Picture 2"/>
           <p:cNvPicPr>
             <a:picLocks noChangeAspect="1"/>
           </p:cNvPicPr>
@@ -20959,8 +21429,8 @@
         </p:blipFill>
         <p:spPr>
           <a:xfrm>
-            <a:off x="575736" y="1916832"/>
-            <a:ext cx="8100720" cy="4752528"/>
+            <a:off x="0" y="2060676"/>
+            <a:ext cx="9144000" cy="3168524"/>
           </a:xfrm>
           <a:prstGeom prst="rect">
             <a:avLst/>
@@ -20970,7 +21440,7 @@
     </p:spTree>
     <p:extLst>
       <p:ext uri="{BB962C8B-B14F-4D97-AF65-F5344CB8AC3E}">
-        <p14:creationId xmlns:p14="http://schemas.microsoft.com/office/powerpoint/2010/main" val="2621163427"/>
+        <p14:creationId xmlns:p14="http://schemas.microsoft.com/office/powerpoint/2010/main" val="2475524279"/>
       </p:ext>
     </p:extLst>
   </p:cSld>
@@ -21027,7 +21497,7 @@
                 <a:latin typeface="Calibri Light" panose="020F0302020204030204" pitchFamily="34" charset="0"/>
                 <a:cs typeface="Calibri Light" panose="020F0302020204030204" pitchFamily="34" charset="0"/>
               </a:rPr>
-              <a:t>Constraint types</a:t>
+              <a:t>Validation report: example</a:t>
             </a:r>
             <a:endParaRPr lang="de-DE">
               <a:solidFill>
@@ -21039,24 +21509,105 @@
           </a:p>
         </p:txBody>
       </p:sp>
+      <p:sp>
+        <p:nvSpPr>
+          <p:cNvPr id="4" name="Date Placeholder 3"/>
+          <p:cNvSpPr>
+            <a:spLocks noGrp="1"/>
+          </p:cNvSpPr>
+          <p:nvPr>
+            <p:ph type="dt" sz="half" idx="10"/>
+          </p:nvPr>
+        </p:nvSpPr>
+        <p:spPr/>
+        <p:txBody>
+          <a:bodyPr/>
+          <a:lstStyle/>
+          <a:p>
+            <a:pPr>
+              <a:defRPr/>
+            </a:pPr>
+            <a:r>
+              <a:rPr lang="de-DE" altLang="de-DE" smtClean="0"/>
+              <a:t>2020-10-08</a:t>
+            </a:r>
+            <a:endParaRPr lang="de-DE" altLang="en-US"/>
+          </a:p>
+        </p:txBody>
+      </p:sp>
+      <p:sp>
+        <p:nvSpPr>
+          <p:cNvPr id="5" name="Footer Placeholder 4"/>
+          <p:cNvSpPr>
+            <a:spLocks noGrp="1"/>
+          </p:cNvSpPr>
+          <p:nvPr>
+            <p:ph type="ftr" sz="quarter" idx="11"/>
+          </p:nvPr>
+        </p:nvSpPr>
+        <p:spPr/>
+        <p:txBody>
+          <a:bodyPr/>
+          <a:lstStyle/>
+          <a:p>
+            <a:pPr>
+              <a:defRPr/>
+            </a:pPr>
+            <a:r>
+              <a:rPr lang="de-DE" altLang="en-US" smtClean="0"/>
+              <a:t>Greenfox</a:t>
+            </a:r>
+            <a:endParaRPr lang="de-DE" altLang="en-US"/>
+          </a:p>
+        </p:txBody>
+      </p:sp>
+      <p:sp>
+        <p:nvSpPr>
+          <p:cNvPr id="6" name="Slide Number Placeholder 5"/>
+          <p:cNvSpPr>
+            <a:spLocks noGrp="1"/>
+          </p:cNvSpPr>
+          <p:nvPr>
+            <p:ph type="sldNum" sz="quarter" idx="12"/>
+          </p:nvPr>
+        </p:nvSpPr>
+        <p:spPr/>
+        <p:txBody>
+          <a:bodyPr/>
+          <a:lstStyle/>
+          <a:p>
+            <a:pPr>
+              <a:defRPr/>
+            </a:pPr>
+            <a:fld id="{F031B2F4-27D1-4E53-97CF-1947CD75B185}" type="slidenum">
+              <a:rPr lang="de-DE" altLang="en-US" smtClean="0"/>
+              <a:pPr>
+                <a:defRPr/>
+              </a:pPr>
+              <a:t>26</a:t>
+            </a:fld>
+            <a:endParaRPr lang="de-DE" altLang="en-US"/>
+          </a:p>
+        </p:txBody>
+      </p:sp>
       <p:pic>
         <p:nvPicPr>
-          <p:cNvPr id="4" name="Picture 3"/>
+          <p:cNvPr id="8" name="Picture 7"/>
           <p:cNvPicPr>
             <a:picLocks noChangeAspect="1"/>
           </p:cNvPicPr>
           <p:nvPr/>
         </p:nvPicPr>
         <p:blipFill>
-          <a:blip r:embed="rId3"/>
+          <a:blip r:embed="rId2"/>
           <a:stretch>
             <a:fillRect/>
           </a:stretch>
         </p:blipFill>
         <p:spPr>
           <a:xfrm>
-            <a:off x="665365" y="1700808"/>
-            <a:ext cx="7372350" cy="4991100"/>
+            <a:off x="575736" y="1916832"/>
+            <a:ext cx="8100720" cy="4752528"/>
           </a:xfrm>
           <a:prstGeom prst="rect">
             <a:avLst/>
@@ -21066,7 +21617,7 @@
     </p:spTree>
     <p:extLst>
       <p:ext uri="{BB962C8B-B14F-4D97-AF65-F5344CB8AC3E}">
-        <p14:creationId xmlns:p14="http://schemas.microsoft.com/office/powerpoint/2010/main" val="3640919414"/>
+        <p14:creationId xmlns:p14="http://schemas.microsoft.com/office/powerpoint/2010/main" val="2621163427"/>
       </p:ext>
     </p:extLst>
   </p:cSld>
@@ -21123,38 +21674,9 @@
                 <a:latin typeface="Calibri Light" panose="020F0302020204030204" pitchFamily="34" charset="0"/>
                 <a:cs typeface="Calibri Light" panose="020F0302020204030204" pitchFamily="34" charset="0"/>
               </a:rPr>
-              <a:t>Important, but only mentioned</a:t>
-            </a:r>
-            <a:br>
-              <a:rPr lang="de-DE" smtClean="0">
-                <a:solidFill>
-                  <a:srgbClr val="006600"/>
-                </a:solidFill>
-                <a:latin typeface="Calibri Light" panose="020F0302020204030204" pitchFamily="34" charset="0"/>
-                <a:cs typeface="Calibri Light" panose="020F0302020204030204" pitchFamily="34" charset="0"/>
-              </a:rPr>
-            </a:br>
-            <a:r>
-              <a:rPr lang="de-DE" i="1">
-                <a:solidFill>
-                  <a:srgbClr val="006600"/>
-                </a:solidFill>
-                <a:latin typeface="Calibri Light" panose="020F0302020204030204" pitchFamily="34" charset="0"/>
-                <a:cs typeface="Calibri Light" panose="020F0302020204030204" pitchFamily="34" charset="0"/>
-              </a:rPr>
-              <a:t> </a:t>
-            </a:r>
-            <a:r>
-              <a:rPr lang="de-DE" i="1" smtClean="0">
-                <a:solidFill>
-                  <a:srgbClr val="006600"/>
-                </a:solidFill>
-                <a:latin typeface="Calibri Light" panose="020F0302020204030204" pitchFamily="34" charset="0"/>
-                <a:cs typeface="Calibri Light" panose="020F0302020204030204" pitchFamily="34" charset="0"/>
-              </a:rPr>
-              <a:t>   (see paper for details)</a:t>
-            </a:r>
-            <a:endParaRPr lang="de-DE" i="1">
+              <a:t>Constraint types</a:t>
+            </a:r>
+            <a:endParaRPr lang="de-DE">
               <a:solidFill>
                 <a:srgbClr val="006600"/>
               </a:solidFill>
@@ -21164,200 +21686,47 @@
           </a:p>
         </p:txBody>
       </p:sp>
-      <p:sp>
-        <p:nvSpPr>
-          <p:cNvPr id="3" name="Content Placeholder 2"/>
-          <p:cNvSpPr>
-            <a:spLocks noGrp="1"/>
-          </p:cNvSpPr>
-          <p:nvPr>
-            <p:ph idx="1"/>
-          </p:nvPr>
-        </p:nvSpPr>
+      <p:pic>
+        <p:nvPicPr>
+          <p:cNvPr id="4" name="Picture 3"/>
+          <p:cNvPicPr>
+            <a:picLocks noChangeAspect="1"/>
+          </p:cNvPicPr>
+          <p:nvPr/>
+        </p:nvPicPr>
+        <p:blipFill>
+          <a:blip r:embed="rId3"/>
+          <a:stretch>
+            <a:fillRect/>
+          </a:stretch>
+        </p:blipFill>
         <p:spPr>
           <a:xfrm>
-            <a:off x="457200" y="1719263"/>
-            <a:ext cx="8686800" cy="4411662"/>
+            <a:off x="665365" y="1700808"/>
+            <a:ext cx="7372350" cy="4991100"/>
           </a:xfrm>
+          <a:prstGeom prst="rect">
+            <a:avLst/>
+          </a:prstGeom>
         </p:spPr>
-        <p:txBody>
-          <a:bodyPr/>
-          <a:lstStyle/>
-          <a:p>
-            <a:r>
-              <a:rPr lang="de-DE" sz="2400">
-                <a:latin typeface="Courier New" panose="02070309020205020404" pitchFamily="49" charset="0"/>
-                <a:cs typeface="Courier New" panose="02070309020205020404" pitchFamily="49" charset="0"/>
-              </a:rPr>
-              <a:t>&lt;focusNode&gt;</a:t>
-            </a:r>
-            <a:r>
-              <a:rPr lang="de-DE" sz="2800">
-                <a:latin typeface="Calibri Light" panose="020F0302020204030204" pitchFamily="34" charset="0"/>
-                <a:cs typeface="Calibri Light" panose="020F0302020204030204" pitchFamily="34" charset="0"/>
-              </a:rPr>
-              <a:t> - changing evaluation context</a:t>
-            </a:r>
-          </a:p>
-          <a:p>
-            <a:r>
-              <a:rPr lang="de-DE" sz="2800">
-                <a:latin typeface="Calibri Light" panose="020F0302020204030204" pitchFamily="34" charset="0"/>
-                <a:cs typeface="Calibri Light" panose="020F0302020204030204" pitchFamily="34" charset="0"/>
-              </a:rPr>
-              <a:t>Variable bindings in XPath and Foxpath (e.g. </a:t>
-            </a:r>
-            <a:r>
-              <a:rPr lang="de-DE" sz="2400">
-                <a:latin typeface="Courier New" panose="02070309020205020404" pitchFamily="49" charset="0"/>
-                <a:cs typeface="Courier New" panose="02070309020205020404" pitchFamily="49" charset="0"/>
-              </a:rPr>
-              <a:t>$fileName</a:t>
-            </a:r>
-            <a:r>
-              <a:rPr lang="de-DE" sz="2800">
-                <a:latin typeface="Calibri Light" panose="020F0302020204030204" pitchFamily="34" charset="0"/>
-                <a:cs typeface="Calibri Light" panose="020F0302020204030204" pitchFamily="34" charset="0"/>
-              </a:rPr>
-              <a:t>)</a:t>
-            </a:r>
-          </a:p>
-          <a:p>
-            <a:r>
-              <a:rPr lang="de-DE" sz="2800" smtClean="0">
-                <a:latin typeface="Calibri Light" panose="020F0302020204030204" pitchFamily="34" charset="0"/>
-                <a:cs typeface="Calibri Light" panose="020F0302020204030204" pitchFamily="34" charset="0"/>
-              </a:rPr>
-              <a:t>Dealing with archives</a:t>
-            </a:r>
-          </a:p>
-          <a:p>
-            <a:r>
-              <a:rPr lang="de-DE" sz="2800" smtClean="0">
-                <a:latin typeface="Calibri Light" panose="020F0302020204030204" pitchFamily="34" charset="0"/>
-                <a:cs typeface="Calibri Light" panose="020F0302020204030204" pitchFamily="34" charset="0"/>
-              </a:rPr>
-              <a:t>JSON, CSV, HTML, .txt – see also </a:t>
-            </a:r>
-            <a:r>
-              <a:rPr lang="de-DE" sz="2800" i="1" smtClean="0">
-                <a:latin typeface="Calibri Light" panose="020F0302020204030204" pitchFamily="34" charset="0"/>
-                <a:cs typeface="Calibri Light" panose="020F0302020204030204" pitchFamily="34" charset="0"/>
-              </a:rPr>
-              <a:t>demo-mediatype</a:t>
-            </a:r>
-          </a:p>
-          <a:p>
-            <a:r>
-              <a:rPr lang="de-DE" sz="2800">
-                <a:latin typeface="Calibri Light" panose="020F0302020204030204" pitchFamily="34" charset="0"/>
-                <a:cs typeface="Calibri Light" panose="020F0302020204030204" pitchFamily="34" charset="0"/>
-              </a:rPr>
-              <a:t>Context &amp; schema parameters</a:t>
-            </a:r>
-          </a:p>
-          <a:p>
-            <a:pPr marL="0" indent="0">
-              <a:buNone/>
-            </a:pPr>
-            <a:endParaRPr lang="de-DE" sz="2800" i="1" smtClean="0">
-              <a:latin typeface="Calibri Light" panose="020F0302020204030204" pitchFamily="34" charset="0"/>
-              <a:cs typeface="Calibri Light" panose="020F0302020204030204" pitchFamily="34" charset="0"/>
-            </a:endParaRPr>
-          </a:p>
-        </p:txBody>
-      </p:sp>
-      <p:sp>
-        <p:nvSpPr>
-          <p:cNvPr id="4" name="Date Placeholder 3"/>
-          <p:cNvSpPr>
-            <a:spLocks noGrp="1"/>
-          </p:cNvSpPr>
-          <p:nvPr>
-            <p:ph type="dt" sz="half" idx="10"/>
-          </p:nvPr>
-        </p:nvSpPr>
-        <p:spPr/>
-        <p:txBody>
-          <a:bodyPr/>
-          <a:lstStyle/>
-          <a:p>
-            <a:pPr>
-              <a:defRPr/>
-            </a:pPr>
-            <a:r>
-              <a:rPr lang="de-DE" altLang="de-DE" smtClean="0"/>
-              <a:t>2020-10-08</a:t>
-            </a:r>
-            <a:endParaRPr lang="de-DE" altLang="en-US"/>
-          </a:p>
-        </p:txBody>
-      </p:sp>
-      <p:sp>
-        <p:nvSpPr>
-          <p:cNvPr id="5" name="Footer Placeholder 4"/>
-          <p:cNvSpPr>
-            <a:spLocks noGrp="1"/>
-          </p:cNvSpPr>
-          <p:nvPr>
-            <p:ph type="ftr" sz="quarter" idx="11"/>
-          </p:nvPr>
-        </p:nvSpPr>
-        <p:spPr/>
-        <p:txBody>
-          <a:bodyPr/>
-          <a:lstStyle/>
-          <a:p>
-            <a:pPr>
-              <a:defRPr/>
-            </a:pPr>
-            <a:r>
-              <a:rPr lang="de-DE" altLang="en-US" smtClean="0"/>
-              <a:t>Greenfox</a:t>
-            </a:r>
-            <a:endParaRPr lang="de-DE" altLang="en-US"/>
-          </a:p>
-        </p:txBody>
-      </p:sp>
-      <p:sp>
-        <p:nvSpPr>
-          <p:cNvPr id="6" name="Slide Number Placeholder 5"/>
-          <p:cNvSpPr>
-            <a:spLocks noGrp="1"/>
-          </p:cNvSpPr>
-          <p:nvPr>
-            <p:ph type="sldNum" sz="quarter" idx="12"/>
-          </p:nvPr>
-        </p:nvSpPr>
-        <p:spPr/>
-        <p:txBody>
-          <a:bodyPr/>
-          <a:lstStyle/>
-          <a:p>
-            <a:pPr>
-              <a:defRPr/>
-            </a:pPr>
-            <a:fld id="{F031B2F4-27D1-4E53-97CF-1947CD75B185}" type="slidenum">
-              <a:rPr lang="de-DE" altLang="en-US" smtClean="0"/>
-              <a:pPr>
-                <a:defRPr/>
-              </a:pPr>
-              <a:t>27</a:t>
-            </a:fld>
-            <a:endParaRPr lang="de-DE" altLang="en-US"/>
-          </a:p>
-        </p:txBody>
-      </p:sp>
+      </p:pic>
     </p:spTree>
     <p:extLst>
       <p:ext uri="{BB962C8B-B14F-4D97-AF65-F5344CB8AC3E}">
-        <p14:creationId xmlns:p14="http://schemas.microsoft.com/office/powerpoint/2010/main" val="869635973"/>
+        <p14:creationId xmlns:p14="http://schemas.microsoft.com/office/powerpoint/2010/main" val="3640919414"/>
       </p:ext>
     </p:extLst>
   </p:cSld>
   <p:clrMapOvr>
     <a:masterClrMapping/>
   </p:clrMapOvr>
+  <p:timing>
+    <p:tnLst>
+      <p:par>
+        <p:cTn id="1" dur="indefinite" restart="never" nodeType="tmRoot"/>
+      </p:par>
+    </p:tnLst>
+  </p:timing>
 </p:sld>
 </file>
 
@@ -21401,9 +21770,38 @@
                 <a:latin typeface="Calibri Light" panose="020F0302020204030204" pitchFamily="34" charset="0"/>
                 <a:cs typeface="Calibri Light" panose="020F0302020204030204" pitchFamily="34" charset="0"/>
               </a:rPr>
-              <a:t>What have you missed?</a:t>
-            </a:r>
-            <a:endParaRPr lang="de-DE">
+              <a:t>Important, but only mentioned</a:t>
+            </a:r>
+            <a:br>
+              <a:rPr lang="de-DE" smtClean="0">
+                <a:solidFill>
+                  <a:srgbClr val="006600"/>
+                </a:solidFill>
+                <a:latin typeface="Calibri Light" panose="020F0302020204030204" pitchFamily="34" charset="0"/>
+                <a:cs typeface="Calibri Light" panose="020F0302020204030204" pitchFamily="34" charset="0"/>
+              </a:rPr>
+            </a:br>
+            <a:r>
+              <a:rPr lang="de-DE" i="1">
+                <a:solidFill>
+                  <a:srgbClr val="006600"/>
+                </a:solidFill>
+                <a:latin typeface="Calibri Light" panose="020F0302020204030204" pitchFamily="34" charset="0"/>
+                <a:cs typeface="Calibri Light" panose="020F0302020204030204" pitchFamily="34" charset="0"/>
+              </a:rPr>
+              <a:t> </a:t>
+            </a:r>
+            <a:r>
+              <a:rPr lang="de-DE" i="1" smtClean="0">
+                <a:solidFill>
+                  <a:srgbClr val="006600"/>
+                </a:solidFill>
+                <a:latin typeface="Calibri Light" panose="020F0302020204030204" pitchFamily="34" charset="0"/>
+                <a:cs typeface="Calibri Light" panose="020F0302020204030204" pitchFamily="34" charset="0"/>
+              </a:rPr>
+              <a:t>   (see paper for details)</a:t>
+            </a:r>
+            <a:endParaRPr lang="de-DE" i="1">
               <a:solidFill>
                 <a:srgbClr val="006600"/>
               </a:solidFill>
@@ -21423,74 +21821,93 @@
             <p:ph idx="1"/>
           </p:nvPr>
         </p:nvSpPr>
-        <p:spPr/>
+        <p:spPr>
+          <a:xfrm>
+            <a:off x="457200" y="1719263"/>
+            <a:ext cx="8686800" cy="4411662"/>
+          </a:xfrm>
+        </p:spPr>
         <p:txBody>
           <a:bodyPr/>
           <a:lstStyle/>
           <a:p>
             <a:r>
-              <a:rPr lang="de-DE" smtClean="0">
+              <a:rPr lang="de-DE" sz="2400">
+                <a:latin typeface="Courier New" panose="02070309020205020404" pitchFamily="49" charset="0"/>
+                <a:cs typeface="Courier New" panose="02070309020205020404" pitchFamily="49" charset="0"/>
+              </a:rPr>
+              <a:t>&lt;focusNode&gt;</a:t>
+            </a:r>
+            <a:r>
+              <a:rPr lang="de-DE" sz="2800">
                 <a:latin typeface="Calibri Light" panose="020F0302020204030204" pitchFamily="34" charset="0"/>
                 <a:cs typeface="Calibri Light" panose="020F0302020204030204" pitchFamily="34" charset="0"/>
               </a:rPr>
-              <a:t>Composite schemas – no imports yet</a:t>
-            </a:r>
-          </a:p>
-          <a:p>
-            <a:r>
-              <a:rPr lang="de-DE" smtClean="0">
+              <a:t> - changing evaluation context</a:t>
+            </a:r>
+          </a:p>
+          <a:p>
+            <a:r>
+              <a:rPr lang="de-DE" sz="2800">
                 <a:latin typeface="Calibri Light" panose="020F0302020204030204" pitchFamily="34" charset="0"/>
                 <a:cs typeface="Calibri Light" panose="020F0302020204030204" pitchFamily="34" charset="0"/>
               </a:rPr>
-              <a:t>Variables declared within the schema</a:t>
-            </a:r>
-          </a:p>
-          <a:p>
-            <a:r>
-              <a:rPr lang="de-DE" smtClean="0">
+              <a:t>Variable bindings in XPath and Foxpath (e.g. </a:t>
+            </a:r>
+            <a:r>
+              <a:rPr lang="de-DE" sz="2400">
+                <a:latin typeface="Courier New" panose="02070309020205020404" pitchFamily="49" charset="0"/>
+                <a:cs typeface="Courier New" panose="02070309020205020404" pitchFamily="49" charset="0"/>
+              </a:rPr>
+              <a:t>$fileName</a:t>
+            </a:r>
+            <a:r>
+              <a:rPr lang="de-DE" sz="2800">
                 <a:latin typeface="Calibri Light" panose="020F0302020204030204" pitchFamily="34" charset="0"/>
                 <a:cs typeface="Calibri Light" panose="020F0302020204030204" pitchFamily="34" charset="0"/>
               </a:rPr>
-              <a:t>Formated validation results </a:t>
-            </a:r>
-          </a:p>
-          <a:p>
-            <a:r>
-              <a:rPr lang="de-DE" smtClean="0">
+              <a:t>)</a:t>
+            </a:r>
+          </a:p>
+          <a:p>
+            <a:r>
+              <a:rPr lang="de-DE" sz="2800" smtClean="0">
                 <a:latin typeface="Calibri Light" panose="020F0302020204030204" pitchFamily="34" charset="0"/>
                 <a:cs typeface="Calibri Light" panose="020F0302020204030204" pitchFamily="34" charset="0"/>
               </a:rPr>
-              <a:t>Support for …</a:t>
+              <a:t>Dealing with archives</a:t>
+            </a:r>
+          </a:p>
+          <a:p>
+            <a:r>
+              <a:rPr lang="de-DE" sz="2800" smtClean="0">
+                <a:latin typeface="Calibri Light" panose="020F0302020204030204" pitchFamily="34" charset="0"/>
+                <a:cs typeface="Calibri Light" panose="020F0302020204030204" pitchFamily="34" charset="0"/>
+              </a:rPr>
+              <a:t>JSON, CSV, HTML, .txt – see also </a:t>
+            </a:r>
+            <a:r>
+              <a:rPr lang="de-DE" sz="2800" i="1" smtClean="0">
+                <a:latin typeface="Calibri Light" panose="020F0302020204030204" pitchFamily="34" charset="0"/>
+                <a:cs typeface="Calibri Light" panose="020F0302020204030204" pitchFamily="34" charset="0"/>
+              </a:rPr>
+              <a:t>demo-mediatype</a:t>
+            </a:r>
+          </a:p>
+          <a:p>
+            <a:r>
+              <a:rPr lang="de-DE" sz="2800">
+                <a:latin typeface="Calibri Light" panose="020F0302020204030204" pitchFamily="34" charset="0"/>
+                <a:cs typeface="Calibri Light" panose="020F0302020204030204" pitchFamily="34" charset="0"/>
+              </a:rPr>
+              <a:t>Context &amp; schema parameters</a:t>
             </a:r>
           </a:p>
           <a:p>
             <a:pPr marL="0" indent="0">
               <a:buNone/>
             </a:pPr>
-            <a:r>
-              <a:rPr lang="de-DE">
-                <a:latin typeface="Calibri Light" panose="020F0302020204030204" pitchFamily="34" charset="0"/>
-                <a:cs typeface="Calibri Light" panose="020F0302020204030204" pitchFamily="34" charset="0"/>
-              </a:rPr>
-              <a:t>	</a:t>
-            </a:r>
-            <a:r>
-              <a:rPr lang="de-DE" smtClean="0">
-                <a:latin typeface="Calibri Light" panose="020F0302020204030204" pitchFamily="34" charset="0"/>
-                <a:cs typeface="Calibri Light" panose="020F0302020204030204" pitchFamily="34" charset="0"/>
-              </a:rPr>
-              <a:t>schematron, JSON Schema, SHACL</a:t>
-            </a:r>
-          </a:p>
-          <a:p>
-            <a:r>
-              <a:rPr lang="de-DE" smtClean="0">
-                <a:latin typeface="Calibri Light" panose="020F0302020204030204" pitchFamily="34" charset="0"/>
-                <a:cs typeface="Calibri Light" panose="020F0302020204030204" pitchFamily="34" charset="0"/>
-              </a:rPr>
-              <a:t>Please fill in here: ______________________</a:t>
-            </a:r>
-            <a:endParaRPr lang="de-DE">
+            <a:endParaRPr lang="de-DE" sz="2800" i="1" smtClean="0">
               <a:latin typeface="Calibri Light" panose="020F0302020204030204" pitchFamily="34" charset="0"/>
               <a:cs typeface="Calibri Light" panose="020F0302020204030204" pitchFamily="34" charset="0"/>
             </a:endParaRPr>
@@ -21581,7 +21998,7 @@
     </p:spTree>
     <p:extLst>
       <p:ext uri="{BB962C8B-B14F-4D97-AF65-F5344CB8AC3E}">
-        <p14:creationId xmlns:p14="http://schemas.microsoft.com/office/powerpoint/2010/main" val="3062403288"/>
+        <p14:creationId xmlns:p14="http://schemas.microsoft.com/office/powerpoint/2010/main" val="869635973"/>
       </p:ext>
     </p:extLst>
   </p:cSld>
@@ -21618,56 +22035,111 @@
             <p:ph type="title"/>
           </p:nvPr>
         </p:nvSpPr>
-        <p:spPr>
-          <a:xfrm>
-            <a:off x="539552" y="405408"/>
-            <a:ext cx="7543800" cy="1295400"/>
-          </a:xfrm>
-        </p:spPr>
+        <p:spPr/>
         <p:txBody>
           <a:bodyPr/>
           <a:lstStyle/>
           <a:p>
-            <a:pPr algn="ctr"/>
             <a:r>
               <a:rPr lang="de-DE" smtClean="0">
                 <a:solidFill>
-                  <a:schemeClr val="bg1">
-                    <a:lumMod val="50000"/>
-                  </a:schemeClr>
-                </a:solidFill>
-                <a:latin typeface="Bradley Hand ITC" panose="03070402050302030203" pitchFamily="66" charset="0"/>
-              </a:rPr>
-              <a:t>Thank you, Jodle and all others,</a:t>
-            </a:r>
-            <a:br>
-              <a:rPr lang="de-DE" smtClean="0">
-                <a:solidFill>
-                  <a:schemeClr val="bg1">
-                    <a:lumMod val="50000"/>
-                  </a:schemeClr>
-                </a:solidFill>
-                <a:latin typeface="Bradley Hand ITC" panose="03070402050302030203" pitchFamily="66" charset="0"/>
-              </a:rPr>
-            </a:br>
-            <a:r>
-              <a:rPr lang="de-DE" smtClean="0">
-                <a:solidFill>
-                  <a:schemeClr val="bg1">
-                    <a:lumMod val="50000"/>
-                  </a:schemeClr>
-                </a:solidFill>
-                <a:latin typeface="Bradley Hand ITC" panose="03070402050302030203" pitchFamily="66" charset="0"/>
-              </a:rPr>
-              <a:t>for your kind attention!</a:t>
+                  <a:srgbClr val="006600"/>
+                </a:solidFill>
+                <a:latin typeface="Calibri Light" panose="020F0302020204030204" pitchFamily="34" charset="0"/>
+                <a:cs typeface="Calibri Light" panose="020F0302020204030204" pitchFamily="34" charset="0"/>
+              </a:rPr>
+              <a:t>What have you missed?</a:t>
             </a:r>
             <a:endParaRPr lang="de-DE">
               <a:solidFill>
-                <a:schemeClr val="bg1">
-                  <a:lumMod val="50000"/>
-                </a:schemeClr>
+                <a:srgbClr val="006600"/>
               </a:solidFill>
-              <a:latin typeface="Bradley Hand ITC" panose="03070402050302030203" pitchFamily="66" charset="0"/>
+              <a:latin typeface="Calibri Light" panose="020F0302020204030204" pitchFamily="34" charset="0"/>
+              <a:cs typeface="Calibri Light" panose="020F0302020204030204" pitchFamily="34" charset="0"/>
+            </a:endParaRPr>
+          </a:p>
+        </p:txBody>
+      </p:sp>
+      <p:sp>
+        <p:nvSpPr>
+          <p:cNvPr id="3" name="Content Placeholder 2"/>
+          <p:cNvSpPr>
+            <a:spLocks noGrp="1"/>
+          </p:cNvSpPr>
+          <p:nvPr>
+            <p:ph idx="1"/>
+          </p:nvPr>
+        </p:nvSpPr>
+        <p:spPr/>
+        <p:txBody>
+          <a:bodyPr/>
+          <a:lstStyle/>
+          <a:p>
+            <a:r>
+              <a:rPr lang="de-DE" smtClean="0">
+                <a:latin typeface="Calibri Light" panose="020F0302020204030204" pitchFamily="34" charset="0"/>
+                <a:cs typeface="Calibri Light" panose="020F0302020204030204" pitchFamily="34" charset="0"/>
+              </a:rPr>
+              <a:t>Composite schemas – no imports yet</a:t>
+            </a:r>
+          </a:p>
+          <a:p>
+            <a:r>
+              <a:rPr lang="de-DE" smtClean="0">
+                <a:latin typeface="Calibri Light" panose="020F0302020204030204" pitchFamily="34" charset="0"/>
+                <a:cs typeface="Calibri Light" panose="020F0302020204030204" pitchFamily="34" charset="0"/>
+              </a:rPr>
+              <a:t>Variables declared within the schema</a:t>
+            </a:r>
+          </a:p>
+          <a:p>
+            <a:r>
+              <a:rPr lang="de-DE" smtClean="0">
+                <a:latin typeface="Calibri Light" panose="020F0302020204030204" pitchFamily="34" charset="0"/>
+                <a:cs typeface="Calibri Light" panose="020F0302020204030204" pitchFamily="34" charset="0"/>
+              </a:rPr>
+              <a:t>Formated validation results </a:t>
+            </a:r>
+          </a:p>
+          <a:p>
+            <a:r>
+              <a:rPr lang="de-DE" smtClean="0">
+                <a:latin typeface="Calibri Light" panose="020F0302020204030204" pitchFamily="34" charset="0"/>
+                <a:cs typeface="Calibri Light" panose="020F0302020204030204" pitchFamily="34" charset="0"/>
+              </a:rPr>
+              <a:t>Support for …</a:t>
+            </a:r>
+          </a:p>
+          <a:p>
+            <a:pPr marL="0" indent="0">
+              <a:buNone/>
+            </a:pPr>
+            <a:r>
+              <a:rPr lang="de-DE">
+                <a:latin typeface="Calibri Light" panose="020F0302020204030204" pitchFamily="34" charset="0"/>
+                <a:cs typeface="Calibri Light" panose="020F0302020204030204" pitchFamily="34" charset="0"/>
+              </a:rPr>
+              <a:t>	</a:t>
+            </a:r>
+            <a:r>
+              <a:rPr lang="de-DE" smtClean="0">
+                <a:latin typeface="Calibri Light" panose="020F0302020204030204" pitchFamily="34" charset="0"/>
+                <a:cs typeface="Calibri Light" panose="020F0302020204030204" pitchFamily="34" charset="0"/>
+              </a:rPr>
+              <a:t>schematron, JSON Schema, SHACL</a:t>
+            </a:r>
+          </a:p>
+          <a:p>
+            <a:r>
+              <a:rPr lang="de-DE" smtClean="0">
+                <a:latin typeface="Calibri Light" panose="020F0302020204030204" pitchFamily="34" charset="0"/>
+                <a:cs typeface="Calibri Light" panose="020F0302020204030204" pitchFamily="34" charset="0"/>
+              </a:rPr>
+              <a:t>Please fill in here: ______________________</a:t>
+            </a:r>
+            <a:endParaRPr lang="de-DE">
+              <a:latin typeface="Calibri Light" panose="020F0302020204030204" pitchFamily="34" charset="0"/>
+              <a:cs typeface="Calibri Light" panose="020F0302020204030204" pitchFamily="34" charset="0"/>
             </a:endParaRPr>
           </a:p>
         </p:txBody>
@@ -21748,6 +22220,866 @@
                 <a:defRPr/>
               </a:pPr>
               <a:t>29</a:t>
+            </a:fld>
+            <a:endParaRPr lang="de-DE" altLang="en-US"/>
+          </a:p>
+        </p:txBody>
+      </p:sp>
+    </p:spTree>
+    <p:extLst>
+      <p:ext uri="{BB962C8B-B14F-4D97-AF65-F5344CB8AC3E}">
+        <p14:creationId xmlns:p14="http://schemas.microsoft.com/office/powerpoint/2010/main" val="3062403288"/>
+      </p:ext>
+    </p:extLst>
+  </p:cSld>
+  <p:clrMapOvr>
+    <a:masterClrMapping/>
+  </p:clrMapOvr>
+</p:sld>
+</file>
+
+<file path=ppt/slides/slide3.xml><?xml version="1.0" encoding="utf-8"?>
+<p:sld xmlns:a="http://schemas.openxmlformats.org/drawingml/2006/main" xmlns:r="http://schemas.openxmlformats.org/officeDocument/2006/relationships" xmlns:p="http://schemas.openxmlformats.org/presentationml/2006/main">
+  <p:cSld>
+    <p:spTree>
+      <p:nvGrpSpPr>
+        <p:cNvPr id="1" name=""/>
+        <p:cNvGrpSpPr/>
+        <p:nvPr/>
+      </p:nvGrpSpPr>
+      <p:grpSpPr>
+        <a:xfrm>
+          <a:off x="0" y="0"/>
+          <a:ext cx="0" cy="0"/>
+          <a:chOff x="0" y="0"/>
+          <a:chExt cx="0" cy="0"/>
+        </a:xfrm>
+      </p:grpSpPr>
+      <p:sp>
+        <p:nvSpPr>
+          <p:cNvPr id="2" name="Title 1"/>
+          <p:cNvSpPr>
+            <a:spLocks noGrp="1"/>
+          </p:cNvSpPr>
+          <p:nvPr>
+            <p:ph type="title"/>
+          </p:nvPr>
+        </p:nvSpPr>
+        <p:spPr/>
+        <p:txBody>
+          <a:bodyPr/>
+          <a:lstStyle/>
+          <a:p>
+            <a:r>
+              <a:rPr lang="de-DE" smtClean="0">
+                <a:solidFill>
+                  <a:srgbClr val="006600"/>
+                </a:solidFill>
+                <a:latin typeface="Calibri Light" panose="020F0302020204030204" pitchFamily="34" charset="0"/>
+                <a:cs typeface="Calibri Light" panose="020F0302020204030204" pitchFamily="34" charset="0"/>
+              </a:rPr>
+              <a:t>Why might you care?</a:t>
+            </a:r>
+            <a:endParaRPr lang="de-DE">
+              <a:solidFill>
+                <a:srgbClr val="006600"/>
+              </a:solidFill>
+              <a:latin typeface="Calibri Light" panose="020F0302020204030204" pitchFamily="34" charset="0"/>
+              <a:cs typeface="Calibri Light" panose="020F0302020204030204" pitchFamily="34" charset="0"/>
+            </a:endParaRPr>
+          </a:p>
+        </p:txBody>
+      </p:sp>
+      <p:sp>
+        <p:nvSpPr>
+          <p:cNvPr id="3" name="Content Placeholder 2"/>
+          <p:cNvSpPr>
+            <a:spLocks noGrp="1"/>
+          </p:cNvSpPr>
+          <p:nvPr>
+            <p:ph idx="1"/>
+          </p:nvPr>
+        </p:nvSpPr>
+        <p:spPr>
+          <a:xfrm>
+            <a:off x="457200" y="1719263"/>
+            <a:ext cx="8686800" cy="4411662"/>
+          </a:xfrm>
+        </p:spPr>
+        <p:txBody>
+          <a:bodyPr/>
+          <a:lstStyle/>
+          <a:p>
+            <a:r>
+              <a:rPr lang="de-DE" sz="2000" smtClean="0">
+                <a:latin typeface="Calibri Light" panose="020F0302020204030204" pitchFamily="34" charset="0"/>
+                <a:cs typeface="Calibri Light" panose="020F0302020204030204" pitchFamily="34" charset="0"/>
+              </a:rPr>
+              <a:t>What we are used to:</a:t>
+            </a:r>
+          </a:p>
+          <a:p>
+            <a:pPr marL="0" indent="0">
+              <a:buNone/>
+            </a:pPr>
+            <a:r>
+              <a:rPr lang="de-DE" sz="2000">
+                <a:latin typeface="Calibri Light" panose="020F0302020204030204" pitchFamily="34" charset="0"/>
+                <a:cs typeface="Calibri Light" panose="020F0302020204030204" pitchFamily="34" charset="0"/>
+              </a:rPr>
+              <a:t>	</a:t>
+            </a:r>
+            <a:r>
+              <a:rPr lang="de-DE" sz="2000" smtClean="0">
+                <a:latin typeface="Calibri Light" panose="020F0302020204030204" pitchFamily="34" charset="0"/>
+                <a:cs typeface="Calibri Light" panose="020F0302020204030204" pitchFamily="34" charset="0"/>
+              </a:rPr>
+              <a:t>declarative validation of </a:t>
+            </a:r>
+            <a:r>
+              <a:rPr lang="de-DE" sz="2000" b="1" smtClean="0">
+                <a:latin typeface="Calibri Light" panose="020F0302020204030204" pitchFamily="34" charset="0"/>
+                <a:cs typeface="Calibri Light" panose="020F0302020204030204" pitchFamily="34" charset="0"/>
+              </a:rPr>
+              <a:t>single files</a:t>
+            </a:r>
+            <a:r>
+              <a:rPr lang="de-DE" sz="2000" smtClean="0">
+                <a:latin typeface="Calibri Light" panose="020F0302020204030204" pitchFamily="34" charset="0"/>
+                <a:cs typeface="Calibri Light" panose="020F0302020204030204" pitchFamily="34" charset="0"/>
+              </a:rPr>
+              <a:t> against schemas </a:t>
+            </a:r>
+          </a:p>
+          <a:p>
+            <a:pPr marL="0" indent="0">
+              <a:buNone/>
+            </a:pPr>
+            <a:r>
+              <a:rPr lang="de-DE" sz="2000" smtClean="0">
+                <a:latin typeface="Calibri Light" panose="020F0302020204030204" pitchFamily="34" charset="0"/>
+                <a:cs typeface="Calibri Light" panose="020F0302020204030204" pitchFamily="34" charset="0"/>
+              </a:rPr>
+              <a:t>                (XSD, RelaxNG, JSON Schema, SHACL, …)</a:t>
+            </a:r>
+          </a:p>
+          <a:p>
+            <a:endParaRPr lang="de-DE" sz="2000" smtClean="0">
+              <a:latin typeface="Calibri Light" panose="020F0302020204030204" pitchFamily="34" charset="0"/>
+              <a:cs typeface="Calibri Light" panose="020F0302020204030204" pitchFamily="34" charset="0"/>
+            </a:endParaRPr>
+          </a:p>
+          <a:p>
+            <a:r>
+              <a:rPr lang="de-DE" sz="2000" smtClean="0">
+                <a:latin typeface="Calibri Light" panose="020F0302020204030204" pitchFamily="34" charset="0"/>
+                <a:cs typeface="Calibri Light" panose="020F0302020204030204" pitchFamily="34" charset="0"/>
+              </a:rPr>
+              <a:t>Real interest: validity of </a:t>
+            </a:r>
+            <a:r>
+              <a:rPr lang="de-DE" sz="2000" b="1" smtClean="0">
+                <a:solidFill>
+                  <a:srgbClr val="CC6600"/>
+                </a:solidFill>
+                <a:latin typeface="Calibri Light" panose="020F0302020204030204" pitchFamily="34" charset="0"/>
+                <a:cs typeface="Calibri Light" panose="020F0302020204030204" pitchFamily="34" charset="0"/>
+              </a:rPr>
+              <a:t>systems</a:t>
+            </a:r>
+            <a:r>
+              <a:rPr lang="de-DE" sz="2000" smtClean="0">
+                <a:latin typeface="Calibri Light" panose="020F0302020204030204" pitchFamily="34" charset="0"/>
+                <a:cs typeface="Calibri Light" panose="020F0302020204030204" pitchFamily="34" charset="0"/>
+              </a:rPr>
+              <a:t>, not individual files</a:t>
+            </a:r>
+          </a:p>
+          <a:p>
+            <a:r>
+              <a:rPr lang="de-DE" sz="2000" b="1" smtClean="0">
+                <a:solidFill>
+                  <a:srgbClr val="006600"/>
+                </a:solidFill>
+                <a:latin typeface="Calibri Light" panose="020F0302020204030204" pitchFamily="34" charset="0"/>
+                <a:cs typeface="Calibri Light" panose="020F0302020204030204" pitchFamily="34" charset="0"/>
+              </a:rPr>
+              <a:t>Single file</a:t>
+            </a:r>
+            <a:r>
+              <a:rPr lang="de-DE" sz="2000" smtClean="0">
+                <a:latin typeface="Calibri Light" panose="020F0302020204030204" pitchFamily="34" charset="0"/>
+                <a:cs typeface="Calibri Light" panose="020F0302020204030204" pitchFamily="34" charset="0"/>
+              </a:rPr>
+              <a:t>: a tiny jigsaw piece in the picture of system validity</a:t>
+            </a:r>
+          </a:p>
+          <a:p>
+            <a:r>
+              <a:rPr lang="de-DE" sz="2000" b="1" smtClean="0">
+                <a:solidFill>
+                  <a:srgbClr val="006600"/>
+                </a:solidFill>
+                <a:latin typeface="Calibri Light" panose="020F0302020204030204" pitchFamily="34" charset="0"/>
+                <a:cs typeface="Calibri Light" panose="020F0302020204030204" pitchFamily="34" charset="0"/>
+              </a:rPr>
+              <a:t>File system trees</a:t>
+            </a:r>
+            <a:r>
+              <a:rPr lang="de-DE" sz="2000" smtClean="0">
+                <a:latin typeface="Calibri Light" panose="020F0302020204030204" pitchFamily="34" charset="0"/>
+                <a:cs typeface="Calibri Light" panose="020F0302020204030204" pitchFamily="34" charset="0"/>
+              </a:rPr>
+              <a:t> are simply </a:t>
+            </a:r>
+            <a:r>
+              <a:rPr lang="de-DE" sz="2000" b="1" i="1" smtClean="0">
+                <a:solidFill>
+                  <a:srgbClr val="CC6600"/>
+                </a:solidFill>
+                <a:latin typeface="Calibri Light" panose="020F0302020204030204" pitchFamily="34" charset="0"/>
+                <a:cs typeface="Calibri Light" panose="020F0302020204030204" pitchFamily="34" charset="0"/>
+              </a:rPr>
+              <a:t>larger parts of the picture</a:t>
+            </a:r>
+            <a:r>
+              <a:rPr lang="de-DE" sz="2000" smtClean="0">
+                <a:latin typeface="Calibri Light" panose="020F0302020204030204" pitchFamily="34" charset="0"/>
+                <a:cs typeface="Calibri Light" panose="020F0302020204030204" pitchFamily="34" charset="0"/>
+              </a:rPr>
+              <a:t>; examples:</a:t>
+            </a:r>
+          </a:p>
+          <a:p>
+            <a:pPr marL="0" indent="0">
+              <a:buNone/>
+            </a:pPr>
+            <a:endParaRPr lang="de-DE" sz="2000" smtClean="0">
+              <a:latin typeface="Calibri Light" panose="020F0302020204030204" pitchFamily="34" charset="0"/>
+              <a:cs typeface="Calibri Light" panose="020F0302020204030204" pitchFamily="34" charset="0"/>
+            </a:endParaRPr>
+          </a:p>
+          <a:p>
+            <a:pPr lvl="1"/>
+            <a:r>
+              <a:rPr lang="de-DE" sz="1600">
+                <a:latin typeface="Calibri Light" panose="020F0302020204030204" pitchFamily="34" charset="0"/>
+                <a:cs typeface="Calibri Light" panose="020F0302020204030204" pitchFamily="34" charset="0"/>
+              </a:rPr>
+              <a:t>A product to be shipped</a:t>
+            </a:r>
+          </a:p>
+          <a:p>
+            <a:pPr lvl="1"/>
+            <a:r>
+              <a:rPr lang="de-DE" sz="1600" smtClean="0">
+                <a:latin typeface="Calibri Light" panose="020F0302020204030204" pitchFamily="34" charset="0"/>
+                <a:cs typeface="Calibri Light" panose="020F0302020204030204" pitchFamily="34" charset="0"/>
+              </a:rPr>
+              <a:t>A set of applications in use</a:t>
+            </a:r>
+          </a:p>
+          <a:p>
+            <a:pPr lvl="1"/>
+            <a:r>
+              <a:rPr lang="de-DE" sz="1600" smtClean="0">
+                <a:latin typeface="Calibri Light" panose="020F0302020204030204" pitchFamily="34" charset="0"/>
+                <a:cs typeface="Calibri Light" panose="020F0302020204030204" pitchFamily="34" charset="0"/>
+              </a:rPr>
+              <a:t>Critical components of infrastructure</a:t>
+            </a:r>
+          </a:p>
+          <a:p>
+            <a:pPr lvl="1"/>
+            <a:r>
+              <a:rPr lang="de-DE" sz="1600" smtClean="0">
+                <a:latin typeface="Calibri Light" panose="020F0302020204030204" pitchFamily="34" charset="0"/>
+                <a:cs typeface="Calibri Light" panose="020F0302020204030204" pitchFamily="34" charset="0"/>
+              </a:rPr>
+              <a:t>Data sources and assets</a:t>
+            </a:r>
+          </a:p>
+          <a:p>
+            <a:pPr lvl="1"/>
+            <a:r>
+              <a:rPr lang="de-DE" sz="1600" smtClean="0">
+                <a:latin typeface="Calibri Light" panose="020F0302020204030204" pitchFamily="34" charset="0"/>
+                <a:cs typeface="Calibri Light" panose="020F0302020204030204" pitchFamily="34" charset="0"/>
+              </a:rPr>
+              <a:t>Complex test results, logs, monitoring results</a:t>
+            </a:r>
+          </a:p>
+          <a:p>
+            <a:pPr lvl="1"/>
+            <a:endParaRPr lang="de-DE" sz="1600" smtClean="0"/>
+          </a:p>
+          <a:p>
+            <a:pPr lvl="1"/>
+            <a:endParaRPr lang="de-DE" sz="1600"/>
+          </a:p>
+        </p:txBody>
+      </p:sp>
+      <p:sp>
+        <p:nvSpPr>
+          <p:cNvPr id="4" name="Date Placeholder 3"/>
+          <p:cNvSpPr>
+            <a:spLocks noGrp="1"/>
+          </p:cNvSpPr>
+          <p:nvPr>
+            <p:ph type="dt" sz="half" idx="10"/>
+          </p:nvPr>
+        </p:nvSpPr>
+        <p:spPr/>
+        <p:txBody>
+          <a:bodyPr/>
+          <a:lstStyle/>
+          <a:p>
+            <a:pPr>
+              <a:defRPr/>
+            </a:pPr>
+            <a:r>
+              <a:rPr lang="de-DE" altLang="de-DE" smtClean="0"/>
+              <a:t>2020-10-08</a:t>
+            </a:r>
+            <a:endParaRPr lang="de-DE" altLang="en-US"/>
+          </a:p>
+        </p:txBody>
+      </p:sp>
+      <p:sp>
+        <p:nvSpPr>
+          <p:cNvPr id="5" name="Footer Placeholder 4"/>
+          <p:cNvSpPr>
+            <a:spLocks noGrp="1"/>
+          </p:cNvSpPr>
+          <p:nvPr>
+            <p:ph type="ftr" sz="quarter" idx="11"/>
+          </p:nvPr>
+        </p:nvSpPr>
+        <p:spPr/>
+        <p:txBody>
+          <a:bodyPr/>
+          <a:lstStyle/>
+          <a:p>
+            <a:pPr>
+              <a:defRPr/>
+            </a:pPr>
+            <a:r>
+              <a:rPr lang="de-DE" altLang="en-US" smtClean="0"/>
+              <a:t>Greenfox</a:t>
+            </a:r>
+            <a:endParaRPr lang="de-DE" altLang="en-US"/>
+          </a:p>
+        </p:txBody>
+      </p:sp>
+      <p:sp>
+        <p:nvSpPr>
+          <p:cNvPr id="6" name="Slide Number Placeholder 5"/>
+          <p:cNvSpPr>
+            <a:spLocks noGrp="1"/>
+          </p:cNvSpPr>
+          <p:nvPr>
+            <p:ph type="sldNum" sz="quarter" idx="12"/>
+          </p:nvPr>
+        </p:nvSpPr>
+        <p:spPr/>
+        <p:txBody>
+          <a:bodyPr/>
+          <a:lstStyle/>
+          <a:p>
+            <a:pPr>
+              <a:defRPr/>
+            </a:pPr>
+            <a:fld id="{F031B2F4-27D1-4E53-97CF-1947CD75B185}" type="slidenum">
+              <a:rPr lang="de-DE" altLang="en-US" smtClean="0"/>
+              <a:pPr>
+                <a:defRPr/>
+              </a:pPr>
+              <a:t>3</a:t>
+            </a:fld>
+            <a:endParaRPr lang="de-DE" altLang="en-US"/>
+          </a:p>
+        </p:txBody>
+      </p:sp>
+      <p:sp>
+        <p:nvSpPr>
+          <p:cNvPr id="8" name="Rounded Rectangular Callout 7"/>
+          <p:cNvSpPr/>
+          <p:nvPr/>
+        </p:nvSpPr>
+        <p:spPr bwMode="auto">
+          <a:xfrm>
+            <a:off x="5376259" y="4365104"/>
+            <a:ext cx="3746646" cy="2492896"/>
+          </a:xfrm>
+          <a:prstGeom prst="wedgeRoundRectCallout">
+            <a:avLst>
+              <a:gd name="adj1" fmla="val -100974"/>
+              <a:gd name="adj2" fmla="val -30509"/>
+              <a:gd name="adj3" fmla="val 16667"/>
+            </a:avLst>
+          </a:prstGeom>
+          <a:solidFill>
+            <a:schemeClr val="accent1">
+              <a:lumMod val="20000"/>
+              <a:lumOff val="80000"/>
+            </a:schemeClr>
+          </a:solidFill>
+          <a:ln w="9525" cap="flat" cmpd="sng" algn="ctr">
+            <a:solidFill>
+              <a:schemeClr val="tx1"/>
+            </a:solidFill>
+            <a:prstDash val="solid"/>
+            <a:round/>
+            <a:headEnd type="none" w="med" len="med"/>
+            <a:tailEnd type="none" w="med" len="med"/>
+          </a:ln>
+          <a:effectLst/>
+          <a:extLst/>
+        </p:spPr>
+        <p:txBody>
+          <a:bodyPr vert="horz" wrap="square" lIns="91440" tIns="45720" rIns="91440" bIns="45720" numCol="1" rtlCol="0" anchor="t" anchorCtr="0" compatLnSpc="1">
+            <a:prstTxWarp prst="textNoShape">
+              <a:avLst/>
+            </a:prstTxWarp>
+          </a:bodyPr>
+          <a:lstStyle/>
+          <a:p>
+            <a:pPr marL="0" marR="0" indent="0" algn="ctr" defTabSz="914400" rtl="0" eaLnBrk="1" fontAlgn="base" latinLnBrk="0" hangingPunct="1">
+              <a:lnSpc>
+                <a:spcPct val="100000"/>
+              </a:lnSpc>
+              <a:spcBef>
+                <a:spcPct val="0"/>
+              </a:spcBef>
+              <a:spcAft>
+                <a:spcPct val="0"/>
+              </a:spcAft>
+              <a:buClrTx/>
+              <a:buSzTx/>
+              <a:buFontTx/>
+              <a:buNone/>
+              <a:tabLst/>
+            </a:pPr>
+            <a:r>
+              <a:rPr kumimoji="0" lang="de-DE" sz="1800" b="1" i="1" u="none" strike="noStrike" cap="none" normalizeH="0" smtClean="0">
+                <a:ln>
+                  <a:noFill/>
+                </a:ln>
+                <a:solidFill>
+                  <a:srgbClr val="CC6600"/>
+                </a:solidFill>
+                <a:effectLst/>
+              </a:rPr>
+              <a:t>SAMPLE WORRIES</a:t>
+            </a:r>
+          </a:p>
+          <a:p>
+            <a:pPr marL="0" marR="0" indent="0" algn="ctr" defTabSz="914400" rtl="0" eaLnBrk="1" fontAlgn="base" latinLnBrk="0" hangingPunct="1">
+              <a:lnSpc>
+                <a:spcPct val="100000"/>
+              </a:lnSpc>
+              <a:spcBef>
+                <a:spcPct val="0"/>
+              </a:spcBef>
+              <a:spcAft>
+                <a:spcPct val="0"/>
+              </a:spcAft>
+              <a:buClrTx/>
+              <a:buSzTx/>
+              <a:buFontTx/>
+              <a:buNone/>
+              <a:tabLst/>
+            </a:pPr>
+            <a:endParaRPr lang="de-DE" i="1"/>
+          </a:p>
+          <a:p>
+            <a:pPr marL="0" marR="0" indent="0" algn="ctr" defTabSz="914400" rtl="0" eaLnBrk="1" fontAlgn="base" latinLnBrk="0" hangingPunct="1">
+              <a:lnSpc>
+                <a:spcPct val="100000"/>
+              </a:lnSpc>
+              <a:spcBef>
+                <a:spcPct val="0"/>
+              </a:spcBef>
+              <a:spcAft>
+                <a:spcPct val="0"/>
+              </a:spcAft>
+              <a:buClrTx/>
+              <a:buSzTx/>
+              <a:buFontTx/>
+              <a:buNone/>
+              <a:tabLst/>
+            </a:pPr>
+            <a:r>
+              <a:rPr kumimoji="0" lang="de-DE" sz="1800" b="1" i="1" u="none" strike="noStrike" cap="none" normalizeH="0" smtClean="0">
+                <a:ln>
+                  <a:noFill/>
+                </a:ln>
+                <a:solidFill>
+                  <a:srgbClr val="006600"/>
+                </a:solidFill>
+                <a:effectLst/>
+              </a:rPr>
+              <a:t>No file forgotten? </a:t>
+            </a:r>
+          </a:p>
+          <a:p>
+            <a:pPr marL="0" marR="0" indent="0" algn="ctr" defTabSz="914400" rtl="0" eaLnBrk="1" fontAlgn="base" latinLnBrk="0" hangingPunct="1">
+              <a:lnSpc>
+                <a:spcPct val="100000"/>
+              </a:lnSpc>
+              <a:spcBef>
+                <a:spcPct val="0"/>
+              </a:spcBef>
+              <a:spcAft>
+                <a:spcPct val="0"/>
+              </a:spcAft>
+              <a:buClrTx/>
+              <a:buSzTx/>
+              <a:buFontTx/>
+              <a:buNone/>
+              <a:tabLst/>
+            </a:pPr>
+            <a:r>
+              <a:rPr kumimoji="0" lang="de-DE" sz="1800" b="1" i="1" u="none" strike="noStrike" cap="none" normalizeH="0" smtClean="0">
+                <a:ln>
+                  <a:noFill/>
+                </a:ln>
+                <a:solidFill>
+                  <a:srgbClr val="006600"/>
+                </a:solidFill>
+                <a:effectLst/>
+              </a:rPr>
+              <a:t>File versions correct? </a:t>
+            </a:r>
+          </a:p>
+          <a:p>
+            <a:pPr marL="0" marR="0" indent="0" algn="ctr" defTabSz="914400" rtl="0" eaLnBrk="1" fontAlgn="base" latinLnBrk="0" hangingPunct="1">
+              <a:lnSpc>
+                <a:spcPct val="100000"/>
+              </a:lnSpc>
+              <a:spcBef>
+                <a:spcPct val="0"/>
+              </a:spcBef>
+              <a:spcAft>
+                <a:spcPct val="0"/>
+              </a:spcAft>
+              <a:buClrTx/>
+              <a:buSzTx/>
+              <a:buFontTx/>
+              <a:buNone/>
+              <a:tabLst/>
+            </a:pPr>
+            <a:r>
+              <a:rPr lang="de-DE" i="1" baseline="0" smtClean="0">
+                <a:solidFill>
+                  <a:srgbClr val="006600"/>
+                </a:solidFill>
+              </a:rPr>
+              <a:t>Log files </a:t>
+            </a:r>
+            <a:r>
+              <a:rPr lang="de-DE" i="1" smtClean="0">
+                <a:solidFill>
+                  <a:srgbClr val="006600"/>
+                </a:solidFill>
+              </a:rPr>
+              <a:t>removed?</a:t>
+            </a:r>
+          </a:p>
+          <a:p>
+            <a:pPr marL="0" marR="0" indent="0" algn="ctr" defTabSz="914400" rtl="0" eaLnBrk="1" fontAlgn="base" latinLnBrk="0" hangingPunct="1">
+              <a:lnSpc>
+                <a:spcPct val="100000"/>
+              </a:lnSpc>
+              <a:spcBef>
+                <a:spcPct val="0"/>
+              </a:spcBef>
+              <a:spcAft>
+                <a:spcPct val="0"/>
+              </a:spcAft>
+              <a:buClrTx/>
+              <a:buSzTx/>
+              <a:buFontTx/>
+              <a:buNone/>
+              <a:tabLst/>
+            </a:pPr>
+            <a:r>
+              <a:rPr kumimoji="0" lang="de-DE" sz="1800" b="1" i="1" u="none" strike="noStrike" cap="none" normalizeH="0" baseline="0" smtClean="0">
+                <a:ln>
+                  <a:noFill/>
+                </a:ln>
+                <a:solidFill>
+                  <a:srgbClr val="006600"/>
+                </a:solidFill>
+                <a:effectLst/>
+              </a:rPr>
+              <a:t>Documentation</a:t>
+            </a:r>
+            <a:r>
+              <a:rPr kumimoji="0" lang="de-DE" sz="1800" b="1" i="1" u="none" strike="noStrike" cap="none" normalizeH="0" smtClean="0">
+                <a:ln>
+                  <a:noFill/>
+                </a:ln>
+                <a:solidFill>
+                  <a:srgbClr val="006600"/>
+                </a:solidFill>
+                <a:effectLst/>
+              </a:rPr>
+              <a:t> complete?</a:t>
+            </a:r>
+          </a:p>
+          <a:p>
+            <a:pPr marL="0" marR="0" indent="0" algn="ctr" defTabSz="914400" rtl="0" eaLnBrk="1" fontAlgn="base" latinLnBrk="0" hangingPunct="1">
+              <a:lnSpc>
+                <a:spcPct val="100000"/>
+              </a:lnSpc>
+              <a:spcBef>
+                <a:spcPct val="0"/>
+              </a:spcBef>
+              <a:spcAft>
+                <a:spcPct val="0"/>
+              </a:spcAft>
+              <a:buClrTx/>
+              <a:buSzTx/>
+              <a:buFontTx/>
+              <a:buNone/>
+              <a:tabLst/>
+            </a:pPr>
+            <a:r>
+              <a:rPr lang="de-DE" i="1" baseline="0" smtClean="0">
+                <a:solidFill>
+                  <a:srgbClr val="006600"/>
+                </a:solidFill>
+              </a:rPr>
+              <a:t>All translations included?</a:t>
+            </a:r>
+          </a:p>
+          <a:p>
+            <a:pPr marL="0" marR="0" indent="0" algn="ctr" defTabSz="914400" rtl="0" eaLnBrk="1" fontAlgn="base" latinLnBrk="0" hangingPunct="1">
+              <a:lnSpc>
+                <a:spcPct val="100000"/>
+              </a:lnSpc>
+              <a:spcBef>
+                <a:spcPct val="0"/>
+              </a:spcBef>
+              <a:spcAft>
+                <a:spcPct val="0"/>
+              </a:spcAft>
+              <a:buClrTx/>
+              <a:buSzTx/>
+              <a:buFontTx/>
+              <a:buNone/>
+              <a:tabLst/>
+            </a:pPr>
+            <a:r>
+              <a:rPr lang="de-DE" i="1" smtClean="0">
+                <a:solidFill>
+                  <a:srgbClr val="006600"/>
+                </a:solidFill>
+              </a:rPr>
+              <a:t>All links updated? </a:t>
+            </a:r>
+            <a:r>
+              <a:rPr kumimoji="0" lang="de-DE" sz="1800" b="1" i="1" u="none" strike="noStrike" cap="none" normalizeH="0" smtClean="0">
+                <a:ln>
+                  <a:noFill/>
+                </a:ln>
+                <a:solidFill>
+                  <a:srgbClr val="006600"/>
+                </a:solidFill>
+                <a:effectLst/>
+              </a:rPr>
+              <a:t>Etc. etc.</a:t>
+            </a:r>
+            <a:endParaRPr kumimoji="0" lang="de-DE" sz="1800" b="1" i="1" u="none" strike="noStrike" cap="none" normalizeH="0" baseline="0" smtClean="0">
+              <a:ln>
+                <a:noFill/>
+              </a:ln>
+              <a:solidFill>
+                <a:srgbClr val="006600"/>
+              </a:solidFill>
+              <a:effectLst/>
+            </a:endParaRPr>
+          </a:p>
+        </p:txBody>
+      </p:sp>
+    </p:spTree>
+    <p:extLst>
+      <p:ext uri="{BB962C8B-B14F-4D97-AF65-F5344CB8AC3E}">
+        <p14:creationId xmlns:p14="http://schemas.microsoft.com/office/powerpoint/2010/main" val="4156547638"/>
+      </p:ext>
+    </p:extLst>
+  </p:cSld>
+  <p:clrMapOvr>
+    <a:masterClrMapping/>
+  </p:clrMapOvr>
+  <p:timing>
+    <p:tnLst>
+      <p:par>
+        <p:cTn id="1" dur="indefinite" restart="never" nodeType="tmRoot"/>
+      </p:par>
+    </p:tnLst>
+  </p:timing>
+</p:sld>
+</file>
+
+<file path=ppt/slides/slide30.xml><?xml version="1.0" encoding="utf-8"?>
+<p:sld xmlns:a="http://schemas.openxmlformats.org/drawingml/2006/main" xmlns:r="http://schemas.openxmlformats.org/officeDocument/2006/relationships" xmlns:p="http://schemas.openxmlformats.org/presentationml/2006/main">
+  <p:cSld>
+    <p:spTree>
+      <p:nvGrpSpPr>
+        <p:cNvPr id="1" name=""/>
+        <p:cNvGrpSpPr/>
+        <p:nvPr/>
+      </p:nvGrpSpPr>
+      <p:grpSpPr>
+        <a:xfrm>
+          <a:off x="0" y="0"/>
+          <a:ext cx="0" cy="0"/>
+          <a:chOff x="0" y="0"/>
+          <a:chExt cx="0" cy="0"/>
+        </a:xfrm>
+      </p:grpSpPr>
+      <p:sp>
+        <p:nvSpPr>
+          <p:cNvPr id="2" name="Title 1"/>
+          <p:cNvSpPr>
+            <a:spLocks noGrp="1"/>
+          </p:cNvSpPr>
+          <p:nvPr>
+            <p:ph type="title"/>
+          </p:nvPr>
+        </p:nvSpPr>
+        <p:spPr>
+          <a:xfrm>
+            <a:off x="539552" y="405408"/>
+            <a:ext cx="7543800" cy="1295400"/>
+          </a:xfrm>
+        </p:spPr>
+        <p:txBody>
+          <a:bodyPr/>
+          <a:lstStyle/>
+          <a:p>
+            <a:pPr algn="ctr"/>
+            <a:r>
+              <a:rPr lang="de-DE" smtClean="0">
+                <a:solidFill>
+                  <a:schemeClr val="bg1">
+                    <a:lumMod val="50000"/>
+                  </a:schemeClr>
+                </a:solidFill>
+                <a:latin typeface="Bradley Hand ITC" panose="03070402050302030203" pitchFamily="66" charset="0"/>
+              </a:rPr>
+              <a:t>Thank you, Jodle and all others,</a:t>
+            </a:r>
+            <a:br>
+              <a:rPr lang="de-DE" smtClean="0">
+                <a:solidFill>
+                  <a:schemeClr val="bg1">
+                    <a:lumMod val="50000"/>
+                  </a:schemeClr>
+                </a:solidFill>
+                <a:latin typeface="Bradley Hand ITC" panose="03070402050302030203" pitchFamily="66" charset="0"/>
+              </a:rPr>
+            </a:br>
+            <a:r>
+              <a:rPr lang="de-DE" smtClean="0">
+                <a:solidFill>
+                  <a:schemeClr val="bg1">
+                    <a:lumMod val="50000"/>
+                  </a:schemeClr>
+                </a:solidFill>
+                <a:latin typeface="Bradley Hand ITC" panose="03070402050302030203" pitchFamily="66" charset="0"/>
+              </a:rPr>
+              <a:t>for your kind attention!</a:t>
+            </a:r>
+            <a:endParaRPr lang="de-DE">
+              <a:solidFill>
+                <a:schemeClr val="bg1">
+                  <a:lumMod val="50000"/>
+                </a:schemeClr>
+              </a:solidFill>
+              <a:latin typeface="Bradley Hand ITC" panose="03070402050302030203" pitchFamily="66" charset="0"/>
+            </a:endParaRPr>
+          </a:p>
+        </p:txBody>
+      </p:sp>
+      <p:sp>
+        <p:nvSpPr>
+          <p:cNvPr id="4" name="Date Placeholder 3"/>
+          <p:cNvSpPr>
+            <a:spLocks noGrp="1"/>
+          </p:cNvSpPr>
+          <p:nvPr>
+            <p:ph type="dt" sz="half" idx="10"/>
+          </p:nvPr>
+        </p:nvSpPr>
+        <p:spPr/>
+        <p:txBody>
+          <a:bodyPr/>
+          <a:lstStyle/>
+          <a:p>
+            <a:pPr>
+              <a:defRPr/>
+            </a:pPr>
+            <a:r>
+              <a:rPr lang="de-DE" altLang="de-DE" smtClean="0"/>
+              <a:t>2020-10-08</a:t>
+            </a:r>
+            <a:endParaRPr lang="de-DE" altLang="en-US"/>
+          </a:p>
+        </p:txBody>
+      </p:sp>
+      <p:sp>
+        <p:nvSpPr>
+          <p:cNvPr id="5" name="Footer Placeholder 4"/>
+          <p:cNvSpPr>
+            <a:spLocks noGrp="1"/>
+          </p:cNvSpPr>
+          <p:nvPr>
+            <p:ph type="ftr" sz="quarter" idx="11"/>
+          </p:nvPr>
+        </p:nvSpPr>
+        <p:spPr/>
+        <p:txBody>
+          <a:bodyPr/>
+          <a:lstStyle/>
+          <a:p>
+            <a:pPr>
+              <a:defRPr/>
+            </a:pPr>
+            <a:r>
+              <a:rPr lang="de-DE" altLang="en-US" smtClean="0"/>
+              <a:t>Greenfox</a:t>
+            </a:r>
+            <a:endParaRPr lang="de-DE" altLang="en-US"/>
+          </a:p>
+        </p:txBody>
+      </p:sp>
+      <p:sp>
+        <p:nvSpPr>
+          <p:cNvPr id="6" name="Slide Number Placeholder 5"/>
+          <p:cNvSpPr>
+            <a:spLocks noGrp="1"/>
+          </p:cNvSpPr>
+          <p:nvPr>
+            <p:ph type="sldNum" sz="quarter" idx="12"/>
+          </p:nvPr>
+        </p:nvSpPr>
+        <p:spPr/>
+        <p:txBody>
+          <a:bodyPr/>
+          <a:lstStyle/>
+          <a:p>
+            <a:pPr>
+              <a:defRPr/>
+            </a:pPr>
+            <a:fld id="{F031B2F4-27D1-4E53-97CF-1947CD75B185}" type="slidenum">
+              <a:rPr lang="de-DE" altLang="en-US" smtClean="0"/>
+              <a:pPr>
+                <a:defRPr/>
+              </a:pPr>
+              <a:t>30</a:t>
             </a:fld>
             <a:endParaRPr lang="de-DE" altLang="en-US"/>
           </a:p>
@@ -21842,691 +23174,6 @@
 </p:sld>
 </file>
 
-<file path=ppt/slides/slide3.xml><?xml version="1.0" encoding="utf-8"?>
-<p:sld xmlns:a="http://schemas.openxmlformats.org/drawingml/2006/main" xmlns:r="http://schemas.openxmlformats.org/officeDocument/2006/relationships" xmlns:p="http://schemas.openxmlformats.org/presentationml/2006/main">
-  <p:cSld>
-    <p:spTree>
-      <p:nvGrpSpPr>
-        <p:cNvPr id="1" name=""/>
-        <p:cNvGrpSpPr/>
-        <p:nvPr/>
-      </p:nvGrpSpPr>
-      <p:grpSpPr>
-        <a:xfrm>
-          <a:off x="0" y="0"/>
-          <a:ext cx="0" cy="0"/>
-          <a:chOff x="0" y="0"/>
-          <a:chExt cx="0" cy="0"/>
-        </a:xfrm>
-      </p:grpSpPr>
-      <p:sp>
-        <p:nvSpPr>
-          <p:cNvPr id="2" name="Title 1"/>
-          <p:cNvSpPr>
-            <a:spLocks noGrp="1"/>
-          </p:cNvSpPr>
-          <p:nvPr>
-            <p:ph type="title"/>
-          </p:nvPr>
-        </p:nvSpPr>
-        <p:spPr/>
-        <p:txBody>
-          <a:bodyPr/>
-          <a:lstStyle/>
-          <a:p>
-            <a:r>
-              <a:rPr lang="de-DE" smtClean="0">
-                <a:solidFill>
-                  <a:srgbClr val="006600"/>
-                </a:solidFill>
-                <a:latin typeface="Calibri Light" panose="020F0302020204030204" pitchFamily="34" charset="0"/>
-                <a:cs typeface="Calibri Light" panose="020F0302020204030204" pitchFamily="34" charset="0"/>
-              </a:rPr>
-              <a:t>Why might you care?</a:t>
-            </a:r>
-            <a:endParaRPr lang="de-DE">
-              <a:solidFill>
-                <a:srgbClr val="006600"/>
-              </a:solidFill>
-              <a:latin typeface="Calibri Light" panose="020F0302020204030204" pitchFamily="34" charset="0"/>
-              <a:cs typeface="Calibri Light" panose="020F0302020204030204" pitchFamily="34" charset="0"/>
-            </a:endParaRPr>
-          </a:p>
-        </p:txBody>
-      </p:sp>
-      <p:sp>
-        <p:nvSpPr>
-          <p:cNvPr id="3" name="Content Placeholder 2"/>
-          <p:cNvSpPr>
-            <a:spLocks noGrp="1"/>
-          </p:cNvSpPr>
-          <p:nvPr>
-            <p:ph idx="1"/>
-          </p:nvPr>
-        </p:nvSpPr>
-        <p:spPr>
-          <a:xfrm>
-            <a:off x="457200" y="1719263"/>
-            <a:ext cx="8686800" cy="4411662"/>
-          </a:xfrm>
-        </p:spPr>
-        <p:txBody>
-          <a:bodyPr/>
-          <a:lstStyle/>
-          <a:p>
-            <a:r>
-              <a:rPr lang="de-DE" sz="2000" smtClean="0">
-                <a:latin typeface="Calibri Light" panose="020F0302020204030204" pitchFamily="34" charset="0"/>
-                <a:cs typeface="Calibri Light" panose="020F0302020204030204" pitchFamily="34" charset="0"/>
-              </a:rPr>
-              <a:t>What we are used to:</a:t>
-            </a:r>
-          </a:p>
-          <a:p>
-            <a:pPr marL="0" indent="0">
-              <a:buNone/>
-            </a:pPr>
-            <a:r>
-              <a:rPr lang="de-DE" sz="2000">
-                <a:latin typeface="Calibri Light" panose="020F0302020204030204" pitchFamily="34" charset="0"/>
-                <a:cs typeface="Calibri Light" panose="020F0302020204030204" pitchFamily="34" charset="0"/>
-              </a:rPr>
-              <a:t>	</a:t>
-            </a:r>
-            <a:r>
-              <a:rPr lang="de-DE" sz="2000" smtClean="0">
-                <a:latin typeface="Calibri Light" panose="020F0302020204030204" pitchFamily="34" charset="0"/>
-                <a:cs typeface="Calibri Light" panose="020F0302020204030204" pitchFamily="34" charset="0"/>
-              </a:rPr>
-              <a:t>declarative validation of </a:t>
-            </a:r>
-            <a:r>
-              <a:rPr lang="de-DE" sz="2000" b="1" smtClean="0">
-                <a:latin typeface="Calibri Light" panose="020F0302020204030204" pitchFamily="34" charset="0"/>
-                <a:cs typeface="Calibri Light" panose="020F0302020204030204" pitchFamily="34" charset="0"/>
-              </a:rPr>
-              <a:t>single files</a:t>
-            </a:r>
-            <a:r>
-              <a:rPr lang="de-DE" sz="2000" smtClean="0">
-                <a:latin typeface="Calibri Light" panose="020F0302020204030204" pitchFamily="34" charset="0"/>
-                <a:cs typeface="Calibri Light" panose="020F0302020204030204" pitchFamily="34" charset="0"/>
-              </a:rPr>
-              <a:t> against schemas </a:t>
-            </a:r>
-          </a:p>
-          <a:p>
-            <a:pPr marL="0" indent="0">
-              <a:buNone/>
-            </a:pPr>
-            <a:r>
-              <a:rPr lang="de-DE" sz="2000" smtClean="0">
-                <a:latin typeface="Calibri Light" panose="020F0302020204030204" pitchFamily="34" charset="0"/>
-                <a:cs typeface="Calibri Light" panose="020F0302020204030204" pitchFamily="34" charset="0"/>
-              </a:rPr>
-              <a:t>                (XSD, RelaxNG, JSON Schema, SHACL, …)</a:t>
-            </a:r>
-          </a:p>
-          <a:p>
-            <a:endParaRPr lang="de-DE" sz="2000" smtClean="0">
-              <a:latin typeface="Calibri Light" panose="020F0302020204030204" pitchFamily="34" charset="0"/>
-              <a:cs typeface="Calibri Light" panose="020F0302020204030204" pitchFamily="34" charset="0"/>
-            </a:endParaRPr>
-          </a:p>
-          <a:p>
-            <a:r>
-              <a:rPr lang="de-DE" sz="2000" smtClean="0">
-                <a:latin typeface="Calibri Light" panose="020F0302020204030204" pitchFamily="34" charset="0"/>
-                <a:cs typeface="Calibri Light" panose="020F0302020204030204" pitchFamily="34" charset="0"/>
-              </a:rPr>
-              <a:t>Real interest: validity of </a:t>
-            </a:r>
-            <a:r>
-              <a:rPr lang="de-DE" sz="2000" b="1" smtClean="0">
-                <a:solidFill>
-                  <a:srgbClr val="CC6600"/>
-                </a:solidFill>
-                <a:latin typeface="Calibri Light" panose="020F0302020204030204" pitchFamily="34" charset="0"/>
-                <a:cs typeface="Calibri Light" panose="020F0302020204030204" pitchFamily="34" charset="0"/>
-              </a:rPr>
-              <a:t>systems</a:t>
-            </a:r>
-            <a:r>
-              <a:rPr lang="de-DE" sz="2000" smtClean="0">
-                <a:latin typeface="Calibri Light" panose="020F0302020204030204" pitchFamily="34" charset="0"/>
-                <a:cs typeface="Calibri Light" panose="020F0302020204030204" pitchFamily="34" charset="0"/>
-              </a:rPr>
-              <a:t>, not individual files</a:t>
-            </a:r>
-          </a:p>
-          <a:p>
-            <a:r>
-              <a:rPr lang="de-DE" sz="2000" b="1" smtClean="0">
-                <a:solidFill>
-                  <a:srgbClr val="006600"/>
-                </a:solidFill>
-                <a:latin typeface="Calibri Light" panose="020F0302020204030204" pitchFamily="34" charset="0"/>
-                <a:cs typeface="Calibri Light" panose="020F0302020204030204" pitchFamily="34" charset="0"/>
-              </a:rPr>
-              <a:t>Single file</a:t>
-            </a:r>
-            <a:r>
-              <a:rPr lang="de-DE" sz="2000" smtClean="0">
-                <a:latin typeface="Calibri Light" panose="020F0302020204030204" pitchFamily="34" charset="0"/>
-                <a:cs typeface="Calibri Light" panose="020F0302020204030204" pitchFamily="34" charset="0"/>
-              </a:rPr>
-              <a:t>: a tiny jigsaw piece in the picture of system validity</a:t>
-            </a:r>
-          </a:p>
-          <a:p>
-            <a:r>
-              <a:rPr lang="de-DE" sz="2000" b="1" smtClean="0">
-                <a:solidFill>
-                  <a:srgbClr val="006600"/>
-                </a:solidFill>
-                <a:latin typeface="Calibri Light" panose="020F0302020204030204" pitchFamily="34" charset="0"/>
-                <a:cs typeface="Calibri Light" panose="020F0302020204030204" pitchFamily="34" charset="0"/>
-              </a:rPr>
-              <a:t>File system trees</a:t>
-            </a:r>
-            <a:r>
-              <a:rPr lang="de-DE" sz="2000" smtClean="0">
-                <a:latin typeface="Calibri Light" panose="020F0302020204030204" pitchFamily="34" charset="0"/>
-                <a:cs typeface="Calibri Light" panose="020F0302020204030204" pitchFamily="34" charset="0"/>
-              </a:rPr>
-              <a:t> are simply </a:t>
-            </a:r>
-            <a:r>
-              <a:rPr lang="de-DE" sz="2000" b="1" i="1" smtClean="0">
-                <a:solidFill>
-                  <a:srgbClr val="CC6600"/>
-                </a:solidFill>
-                <a:latin typeface="Calibri Light" panose="020F0302020204030204" pitchFamily="34" charset="0"/>
-                <a:cs typeface="Calibri Light" panose="020F0302020204030204" pitchFamily="34" charset="0"/>
-              </a:rPr>
-              <a:t>larger parts of the picture</a:t>
-            </a:r>
-            <a:r>
-              <a:rPr lang="de-DE" sz="2000" smtClean="0">
-                <a:latin typeface="Calibri Light" panose="020F0302020204030204" pitchFamily="34" charset="0"/>
-                <a:cs typeface="Calibri Light" panose="020F0302020204030204" pitchFamily="34" charset="0"/>
-              </a:rPr>
-              <a:t>; examples:</a:t>
-            </a:r>
-          </a:p>
-          <a:p>
-            <a:pPr marL="0" indent="0">
-              <a:buNone/>
-            </a:pPr>
-            <a:endParaRPr lang="de-DE" sz="2000" smtClean="0">
-              <a:latin typeface="Calibri Light" panose="020F0302020204030204" pitchFamily="34" charset="0"/>
-              <a:cs typeface="Calibri Light" panose="020F0302020204030204" pitchFamily="34" charset="0"/>
-            </a:endParaRPr>
-          </a:p>
-          <a:p>
-            <a:pPr lvl="1"/>
-            <a:r>
-              <a:rPr lang="de-DE" sz="1600">
-                <a:latin typeface="Calibri Light" panose="020F0302020204030204" pitchFamily="34" charset="0"/>
-                <a:cs typeface="Calibri Light" panose="020F0302020204030204" pitchFamily="34" charset="0"/>
-              </a:rPr>
-              <a:t>A product to be shipped</a:t>
-            </a:r>
-          </a:p>
-          <a:p>
-            <a:pPr lvl="1"/>
-            <a:r>
-              <a:rPr lang="de-DE" sz="1600" smtClean="0">
-                <a:latin typeface="Calibri Light" panose="020F0302020204030204" pitchFamily="34" charset="0"/>
-                <a:cs typeface="Calibri Light" panose="020F0302020204030204" pitchFamily="34" charset="0"/>
-              </a:rPr>
-              <a:t>A set of applications in use</a:t>
-            </a:r>
-          </a:p>
-          <a:p>
-            <a:pPr lvl="1"/>
-            <a:r>
-              <a:rPr lang="de-DE" sz="1600" smtClean="0">
-                <a:latin typeface="Calibri Light" panose="020F0302020204030204" pitchFamily="34" charset="0"/>
-                <a:cs typeface="Calibri Light" panose="020F0302020204030204" pitchFamily="34" charset="0"/>
-              </a:rPr>
-              <a:t>Critical components of infrastructure</a:t>
-            </a:r>
-          </a:p>
-          <a:p>
-            <a:pPr lvl="1"/>
-            <a:r>
-              <a:rPr lang="de-DE" sz="1600" smtClean="0">
-                <a:latin typeface="Calibri Light" panose="020F0302020204030204" pitchFamily="34" charset="0"/>
-                <a:cs typeface="Calibri Light" panose="020F0302020204030204" pitchFamily="34" charset="0"/>
-              </a:rPr>
-              <a:t>Data sources and assets</a:t>
-            </a:r>
-          </a:p>
-          <a:p>
-            <a:pPr lvl="1"/>
-            <a:r>
-              <a:rPr lang="de-DE" sz="1600" smtClean="0">
-                <a:latin typeface="Calibri Light" panose="020F0302020204030204" pitchFamily="34" charset="0"/>
-                <a:cs typeface="Calibri Light" panose="020F0302020204030204" pitchFamily="34" charset="0"/>
-              </a:rPr>
-              <a:t>Complex test results, logs, monitoring results</a:t>
-            </a:r>
-          </a:p>
-          <a:p>
-            <a:pPr lvl="1"/>
-            <a:endParaRPr lang="de-DE" sz="1600" smtClean="0"/>
-          </a:p>
-          <a:p>
-            <a:pPr lvl="1"/>
-            <a:endParaRPr lang="de-DE" sz="1600"/>
-          </a:p>
-        </p:txBody>
-      </p:sp>
-      <p:sp>
-        <p:nvSpPr>
-          <p:cNvPr id="4" name="Date Placeholder 3"/>
-          <p:cNvSpPr>
-            <a:spLocks noGrp="1"/>
-          </p:cNvSpPr>
-          <p:nvPr>
-            <p:ph type="dt" sz="half" idx="10"/>
-          </p:nvPr>
-        </p:nvSpPr>
-        <p:spPr/>
-        <p:txBody>
-          <a:bodyPr/>
-          <a:lstStyle/>
-          <a:p>
-            <a:pPr>
-              <a:defRPr/>
-            </a:pPr>
-            <a:r>
-              <a:rPr lang="de-DE" altLang="de-DE" smtClean="0"/>
-              <a:t>2020-10-08</a:t>
-            </a:r>
-            <a:endParaRPr lang="de-DE" altLang="en-US"/>
-          </a:p>
-        </p:txBody>
-      </p:sp>
-      <p:sp>
-        <p:nvSpPr>
-          <p:cNvPr id="5" name="Footer Placeholder 4"/>
-          <p:cNvSpPr>
-            <a:spLocks noGrp="1"/>
-          </p:cNvSpPr>
-          <p:nvPr>
-            <p:ph type="ftr" sz="quarter" idx="11"/>
-          </p:nvPr>
-        </p:nvSpPr>
-        <p:spPr/>
-        <p:txBody>
-          <a:bodyPr/>
-          <a:lstStyle/>
-          <a:p>
-            <a:pPr>
-              <a:defRPr/>
-            </a:pPr>
-            <a:r>
-              <a:rPr lang="de-DE" altLang="en-US" smtClean="0"/>
-              <a:t>Greenfox</a:t>
-            </a:r>
-            <a:endParaRPr lang="de-DE" altLang="en-US"/>
-          </a:p>
-        </p:txBody>
-      </p:sp>
-      <p:sp>
-        <p:nvSpPr>
-          <p:cNvPr id="6" name="Slide Number Placeholder 5"/>
-          <p:cNvSpPr>
-            <a:spLocks noGrp="1"/>
-          </p:cNvSpPr>
-          <p:nvPr>
-            <p:ph type="sldNum" sz="quarter" idx="12"/>
-          </p:nvPr>
-        </p:nvSpPr>
-        <p:spPr/>
-        <p:txBody>
-          <a:bodyPr/>
-          <a:lstStyle/>
-          <a:p>
-            <a:pPr>
-              <a:defRPr/>
-            </a:pPr>
-            <a:fld id="{F031B2F4-27D1-4E53-97CF-1947CD75B185}" type="slidenum">
-              <a:rPr lang="de-DE" altLang="en-US" smtClean="0"/>
-              <a:pPr>
-                <a:defRPr/>
-              </a:pPr>
-              <a:t>3</a:t>
-            </a:fld>
-            <a:endParaRPr lang="de-DE" altLang="en-US"/>
-          </a:p>
-        </p:txBody>
-      </p:sp>
-      <p:sp>
-        <p:nvSpPr>
-          <p:cNvPr id="8" name="Rounded Rectangular Callout 7"/>
-          <p:cNvSpPr/>
-          <p:nvPr/>
-        </p:nvSpPr>
-        <p:spPr bwMode="auto">
-          <a:xfrm>
-            <a:off x="5376259" y="4365104"/>
-            <a:ext cx="3746646" cy="2492896"/>
-          </a:xfrm>
-          <a:prstGeom prst="wedgeRoundRectCallout">
-            <a:avLst>
-              <a:gd name="adj1" fmla="val -100974"/>
-              <a:gd name="adj2" fmla="val -30509"/>
-              <a:gd name="adj3" fmla="val 16667"/>
-            </a:avLst>
-          </a:prstGeom>
-          <a:solidFill>
-            <a:schemeClr val="accent1">
-              <a:lumMod val="20000"/>
-              <a:lumOff val="80000"/>
-            </a:schemeClr>
-          </a:solidFill>
-          <a:ln w="9525" cap="flat" cmpd="sng" algn="ctr">
-            <a:solidFill>
-              <a:schemeClr val="tx1"/>
-            </a:solidFill>
-            <a:prstDash val="solid"/>
-            <a:round/>
-            <a:headEnd type="none" w="med" len="med"/>
-            <a:tailEnd type="none" w="med" len="med"/>
-          </a:ln>
-          <a:effectLst/>
-          <a:extLst/>
-        </p:spPr>
-        <p:txBody>
-          <a:bodyPr vert="horz" wrap="square" lIns="91440" tIns="45720" rIns="91440" bIns="45720" numCol="1" rtlCol="0" anchor="t" anchorCtr="0" compatLnSpc="1">
-            <a:prstTxWarp prst="textNoShape">
-              <a:avLst/>
-            </a:prstTxWarp>
-          </a:bodyPr>
-          <a:lstStyle/>
-          <a:p>
-            <a:pPr marL="0" marR="0" indent="0" algn="ctr" defTabSz="914400" rtl="0" eaLnBrk="1" fontAlgn="base" latinLnBrk="0" hangingPunct="1">
-              <a:lnSpc>
-                <a:spcPct val="100000"/>
-              </a:lnSpc>
-              <a:spcBef>
-                <a:spcPct val="0"/>
-              </a:spcBef>
-              <a:spcAft>
-                <a:spcPct val="0"/>
-              </a:spcAft>
-              <a:buClrTx/>
-              <a:buSzTx/>
-              <a:buFontTx/>
-              <a:buNone/>
-              <a:tabLst/>
-            </a:pPr>
-            <a:r>
-              <a:rPr kumimoji="0" lang="de-DE" sz="1800" b="1" i="1" u="none" strike="noStrike" cap="none" normalizeH="0" smtClean="0">
-                <a:ln>
-                  <a:noFill/>
-                </a:ln>
-                <a:solidFill>
-                  <a:srgbClr val="CC6600"/>
-                </a:solidFill>
-                <a:effectLst/>
-              </a:rPr>
-              <a:t>SAMPLE WORRIES</a:t>
-            </a:r>
-          </a:p>
-          <a:p>
-            <a:pPr marL="0" marR="0" indent="0" algn="ctr" defTabSz="914400" rtl="0" eaLnBrk="1" fontAlgn="base" latinLnBrk="0" hangingPunct="1">
-              <a:lnSpc>
-                <a:spcPct val="100000"/>
-              </a:lnSpc>
-              <a:spcBef>
-                <a:spcPct val="0"/>
-              </a:spcBef>
-              <a:spcAft>
-                <a:spcPct val="0"/>
-              </a:spcAft>
-              <a:buClrTx/>
-              <a:buSzTx/>
-              <a:buFontTx/>
-              <a:buNone/>
-              <a:tabLst/>
-            </a:pPr>
-            <a:endParaRPr lang="de-DE" i="1"/>
-          </a:p>
-          <a:p>
-            <a:pPr marL="0" marR="0" indent="0" algn="ctr" defTabSz="914400" rtl="0" eaLnBrk="1" fontAlgn="base" latinLnBrk="0" hangingPunct="1">
-              <a:lnSpc>
-                <a:spcPct val="100000"/>
-              </a:lnSpc>
-              <a:spcBef>
-                <a:spcPct val="0"/>
-              </a:spcBef>
-              <a:spcAft>
-                <a:spcPct val="0"/>
-              </a:spcAft>
-              <a:buClrTx/>
-              <a:buSzTx/>
-              <a:buFontTx/>
-              <a:buNone/>
-              <a:tabLst/>
-            </a:pPr>
-            <a:r>
-              <a:rPr kumimoji="0" lang="de-DE" sz="1800" b="1" i="1" u="none" strike="noStrike" cap="none" normalizeH="0" smtClean="0">
-                <a:ln>
-                  <a:noFill/>
-                </a:ln>
-                <a:solidFill>
-                  <a:srgbClr val="006600"/>
-                </a:solidFill>
-                <a:effectLst/>
-              </a:rPr>
-              <a:t>No file forgotten? </a:t>
-            </a:r>
-          </a:p>
-          <a:p>
-            <a:pPr marL="0" marR="0" indent="0" algn="ctr" defTabSz="914400" rtl="0" eaLnBrk="1" fontAlgn="base" latinLnBrk="0" hangingPunct="1">
-              <a:lnSpc>
-                <a:spcPct val="100000"/>
-              </a:lnSpc>
-              <a:spcBef>
-                <a:spcPct val="0"/>
-              </a:spcBef>
-              <a:spcAft>
-                <a:spcPct val="0"/>
-              </a:spcAft>
-              <a:buClrTx/>
-              <a:buSzTx/>
-              <a:buFontTx/>
-              <a:buNone/>
-              <a:tabLst/>
-            </a:pPr>
-            <a:r>
-              <a:rPr kumimoji="0" lang="de-DE" sz="1800" b="1" i="1" u="none" strike="noStrike" cap="none" normalizeH="0" smtClean="0">
-                <a:ln>
-                  <a:noFill/>
-                </a:ln>
-                <a:solidFill>
-                  <a:srgbClr val="006600"/>
-                </a:solidFill>
-                <a:effectLst/>
-              </a:rPr>
-              <a:t>File versions correct? </a:t>
-            </a:r>
-          </a:p>
-          <a:p>
-            <a:pPr marL="0" marR="0" indent="0" algn="ctr" defTabSz="914400" rtl="0" eaLnBrk="1" fontAlgn="base" latinLnBrk="0" hangingPunct="1">
-              <a:lnSpc>
-                <a:spcPct val="100000"/>
-              </a:lnSpc>
-              <a:spcBef>
-                <a:spcPct val="0"/>
-              </a:spcBef>
-              <a:spcAft>
-                <a:spcPct val="0"/>
-              </a:spcAft>
-              <a:buClrTx/>
-              <a:buSzTx/>
-              <a:buFontTx/>
-              <a:buNone/>
-              <a:tabLst/>
-            </a:pPr>
-            <a:r>
-              <a:rPr lang="de-DE" i="1" baseline="0" smtClean="0">
-                <a:solidFill>
-                  <a:srgbClr val="006600"/>
-                </a:solidFill>
-              </a:rPr>
-              <a:t>Log files </a:t>
-            </a:r>
-            <a:r>
-              <a:rPr lang="de-DE" i="1" smtClean="0">
-                <a:solidFill>
-                  <a:srgbClr val="006600"/>
-                </a:solidFill>
-              </a:rPr>
-              <a:t>removed?</a:t>
-            </a:r>
-          </a:p>
-          <a:p>
-            <a:pPr marL="0" marR="0" indent="0" algn="ctr" defTabSz="914400" rtl="0" eaLnBrk="1" fontAlgn="base" latinLnBrk="0" hangingPunct="1">
-              <a:lnSpc>
-                <a:spcPct val="100000"/>
-              </a:lnSpc>
-              <a:spcBef>
-                <a:spcPct val="0"/>
-              </a:spcBef>
-              <a:spcAft>
-                <a:spcPct val="0"/>
-              </a:spcAft>
-              <a:buClrTx/>
-              <a:buSzTx/>
-              <a:buFontTx/>
-              <a:buNone/>
-              <a:tabLst/>
-            </a:pPr>
-            <a:r>
-              <a:rPr kumimoji="0" lang="de-DE" sz="1800" b="1" i="1" u="none" strike="noStrike" cap="none" normalizeH="0" baseline="0" smtClean="0">
-                <a:ln>
-                  <a:noFill/>
-                </a:ln>
-                <a:solidFill>
-                  <a:srgbClr val="006600"/>
-                </a:solidFill>
-                <a:effectLst/>
-              </a:rPr>
-              <a:t>Documentation</a:t>
-            </a:r>
-            <a:r>
-              <a:rPr kumimoji="0" lang="de-DE" sz="1800" b="1" i="1" u="none" strike="noStrike" cap="none" normalizeH="0" smtClean="0">
-                <a:ln>
-                  <a:noFill/>
-                </a:ln>
-                <a:solidFill>
-                  <a:srgbClr val="006600"/>
-                </a:solidFill>
-                <a:effectLst/>
-              </a:rPr>
-              <a:t> complete?</a:t>
-            </a:r>
-          </a:p>
-          <a:p>
-            <a:pPr marL="0" marR="0" indent="0" algn="ctr" defTabSz="914400" rtl="0" eaLnBrk="1" fontAlgn="base" latinLnBrk="0" hangingPunct="1">
-              <a:lnSpc>
-                <a:spcPct val="100000"/>
-              </a:lnSpc>
-              <a:spcBef>
-                <a:spcPct val="0"/>
-              </a:spcBef>
-              <a:spcAft>
-                <a:spcPct val="0"/>
-              </a:spcAft>
-              <a:buClrTx/>
-              <a:buSzTx/>
-              <a:buFontTx/>
-              <a:buNone/>
-              <a:tabLst/>
-            </a:pPr>
-            <a:r>
-              <a:rPr lang="de-DE" i="1" baseline="0" smtClean="0">
-                <a:solidFill>
-                  <a:srgbClr val="006600"/>
-                </a:solidFill>
-              </a:rPr>
-              <a:t>All translations included?</a:t>
-            </a:r>
-          </a:p>
-          <a:p>
-            <a:pPr marL="0" marR="0" indent="0" algn="ctr" defTabSz="914400" rtl="0" eaLnBrk="1" fontAlgn="base" latinLnBrk="0" hangingPunct="1">
-              <a:lnSpc>
-                <a:spcPct val="100000"/>
-              </a:lnSpc>
-              <a:spcBef>
-                <a:spcPct val="0"/>
-              </a:spcBef>
-              <a:spcAft>
-                <a:spcPct val="0"/>
-              </a:spcAft>
-              <a:buClrTx/>
-              <a:buSzTx/>
-              <a:buFontTx/>
-              <a:buNone/>
-              <a:tabLst/>
-            </a:pPr>
-            <a:r>
-              <a:rPr lang="de-DE" i="1" smtClean="0">
-                <a:solidFill>
-                  <a:srgbClr val="006600"/>
-                </a:solidFill>
-              </a:rPr>
-              <a:t>All links updated? </a:t>
-            </a:r>
-            <a:r>
-              <a:rPr kumimoji="0" lang="de-DE" sz="1800" b="1" i="1" u="none" strike="noStrike" cap="none" normalizeH="0" smtClean="0">
-                <a:ln>
-                  <a:noFill/>
-                </a:ln>
-                <a:solidFill>
-                  <a:srgbClr val="006600"/>
-                </a:solidFill>
-                <a:effectLst/>
-              </a:rPr>
-              <a:t>Etc. etc.</a:t>
-            </a:r>
-            <a:endParaRPr kumimoji="0" lang="de-DE" sz="1800" b="1" i="1" u="none" strike="noStrike" cap="none" normalizeH="0" baseline="0" smtClean="0">
-              <a:ln>
-                <a:noFill/>
-              </a:ln>
-              <a:solidFill>
-                <a:srgbClr val="006600"/>
-              </a:solidFill>
-              <a:effectLst/>
-            </a:endParaRPr>
-          </a:p>
-        </p:txBody>
-      </p:sp>
-    </p:spTree>
-    <p:extLst>
-      <p:ext uri="{BB962C8B-B14F-4D97-AF65-F5344CB8AC3E}">
-        <p14:creationId xmlns:p14="http://schemas.microsoft.com/office/powerpoint/2010/main" val="4156547638"/>
-      </p:ext>
-    </p:extLst>
-  </p:cSld>
-  <p:clrMapOvr>
-    <a:masterClrMapping/>
-  </p:clrMapOvr>
-  <p:timing>
-    <p:tnLst>
-      <p:par>
-        <p:cTn id="1" dur="indefinite" restart="never" nodeType="tmRoot"/>
-      </p:par>
-    </p:tnLst>
-  </p:timing>
-</p:sld>
-</file>
-
 <file path=ppt/slides/slide4.xml><?xml version="1.0" encoding="utf-8"?>
 <p:sld xmlns:a="http://schemas.openxmlformats.org/drawingml/2006/main" xmlns:r="http://schemas.openxmlformats.org/officeDocument/2006/relationships" xmlns:p="http://schemas.openxmlformats.org/presentationml/2006/main">
   <p:cSld>
@@ -22620,17 +23267,7 @@
                 <a:latin typeface="Calibri Light" panose="020F0302020204030204" pitchFamily="34" charset="0"/>
                 <a:cs typeface="Calibri Light" panose="020F0302020204030204" pitchFamily="34" charset="0"/>
               </a:rPr>
-              <a:t>Guided </a:t>
-            </a:r>
-            <a:r>
-              <a:rPr lang="de-DE" smtClean="0">
-                <a:solidFill>
-                  <a:srgbClr val="006600"/>
-                </a:solidFill>
-                <a:latin typeface="Calibri Light" panose="020F0302020204030204" pitchFamily="34" charset="0"/>
-                <a:cs typeface="Calibri Light" panose="020F0302020204030204" pitchFamily="34" charset="0"/>
-              </a:rPr>
-              <a:t>tour – hands-on impressions</a:t>
+              <a:t>Guided tour – hands-on impressions</a:t>
             </a:r>
           </a:p>
           <a:p>

</xml_diff>

<commit_message>
Polished the slides for Declarative Amsterdam2020.
</commit_message>
<xml_diff>
--- a/declarative-amsterdam-2020/an-introduction-to-greenfox/an-introduction-to-greenfox.pptx
+++ b/declarative-amsterdam-2020/an-introduction-to-greenfox/an-introduction-to-greenfox.pptx
@@ -16717,8 +16717,25 @@
                 <a:latin typeface="Calibri Light" panose="020F0302020204030204" pitchFamily="34" charset="0"/>
                 <a:cs typeface="Calibri Light" panose="020F0302020204030204" pitchFamily="34" charset="0"/>
               </a:rPr>
-              <a:t>Key parameter:	      MinCount</a:t>
-            </a:r>
+              <a:t>Key parameter:	      </a:t>
+            </a:r>
+            <a:r>
+              <a:rPr lang="de-DE" sz="2000" smtClean="0">
+                <a:solidFill>
+                  <a:srgbClr val="006600"/>
+                </a:solidFill>
+                <a:latin typeface="Calibri Light" panose="020F0302020204030204" pitchFamily="34" charset="0"/>
+                <a:cs typeface="Calibri Light" panose="020F0302020204030204" pitchFamily="34" charset="0"/>
+              </a:rPr>
+              <a:t>minCount</a:t>
+            </a:r>
+            <a:endParaRPr lang="de-DE" sz="2000" smtClean="0">
+              <a:solidFill>
+                <a:srgbClr val="006600"/>
+              </a:solidFill>
+              <a:latin typeface="Calibri Light" panose="020F0302020204030204" pitchFamily="34" charset="0"/>
+              <a:cs typeface="Calibri Light" panose="020F0302020204030204" pitchFamily="34" charset="0"/>
+            </a:endParaRPr>
           </a:p>
           <a:p>
             <a:pPr lvl="1"/>
@@ -17020,7 +17037,7 @@
       </p:sp>
       <p:pic>
         <p:nvPicPr>
-          <p:cNvPr id="10" name="Picture 9"/>
+          <p:cNvPr id="8" name="Picture 7"/>
           <p:cNvPicPr>
             <a:picLocks noChangeAspect="1"/>
           </p:cNvPicPr>
@@ -17034,7 +17051,7 @@
         </p:blipFill>
         <p:spPr>
           <a:xfrm>
-            <a:off x="1382596" y="4365104"/>
+            <a:off x="806532" y="4509120"/>
             <a:ext cx="7509884" cy="1170806"/>
           </a:xfrm>
           <a:prstGeom prst="rect">
@@ -17317,7 +17334,27 @@
                 <a:latin typeface="Calibri Light" panose="020F0302020204030204" pitchFamily="34" charset="0"/>
                 <a:cs typeface="Calibri Light" panose="020F0302020204030204" pitchFamily="34" charset="0"/>
               </a:rPr>
-              <a:t>		   e.g. &lt;foxvalue&gt;, &lt;foxvalueVair&gt;, &lt;links&gt;</a:t>
+              <a:t>		   e.g. &lt;foxvalue&gt;, &lt;</a:t>
+            </a:r>
+            <a:r>
+              <a:rPr lang="de-DE" sz="2000" smtClean="0">
+                <a:solidFill>
+                  <a:srgbClr val="006600"/>
+                </a:solidFill>
+                <a:latin typeface="Calibri Light" panose="020F0302020204030204" pitchFamily="34" charset="0"/>
+                <a:cs typeface="Calibri Light" panose="020F0302020204030204" pitchFamily="34" charset="0"/>
+              </a:rPr>
+              <a:t>foxvaluePair</a:t>
+            </a:r>
+            <a:r>
+              <a:rPr lang="de-DE" sz="2000" smtClean="0">
+                <a:solidFill>
+                  <a:srgbClr val="006600"/>
+                </a:solidFill>
+                <a:latin typeface="Calibri Light" panose="020F0302020204030204" pitchFamily="34" charset="0"/>
+                <a:cs typeface="Calibri Light" panose="020F0302020204030204" pitchFamily="34" charset="0"/>
+              </a:rPr>
+              <a:t>&gt;, &lt;links&gt;</a:t>
             </a:r>
           </a:p>
         </p:txBody>
@@ -17802,30 +17839,6 @@
           </a:p>
         </p:txBody>
       </p:sp>
-      <p:pic>
-        <p:nvPicPr>
-          <p:cNvPr id="9" name="Picture 8"/>
-          <p:cNvPicPr>
-            <a:picLocks noChangeAspect="1"/>
-          </p:cNvPicPr>
-          <p:nvPr/>
-        </p:nvPicPr>
-        <p:blipFill>
-          <a:blip r:embed="rId3"/>
-          <a:stretch>
-            <a:fillRect/>
-          </a:stretch>
-        </p:blipFill>
-        <p:spPr>
-          <a:xfrm>
-            <a:off x="655265" y="5373216"/>
-            <a:ext cx="7877175" cy="1200150"/>
-          </a:xfrm>
-          <a:prstGeom prst="rect">
-            <a:avLst/>
-          </a:prstGeom>
-        </p:spPr>
-      </p:pic>
       <p:sp>
         <p:nvSpPr>
           <p:cNvPr id="4" name="Slide Number Placeholder 3"/>
@@ -17855,6 +17868,30 @@
           </a:p>
         </p:txBody>
       </p:sp>
+      <p:pic>
+        <p:nvPicPr>
+          <p:cNvPr id="7" name="Picture 6"/>
+          <p:cNvPicPr>
+            <a:picLocks noChangeAspect="1"/>
+          </p:cNvPicPr>
+          <p:nvPr/>
+        </p:nvPicPr>
+        <p:blipFill>
+          <a:blip r:embed="rId3"/>
+          <a:stretch>
+            <a:fillRect/>
+          </a:stretch>
+        </p:blipFill>
+        <p:spPr>
+          <a:xfrm>
+            <a:off x="405333" y="5429969"/>
+            <a:ext cx="7839075" cy="1095375"/>
+          </a:xfrm>
+          <a:prstGeom prst="rect">
+            <a:avLst/>
+          </a:prstGeom>
+        </p:spPr>
+      </p:pic>
     </p:spTree>
     <p:extLst>
       <p:ext uri="{BB962C8B-B14F-4D97-AF65-F5344CB8AC3E}">
@@ -18210,30 +18247,6 @@
           </a:p>
         </p:txBody>
       </p:sp>
-      <p:pic>
-        <p:nvPicPr>
-          <p:cNvPr id="7" name="Picture 6"/>
-          <p:cNvPicPr>
-            <a:picLocks noChangeAspect="1"/>
-          </p:cNvPicPr>
-          <p:nvPr/>
-        </p:nvPicPr>
-        <p:blipFill>
-          <a:blip r:embed="rId3"/>
-          <a:stretch>
-            <a:fillRect/>
-          </a:stretch>
-        </p:blipFill>
-        <p:spPr>
-          <a:xfrm>
-            <a:off x="1190625" y="5517232"/>
-            <a:ext cx="6762750" cy="857250"/>
-          </a:xfrm>
-          <a:prstGeom prst="rect">
-            <a:avLst/>
-          </a:prstGeom>
-        </p:spPr>
-      </p:pic>
       <p:sp>
         <p:nvSpPr>
           <p:cNvPr id="4" name="Slide Number Placeholder 3"/>
@@ -18263,6 +18276,30 @@
           </a:p>
         </p:txBody>
       </p:sp>
+      <p:pic>
+        <p:nvPicPr>
+          <p:cNvPr id="8" name="Picture 7"/>
+          <p:cNvPicPr>
+            <a:picLocks noChangeAspect="1"/>
+          </p:cNvPicPr>
+          <p:nvPr/>
+        </p:nvPicPr>
+        <p:blipFill>
+          <a:blip r:embed="rId3"/>
+          <a:stretch>
+            <a:fillRect/>
+          </a:stretch>
+        </p:blipFill>
+        <p:spPr>
+          <a:xfrm>
+            <a:off x="962025" y="5442545"/>
+            <a:ext cx="7219950" cy="866775"/>
+          </a:xfrm>
+          <a:prstGeom prst="rect">
+            <a:avLst/>
+          </a:prstGeom>
+        </p:spPr>
+      </p:pic>
     </p:spTree>
     <p:extLst>
       <p:ext uri="{BB962C8B-B14F-4D97-AF65-F5344CB8AC3E}">
@@ -18479,7 +18516,17 @@
                 <a:latin typeface="Calibri Light" panose="020F0302020204030204" pitchFamily="34" charset="0"/>
                 <a:cs typeface="Calibri Light" panose="020F0302020204030204" pitchFamily="34" charset="0"/>
               </a:rPr>
-              <a:t>Binary			&lt;valueCompared&gt;, &lt;docSimilar&gt;, … </a:t>
+              <a:t>Binary constraints</a:t>
+            </a:r>
+            <a:r>
+              <a:rPr lang="de-DE" sz="2000" smtClean="0">
+                <a:solidFill>
+                  <a:srgbClr val="006600"/>
+                </a:solidFill>
+                <a:latin typeface="Calibri Light" panose="020F0302020204030204" pitchFamily="34" charset="0"/>
+                <a:cs typeface="Calibri Light" panose="020F0302020204030204" pitchFamily="34" charset="0"/>
+              </a:rPr>
+              <a:t>		&lt;valueCompared&gt;, &lt;docSimilar&gt;, … </a:t>
             </a:r>
           </a:p>
           <a:p>
@@ -18631,6 +18678,30 @@
           <a:chExt cx="0" cy="0"/>
         </a:xfrm>
       </p:grpSpPr>
+      <p:pic>
+        <p:nvPicPr>
+          <p:cNvPr id="4" name="Picture 3"/>
+          <p:cNvPicPr>
+            <a:picLocks noChangeAspect="1"/>
+          </p:cNvPicPr>
+          <p:nvPr/>
+        </p:nvPicPr>
+        <p:blipFill>
+          <a:blip r:embed="rId3"/>
+          <a:stretch>
+            <a:fillRect/>
+          </a:stretch>
+        </p:blipFill>
+        <p:spPr>
+          <a:xfrm>
+            <a:off x="414337" y="2452464"/>
+            <a:ext cx="8315325" cy="3352800"/>
+          </a:xfrm>
+          <a:prstGeom prst="rect">
+            <a:avLst/>
+          </a:prstGeom>
+        </p:spPr>
+      </p:pic>
       <p:sp>
         <p:nvSpPr>
           <p:cNvPr id="2" name="Title 1"/>
@@ -18681,30 +18752,6 @@
           </a:p>
         </p:txBody>
       </p:sp>
-      <p:pic>
-        <p:nvPicPr>
-          <p:cNvPr id="5" name="Picture 4"/>
-          <p:cNvPicPr>
-            <a:picLocks noChangeAspect="1"/>
-          </p:cNvPicPr>
-          <p:nvPr/>
-        </p:nvPicPr>
-        <p:blipFill>
-          <a:blip r:embed="rId3"/>
-          <a:stretch>
-            <a:fillRect/>
-          </a:stretch>
-        </p:blipFill>
-        <p:spPr>
-          <a:xfrm>
-            <a:off x="395536" y="2479898"/>
-            <a:ext cx="7343775" cy="3181350"/>
-          </a:xfrm>
-          <a:prstGeom prst="rect">
-            <a:avLst/>
-          </a:prstGeom>
-        </p:spPr>
-      </p:pic>
       <p:sp>
         <p:nvSpPr>
           <p:cNvPr id="7" name="TextBox 6"/>
@@ -18931,54 +18978,6 @@
           </a:p>
         </p:txBody>
       </p:sp>
-      <p:pic>
-        <p:nvPicPr>
-          <p:cNvPr id="4" name="Picture 3"/>
-          <p:cNvPicPr>
-            <a:picLocks noChangeAspect="1"/>
-          </p:cNvPicPr>
-          <p:nvPr/>
-        </p:nvPicPr>
-        <p:blipFill>
-          <a:blip r:embed="rId3"/>
-          <a:stretch>
-            <a:fillRect/>
-          </a:stretch>
-        </p:blipFill>
-        <p:spPr>
-          <a:xfrm>
-            <a:off x="440754" y="4407371"/>
-            <a:ext cx="8667750" cy="1685925"/>
-          </a:xfrm>
-          <a:prstGeom prst="rect">
-            <a:avLst/>
-          </a:prstGeom>
-        </p:spPr>
-      </p:pic>
-      <p:pic>
-        <p:nvPicPr>
-          <p:cNvPr id="5" name="Picture 4"/>
-          <p:cNvPicPr>
-            <a:picLocks noChangeAspect="1"/>
-          </p:cNvPicPr>
-          <p:nvPr/>
-        </p:nvPicPr>
-        <p:blipFill>
-          <a:blip r:embed="rId4"/>
-          <a:stretch>
-            <a:fillRect/>
-          </a:stretch>
-        </p:blipFill>
-        <p:spPr>
-          <a:xfrm>
-            <a:off x="419397" y="2414017"/>
-            <a:ext cx="5867400" cy="942975"/>
-          </a:xfrm>
-          <a:prstGeom prst="rect">
-            <a:avLst/>
-          </a:prstGeom>
-        </p:spPr>
-      </p:pic>
       <p:sp>
         <p:nvSpPr>
           <p:cNvPr id="7" name="TextBox 6"/>
@@ -19088,6 +19087,54 @@
           </a:p>
         </p:txBody>
       </p:sp>
+      <p:pic>
+        <p:nvPicPr>
+          <p:cNvPr id="6" name="Picture 5"/>
+          <p:cNvPicPr>
+            <a:picLocks noChangeAspect="1"/>
+          </p:cNvPicPr>
+          <p:nvPr/>
+        </p:nvPicPr>
+        <p:blipFill>
+          <a:blip r:embed="rId3"/>
+          <a:stretch>
+            <a:fillRect/>
+          </a:stretch>
+        </p:blipFill>
+        <p:spPr>
+          <a:xfrm>
+            <a:off x="467544" y="2389634"/>
+            <a:ext cx="6619875" cy="895350"/>
+          </a:xfrm>
+          <a:prstGeom prst="rect">
+            <a:avLst/>
+          </a:prstGeom>
+        </p:spPr>
+      </p:pic>
+      <p:pic>
+        <p:nvPicPr>
+          <p:cNvPr id="9" name="Picture 8"/>
+          <p:cNvPicPr>
+            <a:picLocks noChangeAspect="1"/>
+          </p:cNvPicPr>
+          <p:nvPr/>
+        </p:nvPicPr>
+        <p:blipFill>
+          <a:blip r:embed="rId4"/>
+          <a:stretch>
+            <a:fillRect/>
+          </a:stretch>
+        </p:blipFill>
+        <p:spPr>
+          <a:xfrm>
+            <a:off x="0" y="4437112"/>
+            <a:ext cx="9144000" cy="1651393"/>
+          </a:xfrm>
+          <a:prstGeom prst="rect">
+            <a:avLst/>
+          </a:prstGeom>
+        </p:spPr>
+      </p:pic>
     </p:spTree>
     <p:extLst>
       <p:ext uri="{BB962C8B-B14F-4D97-AF65-F5344CB8AC3E}">
@@ -19249,7 +19296,7 @@
         </p:nvSpPr>
         <p:spPr>
           <a:xfrm>
-            <a:off x="767467" y="1771025"/>
+            <a:off x="792821" y="1738342"/>
             <a:ext cx="7893979" cy="1015663"/>
           </a:xfrm>
           <a:prstGeom prst="rect">
@@ -19287,16 +19334,41 @@
                 <a:latin typeface="Calibri Light" panose="020F0302020204030204" pitchFamily="34" charset="0"/>
                 <a:cs typeface="Calibri Light" panose="020F0302020204030204" pitchFamily="34" charset="0"/>
               </a:rPr>
-              <a:t>   some folder +</a:t>
-            </a:r>
-          </a:p>
-          <a:p>
+              <a:t>   some folder </a:t>
+            </a:r>
+            <a:endParaRPr lang="de-DE" sz="2000" smtClean="0">
+              <a:latin typeface="Calibri Light" panose="020F0302020204030204" pitchFamily="34" charset="0"/>
+              <a:cs typeface="Calibri Light" panose="020F0302020204030204" pitchFamily="34" charset="0"/>
+            </a:endParaRPr>
+          </a:p>
+          <a:p>
+            <a:r>
+              <a:rPr lang="de-DE" sz="2000">
+                <a:latin typeface="Calibri Light" panose="020F0302020204030204" pitchFamily="34" charset="0"/>
+                <a:cs typeface="Calibri Light" panose="020F0302020204030204" pitchFamily="34" charset="0"/>
+              </a:rPr>
+              <a:t> </a:t>
+            </a:r>
             <a:r>
               <a:rPr lang="de-DE" sz="2000" smtClean="0">
                 <a:latin typeface="Calibri Light" panose="020F0302020204030204" pitchFamily="34" charset="0"/>
                 <a:cs typeface="Calibri Light" panose="020F0302020204030204" pitchFamily="34" charset="0"/>
               </a:rPr>
-              <a:t>     all folders/files directly or indirectly contained</a:t>
+              <a:t>     </a:t>
+            </a:r>
+            <a:r>
+              <a:rPr lang="de-DE" sz="2000" smtClean="0">
+                <a:latin typeface="Calibri Light" panose="020F0302020204030204" pitchFamily="34" charset="0"/>
+                <a:cs typeface="Calibri Light" panose="020F0302020204030204" pitchFamily="34" charset="0"/>
+              </a:rPr>
+              <a:t>+ all </a:t>
+            </a:r>
+            <a:r>
+              <a:rPr lang="de-DE" sz="2000" smtClean="0">
+                <a:latin typeface="Calibri Light" panose="020F0302020204030204" pitchFamily="34" charset="0"/>
+                <a:cs typeface="Calibri Light" panose="020F0302020204030204" pitchFamily="34" charset="0"/>
+              </a:rPr>
+              <a:t>folders/files directly or indirectly contained</a:t>
             </a:r>
           </a:p>
         </p:txBody>
@@ -19309,7 +19381,7 @@
         </p:nvSpPr>
         <p:spPr>
           <a:xfrm>
-            <a:off x="792900" y="2906282"/>
+            <a:off x="792900" y="2845385"/>
             <a:ext cx="8243596" cy="1015663"/>
           </a:xfrm>
           <a:prstGeom prst="rect">
@@ -19347,8 +19419,12 @@
                 <a:latin typeface="Calibri Light" panose="020F0302020204030204" pitchFamily="34" charset="0"/>
                 <a:cs typeface="Calibri Light" panose="020F0302020204030204" pitchFamily="34" charset="0"/>
               </a:rPr>
-              <a:t>   check: conformance to a set of constraints =</a:t>
-            </a:r>
+              <a:t>   check: conformance to a set of constraints </a:t>
+            </a:r>
+            <a:endParaRPr lang="de-DE" sz="2000" smtClean="0">
+              <a:latin typeface="Calibri Light" panose="020F0302020204030204" pitchFamily="34" charset="0"/>
+              <a:cs typeface="Calibri Light" panose="020F0302020204030204" pitchFamily="34" charset="0"/>
+            </a:endParaRPr>
           </a:p>
           <a:p>
             <a:r>
@@ -19363,7 +19439,21 @@
                 <a:latin typeface="Calibri Light" panose="020F0302020204030204" pitchFamily="34" charset="0"/>
                 <a:cs typeface="Calibri Light" panose="020F0302020204030204" pitchFamily="34" charset="0"/>
               </a:rPr>
-              <a:t>    a „schema“</a:t>
+              <a:t>     </a:t>
+            </a:r>
+            <a:r>
+              <a:rPr lang="de-DE" sz="2000" smtClean="0">
+                <a:latin typeface="Calibri Light" panose="020F0302020204030204" pitchFamily="34" charset="0"/>
+                <a:cs typeface="Calibri Light" panose="020F0302020204030204" pitchFamily="34" charset="0"/>
+              </a:rPr>
+              <a:t>= „</a:t>
+            </a:r>
+            <a:r>
+              <a:rPr lang="de-DE" sz="2000" smtClean="0">
+                <a:latin typeface="Calibri Light" panose="020F0302020204030204" pitchFamily="34" charset="0"/>
+                <a:cs typeface="Calibri Light" panose="020F0302020204030204" pitchFamily="34" charset="0"/>
+              </a:rPr>
+              <a:t>schema“</a:t>
             </a:r>
           </a:p>
         </p:txBody>
@@ -19376,7 +19466,7 @@
         </p:nvSpPr>
         <p:spPr>
           <a:xfrm>
-            <a:off x="808922" y="4049079"/>
+            <a:off x="808922" y="3925505"/>
             <a:ext cx="8243596" cy="1015663"/>
           </a:xfrm>
           <a:prstGeom prst="rect">
@@ -19457,7 +19547,7 @@
         </p:nvSpPr>
         <p:spPr>
           <a:xfrm>
-            <a:off x="811562" y="5229200"/>
+            <a:off x="811562" y="5077633"/>
             <a:ext cx="8243596" cy="1015663"/>
           </a:xfrm>
           <a:prstGeom prst="rect">
@@ -19553,6 +19643,30 @@
           <a:chExt cx="0" cy="0"/>
         </a:xfrm>
       </p:grpSpPr>
+      <p:pic>
+        <p:nvPicPr>
+          <p:cNvPr id="2" name="Picture 1"/>
+          <p:cNvPicPr>
+            <a:picLocks noChangeAspect="1"/>
+          </p:cNvPicPr>
+          <p:nvPr/>
+        </p:nvPicPr>
+        <p:blipFill>
+          <a:blip r:embed="rId2"/>
+          <a:stretch>
+            <a:fillRect/>
+          </a:stretch>
+        </p:blipFill>
+        <p:spPr>
+          <a:xfrm>
+            <a:off x="467544" y="2428850"/>
+            <a:ext cx="6124575" cy="2800350"/>
+          </a:xfrm>
+          <a:prstGeom prst="rect">
+            <a:avLst/>
+          </a:prstGeom>
+        </p:spPr>
+      </p:pic>
       <p:sp>
         <p:nvSpPr>
           <p:cNvPr id="4" name="Date Placeholder 3"/>
@@ -19733,30 +19847,6 @@
           </a:p>
         </p:txBody>
       </p:sp>
-      <p:pic>
-        <p:nvPicPr>
-          <p:cNvPr id="3" name="Picture 2"/>
-          <p:cNvPicPr>
-            <a:picLocks noChangeAspect="1"/>
-          </p:cNvPicPr>
-          <p:nvPr/>
-        </p:nvPicPr>
-        <p:blipFill>
-          <a:blip r:embed="rId2"/>
-          <a:stretch>
-            <a:fillRect/>
-          </a:stretch>
-        </p:blipFill>
-        <p:spPr>
-          <a:xfrm>
-            <a:off x="323528" y="2439516"/>
-            <a:ext cx="5915025" cy="2933700"/>
-          </a:xfrm>
-          <a:prstGeom prst="rect">
-            <a:avLst/>
-          </a:prstGeom>
-        </p:spPr>
-      </p:pic>
       <p:sp>
         <p:nvSpPr>
           <p:cNvPr id="9" name="TextBox 8"/>
@@ -20571,13 +20661,6 @@
               </a:rPr>
               <a:t>$greenfox/declarative-amsterdam-2020/the-amazing-fox/the-amazing-fox.txt</a:t>
             </a:r>
-            <a:endParaRPr lang="de-DE" sz="2000" smtClean="0">
-              <a:solidFill>
-                <a:srgbClr val="006600"/>
-              </a:solidFill>
-              <a:latin typeface="Calibri Light" panose="020F0302020204030204" pitchFamily="34" charset="0"/>
-              <a:cs typeface="Calibri Light" panose="020F0302020204030204" pitchFamily="34" charset="0"/>
-            </a:endParaRPr>
           </a:p>
         </p:txBody>
       </p:sp>
@@ -20692,17 +20775,7 @@
                 <a:latin typeface="Courier New" panose="02070309020205020404" pitchFamily="49" charset="0"/>
                 <a:cs typeface="Courier New" panose="02070309020205020404" pitchFamily="49" charset="0"/>
               </a:rPr>
-              <a:t>*:</a:t>
-            </a:r>
-            <a:r>
-              <a:rPr lang="de-DE" sz="1600" b="0">
-                <a:solidFill>
-                  <a:srgbClr val="006600"/>
-                </a:solidFill>
-                <a:latin typeface="Courier New" panose="02070309020205020404" pitchFamily="49" charset="0"/>
-                <a:cs typeface="Courier New" panose="02070309020205020404" pitchFamily="49" charset="0"/>
-              </a:rPr>
-              <a:t>docSimilar</a:t>
+              <a:t>*:docSimilar</a:t>
             </a:r>
             <a:r>
               <a:rPr lang="de-DE" sz="1600" b="0" smtClean="0">
@@ -20834,17 +20907,7 @@
                 <a:latin typeface="Courier New" panose="02070309020205020404" pitchFamily="49" charset="0"/>
                 <a:cs typeface="Courier New" panose="02070309020205020404" pitchFamily="49" charset="0"/>
               </a:rPr>
-              <a:t>iata eq </a:t>
-            </a:r>
-            <a:r>
-              <a:rPr lang="de-DE" sz="1600" b="0">
-                <a:solidFill>
-                  <a:srgbClr val="006600"/>
-                </a:solidFill>
-                <a:latin typeface="Courier New" panose="02070309020205020404" pitchFamily="49" charset="0"/>
-                <a:cs typeface="Courier New" panose="02070309020205020404" pitchFamily="49" charset="0"/>
-              </a:rPr>
-              <a:t>'WAT</a:t>
+              <a:t>iata eq 'WAT</a:t>
             </a:r>
             <a:r>
               <a:rPr lang="de-DE" sz="1600" b="0" smtClean="0">
@@ -22506,8 +22569,19 @@
                 <a:latin typeface="Calibri Light" panose="020F0302020204030204" pitchFamily="34" charset="0"/>
                 <a:cs typeface="Calibri Light" panose="020F0302020204030204" pitchFamily="34" charset="0"/>
               </a:rPr>
-              <a:t>Complex test results, logs, monitoring results</a:t>
-            </a:r>
+              <a:t>Complex test </a:t>
+            </a:r>
+            <a:r>
+              <a:rPr lang="de-DE" sz="1600" smtClean="0">
+                <a:latin typeface="Calibri Light" panose="020F0302020204030204" pitchFamily="34" charset="0"/>
+                <a:cs typeface="Calibri Light" panose="020F0302020204030204" pitchFamily="34" charset="0"/>
+              </a:rPr>
+              <a:t>results</a:t>
+            </a:r>
+            <a:endParaRPr lang="de-DE" sz="1600" smtClean="0">
+              <a:latin typeface="Calibri Light" panose="020F0302020204030204" pitchFamily="34" charset="0"/>
+              <a:cs typeface="Calibri Light" panose="020F0302020204030204" pitchFamily="34" charset="0"/>
+            </a:endParaRPr>
           </a:p>
           <a:p>
             <a:pPr lvl="1"/>
@@ -24320,7 +24394,19 @@
                 <a:latin typeface="Calibri Light" panose="020F0302020204030204" pitchFamily="34" charset="0"/>
                 <a:cs typeface="Calibri Light" panose="020F0302020204030204" pitchFamily="34" charset="0"/>
               </a:rPr>
-              <a:t>Results &amp; Reports</a:t>
+              <a:t>Results</a:t>
+            </a:r>
+          </a:p>
+          <a:p>
+            <a:r>
+              <a:rPr lang="de-DE" smtClean="0">
+                <a:solidFill>
+                  <a:srgbClr val="006600"/>
+                </a:solidFill>
+                <a:latin typeface="Calibri Light" panose="020F0302020204030204" pitchFamily="34" charset="0"/>
+                <a:cs typeface="Calibri Light" panose="020F0302020204030204" pitchFamily="34" charset="0"/>
+              </a:rPr>
+              <a:t>Reports</a:t>
             </a:r>
             <a:endParaRPr lang="de-DE">
               <a:solidFill>

</xml_diff>

<commit_message>
Further polish to the slides for Declarative Amsterdam2020.
</commit_message>
<xml_diff>
--- a/declarative-amsterdam-2020/an-introduction-to-greenfox/an-introduction-to-greenfox.pptx
+++ b/declarative-amsterdam-2020/an-introduction-to-greenfox/an-introduction-to-greenfox.pptx
@@ -31,15 +31,15 @@
     <p:sldId id="1235" r:id="rId19"/>
     <p:sldId id="1245" r:id="rId20"/>
     <p:sldId id="1232" r:id="rId21"/>
-    <p:sldId id="1236" r:id="rId22"/>
-    <p:sldId id="1237" r:id="rId23"/>
+    <p:sldId id="1237" r:id="rId22"/>
+    <p:sldId id="1236" r:id="rId23"/>
     <p:sldId id="1251" r:id="rId24"/>
     <p:sldId id="1238" r:id="rId25"/>
     <p:sldId id="1239" r:id="rId26"/>
     <p:sldId id="1240" r:id="rId27"/>
-    <p:sldId id="1248" r:id="rId28"/>
-    <p:sldId id="1247" r:id="rId29"/>
-    <p:sldId id="1250" r:id="rId30"/>
+    <p:sldId id="1252" r:id="rId28"/>
+    <p:sldId id="1248" r:id="rId29"/>
+    <p:sldId id="1247" r:id="rId30"/>
     <p:sldId id="1243" r:id="rId31"/>
   </p:sldIdLst>
   <p:sldSz cx="9144000" cy="6858000" type="screen4x3"/>
@@ -1520,7 +1520,7 @@
     </p:spTree>
     <p:extLst>
       <p:ext uri="{BB962C8B-B14F-4D97-AF65-F5344CB8AC3E}">
-        <p14:creationId xmlns:p14="http://schemas.microsoft.com/office/powerpoint/2010/main" val="630447322"/>
+        <p14:creationId xmlns:p14="http://schemas.microsoft.com/office/powerpoint/2010/main" val="613354908"/>
       </p:ext>
     </p:extLst>
   </p:cSld>
@@ -1610,7 +1610,7 @@
     </p:spTree>
     <p:extLst>
       <p:ext uri="{BB962C8B-B14F-4D97-AF65-F5344CB8AC3E}">
-        <p14:creationId xmlns:p14="http://schemas.microsoft.com/office/powerpoint/2010/main" val="613354908"/>
+        <p14:creationId xmlns:p14="http://schemas.microsoft.com/office/powerpoint/2010/main" val="630447322"/>
       </p:ext>
     </p:extLst>
   </p:cSld>
@@ -1781,7 +1781,7 @@
               <a:pPr>
                 <a:defRPr/>
               </a:pPr>
-              <a:t>27</a:t>
+              <a:t>28</a:t>
             </a:fld>
             <a:endParaRPr lang="de-DE" altLang="de-DE"/>
           </a:p>
@@ -15763,7 +15763,15 @@
                   <a:srgbClr val="CC6600"/>
                 </a:solidFill>
               </a:rPr>
-              <a:t>hands-on tutorial</a:t>
+              <a:t>hands-on </a:t>
+            </a:r>
+            <a:r>
+              <a:rPr lang="en-US" altLang="de-DE" i="1" smtClean="0">
+                <a:solidFill>
+                  <a:srgbClr val="CC6600"/>
+                </a:solidFill>
+              </a:rPr>
+              <a:t>&amp; brainfriendly</a:t>
             </a:r>
             <a:endParaRPr lang="en-US" altLang="de-DE" i="1" dirty="0" smtClean="0">
               <a:solidFill>
@@ -16057,7 +16065,7 @@
                 <a:latin typeface="Calibri Light" panose="020F0302020204030204" pitchFamily="34" charset="0"/>
                 <a:cs typeface="Calibri Light" panose="020F0302020204030204" pitchFamily="34" charset="0"/>
               </a:rPr>
-              <a:t>Constraints</a:t>
+              <a:t>2. Constraints</a:t>
             </a:r>
             <a:endParaRPr lang="de-DE">
               <a:solidFill>
@@ -16394,7 +16402,17 @@
                 <a:latin typeface="Calibri Light" panose="020F0302020204030204" pitchFamily="34" charset="0"/>
                 <a:cs typeface="Calibri Light" panose="020F0302020204030204" pitchFamily="34" charset="0"/>
               </a:rPr>
-              <a:t>    = pass|failure   +   details</a:t>
+              <a:t>    = </a:t>
+            </a:r>
+            <a:r>
+              <a:rPr lang="de-DE" sz="2400" b="0" smtClean="0">
+                <a:solidFill>
+                  <a:srgbClr val="006600"/>
+                </a:solidFill>
+                <a:latin typeface="Calibri Light" panose="020F0302020204030204" pitchFamily="34" charset="0"/>
+                <a:cs typeface="Calibri Light" panose="020F0302020204030204" pitchFamily="34" charset="0"/>
+              </a:rPr>
+              <a:t>(1) pass|failure    (2) details</a:t>
             </a:r>
             <a:endParaRPr lang="de-DE" sz="2400" b="0">
               <a:solidFill>
@@ -16408,7 +16426,7 @@
       </p:sp>
       <p:pic>
         <p:nvPicPr>
-          <p:cNvPr id="10" name="Picture 9"/>
+          <p:cNvPr id="7" name="Picture 6"/>
           <p:cNvPicPr>
             <a:picLocks noChangeAspect="1"/>
           </p:cNvPicPr>
@@ -16422,8 +16440,8 @@
         </p:blipFill>
         <p:spPr>
           <a:xfrm>
-            <a:off x="806532" y="5373216"/>
-            <a:ext cx="7509884" cy="1170806"/>
+            <a:off x="827584" y="5373216"/>
+            <a:ext cx="7477125" cy="942975"/>
           </a:xfrm>
           <a:prstGeom prst="rect">
             <a:avLst/>
@@ -16490,9 +16508,19 @@
                 <a:latin typeface="Calibri Light" panose="020F0302020204030204" pitchFamily="34" charset="0"/>
                 <a:cs typeface="Calibri Light" panose="020F0302020204030204" pitchFamily="34" charset="0"/>
               </a:rPr>
-              <a:t>Constraints II</a:t>
-            </a:r>
-            <a:endParaRPr lang="de-DE">
+              <a:t>2. Constraints - </a:t>
+            </a:r>
+            <a:r>
+              <a:rPr lang="de-DE" i="1" smtClean="0">
+                <a:solidFill>
+                  <a:srgbClr val="006600"/>
+                </a:solidFill>
+                <a:latin typeface="Calibri Light" panose="020F0302020204030204" pitchFamily="34" charset="0"/>
+                <a:cs typeface="Calibri Light" panose="020F0302020204030204" pitchFamily="34" charset="0"/>
+              </a:rPr>
+              <a:t>type + facet</a:t>
+            </a:r>
+            <a:endParaRPr lang="de-DE" i="1">
               <a:solidFill>
                 <a:srgbClr val="006600"/>
               </a:solidFill>
@@ -16530,8 +16558,25 @@
                 <a:latin typeface="Calibri Light" panose="020F0302020204030204" pitchFamily="34" charset="0"/>
                 <a:cs typeface="Calibri Light" panose="020F0302020204030204" pitchFamily="34" charset="0"/>
               </a:rPr>
-              <a:t>Type, parameters, constraint component</a:t>
-            </a:r>
+              <a:t>Type, parameters, </a:t>
+            </a:r>
+            <a:r>
+              <a:rPr lang="de-DE" sz="2400" smtClean="0">
+                <a:solidFill>
+                  <a:srgbClr val="006600"/>
+                </a:solidFill>
+                <a:latin typeface="Calibri Light" panose="020F0302020204030204" pitchFamily="34" charset="0"/>
+                <a:cs typeface="Calibri Light" panose="020F0302020204030204" pitchFamily="34" charset="0"/>
+              </a:rPr>
+              <a:t>facet</a:t>
+            </a:r>
+            <a:endParaRPr lang="de-DE" sz="2400" smtClean="0">
+              <a:solidFill>
+                <a:srgbClr val="006600"/>
+              </a:solidFill>
+              <a:latin typeface="Calibri Light" panose="020F0302020204030204" pitchFamily="34" charset="0"/>
+              <a:cs typeface="Calibri Light" panose="020F0302020204030204" pitchFamily="34" charset="0"/>
+            </a:endParaRPr>
           </a:p>
           <a:p>
             <a:pPr lvl="1"/>
@@ -16619,7 +16664,7 @@
                 <a:latin typeface="Calibri Light" panose="020F0302020204030204" pitchFamily="34" charset="0"/>
                 <a:cs typeface="Calibri Light" panose="020F0302020204030204" pitchFamily="34" charset="0"/>
               </a:rPr>
-              <a:t>constraint component</a:t>
+              <a:t>facet</a:t>
             </a:r>
             <a:r>
               <a:rPr lang="de-DE" sz="2000" smtClean="0">
@@ -16629,7 +16674,17 @@
                 <a:latin typeface="Calibri Light" panose="020F0302020204030204" pitchFamily="34" charset="0"/>
                 <a:cs typeface="Calibri Light" panose="020F0302020204030204" pitchFamily="34" charset="0"/>
               </a:rPr>
-              <a:t> depends on a </a:t>
+              <a:t> </a:t>
+            </a:r>
+            <a:r>
+              <a:rPr lang="de-DE" sz="2000" smtClean="0">
+                <a:solidFill>
+                  <a:srgbClr val="006600"/>
+                </a:solidFill>
+                <a:latin typeface="Calibri Light" panose="020F0302020204030204" pitchFamily="34" charset="0"/>
+                <a:cs typeface="Calibri Light" panose="020F0302020204030204" pitchFamily="34" charset="0"/>
+              </a:rPr>
+              <a:t>depends on a </a:t>
             </a:r>
             <a:r>
               <a:rPr lang="de-DE" sz="2000" u="sng" smtClean="0">
@@ -16671,67 +16726,21 @@
                 <a:latin typeface="Calibri Light" panose="020F0302020204030204" pitchFamily="34" charset="0"/>
                 <a:cs typeface="Calibri Light" panose="020F0302020204030204" pitchFamily="34" charset="0"/>
               </a:rPr>
-              <a:t>Type:		      Value</a:t>
-            </a:r>
-          </a:p>
-          <a:p>
-            <a:pPr lvl="1"/>
+              <a:t>Type:		</a:t>
+            </a:r>
             <a:r>
               <a:rPr lang="de-DE" sz="2000" smtClean="0">
                 <a:solidFill>
-                  <a:srgbClr val="006600"/>
-                </a:solidFill>
-                <a:latin typeface="Calibri Light" panose="020F0302020204030204" pitchFamily="34" charset="0"/>
-                <a:cs typeface="Calibri Light" panose="020F0302020204030204" pitchFamily="34" charset="0"/>
-              </a:rPr>
-              <a:t>Parameters: 	      exprXP, </a:t>
-            </a:r>
-            <a:r>
-              <a:rPr lang="de-DE" sz="2000" u="sng" smtClean="0">
-                <a:solidFill>
-                  <a:srgbClr val="006600"/>
-                </a:solidFill>
-                <a:latin typeface="Calibri Light" panose="020F0302020204030204" pitchFamily="34" charset="0"/>
-                <a:cs typeface="Calibri Light" panose="020F0302020204030204" pitchFamily="34" charset="0"/>
-              </a:rPr>
-              <a:t>minCount</a:t>
-            </a:r>
-            <a:r>
-              <a:rPr lang="de-DE" sz="2000" smtClean="0">
-                <a:solidFill>
-                  <a:srgbClr val="006600"/>
-                </a:solidFill>
-                <a:latin typeface="Calibri Light" panose="020F0302020204030204" pitchFamily="34" charset="0"/>
-                <a:cs typeface="Calibri Light" panose="020F0302020204030204" pitchFamily="34" charset="0"/>
-              </a:rPr>
-              <a:t>, minCountMsg</a:t>
-            </a:r>
-          </a:p>
-          <a:p>
-            <a:pPr lvl="1"/>
-            <a:r>
-              <a:rPr lang="de-DE" sz="2000" smtClean="0">
-                <a:solidFill>
-                  <a:srgbClr val="006600"/>
-                </a:solidFill>
-                <a:latin typeface="Calibri Light" panose="020F0302020204030204" pitchFamily="34" charset="0"/>
-                <a:cs typeface="Calibri Light" panose="020F0302020204030204" pitchFamily="34" charset="0"/>
-              </a:rPr>
-              <a:t>Key parameter:	      </a:t>
-            </a:r>
-            <a:r>
-              <a:rPr lang="de-DE" sz="2000" smtClean="0">
-                <a:solidFill>
-                  <a:srgbClr val="006600"/>
-                </a:solidFill>
-                <a:latin typeface="Calibri Light" panose="020F0302020204030204" pitchFamily="34" charset="0"/>
-                <a:cs typeface="Calibri Light" panose="020F0302020204030204" pitchFamily="34" charset="0"/>
-              </a:rPr>
-              <a:t>minCount</a:t>
+                  <a:srgbClr val="C00000"/>
+                </a:solidFill>
+                <a:latin typeface="Calibri Light" panose="020F0302020204030204" pitchFamily="34" charset="0"/>
+                <a:cs typeface="Calibri Light" panose="020F0302020204030204" pitchFamily="34" charset="0"/>
+              </a:rPr>
+              <a:t>Value</a:t>
             </a:r>
             <a:endParaRPr lang="de-DE" sz="2000" smtClean="0">
               <a:solidFill>
-                <a:srgbClr val="006600"/>
+                <a:srgbClr val="C00000"/>
               </a:solidFill>
               <a:latin typeface="Calibri Light" panose="020F0302020204030204" pitchFamily="34" charset="0"/>
               <a:cs typeface="Calibri Light" panose="020F0302020204030204" pitchFamily="34" charset="0"/>
@@ -16747,14 +16756,114 @@
                 <a:latin typeface="Calibri Light" panose="020F0302020204030204" pitchFamily="34" charset="0"/>
                 <a:cs typeface="Calibri Light" panose="020F0302020204030204" pitchFamily="34" charset="0"/>
               </a:rPr>
-              <a:t>Constraint Component: ValueMinCount</a:t>
-            </a:r>
+              <a:t>Parameters: 	</a:t>
+            </a:r>
+            <a:r>
+              <a:rPr lang="de-DE" sz="2000" smtClean="0">
+                <a:solidFill>
+                  <a:srgbClr val="006600"/>
+                </a:solidFill>
+                <a:latin typeface="Calibri Light" panose="020F0302020204030204" pitchFamily="34" charset="0"/>
+                <a:cs typeface="Calibri Light" panose="020F0302020204030204" pitchFamily="34" charset="0"/>
+              </a:rPr>
+              <a:t>exprXP</a:t>
+            </a:r>
+            <a:r>
+              <a:rPr lang="de-DE" sz="2000" smtClean="0">
+                <a:solidFill>
+                  <a:srgbClr val="006600"/>
+                </a:solidFill>
+                <a:latin typeface="Calibri Light" panose="020F0302020204030204" pitchFamily="34" charset="0"/>
+                <a:cs typeface="Calibri Light" panose="020F0302020204030204" pitchFamily="34" charset="0"/>
+              </a:rPr>
+              <a:t>, </a:t>
+            </a:r>
+            <a:r>
+              <a:rPr lang="de-DE" sz="2000" u="sng" smtClean="0">
+                <a:solidFill>
+                  <a:srgbClr val="006600"/>
+                </a:solidFill>
+                <a:latin typeface="Calibri Light" panose="020F0302020204030204" pitchFamily="34" charset="0"/>
+                <a:cs typeface="Calibri Light" panose="020F0302020204030204" pitchFamily="34" charset="0"/>
+              </a:rPr>
+              <a:t>minCount</a:t>
+            </a:r>
+            <a:r>
+              <a:rPr lang="de-DE" sz="2000" smtClean="0">
+                <a:solidFill>
+                  <a:srgbClr val="006600"/>
+                </a:solidFill>
+                <a:latin typeface="Calibri Light" panose="020F0302020204030204" pitchFamily="34" charset="0"/>
+                <a:cs typeface="Calibri Light" panose="020F0302020204030204" pitchFamily="34" charset="0"/>
+              </a:rPr>
+              <a:t>, minCountMsg</a:t>
+            </a:r>
+          </a:p>
+          <a:p>
+            <a:pPr lvl="1"/>
+            <a:r>
+              <a:rPr lang="de-DE" sz="2000" smtClean="0">
+                <a:solidFill>
+                  <a:srgbClr val="006600"/>
+                </a:solidFill>
+                <a:latin typeface="Calibri Light" panose="020F0302020204030204" pitchFamily="34" charset="0"/>
+                <a:cs typeface="Calibri Light" panose="020F0302020204030204" pitchFamily="34" charset="0"/>
+              </a:rPr>
+              <a:t>Key parameter:	</a:t>
+            </a:r>
+            <a:r>
+              <a:rPr lang="de-DE" sz="2000" smtClean="0">
+                <a:solidFill>
+                  <a:srgbClr val="C00000"/>
+                </a:solidFill>
+                <a:latin typeface="Calibri Light" panose="020F0302020204030204" pitchFamily="34" charset="0"/>
+                <a:cs typeface="Calibri Light" panose="020F0302020204030204" pitchFamily="34" charset="0"/>
+              </a:rPr>
+              <a:t>minCount</a:t>
+            </a:r>
+            <a:endParaRPr lang="de-DE" sz="2000" smtClean="0">
+              <a:solidFill>
+                <a:srgbClr val="C00000"/>
+              </a:solidFill>
+              <a:latin typeface="Calibri Light" panose="020F0302020204030204" pitchFamily="34" charset="0"/>
+              <a:cs typeface="Calibri Light" panose="020F0302020204030204" pitchFamily="34" charset="0"/>
+            </a:endParaRPr>
+          </a:p>
+          <a:p>
+            <a:pPr lvl="1"/>
+            <a:r>
+              <a:rPr lang="de-DE" sz="2000" smtClean="0">
+                <a:solidFill>
+                  <a:srgbClr val="006600"/>
+                </a:solidFill>
+                <a:latin typeface="Calibri Light" panose="020F0302020204030204" pitchFamily="34" charset="0"/>
+                <a:cs typeface="Calibri Light" panose="020F0302020204030204" pitchFamily="34" charset="0"/>
+              </a:rPr>
+              <a:t>Facet:             	</a:t>
+            </a:r>
+            <a:r>
+              <a:rPr lang="de-DE" sz="2000" smtClean="0">
+                <a:solidFill>
+                  <a:srgbClr val="C00000"/>
+                </a:solidFill>
+                <a:latin typeface="Calibri Light" panose="020F0302020204030204" pitchFamily="34" charset="0"/>
+                <a:cs typeface="Calibri Light" panose="020F0302020204030204" pitchFamily="34" charset="0"/>
+              </a:rPr>
+              <a:t>ValueMinCount</a:t>
+            </a:r>
+            <a:endParaRPr lang="de-DE" sz="2000" smtClean="0">
+              <a:solidFill>
+                <a:srgbClr val="C00000"/>
+              </a:solidFill>
+              <a:latin typeface="Calibri Light" panose="020F0302020204030204" pitchFamily="34" charset="0"/>
+              <a:cs typeface="Calibri Light" panose="020F0302020204030204" pitchFamily="34" charset="0"/>
+            </a:endParaRPr>
           </a:p>
         </p:txBody>
       </p:sp>
       <p:pic>
         <p:nvPicPr>
-          <p:cNvPr id="11" name="Picture 10"/>
+          <p:cNvPr id="5" name="Picture 4"/>
           <p:cNvPicPr>
             <a:picLocks noChangeAspect="1"/>
           </p:cNvPicPr>
@@ -16768,8 +16877,8 @@
         </p:blipFill>
         <p:spPr>
           <a:xfrm>
-            <a:off x="806532" y="5373216"/>
-            <a:ext cx="7509884" cy="1170806"/>
+            <a:off x="827584" y="5373216"/>
+            <a:ext cx="7477125" cy="942975"/>
           </a:xfrm>
           <a:prstGeom prst="rect">
             <a:avLst/>
@@ -16836,9 +16945,19 @@
                 <a:latin typeface="Calibri Light" panose="020F0302020204030204" pitchFamily="34" charset="0"/>
                 <a:cs typeface="Calibri Light" panose="020F0302020204030204" pitchFamily="34" charset="0"/>
               </a:rPr>
-              <a:t>Constraints III</a:t>
-            </a:r>
-            <a:endParaRPr lang="de-DE">
+              <a:t>2. Constraints - </a:t>
+            </a:r>
+            <a:r>
+              <a:rPr lang="de-DE" i="1" smtClean="0">
+                <a:solidFill>
+                  <a:srgbClr val="006600"/>
+                </a:solidFill>
+                <a:latin typeface="Calibri Light" panose="020F0302020204030204" pitchFamily="34" charset="0"/>
+                <a:cs typeface="Calibri Light" panose="020F0302020204030204" pitchFamily="34" charset="0"/>
+              </a:rPr>
+              <a:t>example</a:t>
+            </a:r>
+            <a:endParaRPr lang="de-DE" i="1">
               <a:solidFill>
                 <a:srgbClr val="006600"/>
               </a:solidFill>
@@ -16893,8 +17012,25 @@
                 <a:latin typeface="Calibri Light" panose="020F0302020204030204" pitchFamily="34" charset="0"/>
                 <a:cs typeface="Calibri Light" panose="020F0302020204030204" pitchFamily="34" charset="0"/>
               </a:rPr>
-              <a:t>Type:		     Value</a:t>
-            </a:r>
+              <a:t>Type:		</a:t>
+            </a:r>
+            <a:r>
+              <a:rPr lang="de-DE" sz="2000" smtClean="0">
+                <a:solidFill>
+                  <a:srgbClr val="C00000"/>
+                </a:solidFill>
+                <a:latin typeface="Calibri Light" panose="020F0302020204030204" pitchFamily="34" charset="0"/>
+                <a:cs typeface="Calibri Light" panose="020F0302020204030204" pitchFamily="34" charset="0"/>
+              </a:rPr>
+              <a:t>Value</a:t>
+            </a:r>
+            <a:endParaRPr lang="de-DE" sz="2000" smtClean="0">
+              <a:solidFill>
+                <a:srgbClr val="C00000"/>
+              </a:solidFill>
+              <a:latin typeface="Calibri Light" panose="020F0302020204030204" pitchFamily="34" charset="0"/>
+              <a:cs typeface="Calibri Light" panose="020F0302020204030204" pitchFamily="34" charset="0"/>
+            </a:endParaRPr>
           </a:p>
           <a:p>
             <a:pPr lvl="1"/>
@@ -16906,7 +17042,27 @@
                 <a:latin typeface="Calibri Light" panose="020F0302020204030204" pitchFamily="34" charset="0"/>
                 <a:cs typeface="Calibri Light" panose="020F0302020204030204" pitchFamily="34" charset="0"/>
               </a:rPr>
-              <a:t>Parameters: 	     exprXP, </a:t>
+              <a:t>Parameters: 	</a:t>
+            </a:r>
+            <a:r>
+              <a:rPr lang="de-DE" sz="2000" smtClean="0">
+                <a:solidFill>
+                  <a:srgbClr val="006600"/>
+                </a:solidFill>
+                <a:latin typeface="Calibri Light" panose="020F0302020204030204" pitchFamily="34" charset="0"/>
+                <a:cs typeface="Calibri Light" panose="020F0302020204030204" pitchFamily="34" charset="0"/>
+              </a:rPr>
+              <a:t>exprXP</a:t>
+            </a:r>
+            <a:r>
+              <a:rPr lang="de-DE" sz="2000" smtClean="0">
+                <a:solidFill>
+                  <a:srgbClr val="006600"/>
+                </a:solidFill>
+                <a:latin typeface="Calibri Light" panose="020F0302020204030204" pitchFamily="34" charset="0"/>
+                <a:cs typeface="Calibri Light" panose="020F0302020204030204" pitchFamily="34" charset="0"/>
+              </a:rPr>
+              <a:t>, </a:t>
             </a:r>
             <a:r>
               <a:rPr lang="de-DE" sz="2000" u="sng" smtClean="0">
@@ -16917,6 +17073,16 @@
                 <a:cs typeface="Calibri Light" panose="020F0302020204030204" pitchFamily="34" charset="0"/>
               </a:rPr>
               <a:t>distinct</a:t>
+            </a:r>
+            <a:r>
+              <a:rPr lang="de-DE" sz="2000" smtClean="0">
+                <a:solidFill>
+                  <a:srgbClr val="006600"/>
+                </a:solidFill>
+                <a:latin typeface="Calibri Light" panose="020F0302020204030204" pitchFamily="34" charset="0"/>
+                <a:cs typeface="Calibri Light" panose="020F0302020204030204" pitchFamily="34" charset="0"/>
+              </a:rPr>
+              <a:t>, distinctMsg</a:t>
             </a:r>
             <a:endParaRPr lang="de-DE" sz="2000" smtClean="0">
               <a:solidFill>
@@ -16936,8 +17102,25 @@
                 <a:latin typeface="Calibri Light" panose="020F0302020204030204" pitchFamily="34" charset="0"/>
                 <a:cs typeface="Calibri Light" panose="020F0302020204030204" pitchFamily="34" charset="0"/>
               </a:rPr>
-              <a:t>Key parameter:	     distinct</a:t>
-            </a:r>
+              <a:t>Key parameter:	</a:t>
+            </a:r>
+            <a:r>
+              <a:rPr lang="de-DE" sz="2000" smtClean="0">
+                <a:solidFill>
+                  <a:srgbClr val="C00000"/>
+                </a:solidFill>
+                <a:latin typeface="Calibri Light" panose="020F0302020204030204" pitchFamily="34" charset="0"/>
+                <a:cs typeface="Calibri Light" panose="020F0302020204030204" pitchFamily="34" charset="0"/>
+              </a:rPr>
+              <a:t>distinct</a:t>
+            </a:r>
+            <a:endParaRPr lang="de-DE" sz="2000" smtClean="0">
+              <a:solidFill>
+                <a:srgbClr val="C00000"/>
+              </a:solidFill>
+              <a:latin typeface="Calibri Light" panose="020F0302020204030204" pitchFamily="34" charset="0"/>
+              <a:cs typeface="Calibri Light" panose="020F0302020204030204" pitchFamily="34" charset="0"/>
+            </a:endParaRPr>
           </a:p>
           <a:p>
             <a:pPr lvl="1"/>
@@ -16949,8 +17132,25 @@
                 <a:latin typeface="Calibri Light" panose="020F0302020204030204" pitchFamily="34" charset="0"/>
                 <a:cs typeface="Calibri Light" panose="020F0302020204030204" pitchFamily="34" charset="0"/>
               </a:rPr>
-              <a:t>ConstraintComponent: ValueDistinct</a:t>
-            </a:r>
+              <a:t>Facet: 		</a:t>
+            </a:r>
+            <a:r>
+              <a:rPr lang="de-DE" sz="2000" smtClean="0">
+                <a:solidFill>
+                  <a:srgbClr val="C00000"/>
+                </a:solidFill>
+                <a:latin typeface="Calibri Light" panose="020F0302020204030204" pitchFamily="34" charset="0"/>
+                <a:cs typeface="Calibri Light" panose="020F0302020204030204" pitchFamily="34" charset="0"/>
+              </a:rPr>
+              <a:t>ValueDistinct</a:t>
+            </a:r>
+            <a:endParaRPr lang="de-DE" sz="2000" smtClean="0">
+              <a:solidFill>
+                <a:srgbClr val="C00000"/>
+              </a:solidFill>
+              <a:latin typeface="Calibri Light" panose="020F0302020204030204" pitchFamily="34" charset="0"/>
+              <a:cs typeface="Calibri Light" panose="020F0302020204030204" pitchFamily="34" charset="0"/>
+            </a:endParaRPr>
           </a:p>
         </p:txBody>
       </p:sp>
@@ -17037,7 +17237,7 @@
       </p:sp>
       <p:pic>
         <p:nvPicPr>
-          <p:cNvPr id="8" name="Picture 7"/>
+          <p:cNvPr id="9" name="Picture 8"/>
           <p:cNvPicPr>
             <a:picLocks noChangeAspect="1"/>
           </p:cNvPicPr>
@@ -17051,8 +17251,8 @@
         </p:blipFill>
         <p:spPr>
           <a:xfrm>
-            <a:off x="806532" y="4509120"/>
-            <a:ext cx="7509884" cy="1170806"/>
+            <a:off x="833437" y="4725144"/>
+            <a:ext cx="7477125" cy="942975"/>
           </a:xfrm>
           <a:prstGeom prst="rect">
             <a:avLst/>
@@ -17119,9 +17319,19 @@
                 <a:latin typeface="Calibri Light" panose="020F0302020204030204" pitchFamily="34" charset="0"/>
                 <a:cs typeface="Calibri Light" panose="020F0302020204030204" pitchFamily="34" charset="0"/>
               </a:rPr>
-              <a:t>Constraints IV</a:t>
-            </a:r>
-            <a:endParaRPr lang="de-DE">
+              <a:t>2. Constraints</a:t>
+            </a:r>
+            <a:r>
+              <a:rPr lang="de-DE" i="1" smtClean="0">
+                <a:solidFill>
+                  <a:srgbClr val="006600"/>
+                </a:solidFill>
+                <a:latin typeface="Calibri Light" panose="020F0302020204030204" pitchFamily="34" charset="0"/>
+                <a:cs typeface="Calibri Light" panose="020F0302020204030204" pitchFamily="34" charset="0"/>
+              </a:rPr>
+              <a:t> - categorization</a:t>
+            </a:r>
+            <a:endParaRPr lang="de-DE" i="1">
               <a:solidFill>
                 <a:srgbClr val="006600"/>
               </a:solidFill>
@@ -17141,7 +17351,12 @@
             <p:ph idx="1"/>
           </p:nvPr>
         </p:nvSpPr>
-        <p:spPr/>
+        <p:spPr>
+          <a:xfrm>
+            <a:off x="457200" y="1719263"/>
+            <a:ext cx="8686800" cy="4411662"/>
+          </a:xfrm>
+        </p:spPr>
         <p:txBody>
           <a:bodyPr/>
           <a:lstStyle/>
@@ -17176,7 +17391,17 @@
                 <a:latin typeface="Calibri Light" panose="020F0302020204030204" pitchFamily="34" charset="0"/>
                 <a:cs typeface="Calibri Light" panose="020F0302020204030204" pitchFamily="34" charset="0"/>
               </a:rPr>
-              <a:t>Unary		- targets single resource</a:t>
+              <a:t>Unary		- targets </a:t>
+            </a:r>
+            <a:r>
+              <a:rPr lang="de-DE" sz="2000" b="1" smtClean="0">
+                <a:solidFill>
+                  <a:srgbClr val="006600"/>
+                </a:solidFill>
+                <a:latin typeface="Calibri Light" panose="020F0302020204030204" pitchFamily="34" charset="0"/>
+                <a:cs typeface="Calibri Light" panose="020F0302020204030204" pitchFamily="34" charset="0"/>
+              </a:rPr>
+              <a:t>single resource</a:t>
             </a:r>
           </a:p>
           <a:p>
@@ -17204,7 +17429,17 @@
                 <a:latin typeface="Calibri Light" panose="020F0302020204030204" pitchFamily="34" charset="0"/>
                 <a:cs typeface="Calibri Light" panose="020F0302020204030204" pitchFamily="34" charset="0"/>
               </a:rPr>
-              <a:t>Binary		- targets a pair of resources</a:t>
+              <a:t>Binary		- targets a </a:t>
+            </a:r>
+            <a:r>
+              <a:rPr lang="de-DE" sz="2000" b="1" smtClean="0">
+                <a:solidFill>
+                  <a:srgbClr val="006600"/>
+                </a:solidFill>
+                <a:latin typeface="Calibri Light" panose="020F0302020204030204" pitchFamily="34" charset="0"/>
+                <a:cs typeface="Calibri Light" panose="020F0302020204030204" pitchFamily="34" charset="0"/>
+              </a:rPr>
+              <a:t>pair of resources</a:t>
             </a:r>
           </a:p>
           <a:p>
@@ -17239,7 +17474,17 @@
                 <a:latin typeface="Calibri Light" panose="020F0302020204030204" pitchFamily="34" charset="0"/>
                 <a:cs typeface="Calibri Light" panose="020F0302020204030204" pitchFamily="34" charset="0"/>
               </a:rPr>
-              <a:t>valueCompared&gt;, &lt;docSimilar&gt;</a:t>
+              <a:t>valueCompared&gt;, &lt;docSimilar</a:t>
+            </a:r>
+            <a:r>
+              <a:rPr lang="de-DE" sz="2000" smtClean="0">
+                <a:solidFill>
+                  <a:srgbClr val="006600"/>
+                </a:solidFill>
+                <a:latin typeface="Calibri Light" panose="020F0302020204030204" pitchFamily="34" charset="0"/>
+                <a:cs typeface="Calibri Light" panose="020F0302020204030204" pitchFamily="34" charset="0"/>
+              </a:rPr>
+              <a:t>&gt;, &lt;folderSimilar&gt;</a:t>
             </a:r>
             <a:endParaRPr lang="de-DE" sz="2000">
               <a:solidFill>
@@ -17271,7 +17516,27 @@
                 <a:latin typeface="Calibri Light" panose="020F0302020204030204" pitchFamily="34" charset="0"/>
                 <a:cs typeface="Calibri Light" panose="020F0302020204030204" pitchFamily="34" charset="0"/>
               </a:rPr>
-              <a:t>Closed		- excludes impact from other resources</a:t>
+              <a:t>Closed		- </a:t>
+            </a:r>
+            <a:r>
+              <a:rPr lang="de-DE" sz="2000" b="1" smtClean="0">
+                <a:solidFill>
+                  <a:srgbClr val="006600"/>
+                </a:solidFill>
+                <a:latin typeface="Calibri Light" panose="020F0302020204030204" pitchFamily="34" charset="0"/>
+                <a:cs typeface="Calibri Light" panose="020F0302020204030204" pitchFamily="34" charset="0"/>
+              </a:rPr>
+              <a:t>excludes impact</a:t>
+            </a:r>
+            <a:r>
+              <a:rPr lang="de-DE" sz="2000" smtClean="0">
+                <a:solidFill>
+                  <a:srgbClr val="006600"/>
+                </a:solidFill>
+                <a:latin typeface="Calibri Light" panose="020F0302020204030204" pitchFamily="34" charset="0"/>
+                <a:cs typeface="Calibri Light" panose="020F0302020204030204" pitchFamily="34" charset="0"/>
+              </a:rPr>
+              <a:t> from other resources</a:t>
             </a:r>
           </a:p>
           <a:p>
@@ -17309,7 +17574,27 @@
                 <a:latin typeface="Calibri Light" panose="020F0302020204030204" pitchFamily="34" charset="0"/>
                 <a:cs typeface="Calibri Light" panose="020F0302020204030204" pitchFamily="34" charset="0"/>
               </a:rPr>
-              <a:t>Open		- allows impact from other resources</a:t>
+              <a:t>Open		- </a:t>
+            </a:r>
+            <a:r>
+              <a:rPr lang="de-DE" sz="2000" b="1" smtClean="0">
+                <a:solidFill>
+                  <a:srgbClr val="006600"/>
+                </a:solidFill>
+                <a:latin typeface="Calibri Light" panose="020F0302020204030204" pitchFamily="34" charset="0"/>
+                <a:cs typeface="Calibri Light" panose="020F0302020204030204" pitchFamily="34" charset="0"/>
+              </a:rPr>
+              <a:t>allows impact</a:t>
+            </a:r>
+            <a:r>
+              <a:rPr lang="de-DE" sz="2000" smtClean="0">
+                <a:solidFill>
+                  <a:srgbClr val="006600"/>
+                </a:solidFill>
+                <a:latin typeface="Calibri Light" panose="020F0302020204030204" pitchFamily="34" charset="0"/>
+                <a:cs typeface="Calibri Light" panose="020F0302020204030204" pitchFamily="34" charset="0"/>
+              </a:rPr>
+              <a:t> from other resources</a:t>
             </a:r>
           </a:p>
           <a:p>
@@ -17334,27 +17619,7 @@
                 <a:latin typeface="Calibri Light" panose="020F0302020204030204" pitchFamily="34" charset="0"/>
                 <a:cs typeface="Calibri Light" panose="020F0302020204030204" pitchFamily="34" charset="0"/>
               </a:rPr>
-              <a:t>		   e.g. &lt;foxvalue&gt;, &lt;</a:t>
-            </a:r>
-            <a:r>
-              <a:rPr lang="de-DE" sz="2000" smtClean="0">
-                <a:solidFill>
-                  <a:srgbClr val="006600"/>
-                </a:solidFill>
-                <a:latin typeface="Calibri Light" panose="020F0302020204030204" pitchFamily="34" charset="0"/>
-                <a:cs typeface="Calibri Light" panose="020F0302020204030204" pitchFamily="34" charset="0"/>
-              </a:rPr>
-              <a:t>foxvaluePair</a:t>
-            </a:r>
-            <a:r>
-              <a:rPr lang="de-DE" sz="2000" smtClean="0">
-                <a:solidFill>
-                  <a:srgbClr val="006600"/>
-                </a:solidFill>
-                <a:latin typeface="Calibri Light" panose="020F0302020204030204" pitchFamily="34" charset="0"/>
-                <a:cs typeface="Calibri Light" panose="020F0302020204030204" pitchFamily="34" charset="0"/>
-              </a:rPr>
-              <a:t>&gt;, &lt;links&gt;</a:t>
+              <a:t>		   e.g. &lt;foxvalue&gt;, &lt;foxvaluePair&gt;, &lt;links&gt;</a:t>
             </a:r>
           </a:p>
         </p:txBody>
@@ -17500,9 +17765,19 @@
                 <a:latin typeface="Calibri Light" panose="020F0302020204030204" pitchFamily="34" charset="0"/>
                 <a:cs typeface="Calibri Light" panose="020F0302020204030204" pitchFamily="34" charset="0"/>
               </a:rPr>
-              <a:t>Constraint types</a:t>
-            </a:r>
-            <a:endParaRPr lang="de-DE">
+              <a:t>2. Constraints - </a:t>
+            </a:r>
+            <a:r>
+              <a:rPr lang="de-DE" i="1" smtClean="0">
+                <a:solidFill>
+                  <a:srgbClr val="006600"/>
+                </a:solidFill>
+                <a:latin typeface="Calibri Light" panose="020F0302020204030204" pitchFamily="34" charset="0"/>
+                <a:cs typeface="Calibri Light" panose="020F0302020204030204" pitchFamily="34" charset="0"/>
+              </a:rPr>
+              <a:t>constraint types</a:t>
+            </a:r>
+            <a:endParaRPr lang="de-DE" i="1">
               <a:solidFill>
                 <a:srgbClr val="006600"/>
               </a:solidFill>
@@ -17514,7 +17789,7 @@
       </p:sp>
       <p:pic>
         <p:nvPicPr>
-          <p:cNvPr id="4" name="Picture 3"/>
+          <p:cNvPr id="5" name="Picture 4"/>
           <p:cNvPicPr>
             <a:picLocks noChangeAspect="1"/>
           </p:cNvPicPr>
@@ -17528,8 +17803,8 @@
         </p:blipFill>
         <p:spPr>
           <a:xfrm>
-            <a:off x="665365" y="1700808"/>
-            <a:ext cx="7372350" cy="4991100"/>
+            <a:off x="611560" y="1682452"/>
+            <a:ext cx="7277100" cy="4914900"/>
           </a:xfrm>
           <a:prstGeom prst="rect">
             <a:avLst/>
@@ -17596,7 +17871,7 @@
                 <a:latin typeface="Calibri Light" panose="020F0302020204030204" pitchFamily="34" charset="0"/>
                 <a:cs typeface="Calibri Light" panose="020F0302020204030204" pitchFamily="34" charset="0"/>
               </a:rPr>
-              <a:t>Shapes</a:t>
+              <a:t>3. Shapes</a:t>
             </a:r>
             <a:endParaRPr lang="de-DE">
               <a:solidFill>
@@ -17644,33 +17919,13 @@
                 <a:latin typeface="Calibri Light" panose="020F0302020204030204" pitchFamily="34" charset="0"/>
                 <a:cs typeface="Calibri Light" panose="020F0302020204030204" pitchFamily="34" charset="0"/>
               </a:rPr>
-              <a:t>Set of </a:t>
-            </a:r>
-            <a:r>
-              <a:rPr lang="de-DE" sz="2000" u="sng" smtClean="0">
-                <a:solidFill>
-                  <a:srgbClr val="006600"/>
-                </a:solidFill>
-                <a:latin typeface="Calibri Light" panose="020F0302020204030204" pitchFamily="34" charset="0"/>
-                <a:cs typeface="Calibri Light" panose="020F0302020204030204" pitchFamily="34" charset="0"/>
-              </a:rPr>
-              <a:t>constraint</a:t>
-            </a:r>
+              <a:t>Set of constraints</a:t>
+            </a:r>
+          </a:p>
+          <a:p>
+            <a:pPr lvl="1"/>
             <a:r>
               <a:rPr lang="de-DE" sz="2000" smtClean="0">
-                <a:solidFill>
-                  <a:srgbClr val="006600"/>
-                </a:solidFill>
-                <a:latin typeface="Calibri Light" panose="020F0302020204030204" pitchFamily="34" charset="0"/>
-                <a:cs typeface="Calibri Light" panose="020F0302020204030204" pitchFamily="34" charset="0"/>
-              </a:rPr>
-              <a:t>s</a:t>
-            </a:r>
-          </a:p>
-          <a:p>
-            <a:pPr lvl="1"/>
-            <a:r>
-              <a:rPr lang="de-DE" sz="2000" u="sng" smtClean="0">
                 <a:solidFill>
                   <a:srgbClr val="006600"/>
                 </a:solidFill>
@@ -17726,17 +17981,17 @@
                 <a:latin typeface="Calibri Light" panose="020F0302020204030204" pitchFamily="34" charset="0"/>
                 <a:cs typeface="Calibri Light" panose="020F0302020204030204" pitchFamily="34" charset="0"/>
               </a:rPr>
-              <a:t>Schema representation of a shape: </a:t>
+              <a:t>Schema representation of a shape: &lt;file</a:t>
             </a:r>
             <a:r>
               <a:rPr lang="de-DE" sz="2400" smtClean="0">
                 <a:solidFill>
                   <a:srgbClr val="006600"/>
                 </a:solidFill>
-                <a:latin typeface="Courier New" panose="02070309020205020404" pitchFamily="49" charset="0"/>
-                <a:cs typeface="Courier New" panose="02070309020205020404" pitchFamily="49" charset="0"/>
-              </a:rPr>
-              <a:t>&lt;file&gt;</a:t>
+                <a:latin typeface="Calibri Light" panose="020F0302020204030204" pitchFamily="34" charset="0"/>
+                <a:cs typeface="Calibri Light" panose="020F0302020204030204" pitchFamily="34" charset="0"/>
+              </a:rPr>
+              <a:t>&gt;, &lt;</a:t>
             </a:r>
             <a:r>
               <a:rPr lang="de-DE" sz="2400" smtClean="0">
@@ -17746,17 +18001,7 @@
                 <a:latin typeface="Calibri Light" panose="020F0302020204030204" pitchFamily="34" charset="0"/>
                 <a:cs typeface="Calibri Light" panose="020F0302020204030204" pitchFamily="34" charset="0"/>
               </a:rPr>
-              <a:t> or </a:t>
-            </a:r>
-            <a:r>
-              <a:rPr lang="de-DE" sz="2400" smtClean="0">
-                <a:solidFill>
-                  <a:srgbClr val="006600"/>
-                </a:solidFill>
-                <a:latin typeface="Courier New" panose="02070309020205020404" pitchFamily="49" charset="0"/>
-                <a:cs typeface="Courier New" panose="02070309020205020404" pitchFamily="49" charset="0"/>
-              </a:rPr>
-              <a:t>&lt;folder&gt;</a:t>
+              <a:t>folder&gt;</a:t>
             </a:r>
           </a:p>
           <a:p>
@@ -17957,7 +18202,17 @@
                 <a:latin typeface="Calibri Light" panose="020F0302020204030204" pitchFamily="34" charset="0"/>
                 <a:cs typeface="Calibri Light" panose="020F0302020204030204" pitchFamily="34" charset="0"/>
               </a:rPr>
-              <a:t>Target declaration</a:t>
+              <a:t>4. Target </a:t>
+            </a:r>
+            <a:r>
+              <a:rPr lang="de-DE" smtClean="0">
+                <a:solidFill>
+                  <a:srgbClr val="006600"/>
+                </a:solidFill>
+                <a:latin typeface="Calibri Light" panose="020F0302020204030204" pitchFamily="34" charset="0"/>
+                <a:cs typeface="Calibri Light" panose="020F0302020204030204" pitchFamily="34" charset="0"/>
+              </a:rPr>
+              <a:t>declaration</a:t>
             </a:r>
             <a:endParaRPr lang="de-DE">
               <a:solidFill>
@@ -18058,8 +18313,25 @@
                 <a:latin typeface="Calibri Light" panose="020F0302020204030204" pitchFamily="34" charset="0"/>
                 <a:cs typeface="Calibri Light" panose="020F0302020204030204" pitchFamily="34" charset="0"/>
               </a:rPr>
-              <a:t>Schema representation: attributes of the shape element</a:t>
-            </a:r>
+              <a:t>Schema representation: attributes of </a:t>
+            </a:r>
+            <a:r>
+              <a:rPr lang="de-DE" sz="2400" smtClean="0">
+                <a:solidFill>
+                  <a:srgbClr val="006600"/>
+                </a:solidFill>
+                <a:latin typeface="Calibri Light" panose="020F0302020204030204" pitchFamily="34" charset="0"/>
+                <a:cs typeface="Calibri Light" panose="020F0302020204030204" pitchFamily="34" charset="0"/>
+              </a:rPr>
+              <a:t>&lt;file&gt; or &lt;folder&gt;</a:t>
+            </a:r>
+            <a:endParaRPr lang="de-DE" sz="2400" smtClean="0">
+              <a:solidFill>
+                <a:srgbClr val="006600"/>
+              </a:solidFill>
+              <a:latin typeface="Calibri Light" panose="020F0302020204030204" pitchFamily="34" charset="0"/>
+              <a:cs typeface="Calibri Light" panose="020F0302020204030204" pitchFamily="34" charset="0"/>
+            </a:endParaRPr>
           </a:p>
         </p:txBody>
       </p:sp>
@@ -18210,8 +18482,25 @@
                 <a:latin typeface="Calibri Light" panose="020F0302020204030204" pitchFamily="34" charset="0"/>
                 <a:cs typeface="Calibri Light" panose="020F0302020204030204" pitchFamily="34" charset="0"/>
               </a:rPr>
-              <a:t>	    * Output resources=</a:t>
-            </a:r>
+              <a:t>	    * Output </a:t>
+            </a:r>
+            <a:r>
+              <a:rPr lang="de-DE" sz="2400" b="0" smtClean="0">
+                <a:solidFill>
+                  <a:srgbClr val="006600"/>
+                </a:solidFill>
+                <a:latin typeface="Calibri Light" panose="020F0302020204030204" pitchFamily="34" charset="0"/>
+                <a:cs typeface="Calibri Light" panose="020F0302020204030204" pitchFamily="34" charset="0"/>
+              </a:rPr>
+              <a:t>resources =</a:t>
+            </a:r>
+            <a:endParaRPr lang="de-DE" sz="2400" b="0" smtClean="0">
+              <a:solidFill>
+                <a:srgbClr val="006600"/>
+              </a:solidFill>
+              <a:latin typeface="Calibri Light" panose="020F0302020204030204" pitchFamily="34" charset="0"/>
+              <a:cs typeface="Calibri Light" panose="020F0302020204030204" pitchFamily="34" charset="0"/>
+            </a:endParaRPr>
           </a:p>
           <a:p>
             <a:pPr marL="0" indent="0">
@@ -18235,7 +18524,27 @@
                 <a:latin typeface="Calibri Light" panose="020F0302020204030204" pitchFamily="34" charset="0"/>
                 <a:cs typeface="Calibri Light" panose="020F0302020204030204" pitchFamily="34" charset="0"/>
               </a:rPr>
-              <a:t>	the target of this shape</a:t>
+              <a:t>	</a:t>
+            </a:r>
+            <a:r>
+              <a:rPr lang="de-DE" sz="2400" b="0" smtClean="0">
+                <a:solidFill>
+                  <a:srgbClr val="006600"/>
+                </a:solidFill>
+                <a:latin typeface="Calibri Light" panose="020F0302020204030204" pitchFamily="34" charset="0"/>
+                <a:cs typeface="Calibri Light" panose="020F0302020204030204" pitchFamily="34" charset="0"/>
+              </a:rPr>
+              <a:t>contribution to the </a:t>
+            </a:r>
+            <a:r>
+              <a:rPr lang="de-DE" sz="2400" b="0" smtClean="0">
+                <a:solidFill>
+                  <a:srgbClr val="006600"/>
+                </a:solidFill>
+                <a:latin typeface="Calibri Light" panose="020F0302020204030204" pitchFamily="34" charset="0"/>
+                <a:cs typeface="Calibri Light" panose="020F0302020204030204" pitchFamily="34" charset="0"/>
+              </a:rPr>
+              <a:t>target of this shape</a:t>
             </a:r>
             <a:endParaRPr lang="de-DE" sz="2400" b="0">
               <a:solidFill>
@@ -18278,7 +18587,7 @@
       </p:sp>
       <p:pic>
         <p:nvPicPr>
-          <p:cNvPr id="8" name="Picture 7"/>
+          <p:cNvPr id="6" name="Picture 5"/>
           <p:cNvPicPr>
             <a:picLocks noChangeAspect="1"/>
           </p:cNvPicPr>
@@ -18292,8 +18601,8 @@
         </p:blipFill>
         <p:spPr>
           <a:xfrm>
-            <a:off x="962025" y="5442545"/>
-            <a:ext cx="7219950" cy="866775"/>
+            <a:off x="0" y="5495967"/>
+            <a:ext cx="9144000" cy="957369"/>
           </a:xfrm>
           <a:prstGeom prst="rect">
             <a:avLst/>
@@ -18365,7 +18674,17 @@
                 <a:latin typeface="Calibri Light" panose="020F0302020204030204" pitchFamily="34" charset="0"/>
                 <a:cs typeface="Calibri Light" panose="020F0302020204030204" pitchFamily="34" charset="0"/>
               </a:rPr>
-              <a:t>Link definition</a:t>
+              <a:t>5. Link </a:t>
+            </a:r>
+            <a:r>
+              <a:rPr lang="de-DE" smtClean="0">
+                <a:solidFill>
+                  <a:srgbClr val="006600"/>
+                </a:solidFill>
+                <a:latin typeface="Calibri Light" panose="020F0302020204030204" pitchFamily="34" charset="0"/>
+                <a:cs typeface="Calibri Light" panose="020F0302020204030204" pitchFamily="34" charset="0"/>
+              </a:rPr>
+              <a:t>definition</a:t>
             </a:r>
             <a:endParaRPr lang="de-DE">
               <a:solidFill>
@@ -18387,7 +18706,12 @@
             <p:ph idx="1"/>
           </p:nvPr>
         </p:nvSpPr>
-        <p:spPr/>
+        <p:spPr>
+          <a:xfrm>
+            <a:off x="457200" y="1719263"/>
+            <a:ext cx="8435280" cy="4411662"/>
+          </a:xfrm>
+        </p:spPr>
         <p:txBody>
           <a:bodyPr/>
           <a:lstStyle/>
@@ -18490,7 +18814,27 @@
                 <a:latin typeface="Calibri Light" panose="020F0302020204030204" pitchFamily="34" charset="0"/>
                 <a:cs typeface="Calibri Light" panose="020F0302020204030204" pitchFamily="34" charset="0"/>
               </a:rPr>
-              <a:t>Shapes			&lt;file&gt;, &lt;folder&gt;</a:t>
+              <a:t>Shapes		</a:t>
+            </a:r>
+            <a:r>
+              <a:rPr lang="de-DE" sz="2000" smtClean="0">
+                <a:solidFill>
+                  <a:srgbClr val="006600"/>
+                </a:solidFill>
+                <a:latin typeface="Calibri Light" panose="020F0302020204030204" pitchFamily="34" charset="0"/>
+                <a:cs typeface="Calibri Light" panose="020F0302020204030204" pitchFamily="34" charset="0"/>
+              </a:rPr>
+              <a:t>   &lt;</a:t>
+            </a:r>
+            <a:r>
+              <a:rPr lang="de-DE" sz="2000" smtClean="0">
+                <a:solidFill>
+                  <a:srgbClr val="006600"/>
+                </a:solidFill>
+                <a:latin typeface="Calibri Light" panose="020F0302020204030204" pitchFamily="34" charset="0"/>
+                <a:cs typeface="Calibri Light" panose="020F0302020204030204" pitchFamily="34" charset="0"/>
+              </a:rPr>
+              <a:t>file&gt;, &lt;folder&gt;</a:t>
             </a:r>
           </a:p>
           <a:p>
@@ -18503,7 +18847,27 @@
                 <a:latin typeface="Calibri Light" panose="020F0302020204030204" pitchFamily="34" charset="0"/>
                 <a:cs typeface="Calibri Light" panose="020F0302020204030204" pitchFamily="34" charset="0"/>
               </a:rPr>
-              <a:t>Links constraint		&lt;links&gt;</a:t>
+              <a:t>Links constraint	</a:t>
+            </a:r>
+            <a:r>
+              <a:rPr lang="de-DE" sz="2000" smtClean="0">
+                <a:solidFill>
+                  <a:srgbClr val="006600"/>
+                </a:solidFill>
+                <a:latin typeface="Calibri Light" panose="020F0302020204030204" pitchFamily="34" charset="0"/>
+                <a:cs typeface="Calibri Light" panose="020F0302020204030204" pitchFamily="34" charset="0"/>
+              </a:rPr>
+              <a:t>   &lt;</a:t>
+            </a:r>
+            <a:r>
+              <a:rPr lang="de-DE" sz="2000" smtClean="0">
+                <a:solidFill>
+                  <a:srgbClr val="006600"/>
+                </a:solidFill>
+                <a:latin typeface="Calibri Light" panose="020F0302020204030204" pitchFamily="34" charset="0"/>
+                <a:cs typeface="Calibri Light" panose="020F0302020204030204" pitchFamily="34" charset="0"/>
+              </a:rPr>
+              <a:t>links&gt;</a:t>
             </a:r>
           </a:p>
           <a:p>
@@ -18516,7 +18880,7 @@
                 <a:latin typeface="Calibri Light" panose="020F0302020204030204" pitchFamily="34" charset="0"/>
                 <a:cs typeface="Calibri Light" panose="020F0302020204030204" pitchFamily="34" charset="0"/>
               </a:rPr>
-              <a:t>Binary constraints</a:t>
+              <a:t>Binary constraints	</a:t>
             </a:r>
             <a:r>
               <a:rPr lang="de-DE" sz="2000" smtClean="0">
@@ -18526,7 +18890,37 @@
                 <a:latin typeface="Calibri Light" panose="020F0302020204030204" pitchFamily="34" charset="0"/>
                 <a:cs typeface="Calibri Light" panose="020F0302020204030204" pitchFamily="34" charset="0"/>
               </a:rPr>
-              <a:t>		&lt;valueCompared&gt;, &lt;docSimilar&gt;, … </a:t>
+              <a:t>   &lt;</a:t>
+            </a:r>
+            <a:r>
+              <a:rPr lang="de-DE" sz="2000" smtClean="0">
+                <a:solidFill>
+                  <a:srgbClr val="006600"/>
+                </a:solidFill>
+                <a:latin typeface="Calibri Light" panose="020F0302020204030204" pitchFamily="34" charset="0"/>
+                <a:cs typeface="Calibri Light" panose="020F0302020204030204" pitchFamily="34" charset="0"/>
+              </a:rPr>
+              <a:t>valueCompared&gt;, &lt;docSimilar</a:t>
+            </a:r>
+            <a:r>
+              <a:rPr lang="de-DE" sz="2000" smtClean="0">
+                <a:solidFill>
+                  <a:srgbClr val="006600"/>
+                </a:solidFill>
+                <a:latin typeface="Calibri Light" panose="020F0302020204030204" pitchFamily="34" charset="0"/>
+                <a:cs typeface="Calibri Light" panose="020F0302020204030204" pitchFamily="34" charset="0"/>
+              </a:rPr>
+              <a:t>&gt;, &lt;folderSimilar&gt; </a:t>
+            </a:r>
+            <a:r>
+              <a:rPr lang="de-DE" sz="2000" smtClean="0">
+                <a:solidFill>
+                  <a:srgbClr val="006600"/>
+                </a:solidFill>
+                <a:latin typeface="Calibri Light" panose="020F0302020204030204" pitchFamily="34" charset="0"/>
+                <a:cs typeface="Calibri Light" panose="020F0302020204030204" pitchFamily="34" charset="0"/>
+              </a:rPr>
+              <a:t>… </a:t>
             </a:r>
           </a:p>
           <a:p>
@@ -18539,7 +18933,27 @@
                 <a:latin typeface="Calibri Light" panose="020F0302020204030204" pitchFamily="34" charset="0"/>
                 <a:cs typeface="Calibri Light" panose="020F0302020204030204" pitchFamily="34" charset="0"/>
               </a:rPr>
-              <a:t>Hyperdoc constraints	&lt;hyperdocTree&gt;</a:t>
+              <a:t>Hyperdoc </a:t>
+            </a:r>
+            <a:r>
+              <a:rPr lang="de-DE" sz="2000" smtClean="0">
+                <a:solidFill>
+                  <a:srgbClr val="006600"/>
+                </a:solidFill>
+                <a:latin typeface="Calibri Light" panose="020F0302020204030204" pitchFamily="34" charset="0"/>
+                <a:cs typeface="Calibri Light" panose="020F0302020204030204" pitchFamily="34" charset="0"/>
+              </a:rPr>
+              <a:t>constraint   &lt;hyperdocTree</a:t>
+            </a:r>
+            <a:r>
+              <a:rPr lang="de-DE" sz="2000" smtClean="0">
+                <a:solidFill>
+                  <a:srgbClr val="006600"/>
+                </a:solidFill>
+                <a:latin typeface="Calibri Light" panose="020F0302020204030204" pitchFamily="34" charset="0"/>
+                <a:cs typeface="Calibri Light" panose="020F0302020204030204" pitchFamily="34" charset="0"/>
+              </a:rPr>
+              <a:t>&gt;</a:t>
             </a:r>
           </a:p>
         </p:txBody>
@@ -18730,7 +19144,7 @@
                 <a:latin typeface="Calibri Light" panose="020F0302020204030204" pitchFamily="34" charset="0"/>
                 <a:cs typeface="Calibri Light" panose="020F0302020204030204" pitchFamily="34" charset="0"/>
               </a:rPr>
-              <a:t>Link Definition: </a:t>
+              <a:t>5. Link definition</a:t>
             </a:r>
             <a:r>
               <a:rPr lang="de-DE" i="1" smtClean="0">
@@ -18740,7 +19154,7 @@
                 <a:latin typeface="Calibri Light" panose="020F0302020204030204" pitchFamily="34" charset="0"/>
                 <a:cs typeface="Calibri Light" panose="020F0302020204030204" pitchFamily="34" charset="0"/>
               </a:rPr>
-              <a:t>connector types</a:t>
+              <a:t> - connectors</a:t>
             </a:r>
             <a:endParaRPr lang="de-DE" i="1">
               <a:solidFill>
@@ -18761,7 +19175,7 @@
         <p:spPr>
           <a:xfrm>
             <a:off x="467544" y="1988840"/>
-            <a:ext cx="2553904" cy="461665"/>
+            <a:ext cx="2568332" cy="461665"/>
           </a:xfrm>
           <a:prstGeom prst="rect">
             <a:avLst/>
@@ -18781,7 +19195,16 @@
                 </a:solidFill>
                 <a:latin typeface="Bradley Hand ITC" panose="03070402050302030203" pitchFamily="66" charset="0"/>
               </a:rPr>
-              <a:t>Connecter: foxpath</a:t>
+              <a:t>Connector</a:t>
+            </a:r>
+            <a:r>
+              <a:rPr lang="de-DE" sz="2400" smtClean="0">
+                <a:solidFill>
+                  <a:srgbClr val="006600"/>
+                </a:solidFill>
+                <a:latin typeface="Bradley Hand ITC" panose="03070402050302030203" pitchFamily="66" charset="0"/>
+              </a:rPr>
+              <a:t>: foxpath</a:t>
             </a:r>
             <a:endParaRPr lang="de-DE" sz="2400">
               <a:solidFill>
@@ -18801,7 +19224,7 @@
         <p:spPr>
           <a:xfrm>
             <a:off x="467544" y="3303646"/>
-            <a:ext cx="3518912" cy="461665"/>
+            <a:ext cx="3643946" cy="461665"/>
           </a:xfrm>
           <a:prstGeom prst="rect">
             <a:avLst/>
@@ -18821,7 +19244,16 @@
                 </a:solidFill>
                 <a:latin typeface="Bradley Hand ITC" panose="03070402050302030203" pitchFamily="66" charset="0"/>
               </a:rPr>
-              <a:t>Connecter: href-expression</a:t>
+              <a:t>Connector</a:t>
+            </a:r>
+            <a:r>
+              <a:rPr lang="de-DE" sz="2400" smtClean="0">
+                <a:solidFill>
+                  <a:srgbClr val="006600"/>
+                </a:solidFill>
+                <a:latin typeface="Bradley Hand ITC" panose="03070402050302030203" pitchFamily="66" charset="0"/>
+              </a:rPr>
+              <a:t>: href-expression</a:t>
             </a:r>
             <a:endParaRPr lang="de-DE" sz="2400">
               <a:solidFill>
@@ -18861,7 +19293,16 @@
                 </a:solidFill>
                 <a:latin typeface="Bradley Hand ITC" panose="03070402050302030203" pitchFamily="66" charset="0"/>
               </a:rPr>
-              <a:t>Connecter: URI-expression</a:t>
+              <a:t>Connector</a:t>
+            </a:r>
+            <a:r>
+              <a:rPr lang="de-DE" sz="2400" smtClean="0">
+                <a:solidFill>
+                  <a:srgbClr val="006600"/>
+                </a:solidFill>
+                <a:latin typeface="Bradley Hand ITC" panose="03070402050302030203" pitchFamily="66" charset="0"/>
+              </a:rPr>
+              <a:t>: URI-expression</a:t>
             </a:r>
             <a:endParaRPr lang="de-DE" sz="2400">
               <a:solidFill>
@@ -18966,9 +19407,19 @@
                 <a:latin typeface="Calibri Light" panose="020F0302020204030204" pitchFamily="34" charset="0"/>
                 <a:cs typeface="Calibri Light" panose="020F0302020204030204" pitchFamily="34" charset="0"/>
               </a:rPr>
-              <a:t>Global Link Definitions &lt;linkDef&gt;</a:t>
-            </a:r>
-            <a:endParaRPr lang="de-DE">
+              <a:t>5. Link definition - </a:t>
+            </a:r>
+            <a:r>
+              <a:rPr lang="de-DE" i="1" smtClean="0">
+                <a:solidFill>
+                  <a:srgbClr val="006600"/>
+                </a:solidFill>
+                <a:latin typeface="Calibri Light" panose="020F0302020204030204" pitchFamily="34" charset="0"/>
+                <a:cs typeface="Calibri Light" panose="020F0302020204030204" pitchFamily="34" charset="0"/>
+              </a:rPr>
+              <a:t>more connectors</a:t>
+            </a:r>
+            <a:endParaRPr lang="de-DE" i="1">
               <a:solidFill>
                 <a:srgbClr val="006600"/>
               </a:solidFill>
@@ -18987,7 +19438,7 @@
         <p:spPr>
           <a:xfrm>
             <a:off x="467544" y="1988840"/>
-            <a:ext cx="2438488" cy="461665"/>
+            <a:ext cx="2452916" cy="461665"/>
           </a:xfrm>
           <a:prstGeom prst="rect">
             <a:avLst/>
@@ -19007,7 +19458,16 @@
                 </a:solidFill>
                 <a:latin typeface="Bradley Hand ITC" panose="03070402050302030203" pitchFamily="66" charset="0"/>
               </a:rPr>
-              <a:t>Connecter: mirror</a:t>
+              <a:t>Connector</a:t>
+            </a:r>
+            <a:r>
+              <a:rPr lang="de-DE" sz="2400" smtClean="0">
+                <a:solidFill>
+                  <a:srgbClr val="006600"/>
+                </a:solidFill>
+                <a:latin typeface="Bradley Hand ITC" panose="03070402050302030203" pitchFamily="66" charset="0"/>
+              </a:rPr>
+              <a:t>: mirror</a:t>
             </a:r>
             <a:endParaRPr lang="de-DE" sz="2400">
               <a:solidFill>
@@ -19047,7 +19507,16 @@
                 </a:solidFill>
                 <a:latin typeface="Bradley Hand ITC" panose="03070402050302030203" pitchFamily="66" charset="0"/>
               </a:rPr>
-              <a:t>Connecter: URI-template</a:t>
+              <a:t>Connector</a:t>
+            </a:r>
+            <a:r>
+              <a:rPr lang="de-DE" sz="2400" smtClean="0">
+                <a:solidFill>
+                  <a:srgbClr val="006600"/>
+                </a:solidFill>
+                <a:latin typeface="Bradley Hand ITC" panose="03070402050302030203" pitchFamily="66" charset="0"/>
+              </a:rPr>
+              <a:t>: URI-template</a:t>
             </a:r>
             <a:endParaRPr lang="de-DE" sz="2400">
               <a:solidFill>
@@ -19334,7 +19803,14 @@
                 <a:latin typeface="Calibri Light" panose="020F0302020204030204" pitchFamily="34" charset="0"/>
                 <a:cs typeface="Calibri Light" panose="020F0302020204030204" pitchFamily="34" charset="0"/>
               </a:rPr>
-              <a:t>   some folder </a:t>
+              <a:t>   </a:t>
+            </a:r>
+            <a:r>
+              <a:rPr lang="de-DE" sz="2000" smtClean="0">
+                <a:latin typeface="Calibri Light" panose="020F0302020204030204" pitchFamily="34" charset="0"/>
+                <a:cs typeface="Calibri Light" panose="020F0302020204030204" pitchFamily="34" charset="0"/>
+              </a:rPr>
+              <a:t>a selected folder </a:t>
             </a:r>
             <a:endParaRPr lang="de-DE" sz="2000" smtClean="0">
               <a:latin typeface="Calibri Light" panose="020F0302020204030204" pitchFamily="34" charset="0"/>
@@ -19354,21 +19830,7 @@
                 <a:latin typeface="Calibri Light" panose="020F0302020204030204" pitchFamily="34" charset="0"/>
                 <a:cs typeface="Calibri Light" panose="020F0302020204030204" pitchFamily="34" charset="0"/>
               </a:rPr>
-              <a:t>     </a:t>
-            </a:r>
-            <a:r>
-              <a:rPr lang="de-DE" sz="2000" smtClean="0">
-                <a:latin typeface="Calibri Light" panose="020F0302020204030204" pitchFamily="34" charset="0"/>
-                <a:cs typeface="Calibri Light" panose="020F0302020204030204" pitchFamily="34" charset="0"/>
-              </a:rPr>
-              <a:t>+ all </a:t>
-            </a:r>
-            <a:r>
-              <a:rPr lang="de-DE" sz="2000" smtClean="0">
-                <a:latin typeface="Calibri Light" panose="020F0302020204030204" pitchFamily="34" charset="0"/>
-                <a:cs typeface="Calibri Light" panose="020F0302020204030204" pitchFamily="34" charset="0"/>
-              </a:rPr>
-              <a:t>folders/files directly or indirectly contained</a:t>
+              <a:t>     + all folders/files directly or indirectly contained</a:t>
             </a:r>
           </a:p>
         </p:txBody>
@@ -19419,7 +19881,28 @@
                 <a:latin typeface="Calibri Light" panose="020F0302020204030204" pitchFamily="34" charset="0"/>
                 <a:cs typeface="Calibri Light" panose="020F0302020204030204" pitchFamily="34" charset="0"/>
               </a:rPr>
-              <a:t>   check: conformance to a set of constraints </a:t>
+              <a:t>   </a:t>
+            </a:r>
+            <a:r>
+              <a:rPr lang="de-DE" sz="2000" smtClean="0">
+                <a:latin typeface="Calibri Light" panose="020F0302020204030204" pitchFamily="34" charset="0"/>
+                <a:cs typeface="Calibri Light" panose="020F0302020204030204" pitchFamily="34" charset="0"/>
+              </a:rPr>
+              <a:t>check conformance to a </a:t>
+            </a:r>
+            <a:r>
+              <a:rPr lang="de-DE" sz="2000" smtClean="0">
+                <a:latin typeface="Calibri Light" panose="020F0302020204030204" pitchFamily="34" charset="0"/>
+                <a:cs typeface="Calibri Light" panose="020F0302020204030204" pitchFamily="34" charset="0"/>
+              </a:rPr>
+              <a:t>set of </a:t>
+            </a:r>
+            <a:r>
+              <a:rPr lang="de-DE" sz="2000" smtClean="0">
+                <a:latin typeface="Calibri Light" panose="020F0302020204030204" pitchFamily="34" charset="0"/>
+                <a:cs typeface="Calibri Light" panose="020F0302020204030204" pitchFamily="34" charset="0"/>
+              </a:rPr>
+              <a:t>constraints („schema“) </a:t>
             </a:r>
             <a:endParaRPr lang="de-DE" sz="2000" smtClean="0">
               <a:latin typeface="Calibri Light" panose="020F0302020204030204" pitchFamily="34" charset="0"/>
@@ -19440,20 +19923,6 @@
                 <a:cs typeface="Calibri Light" panose="020F0302020204030204" pitchFamily="34" charset="0"/>
               </a:rPr>
               <a:t>     </a:t>
-            </a:r>
-            <a:r>
-              <a:rPr lang="de-DE" sz="2000" smtClean="0">
-                <a:latin typeface="Calibri Light" panose="020F0302020204030204" pitchFamily="34" charset="0"/>
-                <a:cs typeface="Calibri Light" panose="020F0302020204030204" pitchFamily="34" charset="0"/>
-              </a:rPr>
-              <a:t>= „</a:t>
-            </a:r>
-            <a:r>
-              <a:rPr lang="de-DE" sz="2000" smtClean="0">
-                <a:latin typeface="Calibri Light" panose="020F0302020204030204" pitchFamily="34" charset="0"/>
-                <a:cs typeface="Calibri Light" panose="020F0302020204030204" pitchFamily="34" charset="0"/>
-              </a:rPr>
-              <a:t>schema“</a:t>
             </a:r>
           </a:p>
         </p:txBody>
@@ -19466,7 +19935,7 @@
         </p:nvSpPr>
         <p:spPr>
           <a:xfrm>
-            <a:off x="808922" y="3925505"/>
+            <a:off x="808922" y="3717032"/>
             <a:ext cx="8243596" cy="1015663"/>
           </a:xfrm>
           <a:prstGeom prst="rect">
@@ -19547,7 +20016,7 @@
         </p:nvSpPr>
         <p:spPr>
           <a:xfrm>
-            <a:off x="811562" y="5077633"/>
+            <a:off x="811562" y="4869160"/>
             <a:ext cx="8243596" cy="1015663"/>
           </a:xfrm>
           <a:prstGeom prst="rect">
@@ -19776,27 +20245,7 @@
                 <a:latin typeface="Calibri Light" panose="020F0302020204030204" pitchFamily="34" charset="0"/>
                 <a:cs typeface="Calibri Light" panose="020F0302020204030204" pitchFamily="34" charset="0"/>
               </a:rPr>
-              <a:t>Target Declaration </a:t>
-            </a:r>
-            <a:r>
-              <a:rPr lang="de-DE" i="1" smtClean="0">
-                <a:solidFill>
-                  <a:srgbClr val="006600"/>
-                </a:solidFill>
-                <a:latin typeface="Calibri Light" panose="020F0302020204030204" pitchFamily="34" charset="0"/>
-                <a:cs typeface="Calibri Light" panose="020F0302020204030204" pitchFamily="34" charset="0"/>
-              </a:rPr>
-              <a:t>references</a:t>
-            </a:r>
-            <a:r>
-              <a:rPr lang="de-DE" smtClean="0">
-                <a:solidFill>
-                  <a:srgbClr val="006600"/>
-                </a:solidFill>
-                <a:latin typeface="Calibri Light" panose="020F0302020204030204" pitchFamily="34" charset="0"/>
-                <a:cs typeface="Calibri Light" panose="020F0302020204030204" pitchFamily="34" charset="0"/>
-              </a:rPr>
-              <a:t> or</a:t>
+              <a:t>5. Link definition </a:t>
             </a:r>
             <a:br>
               <a:rPr lang="de-DE" smtClean="0">
@@ -19808,14 +20257,14 @@
               </a:rPr>
             </a:br>
             <a:r>
-              <a:rPr lang="de-DE" smtClean="0">
-                <a:solidFill>
-                  <a:srgbClr val="006600"/>
-                </a:solidFill>
-                <a:latin typeface="Calibri Light" panose="020F0302020204030204" pitchFamily="34" charset="0"/>
-                <a:cs typeface="Calibri Light" panose="020F0302020204030204" pitchFamily="34" charset="0"/>
-              </a:rPr>
-              <a:t>   </a:t>
+              <a:rPr lang="de-DE" i="1">
+                <a:solidFill>
+                  <a:srgbClr val="006600"/>
+                </a:solidFill>
+                <a:latin typeface="Calibri Light" panose="020F0302020204030204" pitchFamily="34" charset="0"/>
+                <a:cs typeface="Calibri Light" panose="020F0302020204030204" pitchFamily="34" charset="0"/>
+              </a:rPr>
+              <a:t> </a:t>
             </a:r>
             <a:r>
               <a:rPr lang="de-DE" i="1" smtClean="0">
@@ -19825,19 +20274,19 @@
                 <a:latin typeface="Calibri Light" panose="020F0302020204030204" pitchFamily="34" charset="0"/>
                 <a:cs typeface="Calibri Light" panose="020F0302020204030204" pitchFamily="34" charset="0"/>
               </a:rPr>
-              <a:t>contains</a:t>
-            </a:r>
-            <a:r>
-              <a:rPr lang="de-DE" smtClean="0">
-                <a:solidFill>
-                  <a:srgbClr val="006600"/>
-                </a:solidFill>
-                <a:latin typeface="Calibri Light" panose="020F0302020204030204" pitchFamily="34" charset="0"/>
-                <a:cs typeface="Calibri Light" panose="020F0302020204030204" pitchFamily="34" charset="0"/>
-              </a:rPr>
-              <a:t> a Link Definition</a:t>
-            </a:r>
-            <a:endParaRPr lang="de-DE">
+              <a:t>    - </a:t>
+            </a:r>
+            <a:r>
+              <a:rPr lang="de-DE" i="1" smtClean="0">
+                <a:solidFill>
+                  <a:srgbClr val="006600"/>
+                </a:solidFill>
+                <a:latin typeface="Calibri Light" panose="020F0302020204030204" pitchFamily="34" charset="0"/>
+                <a:cs typeface="Calibri Light" panose="020F0302020204030204" pitchFamily="34" charset="0"/>
+              </a:rPr>
+              <a:t>used by target declarations</a:t>
+            </a:r>
+            <a:endParaRPr lang="de-DE" i="1">
               <a:solidFill>
                 <a:srgbClr val="006600"/>
               </a:solidFill>
@@ -19914,7 +20363,7 @@
         <p:spPr>
           <a:xfrm>
             <a:off x="463973" y="3429000"/>
-            <a:ext cx="7348487" cy="461665"/>
+            <a:ext cx="8270213" cy="461665"/>
           </a:xfrm>
           <a:prstGeom prst="rect">
             <a:avLst/>
@@ -19952,7 +20401,25 @@
                 </a:solidFill>
                 <a:latin typeface="Bradley Hand ITC" panose="03070402050302030203" pitchFamily="66" charset="0"/>
               </a:rPr>
-              <a:t>	   (@foxpath, @hrefXP, @uriXP, …)</a:t>
+              <a:t>	   </a:t>
+            </a:r>
+            <a:r>
+              <a:rPr lang="de-DE" sz="2400" b="0" smtClean="0">
+                <a:solidFill>
+                  <a:srgbClr val="006600"/>
+                </a:solidFill>
+                <a:latin typeface="Bradley Hand ITC" panose="03070402050302030203" pitchFamily="66" charset="0"/>
+              </a:rPr>
+              <a:t>(@navigateFOX, </a:t>
+            </a:r>
+            <a:r>
+              <a:rPr lang="de-DE" sz="2400" b="0" smtClean="0">
+                <a:solidFill>
+                  <a:srgbClr val="006600"/>
+                </a:solidFill>
+                <a:latin typeface="Bradley Hand ITC" panose="03070402050302030203" pitchFamily="66" charset="0"/>
+              </a:rPr>
+              <a:t>@hrefXP, @uriXP, …)</a:t>
             </a:r>
             <a:endParaRPr lang="de-DE" sz="2400" b="0">
               <a:solidFill>
@@ -20028,9 +20495,68 @@
                 <a:latin typeface="Calibri Light" panose="020F0302020204030204" pitchFamily="34" charset="0"/>
                 <a:cs typeface="Calibri Light" panose="020F0302020204030204" pitchFamily="34" charset="0"/>
               </a:rPr>
-              <a:t>Link constraints</a:t>
-            </a:r>
-            <a:endParaRPr lang="de-DE">
+              <a:t>5. Link definition</a:t>
+            </a:r>
+            <a:r>
+              <a:rPr lang="de-DE" i="1" smtClean="0">
+                <a:solidFill>
+                  <a:srgbClr val="006600"/>
+                </a:solidFill>
+                <a:latin typeface="Calibri Light" panose="020F0302020204030204" pitchFamily="34" charset="0"/>
+                <a:cs typeface="Calibri Light" panose="020F0302020204030204" pitchFamily="34" charset="0"/>
+              </a:rPr>
+              <a:t> </a:t>
+            </a:r>
+            <a:br>
+              <a:rPr lang="de-DE" i="1" smtClean="0">
+                <a:solidFill>
+                  <a:srgbClr val="006600"/>
+                </a:solidFill>
+                <a:latin typeface="Calibri Light" panose="020F0302020204030204" pitchFamily="34" charset="0"/>
+                <a:cs typeface="Calibri Light" panose="020F0302020204030204" pitchFamily="34" charset="0"/>
+              </a:rPr>
+            </a:br>
+            <a:r>
+              <a:rPr lang="de-DE" i="1">
+                <a:solidFill>
+                  <a:srgbClr val="006600"/>
+                </a:solidFill>
+                <a:latin typeface="Calibri Light" panose="020F0302020204030204" pitchFamily="34" charset="0"/>
+                <a:cs typeface="Calibri Light" panose="020F0302020204030204" pitchFamily="34" charset="0"/>
+              </a:rPr>
+              <a:t> </a:t>
+            </a:r>
+            <a:r>
+              <a:rPr lang="de-DE" i="1" smtClean="0">
+                <a:solidFill>
+                  <a:srgbClr val="006600"/>
+                </a:solidFill>
+                <a:latin typeface="Calibri Light" panose="020F0302020204030204" pitchFamily="34" charset="0"/>
+                <a:cs typeface="Calibri Light" panose="020F0302020204030204" pitchFamily="34" charset="0"/>
+              </a:rPr>
+              <a:t>    - used by </a:t>
+            </a:r>
+            <a:r>
+              <a:rPr lang="de-DE" i="1" smtClean="0">
+                <a:solidFill>
+                  <a:srgbClr val="006600"/>
+                </a:solidFill>
+                <a:latin typeface="Calibri Light" panose="020F0302020204030204" pitchFamily="34" charset="0"/>
+                <a:cs typeface="Calibri Light" panose="020F0302020204030204" pitchFamily="34" charset="0"/>
+              </a:rPr>
+              <a:t>binary </a:t>
+            </a:r>
+            <a:r>
+              <a:rPr lang="de-DE" i="1" smtClean="0">
+                <a:solidFill>
+                  <a:srgbClr val="006600"/>
+                </a:solidFill>
+                <a:latin typeface="Calibri Light" panose="020F0302020204030204" pitchFamily="34" charset="0"/>
+                <a:cs typeface="Calibri Light" panose="020F0302020204030204" pitchFamily="34" charset="0"/>
+              </a:rPr>
+              <a:t>constraints</a:t>
+            </a:r>
+            <a:endParaRPr lang="de-DE" i="1">
               <a:solidFill>
                 <a:srgbClr val="006600"/>
               </a:solidFill>
@@ -20042,7 +20568,7 @@
       </p:sp>
       <p:pic>
         <p:nvPicPr>
-          <p:cNvPr id="5" name="Picture 4"/>
+          <p:cNvPr id="4" name="Picture 3"/>
           <p:cNvPicPr>
             <a:picLocks noChangeAspect="1"/>
           </p:cNvPicPr>
@@ -20056,8 +20582,8 @@
         </p:blipFill>
         <p:spPr>
           <a:xfrm>
-            <a:off x="467544" y="2420888"/>
-            <a:ext cx="4638675" cy="2505075"/>
+            <a:off x="857250" y="2353022"/>
+            <a:ext cx="7429500" cy="3524250"/>
           </a:xfrm>
           <a:prstGeom prst="rect">
             <a:avLst/>
@@ -20073,7 +20599,7 @@
         <p:spPr>
           <a:xfrm>
             <a:off x="467544" y="1988840"/>
-            <a:ext cx="7795724" cy="461665"/>
+            <a:ext cx="2170787" cy="461665"/>
           </a:xfrm>
           <a:prstGeom prst="rect">
             <a:avLst/>
@@ -20093,43 +20619,7 @@
                 </a:solidFill>
                 <a:latin typeface="Bradley Hand ITC" panose="03070402050302030203" pitchFamily="66" charset="0"/>
               </a:rPr>
-              <a:t>Links </a:t>
-            </a:r>
-            <a:r>
-              <a:rPr lang="de-DE" sz="2400" smtClean="0">
-                <a:solidFill>
-                  <a:srgbClr val="006600"/>
-                </a:solidFill>
-                <a:latin typeface="Bradley Hand ITC" panose="03070402050302030203" pitchFamily="66" charset="0"/>
-              </a:rPr>
-              <a:t>resolvable</a:t>
-            </a:r>
-            <a:r>
-              <a:rPr lang="de-DE" sz="2400" b="0" smtClean="0">
-                <a:solidFill>
-                  <a:srgbClr val="006600"/>
-                </a:solidFill>
-                <a:latin typeface="Bradley Hand ITC" panose="03070402050302030203" pitchFamily="66" charset="0"/>
-              </a:rPr>
-              <a:t> and yield </a:t>
-            </a:r>
-            <a:r>
-              <a:rPr lang="de-DE" sz="2400" smtClean="0">
-                <a:solidFill>
-                  <a:srgbClr val="006600"/>
-                </a:solidFill>
-                <a:latin typeface="Bradley Hand ITC" panose="03070402050302030203" pitchFamily="66" charset="0"/>
-              </a:rPr>
-              <a:t>at least one</a:t>
-            </a:r>
-            <a:r>
-              <a:rPr lang="de-DE" sz="2400" b="0" smtClean="0">
-                <a:solidFill>
-                  <a:srgbClr val="006600"/>
-                </a:solidFill>
-                <a:latin typeface="Bradley Hand ITC" panose="03070402050302030203" pitchFamily="66" charset="0"/>
-              </a:rPr>
-              <a:t> link target resource</a:t>
+              <a:t>ValueCompared</a:t>
             </a:r>
             <a:endParaRPr lang="de-DE" sz="2400" b="0">
               <a:solidFill>
@@ -20142,14 +20632,14 @@
       </p:sp>
       <p:sp>
         <p:nvSpPr>
-          <p:cNvPr id="8" name="TextBox 7"/>
+          <p:cNvPr id="7" name="TextBox 6"/>
           <p:cNvSpPr txBox="1"/>
           <p:nvPr/>
         </p:nvSpPr>
         <p:spPr>
           <a:xfrm>
-            <a:off x="471456" y="3831431"/>
-            <a:ext cx="4413388" cy="461665"/>
+            <a:off x="467544" y="4551511"/>
+            <a:ext cx="1661032" cy="461665"/>
           </a:xfrm>
           <a:prstGeom prst="rect">
             <a:avLst/>
@@ -20163,22 +20653,13 @@
           <a:lstStyle/>
           <a:p>
             <a:r>
-              <a:rPr lang="de-DE" sz="2400" smtClean="0">
+              <a:rPr lang="de-DE" sz="2400" b="0" smtClean="0">
                 <a:solidFill>
                   <a:srgbClr val="006600"/>
                 </a:solidFill>
                 <a:latin typeface="Bradley Hand ITC" panose="03070402050302030203" pitchFamily="66" charset="0"/>
               </a:rPr>
-              <a:t>Exactly one</a:t>
-            </a:r>
-            <a:r>
-              <a:rPr lang="de-DE" sz="2400" b="0" smtClean="0">
-                <a:solidFill>
-                  <a:srgbClr val="006600"/>
-                </a:solidFill>
-                <a:latin typeface="Bradley Hand ITC" panose="03070402050302030203" pitchFamily="66" charset="0"/>
-              </a:rPr>
-              <a:t> link target resource</a:t>
+              <a:t>DocSimilar</a:t>
             </a:r>
             <a:endParaRPr lang="de-DE" sz="2400" b="0">
               <a:solidFill>
@@ -20191,7 +20672,59 @@
       </p:sp>
       <p:sp>
         <p:nvSpPr>
-          <p:cNvPr id="3" name="Slide Number Placeholder 2"/>
+          <p:cNvPr id="3" name="Date Placeholder 2"/>
+          <p:cNvSpPr>
+            <a:spLocks noGrp="1"/>
+          </p:cNvSpPr>
+          <p:nvPr>
+            <p:ph type="dt" sz="half" idx="10"/>
+          </p:nvPr>
+        </p:nvSpPr>
+        <p:spPr/>
+        <p:txBody>
+          <a:bodyPr/>
+          <a:lstStyle/>
+          <a:p>
+            <a:pPr>
+              <a:defRPr/>
+            </a:pPr>
+            <a:r>
+              <a:rPr lang="de-DE" altLang="de-DE" smtClean="0"/>
+              <a:t>2020-10-08</a:t>
+            </a:r>
+            <a:endParaRPr lang="de-DE" altLang="en-US"/>
+          </a:p>
+        </p:txBody>
+      </p:sp>
+      <p:sp>
+        <p:nvSpPr>
+          <p:cNvPr id="5" name="Footer Placeholder 4"/>
+          <p:cNvSpPr>
+            <a:spLocks noGrp="1"/>
+          </p:cNvSpPr>
+          <p:nvPr>
+            <p:ph type="ftr" sz="quarter" idx="11"/>
+          </p:nvPr>
+        </p:nvSpPr>
+        <p:spPr/>
+        <p:txBody>
+          <a:bodyPr/>
+          <a:lstStyle/>
+          <a:p>
+            <a:pPr>
+              <a:defRPr/>
+            </a:pPr>
+            <a:r>
+              <a:rPr lang="de-DE" altLang="en-US" smtClean="0"/>
+              <a:t>Greenfox</a:t>
+            </a:r>
+            <a:endParaRPr lang="de-DE" altLang="en-US"/>
+          </a:p>
+        </p:txBody>
+      </p:sp>
+      <p:sp>
+        <p:nvSpPr>
+          <p:cNvPr id="8" name="Slide Number Placeholder 7"/>
           <p:cNvSpPr>
             <a:spLocks noGrp="1"/>
           </p:cNvSpPr>
@@ -20221,7 +20754,7 @@
     </p:spTree>
     <p:extLst>
       <p:ext uri="{BB962C8B-B14F-4D97-AF65-F5344CB8AC3E}">
-        <p14:creationId xmlns:p14="http://schemas.microsoft.com/office/powerpoint/2010/main" val="1732630876"/>
+        <p14:creationId xmlns:p14="http://schemas.microsoft.com/office/powerpoint/2010/main" val="3833411121"/>
       </p:ext>
     </p:extLst>
   </p:cSld>
@@ -20283,38 +20816,19 @@
                 <a:latin typeface="Calibri Light" panose="020F0302020204030204" pitchFamily="34" charset="0"/>
                 <a:cs typeface="Calibri Light" panose="020F0302020204030204" pitchFamily="34" charset="0"/>
               </a:rPr>
-              <a:t>Link using elements: </a:t>
-            </a:r>
-            <a:br>
-              <a:rPr lang="de-DE" smtClean="0">
-                <a:solidFill>
-                  <a:srgbClr val="006600"/>
-                </a:solidFill>
-                <a:latin typeface="Calibri Light" panose="020F0302020204030204" pitchFamily="34" charset="0"/>
-                <a:cs typeface="Calibri Light" panose="020F0302020204030204" pitchFamily="34" charset="0"/>
-              </a:rPr>
-            </a:br>
-            <a:r>
-              <a:rPr lang="de-DE">
-                <a:solidFill>
-                  <a:srgbClr val="006600"/>
-                </a:solidFill>
-                <a:latin typeface="Calibri Light" panose="020F0302020204030204" pitchFamily="34" charset="0"/>
-                <a:cs typeface="Calibri Light" panose="020F0302020204030204" pitchFamily="34" charset="0"/>
-              </a:rPr>
-              <a:t> </a:t>
-            </a:r>
-            <a:r>
-              <a:rPr lang="de-DE" smtClean="0">
-                <a:solidFill>
-                  <a:srgbClr val="006600"/>
-                </a:solidFill>
-                <a:latin typeface="Calibri Light" panose="020F0302020204030204" pitchFamily="34" charset="0"/>
-                <a:cs typeface="Calibri Light" panose="020F0302020204030204" pitchFamily="34" charset="0"/>
-              </a:rPr>
-              <a:t>  binary constraints</a:t>
-            </a:r>
-            <a:endParaRPr lang="de-DE">
+              <a:t>5. Link definition</a:t>
+            </a:r>
+            <a:r>
+              <a:rPr lang="de-DE" i="1" smtClean="0">
+                <a:solidFill>
+                  <a:srgbClr val="006600"/>
+                </a:solidFill>
+                <a:latin typeface="Calibri Light" panose="020F0302020204030204" pitchFamily="34" charset="0"/>
+                <a:cs typeface="Calibri Light" panose="020F0302020204030204" pitchFamily="34" charset="0"/>
+              </a:rPr>
+              <a:t> - constraints</a:t>
+            </a:r>
+            <a:endParaRPr lang="de-DE" i="1">
               <a:solidFill>
                 <a:srgbClr val="006600"/>
               </a:solidFill>
@@ -20326,7 +20840,7 @@
       </p:sp>
       <p:pic>
         <p:nvPicPr>
-          <p:cNvPr id="4" name="Picture 3"/>
+          <p:cNvPr id="5" name="Picture 4"/>
           <p:cNvPicPr>
             <a:picLocks noChangeAspect="1"/>
           </p:cNvPicPr>
@@ -20340,8 +20854,8 @@
         </p:blipFill>
         <p:spPr>
           <a:xfrm>
-            <a:off x="857250" y="2353022"/>
-            <a:ext cx="7429500" cy="3524250"/>
+            <a:off x="467544" y="2420888"/>
+            <a:ext cx="4638675" cy="2505075"/>
           </a:xfrm>
           <a:prstGeom prst="rect">
             <a:avLst/>
@@ -20357,7 +20871,7 @@
         <p:spPr>
           <a:xfrm>
             <a:off x="467544" y="1988840"/>
-            <a:ext cx="2170787" cy="461665"/>
+            <a:ext cx="7795724" cy="461665"/>
           </a:xfrm>
           <a:prstGeom prst="rect">
             <a:avLst/>
@@ -20377,7 +20891,43 @@
                 </a:solidFill>
                 <a:latin typeface="Bradley Hand ITC" panose="03070402050302030203" pitchFamily="66" charset="0"/>
               </a:rPr>
-              <a:t>ValueCompared</a:t>
+              <a:t>Links </a:t>
+            </a:r>
+            <a:r>
+              <a:rPr lang="de-DE" sz="2400" smtClean="0">
+                <a:solidFill>
+                  <a:srgbClr val="006600"/>
+                </a:solidFill>
+                <a:latin typeface="Bradley Hand ITC" panose="03070402050302030203" pitchFamily="66" charset="0"/>
+              </a:rPr>
+              <a:t>resolvable</a:t>
+            </a:r>
+            <a:r>
+              <a:rPr lang="de-DE" sz="2400" b="0" smtClean="0">
+                <a:solidFill>
+                  <a:srgbClr val="006600"/>
+                </a:solidFill>
+                <a:latin typeface="Bradley Hand ITC" panose="03070402050302030203" pitchFamily="66" charset="0"/>
+              </a:rPr>
+              <a:t> and yield </a:t>
+            </a:r>
+            <a:r>
+              <a:rPr lang="de-DE" sz="2400" smtClean="0">
+                <a:solidFill>
+                  <a:srgbClr val="006600"/>
+                </a:solidFill>
+                <a:latin typeface="Bradley Hand ITC" panose="03070402050302030203" pitchFamily="66" charset="0"/>
+              </a:rPr>
+              <a:t>at least one</a:t>
+            </a:r>
+            <a:r>
+              <a:rPr lang="de-DE" sz="2400" b="0" smtClean="0">
+                <a:solidFill>
+                  <a:srgbClr val="006600"/>
+                </a:solidFill>
+                <a:latin typeface="Bradley Hand ITC" panose="03070402050302030203" pitchFamily="66" charset="0"/>
+              </a:rPr>
+              <a:t> link target resource</a:t>
             </a:r>
             <a:endParaRPr lang="de-DE" sz="2400" b="0">
               <a:solidFill>
@@ -20390,14 +20940,14 @@
       </p:sp>
       <p:sp>
         <p:nvSpPr>
-          <p:cNvPr id="7" name="TextBox 6"/>
+          <p:cNvPr id="8" name="TextBox 7"/>
           <p:cNvSpPr txBox="1"/>
           <p:nvPr/>
         </p:nvSpPr>
         <p:spPr>
           <a:xfrm>
-            <a:off x="467544" y="4551511"/>
-            <a:ext cx="1661032" cy="461665"/>
+            <a:off x="471456" y="3831431"/>
+            <a:ext cx="4413388" cy="461665"/>
           </a:xfrm>
           <a:prstGeom prst="rect">
             <a:avLst/>
@@ -20411,13 +20961,22 @@
           <a:lstStyle/>
           <a:p>
             <a:r>
+              <a:rPr lang="de-DE" sz="2400" smtClean="0">
+                <a:solidFill>
+                  <a:srgbClr val="006600"/>
+                </a:solidFill>
+                <a:latin typeface="Bradley Hand ITC" panose="03070402050302030203" pitchFamily="66" charset="0"/>
+              </a:rPr>
+              <a:t>Exactly one</a:t>
+            </a:r>
+            <a:r>
               <a:rPr lang="de-DE" sz="2400" b="0" smtClean="0">
                 <a:solidFill>
                   <a:srgbClr val="006600"/>
                 </a:solidFill>
                 <a:latin typeface="Bradley Hand ITC" panose="03070402050302030203" pitchFamily="66" charset="0"/>
               </a:rPr>
-              <a:t>DocSimilar</a:t>
+              <a:t> link target resource</a:t>
             </a:r>
             <a:endParaRPr lang="de-DE" sz="2400" b="0">
               <a:solidFill>
@@ -20430,59 +20989,7 @@
       </p:sp>
       <p:sp>
         <p:nvSpPr>
-          <p:cNvPr id="3" name="Date Placeholder 2"/>
-          <p:cNvSpPr>
-            <a:spLocks noGrp="1"/>
-          </p:cNvSpPr>
-          <p:nvPr>
-            <p:ph type="dt" sz="half" idx="10"/>
-          </p:nvPr>
-        </p:nvSpPr>
-        <p:spPr/>
-        <p:txBody>
-          <a:bodyPr/>
-          <a:lstStyle/>
-          <a:p>
-            <a:pPr>
-              <a:defRPr/>
-            </a:pPr>
-            <a:r>
-              <a:rPr lang="de-DE" altLang="de-DE" smtClean="0"/>
-              <a:t>2020-10-08</a:t>
-            </a:r>
-            <a:endParaRPr lang="de-DE" altLang="en-US"/>
-          </a:p>
-        </p:txBody>
-      </p:sp>
-      <p:sp>
-        <p:nvSpPr>
-          <p:cNvPr id="5" name="Footer Placeholder 4"/>
-          <p:cNvSpPr>
-            <a:spLocks noGrp="1"/>
-          </p:cNvSpPr>
-          <p:nvPr>
-            <p:ph type="ftr" sz="quarter" idx="11"/>
-          </p:nvPr>
-        </p:nvSpPr>
-        <p:spPr/>
-        <p:txBody>
-          <a:bodyPr/>
-          <a:lstStyle/>
-          <a:p>
-            <a:pPr>
-              <a:defRPr/>
-            </a:pPr>
-            <a:r>
-              <a:rPr lang="de-DE" altLang="en-US" smtClean="0"/>
-              <a:t>Greenfox</a:t>
-            </a:r>
-            <a:endParaRPr lang="de-DE" altLang="en-US"/>
-          </a:p>
-        </p:txBody>
-      </p:sp>
-      <p:sp>
-        <p:nvSpPr>
-          <p:cNvPr id="8" name="Slide Number Placeholder 7"/>
+          <p:cNvPr id="3" name="Slide Number Placeholder 2"/>
           <p:cNvSpPr>
             <a:spLocks noGrp="1"/>
           </p:cNvSpPr>
@@ -20512,7 +21019,7 @@
     </p:spTree>
     <p:extLst>
       <p:ext uri="{BB962C8B-B14F-4D97-AF65-F5344CB8AC3E}">
-        <p14:creationId xmlns:p14="http://schemas.microsoft.com/office/powerpoint/2010/main" val="3833411121"/>
+        <p14:creationId xmlns:p14="http://schemas.microsoft.com/office/powerpoint/2010/main" val="1732630876"/>
       </p:ext>
     </p:extLst>
   </p:cSld>
@@ -20612,7 +21119,7 @@
                 <a:latin typeface="Calibri Light" panose="020F0302020204030204" pitchFamily="34" charset="0"/>
                 <a:cs typeface="Calibri Light" panose="020F0302020204030204" pitchFamily="34" charset="0"/>
               </a:rPr>
-              <a:t>Please take note of </a:t>
+              <a:t>Note the </a:t>
             </a:r>
             <a:r>
               <a:rPr lang="de-DE" sz="2400" smtClean="0">
@@ -20622,18 +21129,45 @@
                 <a:latin typeface="Calibri Light" panose="020F0302020204030204" pitchFamily="34" charset="0"/>
                 <a:cs typeface="Calibri Light" panose="020F0302020204030204" pitchFamily="34" charset="0"/>
               </a:rPr>
-              <a:t>the amazing fox</a:t>
+              <a:t>the </a:t>
             </a:r>
             <a:r>
               <a:rPr lang="de-DE" sz="2400" smtClean="0">
                 <a:solidFill>
-                  <a:srgbClr val="006600"/>
-                </a:solidFill>
-                <a:latin typeface="Calibri Light" panose="020F0302020204030204" pitchFamily="34" charset="0"/>
-                <a:cs typeface="Calibri Light" panose="020F0302020204030204" pitchFamily="34" charset="0"/>
-              </a:rPr>
-              <a:t> – take a look at</a:t>
-            </a:r>
+                  <a:srgbClr val="CC6600"/>
+                </a:solidFill>
+                <a:latin typeface="Calibri Light" panose="020F0302020204030204" pitchFamily="34" charset="0"/>
+                <a:cs typeface="Calibri Light" panose="020F0302020204030204" pitchFamily="34" charset="0"/>
+              </a:rPr>
+              <a:t>amazing fox</a:t>
+            </a:r>
+            <a:r>
+              <a:rPr lang="de-DE" sz="2400" smtClean="0">
+                <a:solidFill>
+                  <a:srgbClr val="006600"/>
+                </a:solidFill>
+                <a:latin typeface="Calibri Light" panose="020F0302020204030204" pitchFamily="34" charset="0"/>
+                <a:cs typeface="Calibri Light" panose="020F0302020204030204" pitchFamily="34" charset="0"/>
+              </a:rPr>
+              <a:t> – </a:t>
+            </a:r>
+            <a:r>
+              <a:rPr lang="de-DE" sz="2400" smtClean="0">
+                <a:solidFill>
+                  <a:srgbClr val="006600"/>
+                </a:solidFill>
+                <a:latin typeface="Calibri Light" panose="020F0302020204030204" pitchFamily="34" charset="0"/>
+                <a:cs typeface="Calibri Light" panose="020F0302020204030204" pitchFamily="34" charset="0"/>
+              </a:rPr>
+              <a:t>look at …</a:t>
+            </a:r>
+            <a:endParaRPr lang="de-DE" sz="2400" smtClean="0">
+              <a:solidFill>
+                <a:srgbClr val="006600"/>
+              </a:solidFill>
+              <a:latin typeface="Calibri Light" panose="020F0302020204030204" pitchFamily="34" charset="0"/>
+              <a:cs typeface="Calibri Light" panose="020F0302020204030204" pitchFamily="34" charset="0"/>
+            </a:endParaRPr>
           </a:p>
           <a:p>
             <a:pPr marL="0" indent="0">
@@ -20659,8 +21193,62 @@
                 <a:latin typeface="Calibri Light" panose="020F0302020204030204" pitchFamily="34" charset="0"/>
                 <a:cs typeface="Calibri Light" panose="020F0302020204030204" pitchFamily="34" charset="0"/>
               </a:rPr>
-              <a:t>$greenfox/declarative-amsterdam-2020/the-amazing-fox/the-amazing-fox.txt</a:t>
-            </a:r>
+              <a:t>$</a:t>
+            </a:r>
+            <a:r>
+              <a:rPr lang="de-DE" sz="2000" smtClean="0">
+                <a:solidFill>
+                  <a:srgbClr val="006600"/>
+                </a:solidFill>
+                <a:latin typeface="Calibri Light" panose="020F0302020204030204" pitchFamily="34" charset="0"/>
+                <a:cs typeface="Calibri Light" panose="020F0302020204030204" pitchFamily="34" charset="0"/>
+              </a:rPr>
+              <a:t>greenfox/declarative-amsterdam-2020/the-amazing-fox/the-amazing-fox.txt</a:t>
+            </a:r>
+          </a:p>
+          <a:p>
+            <a:pPr marL="0" indent="0">
+              <a:buNone/>
+            </a:pPr>
+            <a:r>
+              <a:rPr lang="de-DE" sz="2000">
+                <a:solidFill>
+                  <a:srgbClr val="006600"/>
+                </a:solidFill>
+                <a:latin typeface="Calibri Light" panose="020F0302020204030204" pitchFamily="34" charset="0"/>
+                <a:cs typeface="Calibri Light" panose="020F0302020204030204" pitchFamily="34" charset="0"/>
+              </a:rPr>
+              <a:t>$</a:t>
+            </a:r>
+            <a:r>
+              <a:rPr lang="de-DE" sz="2000" smtClean="0">
+                <a:solidFill>
+                  <a:srgbClr val="006600"/>
+                </a:solidFill>
+                <a:latin typeface="Calibri Light" panose="020F0302020204030204" pitchFamily="34" charset="0"/>
+                <a:cs typeface="Calibri Light" panose="020F0302020204030204" pitchFamily="34" charset="0"/>
+              </a:rPr>
+              <a:t>greenfox/declarative-amsterdam-2020/tutorial-foxpath/tutorial-foxpath.txt</a:t>
+            </a:r>
+            <a:endParaRPr lang="de-DE" sz="2000">
+              <a:solidFill>
+                <a:srgbClr val="006600"/>
+              </a:solidFill>
+              <a:latin typeface="Calibri Light" panose="020F0302020204030204" pitchFamily="34" charset="0"/>
+              <a:cs typeface="Calibri Light" panose="020F0302020204030204" pitchFamily="34" charset="0"/>
+            </a:endParaRPr>
+          </a:p>
+          <a:p>
+            <a:pPr marL="0" indent="0">
+              <a:buNone/>
+            </a:pPr>
+            <a:endParaRPr lang="de-DE" sz="2000" smtClean="0">
+              <a:solidFill>
+                <a:srgbClr val="006600"/>
+              </a:solidFill>
+              <a:latin typeface="Calibri Light" panose="020F0302020204030204" pitchFamily="34" charset="0"/>
+              <a:cs typeface="Calibri Light" panose="020F0302020204030204" pitchFamily="34" charset="0"/>
+            </a:endParaRPr>
           </a:p>
         </p:txBody>
       </p:sp>
@@ -20938,7 +21526,27 @@
                 <a:latin typeface="Calibri Light" panose="020F0302020204030204" pitchFamily="34" charset="0"/>
                 <a:cs typeface="Calibri Light" panose="020F0302020204030204" pitchFamily="34" charset="0"/>
               </a:rPr>
-              <a:t>selects files base on their structured JSON content.</a:t>
+              <a:t>selects files </a:t>
+            </a:r>
+            <a:r>
+              <a:rPr lang="de-DE" b="0" smtClean="0">
+                <a:solidFill>
+                  <a:srgbClr val="006600"/>
+                </a:solidFill>
+                <a:latin typeface="Calibri Light" panose="020F0302020204030204" pitchFamily="34" charset="0"/>
+                <a:cs typeface="Calibri Light" panose="020F0302020204030204" pitchFamily="34" charset="0"/>
+              </a:rPr>
+              <a:t>based </a:t>
+            </a:r>
+            <a:r>
+              <a:rPr lang="de-DE" b="0" smtClean="0">
+                <a:solidFill>
+                  <a:srgbClr val="006600"/>
+                </a:solidFill>
+                <a:latin typeface="Calibri Light" panose="020F0302020204030204" pitchFamily="34" charset="0"/>
+                <a:cs typeface="Calibri Light" panose="020F0302020204030204" pitchFamily="34" charset="0"/>
+              </a:rPr>
+              <a:t>on their structured JSON content.</a:t>
             </a:r>
             <a:endParaRPr lang="de-DE" b="0">
               <a:solidFill>
@@ -21015,7 +21623,21 @@
                 <a:latin typeface="Calibri Light" panose="020F0302020204030204" pitchFamily="34" charset="0"/>
                 <a:cs typeface="Calibri Light" panose="020F0302020204030204" pitchFamily="34" charset="0"/>
               </a:rPr>
-              <a:t>NOTE: In Greenfox, the roles of / and \ are reversed. If you use fox with option </a:t>
+              <a:t>NOTE: In Greenfox, the roles of / and \ are reversed. If you use </a:t>
+            </a:r>
+            <a:r>
+              <a:rPr lang="de-DE" sz="1600" smtClean="0">
+                <a:latin typeface="Courier New" panose="02070309020205020404" pitchFamily="49" charset="0"/>
+                <a:cs typeface="Courier New" panose="02070309020205020404" pitchFamily="49" charset="0"/>
+              </a:rPr>
+              <a:t>fox</a:t>
+            </a:r>
+            <a:r>
+              <a:rPr lang="de-DE" sz="1600" smtClean="0">
+                <a:latin typeface="Calibri Light" panose="020F0302020204030204" pitchFamily="34" charset="0"/>
+                <a:cs typeface="Calibri Light" panose="020F0302020204030204" pitchFamily="34" charset="0"/>
+              </a:rPr>
+              <a:t> with option </a:t>
             </a:r>
             <a:r>
               <a:rPr lang="de-DE" sz="1600" smtClean="0">
@@ -21098,7 +21720,7 @@
                 <a:latin typeface="Calibri Light" panose="020F0302020204030204" pitchFamily="34" charset="0"/>
                 <a:cs typeface="Calibri Light" panose="020F0302020204030204" pitchFamily="34" charset="0"/>
               </a:rPr>
-              <a:t>Results &amp; Reports</a:t>
+              <a:t>6. Results</a:t>
             </a:r>
             <a:endParaRPr lang="de-DE">
               <a:solidFill>
@@ -21198,8 +21820,25 @@
                 <a:latin typeface="Calibri Light" panose="020F0302020204030204" pitchFamily="34" charset="0"/>
                 <a:cs typeface="Calibri Light" panose="020F0302020204030204" pitchFamily="34" charset="0"/>
               </a:rPr>
-              <a:t>Identify the constraint component</a:t>
-            </a:r>
+              <a:t>Identify the </a:t>
+            </a:r>
+            <a:r>
+              <a:rPr lang="de-DE" sz="2000" smtClean="0">
+                <a:solidFill>
+                  <a:srgbClr val="006600"/>
+                </a:solidFill>
+                <a:latin typeface="Calibri Light" panose="020F0302020204030204" pitchFamily="34" charset="0"/>
+                <a:cs typeface="Calibri Light" panose="020F0302020204030204" pitchFamily="34" charset="0"/>
+              </a:rPr>
+              <a:t>constraint type and facet</a:t>
+            </a:r>
+            <a:endParaRPr lang="de-DE" sz="2000" smtClean="0">
+              <a:solidFill>
+                <a:srgbClr val="006600"/>
+              </a:solidFill>
+              <a:latin typeface="Calibri Light" panose="020F0302020204030204" pitchFamily="34" charset="0"/>
+              <a:cs typeface="Calibri Light" panose="020F0302020204030204" pitchFamily="34" charset="0"/>
+            </a:endParaRPr>
           </a:p>
           <a:p>
             <a:pPr lvl="1"/>
@@ -21224,7 +21863,17 @@
                 <a:latin typeface="Calibri Light" panose="020F0302020204030204" pitchFamily="34" charset="0"/>
                 <a:cs typeface="Calibri Light" panose="020F0302020204030204" pitchFamily="34" charset="0"/>
               </a:rPr>
-              <a:t>Selected constraint parameters</a:t>
+              <a:t>Constraint </a:t>
+            </a:r>
+            <a:r>
+              <a:rPr lang="de-DE" sz="2000" smtClean="0">
+                <a:solidFill>
+                  <a:srgbClr val="006600"/>
+                </a:solidFill>
+                <a:latin typeface="Calibri Light" panose="020F0302020204030204" pitchFamily="34" charset="0"/>
+                <a:cs typeface="Calibri Light" panose="020F0302020204030204" pitchFamily="34" charset="0"/>
+              </a:rPr>
+              <a:t>parameters</a:t>
             </a:r>
           </a:p>
           <a:p>
@@ -21383,9 +22032,19 @@
                 <a:latin typeface="Calibri Light" panose="020F0302020204030204" pitchFamily="34" charset="0"/>
                 <a:cs typeface="Calibri Light" panose="020F0302020204030204" pitchFamily="34" charset="0"/>
               </a:rPr>
-              <a:t>Validation result: example</a:t>
-            </a:r>
-            <a:endParaRPr lang="de-DE">
+              <a:t>6. Result</a:t>
+            </a:r>
+            <a:r>
+              <a:rPr lang="de-DE" i="1" smtClean="0">
+                <a:solidFill>
+                  <a:srgbClr val="006600"/>
+                </a:solidFill>
+                <a:latin typeface="Calibri Light" panose="020F0302020204030204" pitchFamily="34" charset="0"/>
+                <a:cs typeface="Calibri Light" panose="020F0302020204030204" pitchFamily="34" charset="0"/>
+              </a:rPr>
+              <a:t> - example</a:t>
+            </a:r>
+            <a:endParaRPr lang="de-DE" i="1">
               <a:solidFill>
                 <a:srgbClr val="006600"/>
               </a:solidFill>
@@ -21560,9 +22219,19 @@
                 <a:latin typeface="Calibri Light" panose="020F0302020204030204" pitchFamily="34" charset="0"/>
                 <a:cs typeface="Calibri Light" panose="020F0302020204030204" pitchFamily="34" charset="0"/>
               </a:rPr>
-              <a:t>Validation report: example</a:t>
-            </a:r>
-            <a:endParaRPr lang="de-DE">
+              <a:t>7. Report</a:t>
+            </a:r>
+            <a:r>
+              <a:rPr lang="de-DE" i="1" smtClean="0">
+                <a:solidFill>
+                  <a:srgbClr val="006600"/>
+                </a:solidFill>
+                <a:latin typeface="Calibri Light" panose="020F0302020204030204" pitchFamily="34" charset="0"/>
+                <a:cs typeface="Calibri Light" panose="020F0302020204030204" pitchFamily="34" charset="0"/>
+              </a:rPr>
+              <a:t> - example</a:t>
+            </a:r>
+            <a:endParaRPr lang="de-DE" i="1">
               <a:solidFill>
                 <a:srgbClr val="006600"/>
               </a:solidFill>
@@ -21737,7 +22406,17 @@
                 <a:latin typeface="Calibri Light" panose="020F0302020204030204" pitchFamily="34" charset="0"/>
                 <a:cs typeface="Calibri Light" panose="020F0302020204030204" pitchFamily="34" charset="0"/>
               </a:rPr>
-              <a:t>Constraint types</a:t>
+              <a:t>Part </a:t>
+            </a:r>
+            <a:r>
+              <a:rPr lang="de-DE" smtClean="0">
+                <a:solidFill>
+                  <a:srgbClr val="006600"/>
+                </a:solidFill>
+                <a:latin typeface="Calibri Light" panose="020F0302020204030204" pitchFamily="34" charset="0"/>
+                <a:cs typeface="Calibri Light" panose="020F0302020204030204" pitchFamily="34" charset="0"/>
+              </a:rPr>
+              <a:t>3: Constraint types</a:t>
             </a:r>
             <a:endParaRPr lang="de-DE">
               <a:solidFill>
@@ -21749,34 +22428,171 @@
           </a:p>
         </p:txBody>
       </p:sp>
-      <p:pic>
-        <p:nvPicPr>
-          <p:cNvPr id="4" name="Picture 3"/>
-          <p:cNvPicPr>
-            <a:picLocks noChangeAspect="1"/>
-          </p:cNvPicPr>
+      <p:sp>
+        <p:nvSpPr>
+          <p:cNvPr id="4" name="Date Placeholder 3"/>
+          <p:cNvSpPr>
+            <a:spLocks noGrp="1"/>
+          </p:cNvSpPr>
+          <p:nvPr>
+            <p:ph type="dt" sz="half" idx="10"/>
+          </p:nvPr>
+        </p:nvSpPr>
+        <p:spPr/>
+        <p:txBody>
+          <a:bodyPr/>
+          <a:lstStyle/>
+          <a:p>
+            <a:pPr>
+              <a:defRPr/>
+            </a:pPr>
+            <a:r>
+              <a:rPr lang="de-DE" altLang="de-DE" smtClean="0"/>
+              <a:t>2020-10-08</a:t>
+            </a:r>
+            <a:endParaRPr lang="de-DE" altLang="en-US"/>
+          </a:p>
+        </p:txBody>
+      </p:sp>
+      <p:sp>
+        <p:nvSpPr>
+          <p:cNvPr id="5" name="Footer Placeholder 4"/>
+          <p:cNvSpPr>
+            <a:spLocks noGrp="1"/>
+          </p:cNvSpPr>
+          <p:nvPr>
+            <p:ph type="ftr" sz="quarter" idx="11"/>
+          </p:nvPr>
+        </p:nvSpPr>
+        <p:spPr/>
+        <p:txBody>
+          <a:bodyPr/>
+          <a:lstStyle/>
+          <a:p>
+            <a:pPr>
+              <a:defRPr/>
+            </a:pPr>
+            <a:r>
+              <a:rPr lang="de-DE" altLang="en-US" smtClean="0"/>
+              <a:t>Greenfox</a:t>
+            </a:r>
+            <a:endParaRPr lang="de-DE" altLang="en-US"/>
+          </a:p>
+        </p:txBody>
+      </p:sp>
+      <p:sp>
+        <p:nvSpPr>
+          <p:cNvPr id="6" name="Slide Number Placeholder 5"/>
+          <p:cNvSpPr>
+            <a:spLocks noGrp="1"/>
+          </p:cNvSpPr>
+          <p:nvPr>
+            <p:ph type="sldNum" sz="quarter" idx="12"/>
+          </p:nvPr>
+        </p:nvSpPr>
+        <p:spPr/>
+        <p:txBody>
+          <a:bodyPr/>
+          <a:lstStyle/>
+          <a:p>
+            <a:pPr>
+              <a:defRPr/>
+            </a:pPr>
+            <a:fld id="{F031B2F4-27D1-4E53-97CF-1947CD75B185}" type="slidenum">
+              <a:rPr lang="de-DE" altLang="en-US" smtClean="0"/>
+              <a:pPr>
+                <a:defRPr/>
+              </a:pPr>
+              <a:t>27</a:t>
+            </a:fld>
+            <a:endParaRPr lang="de-DE" altLang="en-US"/>
+          </a:p>
+        </p:txBody>
+      </p:sp>
+      <p:sp>
+        <p:nvSpPr>
+          <p:cNvPr id="7" name="TextBox 6"/>
+          <p:cNvSpPr txBox="1"/>
           <p:nvPr/>
-        </p:nvPicPr>
-        <p:blipFill>
-          <a:blip r:embed="rId3"/>
-          <a:stretch>
-            <a:fillRect/>
-          </a:stretch>
-        </p:blipFill>
+        </p:nvSpPr>
         <p:spPr>
           <a:xfrm>
-            <a:off x="665365" y="1700808"/>
-            <a:ext cx="7372350" cy="4991100"/>
+            <a:off x="683568" y="2348880"/>
+            <a:ext cx="8316416" cy="1692771"/>
           </a:xfrm>
           <a:prstGeom prst="rect">
             <a:avLst/>
           </a:prstGeom>
+          <a:noFill/>
         </p:spPr>
-      </p:pic>
+        <p:txBody>
+          <a:bodyPr wrap="square" rtlCol="0">
+            <a:spAutoFit/>
+          </a:bodyPr>
+          <a:lstStyle/>
+          <a:p>
+            <a:r>
+              <a:rPr lang="de-DE" sz="3200" smtClean="0">
+                <a:solidFill>
+                  <a:srgbClr val="006600"/>
+                </a:solidFill>
+                <a:latin typeface="Calibri Light" panose="020F0302020204030204" pitchFamily="34" charset="0"/>
+                <a:cs typeface="Calibri Light" panose="020F0302020204030204" pitchFamily="34" charset="0"/>
+              </a:rPr>
+              <a:t>Now you are ready to familiarize yourself with</a:t>
+            </a:r>
+            <a:endParaRPr lang="de-DE" sz="3200" smtClean="0">
+              <a:solidFill>
+                <a:srgbClr val="006600"/>
+              </a:solidFill>
+              <a:latin typeface="Calibri Light" panose="020F0302020204030204" pitchFamily="34" charset="0"/>
+              <a:cs typeface="Calibri Light" panose="020F0302020204030204" pitchFamily="34" charset="0"/>
+            </a:endParaRPr>
+          </a:p>
+          <a:p>
+            <a:endParaRPr lang="de-DE" sz="3200">
+              <a:solidFill>
+                <a:srgbClr val="006600"/>
+              </a:solidFill>
+              <a:latin typeface="Calibri Light" panose="020F0302020204030204" pitchFamily="34" charset="0"/>
+              <a:cs typeface="Calibri Light" panose="020F0302020204030204" pitchFamily="34" charset="0"/>
+            </a:endParaRPr>
+          </a:p>
+          <a:p>
+            <a:r>
+              <a:rPr lang="de-DE" sz="4000" smtClean="0">
+                <a:solidFill>
+                  <a:srgbClr val="006600"/>
+                </a:solidFill>
+                <a:latin typeface="Calibri Light" panose="020F0302020204030204" pitchFamily="34" charset="0"/>
+                <a:cs typeface="Calibri Light" panose="020F0302020204030204" pitchFamily="34" charset="0"/>
+              </a:rPr>
+              <a:t>                 </a:t>
+            </a:r>
+            <a:r>
+              <a:rPr lang="de-DE" sz="4000" i="1" smtClean="0">
+                <a:solidFill>
+                  <a:srgbClr val="006600"/>
+                </a:solidFill>
+                <a:latin typeface="Calibri Light" panose="020F0302020204030204" pitchFamily="34" charset="0"/>
+                <a:cs typeface="Calibri Light" panose="020F0302020204030204" pitchFamily="34" charset="0"/>
+              </a:rPr>
+              <a:t>CONSTRAINT TYPES</a:t>
+            </a:r>
+            <a:endParaRPr lang="de-DE" sz="4000" i="1">
+              <a:solidFill>
+                <a:srgbClr val="006600"/>
+              </a:solidFill>
+              <a:latin typeface="Calibri Light" panose="020F0302020204030204" pitchFamily="34" charset="0"/>
+              <a:cs typeface="Calibri Light" panose="020F0302020204030204" pitchFamily="34" charset="0"/>
+            </a:endParaRPr>
+          </a:p>
+        </p:txBody>
+      </p:sp>
     </p:spTree>
     <p:extLst>
       <p:ext uri="{BB962C8B-B14F-4D97-AF65-F5344CB8AC3E}">
-        <p14:creationId xmlns:p14="http://schemas.microsoft.com/office/powerpoint/2010/main" val="3640919414"/>
+        <p14:creationId xmlns:p14="http://schemas.microsoft.com/office/powerpoint/2010/main" val="343518980"/>
       </p:ext>
     </p:extLst>
   </p:cSld>
@@ -21833,38 +22649,9 @@
                 <a:latin typeface="Calibri Light" panose="020F0302020204030204" pitchFamily="34" charset="0"/>
                 <a:cs typeface="Calibri Light" panose="020F0302020204030204" pitchFamily="34" charset="0"/>
               </a:rPr>
-              <a:t>Important, but only mentioned</a:t>
-            </a:r>
-            <a:br>
-              <a:rPr lang="de-DE" smtClean="0">
-                <a:solidFill>
-                  <a:srgbClr val="006600"/>
-                </a:solidFill>
-                <a:latin typeface="Calibri Light" panose="020F0302020204030204" pitchFamily="34" charset="0"/>
-                <a:cs typeface="Calibri Light" panose="020F0302020204030204" pitchFamily="34" charset="0"/>
-              </a:rPr>
-            </a:br>
-            <a:r>
-              <a:rPr lang="de-DE" i="1">
-                <a:solidFill>
-                  <a:srgbClr val="006600"/>
-                </a:solidFill>
-                <a:latin typeface="Calibri Light" panose="020F0302020204030204" pitchFamily="34" charset="0"/>
-                <a:cs typeface="Calibri Light" panose="020F0302020204030204" pitchFamily="34" charset="0"/>
-              </a:rPr>
-              <a:t> </a:t>
-            </a:r>
-            <a:r>
-              <a:rPr lang="de-DE" i="1" smtClean="0">
-                <a:solidFill>
-                  <a:srgbClr val="006600"/>
-                </a:solidFill>
-                <a:latin typeface="Calibri Light" panose="020F0302020204030204" pitchFamily="34" charset="0"/>
-                <a:cs typeface="Calibri Light" panose="020F0302020204030204" pitchFamily="34" charset="0"/>
-              </a:rPr>
-              <a:t>   (see paper for details)</a:t>
-            </a:r>
-            <a:endParaRPr lang="de-DE" i="1">
+              <a:t>Constraint types</a:t>
+            </a:r>
+            <a:endParaRPr lang="de-DE">
               <a:solidFill>
                 <a:srgbClr val="006600"/>
               </a:solidFill>
@@ -21874,200 +22661,47 @@
           </a:p>
         </p:txBody>
       </p:sp>
-      <p:sp>
-        <p:nvSpPr>
-          <p:cNvPr id="3" name="Content Placeholder 2"/>
-          <p:cNvSpPr>
-            <a:spLocks noGrp="1"/>
-          </p:cNvSpPr>
-          <p:nvPr>
-            <p:ph idx="1"/>
-          </p:nvPr>
-        </p:nvSpPr>
+      <p:pic>
+        <p:nvPicPr>
+          <p:cNvPr id="5" name="Picture 4"/>
+          <p:cNvPicPr>
+            <a:picLocks noChangeAspect="1"/>
+          </p:cNvPicPr>
+          <p:nvPr/>
+        </p:nvPicPr>
+        <p:blipFill>
+          <a:blip r:embed="rId3"/>
+          <a:stretch>
+            <a:fillRect/>
+          </a:stretch>
+        </p:blipFill>
         <p:spPr>
           <a:xfrm>
-            <a:off x="457200" y="1719263"/>
-            <a:ext cx="8686800" cy="4411662"/>
+            <a:off x="611560" y="1682452"/>
+            <a:ext cx="7277100" cy="4914900"/>
           </a:xfrm>
+          <a:prstGeom prst="rect">
+            <a:avLst/>
+          </a:prstGeom>
         </p:spPr>
-        <p:txBody>
-          <a:bodyPr/>
-          <a:lstStyle/>
-          <a:p>
-            <a:r>
-              <a:rPr lang="de-DE" sz="2400">
-                <a:latin typeface="Courier New" panose="02070309020205020404" pitchFamily="49" charset="0"/>
-                <a:cs typeface="Courier New" panose="02070309020205020404" pitchFamily="49" charset="0"/>
-              </a:rPr>
-              <a:t>&lt;focusNode&gt;</a:t>
-            </a:r>
-            <a:r>
-              <a:rPr lang="de-DE" sz="2800">
-                <a:latin typeface="Calibri Light" panose="020F0302020204030204" pitchFamily="34" charset="0"/>
-                <a:cs typeface="Calibri Light" panose="020F0302020204030204" pitchFamily="34" charset="0"/>
-              </a:rPr>
-              <a:t> - changing evaluation context</a:t>
-            </a:r>
-          </a:p>
-          <a:p>
-            <a:r>
-              <a:rPr lang="de-DE" sz="2800">
-                <a:latin typeface="Calibri Light" panose="020F0302020204030204" pitchFamily="34" charset="0"/>
-                <a:cs typeface="Calibri Light" panose="020F0302020204030204" pitchFamily="34" charset="0"/>
-              </a:rPr>
-              <a:t>Variable bindings in XPath and Foxpath (e.g. </a:t>
-            </a:r>
-            <a:r>
-              <a:rPr lang="de-DE" sz="2400">
-                <a:latin typeface="Courier New" panose="02070309020205020404" pitchFamily="49" charset="0"/>
-                <a:cs typeface="Courier New" panose="02070309020205020404" pitchFamily="49" charset="0"/>
-              </a:rPr>
-              <a:t>$fileName</a:t>
-            </a:r>
-            <a:r>
-              <a:rPr lang="de-DE" sz="2800">
-                <a:latin typeface="Calibri Light" panose="020F0302020204030204" pitchFamily="34" charset="0"/>
-                <a:cs typeface="Calibri Light" panose="020F0302020204030204" pitchFamily="34" charset="0"/>
-              </a:rPr>
-              <a:t>)</a:t>
-            </a:r>
-          </a:p>
-          <a:p>
-            <a:r>
-              <a:rPr lang="de-DE" sz="2800" smtClean="0">
-                <a:latin typeface="Calibri Light" panose="020F0302020204030204" pitchFamily="34" charset="0"/>
-                <a:cs typeface="Calibri Light" panose="020F0302020204030204" pitchFamily="34" charset="0"/>
-              </a:rPr>
-              <a:t>Dealing with archives</a:t>
-            </a:r>
-          </a:p>
-          <a:p>
-            <a:r>
-              <a:rPr lang="de-DE" sz="2800" smtClean="0">
-                <a:latin typeface="Calibri Light" panose="020F0302020204030204" pitchFamily="34" charset="0"/>
-                <a:cs typeface="Calibri Light" panose="020F0302020204030204" pitchFamily="34" charset="0"/>
-              </a:rPr>
-              <a:t>JSON, CSV, HTML, .txt – see also </a:t>
-            </a:r>
-            <a:r>
-              <a:rPr lang="de-DE" sz="2800" i="1" smtClean="0">
-                <a:latin typeface="Calibri Light" panose="020F0302020204030204" pitchFamily="34" charset="0"/>
-                <a:cs typeface="Calibri Light" panose="020F0302020204030204" pitchFamily="34" charset="0"/>
-              </a:rPr>
-              <a:t>demo-mediatype</a:t>
-            </a:r>
-          </a:p>
-          <a:p>
-            <a:r>
-              <a:rPr lang="de-DE" sz="2800">
-                <a:latin typeface="Calibri Light" panose="020F0302020204030204" pitchFamily="34" charset="0"/>
-                <a:cs typeface="Calibri Light" panose="020F0302020204030204" pitchFamily="34" charset="0"/>
-              </a:rPr>
-              <a:t>Context &amp; schema parameters</a:t>
-            </a:r>
-          </a:p>
-          <a:p>
-            <a:pPr marL="0" indent="0">
-              <a:buNone/>
-            </a:pPr>
-            <a:endParaRPr lang="de-DE" sz="2800" i="1" smtClean="0">
-              <a:latin typeface="Calibri Light" panose="020F0302020204030204" pitchFamily="34" charset="0"/>
-              <a:cs typeface="Calibri Light" panose="020F0302020204030204" pitchFamily="34" charset="0"/>
-            </a:endParaRPr>
-          </a:p>
-        </p:txBody>
-      </p:sp>
-      <p:sp>
-        <p:nvSpPr>
-          <p:cNvPr id="4" name="Date Placeholder 3"/>
-          <p:cNvSpPr>
-            <a:spLocks noGrp="1"/>
-          </p:cNvSpPr>
-          <p:nvPr>
-            <p:ph type="dt" sz="half" idx="10"/>
-          </p:nvPr>
-        </p:nvSpPr>
-        <p:spPr/>
-        <p:txBody>
-          <a:bodyPr/>
-          <a:lstStyle/>
-          <a:p>
-            <a:pPr>
-              <a:defRPr/>
-            </a:pPr>
-            <a:r>
-              <a:rPr lang="de-DE" altLang="de-DE" smtClean="0"/>
-              <a:t>2020-10-08</a:t>
-            </a:r>
-            <a:endParaRPr lang="de-DE" altLang="en-US"/>
-          </a:p>
-        </p:txBody>
-      </p:sp>
-      <p:sp>
-        <p:nvSpPr>
-          <p:cNvPr id="5" name="Footer Placeholder 4"/>
-          <p:cNvSpPr>
-            <a:spLocks noGrp="1"/>
-          </p:cNvSpPr>
-          <p:nvPr>
-            <p:ph type="ftr" sz="quarter" idx="11"/>
-          </p:nvPr>
-        </p:nvSpPr>
-        <p:spPr/>
-        <p:txBody>
-          <a:bodyPr/>
-          <a:lstStyle/>
-          <a:p>
-            <a:pPr>
-              <a:defRPr/>
-            </a:pPr>
-            <a:r>
-              <a:rPr lang="de-DE" altLang="en-US" smtClean="0"/>
-              <a:t>Greenfox</a:t>
-            </a:r>
-            <a:endParaRPr lang="de-DE" altLang="en-US"/>
-          </a:p>
-        </p:txBody>
-      </p:sp>
-      <p:sp>
-        <p:nvSpPr>
-          <p:cNvPr id="6" name="Slide Number Placeholder 5"/>
-          <p:cNvSpPr>
-            <a:spLocks noGrp="1"/>
-          </p:cNvSpPr>
-          <p:nvPr>
-            <p:ph type="sldNum" sz="quarter" idx="12"/>
-          </p:nvPr>
-        </p:nvSpPr>
-        <p:spPr/>
-        <p:txBody>
-          <a:bodyPr/>
-          <a:lstStyle/>
-          <a:p>
-            <a:pPr>
-              <a:defRPr/>
-            </a:pPr>
-            <a:fld id="{F031B2F4-27D1-4E53-97CF-1947CD75B185}" type="slidenum">
-              <a:rPr lang="de-DE" altLang="en-US" smtClean="0"/>
-              <a:pPr>
-                <a:defRPr/>
-              </a:pPr>
-              <a:t>28</a:t>
-            </a:fld>
-            <a:endParaRPr lang="de-DE" altLang="en-US"/>
-          </a:p>
-        </p:txBody>
-      </p:sp>
+      </p:pic>
     </p:spTree>
     <p:extLst>
       <p:ext uri="{BB962C8B-B14F-4D97-AF65-F5344CB8AC3E}">
-        <p14:creationId xmlns:p14="http://schemas.microsoft.com/office/powerpoint/2010/main" val="869635973"/>
+        <p14:creationId xmlns:p14="http://schemas.microsoft.com/office/powerpoint/2010/main" val="3640919414"/>
       </p:ext>
     </p:extLst>
   </p:cSld>
   <p:clrMapOvr>
     <a:masterClrMapping/>
   </p:clrMapOvr>
+  <p:timing>
+    <p:tnLst>
+      <p:par>
+        <p:cTn id="1" dur="indefinite" restart="never" nodeType="tmRoot"/>
+      </p:par>
+    </p:tnLst>
+  </p:timing>
 </p:sld>
 </file>
 
@@ -22111,9 +22745,19 @@
                 <a:latin typeface="Calibri Light" panose="020F0302020204030204" pitchFamily="34" charset="0"/>
                 <a:cs typeface="Calibri Light" panose="020F0302020204030204" pitchFamily="34" charset="0"/>
               </a:rPr>
-              <a:t>What have you missed?</a:t>
-            </a:r>
-            <a:endParaRPr lang="de-DE">
+              <a:t>Important, but only </a:t>
+            </a:r>
+            <a:r>
+              <a:rPr lang="de-DE" smtClean="0">
+                <a:solidFill>
+                  <a:srgbClr val="006600"/>
+                </a:solidFill>
+                <a:latin typeface="Calibri Light" panose="020F0302020204030204" pitchFamily="34" charset="0"/>
+                <a:cs typeface="Calibri Light" panose="020F0302020204030204" pitchFamily="34" charset="0"/>
+              </a:rPr>
+              <a:t>mentioned</a:t>
+            </a:r>
+            <a:endParaRPr lang="de-DE" i="1">
               <a:solidFill>
                 <a:srgbClr val="006600"/>
               </a:solidFill>
@@ -22133,74 +22777,125 @@
             <p:ph idx="1"/>
           </p:nvPr>
         </p:nvSpPr>
-        <p:spPr/>
+        <p:spPr>
+          <a:xfrm>
+            <a:off x="457200" y="1719263"/>
+            <a:ext cx="8686800" cy="4411662"/>
+          </a:xfrm>
+        </p:spPr>
         <p:txBody>
           <a:bodyPr/>
           <a:lstStyle/>
           <a:p>
             <a:r>
-              <a:rPr lang="de-DE" smtClean="0">
-                <a:latin typeface="Calibri Light" panose="020F0302020204030204" pitchFamily="34" charset="0"/>
-                <a:cs typeface="Calibri Light" panose="020F0302020204030204" pitchFamily="34" charset="0"/>
-              </a:rPr>
-              <a:t>Composite schemas – no imports yet</a:t>
-            </a:r>
-          </a:p>
-          <a:p>
-            <a:r>
-              <a:rPr lang="de-DE" smtClean="0">
-                <a:latin typeface="Calibri Light" panose="020F0302020204030204" pitchFamily="34" charset="0"/>
-                <a:cs typeface="Calibri Light" panose="020F0302020204030204" pitchFamily="34" charset="0"/>
-              </a:rPr>
-              <a:t>Variables declared within the schema</a:t>
-            </a:r>
-          </a:p>
-          <a:p>
-            <a:r>
-              <a:rPr lang="de-DE" smtClean="0">
-                <a:latin typeface="Calibri Light" panose="020F0302020204030204" pitchFamily="34" charset="0"/>
-                <a:cs typeface="Calibri Light" panose="020F0302020204030204" pitchFamily="34" charset="0"/>
-              </a:rPr>
-              <a:t>Formated validation results </a:t>
-            </a:r>
-          </a:p>
-          <a:p>
-            <a:r>
-              <a:rPr lang="de-DE" smtClean="0">
-                <a:latin typeface="Calibri Light" panose="020F0302020204030204" pitchFamily="34" charset="0"/>
-                <a:cs typeface="Calibri Light" panose="020F0302020204030204" pitchFamily="34" charset="0"/>
-              </a:rPr>
-              <a:t>Support for …</a:t>
+              <a:rPr lang="de-DE" sz="2400">
+                <a:latin typeface="Courier New" panose="02070309020205020404" pitchFamily="49" charset="0"/>
+                <a:cs typeface="Courier New" panose="02070309020205020404" pitchFamily="49" charset="0"/>
+              </a:rPr>
+              <a:t>&lt;focusNode&gt;</a:t>
+            </a:r>
+            <a:r>
+              <a:rPr lang="de-DE" sz="2800">
+                <a:latin typeface="Calibri Light" panose="020F0302020204030204" pitchFamily="34" charset="0"/>
+                <a:cs typeface="Calibri Light" panose="020F0302020204030204" pitchFamily="34" charset="0"/>
+              </a:rPr>
+              <a:t> - changing evaluation context</a:t>
+            </a:r>
+          </a:p>
+          <a:p>
+            <a:r>
+              <a:rPr lang="de-DE" sz="2800">
+                <a:latin typeface="Calibri Light" panose="020F0302020204030204" pitchFamily="34" charset="0"/>
+                <a:cs typeface="Calibri Light" panose="020F0302020204030204" pitchFamily="34" charset="0"/>
+              </a:rPr>
+              <a:t>Variable bindings in XPath and Foxpath (e.g. </a:t>
+            </a:r>
+            <a:r>
+              <a:rPr lang="de-DE" sz="2400">
+                <a:latin typeface="Courier New" panose="02070309020205020404" pitchFamily="49" charset="0"/>
+                <a:cs typeface="Courier New" panose="02070309020205020404" pitchFamily="49" charset="0"/>
+              </a:rPr>
+              <a:t>$fileName</a:t>
+            </a:r>
+            <a:r>
+              <a:rPr lang="de-DE" sz="2800">
+                <a:latin typeface="Calibri Light" panose="020F0302020204030204" pitchFamily="34" charset="0"/>
+                <a:cs typeface="Calibri Light" panose="020F0302020204030204" pitchFamily="34" charset="0"/>
+              </a:rPr>
+              <a:t>)</a:t>
+            </a:r>
+          </a:p>
+          <a:p>
+            <a:r>
+              <a:rPr lang="de-DE" sz="2800" smtClean="0">
+                <a:latin typeface="Calibri Light" panose="020F0302020204030204" pitchFamily="34" charset="0"/>
+                <a:cs typeface="Calibri Light" panose="020F0302020204030204" pitchFamily="34" charset="0"/>
+              </a:rPr>
+              <a:t>Dealing with archives</a:t>
+            </a:r>
+          </a:p>
+          <a:p>
+            <a:r>
+              <a:rPr lang="de-DE" sz="2800" smtClean="0">
+                <a:latin typeface="Calibri Light" panose="020F0302020204030204" pitchFamily="34" charset="0"/>
+                <a:cs typeface="Calibri Light" panose="020F0302020204030204" pitchFamily="34" charset="0"/>
+              </a:rPr>
+              <a:t>JSON, CSV, HTML, .txt </a:t>
+            </a:r>
+            <a:r>
+              <a:rPr lang="de-DE" sz="2800" smtClean="0">
+                <a:latin typeface="Calibri Light" panose="020F0302020204030204" pitchFamily="34" charset="0"/>
+                <a:cs typeface="Calibri Light" panose="020F0302020204030204" pitchFamily="34" charset="0"/>
+              </a:rPr>
+              <a:t>(see </a:t>
+            </a:r>
+            <a:r>
+              <a:rPr lang="de-DE" sz="2800" smtClean="0">
+                <a:latin typeface="Calibri Light" panose="020F0302020204030204" pitchFamily="34" charset="0"/>
+                <a:cs typeface="Calibri Light" panose="020F0302020204030204" pitchFamily="34" charset="0"/>
+              </a:rPr>
+              <a:t>also </a:t>
+            </a:r>
+            <a:r>
+              <a:rPr lang="de-DE" sz="2800" i="1" smtClean="0">
+                <a:latin typeface="Calibri Light" panose="020F0302020204030204" pitchFamily="34" charset="0"/>
+                <a:cs typeface="Calibri Light" panose="020F0302020204030204" pitchFamily="34" charset="0"/>
+              </a:rPr>
+              <a:t>demo-mediatype</a:t>
+            </a:r>
+            <a:r>
+              <a:rPr lang="de-DE" sz="2800" smtClean="0">
+                <a:latin typeface="Calibri Light" panose="020F0302020204030204" pitchFamily="34" charset="0"/>
+                <a:cs typeface="Calibri Light" panose="020F0302020204030204" pitchFamily="34" charset="0"/>
+              </a:rPr>
+              <a:t>)</a:t>
+            </a:r>
+            <a:endParaRPr lang="de-DE" sz="2800" smtClean="0">
+              <a:latin typeface="Calibri Light" panose="020F0302020204030204" pitchFamily="34" charset="0"/>
+              <a:cs typeface="Calibri Light" panose="020F0302020204030204" pitchFamily="34" charset="0"/>
+            </a:endParaRPr>
+          </a:p>
+          <a:p>
+            <a:r>
+              <a:rPr lang="de-DE" sz="2800" smtClean="0">
+                <a:latin typeface="Calibri Light" panose="020F0302020204030204" pitchFamily="34" charset="0"/>
+                <a:cs typeface="Calibri Light" panose="020F0302020204030204" pitchFamily="34" charset="0"/>
+              </a:rPr>
+              <a:t>Schema context </a:t>
+            </a:r>
+            <a:r>
+              <a:rPr lang="de-DE" sz="2800">
+                <a:latin typeface="Calibri Light" panose="020F0302020204030204" pitchFamily="34" charset="0"/>
+                <a:cs typeface="Calibri Light" panose="020F0302020204030204" pitchFamily="34" charset="0"/>
+              </a:rPr>
+              <a:t>&amp; schema parameters</a:t>
             </a:r>
           </a:p>
           <a:p>
             <a:pPr marL="0" indent="0">
               <a:buNone/>
             </a:pPr>
-            <a:r>
-              <a:rPr lang="de-DE">
-                <a:latin typeface="Calibri Light" panose="020F0302020204030204" pitchFamily="34" charset="0"/>
-                <a:cs typeface="Calibri Light" panose="020F0302020204030204" pitchFamily="34" charset="0"/>
-              </a:rPr>
-              <a:t>	</a:t>
-            </a:r>
-            <a:r>
-              <a:rPr lang="de-DE" smtClean="0">
-                <a:latin typeface="Calibri Light" panose="020F0302020204030204" pitchFamily="34" charset="0"/>
-                <a:cs typeface="Calibri Light" panose="020F0302020204030204" pitchFamily="34" charset="0"/>
-              </a:rPr>
-              <a:t>schematron, JSON Schema, SHACL</a:t>
-            </a:r>
-          </a:p>
-          <a:p>
-            <a:r>
-              <a:rPr lang="de-DE" smtClean="0">
-                <a:latin typeface="Calibri Light" panose="020F0302020204030204" pitchFamily="34" charset="0"/>
-                <a:cs typeface="Calibri Light" panose="020F0302020204030204" pitchFamily="34" charset="0"/>
-              </a:rPr>
-              <a:t>Please fill in here: ______________________</a:t>
-            </a:r>
-            <a:endParaRPr lang="de-DE">
+            <a:endParaRPr lang="de-DE" sz="2800" i="1" smtClean="0">
               <a:latin typeface="Calibri Light" panose="020F0302020204030204" pitchFamily="34" charset="0"/>
               <a:cs typeface="Calibri Light" panose="020F0302020204030204" pitchFamily="34" charset="0"/>
             </a:endParaRPr>
@@ -22291,7 +22986,7 @@
     </p:spTree>
     <p:extLst>
       <p:ext uri="{BB962C8B-B14F-4D97-AF65-F5344CB8AC3E}">
-        <p14:creationId xmlns:p14="http://schemas.microsoft.com/office/powerpoint/2010/main" val="3062403288"/>
+        <p14:creationId xmlns:p14="http://schemas.microsoft.com/office/powerpoint/2010/main" val="869635973"/>
       </p:ext>
     </p:extLst>
   </p:cSld>
@@ -22423,7 +23118,21 @@
                 <a:latin typeface="Calibri Light" panose="020F0302020204030204" pitchFamily="34" charset="0"/>
                 <a:cs typeface="Calibri Light" panose="020F0302020204030204" pitchFamily="34" charset="0"/>
               </a:rPr>
-              <a:t>                (XSD, RelaxNG, JSON Schema, SHACL, …)</a:t>
+              <a:t>                (XSD, RelaxNG, JSON Schema, </a:t>
+            </a:r>
+            <a:r>
+              <a:rPr lang="de-DE" sz="2000" smtClean="0">
+                <a:latin typeface="Calibri Light" panose="020F0302020204030204" pitchFamily="34" charset="0"/>
+                <a:cs typeface="Calibri Light" panose="020F0302020204030204" pitchFamily="34" charset="0"/>
+              </a:rPr>
+              <a:t>CSV Schema, SHACL</a:t>
+            </a:r>
+            <a:r>
+              <a:rPr lang="de-DE" sz="2000" smtClean="0">
+                <a:latin typeface="Calibri Light" panose="020F0302020204030204" pitchFamily="34" charset="0"/>
+                <a:cs typeface="Calibri Light" panose="020F0302020204030204" pitchFamily="34" charset="0"/>
+              </a:rPr>
+              <a:t>, …)</a:t>
             </a:r>
           </a:p>
           <a:p>
@@ -22503,20 +23212,51 @@
                 <a:latin typeface="Calibri Light" panose="020F0302020204030204" pitchFamily="34" charset="0"/>
                 <a:cs typeface="Calibri Light" panose="020F0302020204030204" pitchFamily="34" charset="0"/>
               </a:rPr>
-              <a:t>larger parts of the picture</a:t>
+              <a:t>larger parts of the </a:t>
+            </a:r>
+            <a:r>
+              <a:rPr lang="de-DE" sz="2000" b="1" i="1" smtClean="0">
+                <a:solidFill>
+                  <a:srgbClr val="CC6600"/>
+                </a:solidFill>
+                <a:latin typeface="Calibri Light" panose="020F0302020204030204" pitchFamily="34" charset="0"/>
+                <a:cs typeface="Calibri Light" panose="020F0302020204030204" pitchFamily="34" charset="0"/>
+              </a:rPr>
+              <a:t>picture</a:t>
             </a:r>
             <a:r>
               <a:rPr lang="de-DE" sz="2000" smtClean="0">
                 <a:latin typeface="Calibri Light" panose="020F0302020204030204" pitchFamily="34" charset="0"/>
                 <a:cs typeface="Calibri Light" panose="020F0302020204030204" pitchFamily="34" charset="0"/>
               </a:rPr>
-              <a:t>; examples:</a:t>
+              <a:t> </a:t>
             </a:r>
           </a:p>
           <a:p>
             <a:pPr marL="0" indent="0">
               <a:buNone/>
             </a:pPr>
+            <a:r>
+              <a:rPr lang="de-DE" sz="2000">
+                <a:latin typeface="Calibri Light" panose="020F0302020204030204" pitchFamily="34" charset="0"/>
+                <a:cs typeface="Calibri Light" panose="020F0302020204030204" pitchFamily="34" charset="0"/>
+              </a:rPr>
+              <a:t> </a:t>
+            </a:r>
+            <a:r>
+              <a:rPr lang="de-DE" sz="2000" smtClean="0">
+                <a:latin typeface="Calibri Light" panose="020F0302020204030204" pitchFamily="34" charset="0"/>
+                <a:cs typeface="Calibri Light" panose="020F0302020204030204" pitchFamily="34" charset="0"/>
+              </a:rPr>
+              <a:t>     E</a:t>
+            </a:r>
+            <a:r>
+              <a:rPr lang="de-DE" sz="2000" smtClean="0">
+                <a:latin typeface="Calibri Light" panose="020F0302020204030204" pitchFamily="34" charset="0"/>
+                <a:cs typeface="Calibri Light" panose="020F0302020204030204" pitchFamily="34" charset="0"/>
+              </a:rPr>
+              <a:t>xamples:</a:t>
+            </a:r>
             <a:endParaRPr lang="de-DE" sz="2000" smtClean="0">
               <a:latin typeface="Calibri Light" panose="020F0302020204030204" pitchFamily="34" charset="0"/>
               <a:cs typeface="Calibri Light" panose="020F0302020204030204" pitchFamily="34" charset="0"/>
@@ -22569,19 +23309,8 @@
                 <a:latin typeface="Calibri Light" panose="020F0302020204030204" pitchFamily="34" charset="0"/>
                 <a:cs typeface="Calibri Light" panose="020F0302020204030204" pitchFamily="34" charset="0"/>
               </a:rPr>
-              <a:t>Complex test </a:t>
-            </a:r>
-            <a:r>
-              <a:rPr lang="de-DE" sz="1600" smtClean="0">
-                <a:latin typeface="Calibri Light" panose="020F0302020204030204" pitchFamily="34" charset="0"/>
-                <a:cs typeface="Calibri Light" panose="020F0302020204030204" pitchFamily="34" charset="0"/>
-              </a:rPr>
-              <a:t>results</a:t>
-            </a:r>
-            <a:endParaRPr lang="de-DE" sz="1600" smtClean="0">
-              <a:latin typeface="Calibri Light" panose="020F0302020204030204" pitchFamily="34" charset="0"/>
-              <a:cs typeface="Calibri Light" panose="020F0302020204030204" pitchFamily="34" charset="0"/>
-            </a:endParaRPr>
+              <a:t>Complex test results</a:t>
+            </a:r>
           </a:p>
           <a:p>
             <a:pPr lvl="1"/>
@@ -22687,8 +23416,8 @@
           </a:xfrm>
           <a:prstGeom prst="wedgeRoundRectCallout">
             <a:avLst>
-              <a:gd name="adj1" fmla="val -100974"/>
-              <a:gd name="adj2" fmla="val -30509"/>
+              <a:gd name="adj1" fmla="val -106951"/>
+              <a:gd name="adj2" fmla="val -32006"/>
               <a:gd name="adj3" fmla="val 16667"/>
             </a:avLst>
           </a:prstGeom>
@@ -23341,10 +24070,8 @@
                 <a:latin typeface="Calibri Light" panose="020F0302020204030204" pitchFamily="34" charset="0"/>
                 <a:cs typeface="Calibri Light" panose="020F0302020204030204" pitchFamily="34" charset="0"/>
               </a:rPr>
-              <a:t>Guided tour – hands-on impressions</a:t>
-            </a:r>
-          </a:p>
-          <a:p>
+              <a:t>Getting started - hands-on </a:t>
+            </a:r>
             <a:r>
               <a:rPr lang="de-DE" smtClean="0">
                 <a:solidFill>
@@ -23353,7 +24080,7 @@
                 <a:latin typeface="Calibri Light" panose="020F0302020204030204" pitchFamily="34" charset="0"/>
                 <a:cs typeface="Calibri Light" panose="020F0302020204030204" pitchFamily="34" charset="0"/>
               </a:rPr>
-              <a:t>Big Picture – concepts and major features</a:t>
+              <a:t>impressions</a:t>
             </a:r>
           </a:p>
           <a:p>
@@ -23365,7 +24092,56 @@
                 <a:latin typeface="Calibri Light" panose="020F0302020204030204" pitchFamily="34" charset="0"/>
                 <a:cs typeface="Calibri Light" panose="020F0302020204030204" pitchFamily="34" charset="0"/>
               </a:rPr>
-              <a:t>Overview of available constraint types</a:t>
+              <a:t>Big Picture </a:t>
+            </a:r>
+            <a:r>
+              <a:rPr lang="de-DE" smtClean="0">
+                <a:solidFill>
+                  <a:srgbClr val="006600"/>
+                </a:solidFill>
+                <a:latin typeface="Calibri Light" panose="020F0302020204030204" pitchFamily="34" charset="0"/>
+                <a:cs typeface="Calibri Light" panose="020F0302020204030204" pitchFamily="34" charset="0"/>
+              </a:rPr>
+              <a:t>	- concepts</a:t>
+            </a:r>
+            <a:endParaRPr lang="de-DE" smtClean="0">
+              <a:solidFill>
+                <a:srgbClr val="006600"/>
+              </a:solidFill>
+              <a:latin typeface="Calibri Light" panose="020F0302020204030204" pitchFamily="34" charset="0"/>
+              <a:cs typeface="Calibri Light" panose="020F0302020204030204" pitchFamily="34" charset="0"/>
+            </a:endParaRPr>
+          </a:p>
+          <a:p>
+            <a:r>
+              <a:rPr lang="de-DE" smtClean="0">
+                <a:solidFill>
+                  <a:srgbClr val="006600"/>
+                </a:solidFill>
+                <a:latin typeface="Calibri Light" panose="020F0302020204030204" pitchFamily="34" charset="0"/>
+                <a:cs typeface="Calibri Light" panose="020F0302020204030204" pitchFamily="34" charset="0"/>
+              </a:rPr>
+              <a:t>Overview </a:t>
+            </a:r>
+            <a:r>
+              <a:rPr lang="de-DE" smtClean="0">
+                <a:solidFill>
+                  <a:srgbClr val="006600"/>
+                </a:solidFill>
+                <a:latin typeface="Calibri Light" panose="020F0302020204030204" pitchFamily="34" charset="0"/>
+                <a:cs typeface="Calibri Light" panose="020F0302020204030204" pitchFamily="34" charset="0"/>
+              </a:rPr>
+              <a:t>	- available </a:t>
+            </a:r>
+            <a:r>
+              <a:rPr lang="de-DE" smtClean="0">
+                <a:solidFill>
+                  <a:srgbClr val="006600"/>
+                </a:solidFill>
+                <a:latin typeface="Calibri Light" panose="020F0302020204030204" pitchFamily="34" charset="0"/>
+                <a:cs typeface="Calibri Light" panose="020F0302020204030204" pitchFamily="34" charset="0"/>
+              </a:rPr>
+              <a:t>constraint types</a:t>
             </a:r>
           </a:p>
           <a:p>
@@ -23507,6 +24283,16 @@
           <a:lstStyle/>
           <a:p>
             <a:r>
+              <a:rPr lang="de-DE">
+                <a:solidFill>
+                  <a:srgbClr val="006600"/>
+                </a:solidFill>
+                <a:latin typeface="Calibri Light" panose="020F0302020204030204" pitchFamily="34" charset="0"/>
+                <a:cs typeface="Calibri Light" panose="020F0302020204030204" pitchFamily="34" charset="0"/>
+              </a:rPr>
+              <a:t>Part </a:t>
+            </a:r>
+            <a:r>
               <a:rPr lang="de-DE" smtClean="0">
                 <a:solidFill>
                   <a:srgbClr val="006600"/>
@@ -23514,7 +24300,17 @@
                 <a:latin typeface="Calibri Light" panose="020F0302020204030204" pitchFamily="34" charset="0"/>
                 <a:cs typeface="Calibri Light" panose="020F0302020204030204" pitchFamily="34" charset="0"/>
               </a:rPr>
-              <a:t>Getting started …</a:t>
+              <a:t>1: Getting </a:t>
+            </a:r>
+            <a:r>
+              <a:rPr lang="de-DE" smtClean="0">
+                <a:solidFill>
+                  <a:srgbClr val="006600"/>
+                </a:solidFill>
+                <a:latin typeface="Calibri Light" panose="020F0302020204030204" pitchFamily="34" charset="0"/>
+                <a:cs typeface="Calibri Light" panose="020F0302020204030204" pitchFamily="34" charset="0"/>
+              </a:rPr>
+              <a:t>started …</a:t>
             </a:r>
             <a:endParaRPr lang="de-DE">
               <a:solidFill>
@@ -24227,7 +25023,17 @@
                 <a:latin typeface="Calibri Light" panose="020F0302020204030204" pitchFamily="34" charset="0"/>
                 <a:cs typeface="Calibri Light" panose="020F0302020204030204" pitchFamily="34" charset="0"/>
               </a:rPr>
-              <a:t>SEVEN THINGS</a:t>
+              <a:t>SEVEN </a:t>
+            </a:r>
+            <a:r>
+              <a:rPr lang="de-DE" sz="4000" i="1" smtClean="0">
+                <a:solidFill>
+                  <a:srgbClr val="006600"/>
+                </a:solidFill>
+                <a:latin typeface="Calibri Light" panose="020F0302020204030204" pitchFamily="34" charset="0"/>
+                <a:cs typeface="Calibri Light" panose="020F0302020204030204" pitchFamily="34" charset="0"/>
+              </a:rPr>
+              <a:t>CONCEPTS</a:t>
             </a:r>
             <a:endParaRPr lang="de-DE" sz="4000" i="1">
               <a:solidFill>
@@ -24299,7 +25105,17 @@
                 <a:latin typeface="Calibri Light" panose="020F0302020204030204" pitchFamily="34" charset="0"/>
                 <a:cs typeface="Calibri Light" panose="020F0302020204030204" pitchFamily="34" charset="0"/>
               </a:rPr>
-              <a:t>SEVEN THINGS</a:t>
+              <a:t>SEVEN </a:t>
+            </a:r>
+            <a:r>
+              <a:rPr lang="de-DE" smtClean="0">
+                <a:solidFill>
+                  <a:srgbClr val="006600"/>
+                </a:solidFill>
+                <a:latin typeface="Calibri Light" panose="020F0302020204030204" pitchFamily="34" charset="0"/>
+                <a:cs typeface="Calibri Light" panose="020F0302020204030204" pitchFamily="34" charset="0"/>
+              </a:rPr>
+              <a:t>CONCEPTS</a:t>
             </a:r>
             <a:endParaRPr lang="de-DE">
               <a:solidFill>
@@ -24336,6 +25152,13 @@
               </a:rPr>
               <a:t>Resources</a:t>
             </a:r>
+            <a:endParaRPr lang="de-DE" smtClean="0">
+              <a:solidFill>
+                <a:srgbClr val="006600"/>
+              </a:solidFill>
+              <a:latin typeface="Calibri Light" panose="020F0302020204030204" pitchFamily="34" charset="0"/>
+              <a:cs typeface="Calibri Light" panose="020F0302020204030204" pitchFamily="34" charset="0"/>
+            </a:endParaRPr>
           </a:p>
           <a:p>
             <a:r>
@@ -24348,6 +25171,13 @@
               </a:rPr>
               <a:t>Constraints</a:t>
             </a:r>
+            <a:endParaRPr lang="de-DE" smtClean="0">
+              <a:solidFill>
+                <a:srgbClr val="006600"/>
+              </a:solidFill>
+              <a:latin typeface="Calibri Light" panose="020F0302020204030204" pitchFamily="34" charset="0"/>
+              <a:cs typeface="Calibri Light" panose="020F0302020204030204" pitchFamily="34" charset="0"/>
+            </a:endParaRPr>
           </a:p>
           <a:p>
             <a:r>
@@ -24360,6 +25190,13 @@
               </a:rPr>
               <a:t>Shapes</a:t>
             </a:r>
+            <a:endParaRPr lang="de-DE" smtClean="0">
+              <a:solidFill>
+                <a:srgbClr val="006600"/>
+              </a:solidFill>
+              <a:latin typeface="Calibri Light" panose="020F0302020204030204" pitchFamily="34" charset="0"/>
+              <a:cs typeface="Calibri Light" panose="020F0302020204030204" pitchFamily="34" charset="0"/>
+            </a:endParaRPr>
           </a:p>
           <a:p>
             <a:r>
@@ -24370,10 +25207,8 @@
                 <a:latin typeface="Calibri Light" panose="020F0302020204030204" pitchFamily="34" charset="0"/>
                 <a:cs typeface="Calibri Light" panose="020F0302020204030204" pitchFamily="34" charset="0"/>
               </a:rPr>
-              <a:t>Target declarations</a:t>
-            </a:r>
-          </a:p>
-          <a:p>
+              <a:t>Target </a:t>
+            </a:r>
             <a:r>
               <a:rPr lang="de-DE" smtClean="0">
                 <a:solidFill>
@@ -24382,7 +25217,7 @@
                 <a:latin typeface="Calibri Light" panose="020F0302020204030204" pitchFamily="34" charset="0"/>
                 <a:cs typeface="Calibri Light" panose="020F0302020204030204" pitchFamily="34" charset="0"/>
               </a:rPr>
-              <a:t>Link definitions</a:t>
+              <a:t>declarations</a:t>
             </a:r>
           </a:p>
           <a:p>
@@ -24394,8 +25229,37 @@
                 <a:latin typeface="Calibri Light" panose="020F0302020204030204" pitchFamily="34" charset="0"/>
                 <a:cs typeface="Calibri Light" panose="020F0302020204030204" pitchFamily="34" charset="0"/>
               </a:rPr>
+              <a:t>Link </a:t>
+            </a:r>
+            <a:r>
+              <a:rPr lang="de-DE" smtClean="0">
+                <a:solidFill>
+                  <a:srgbClr val="006600"/>
+                </a:solidFill>
+                <a:latin typeface="Calibri Light" panose="020F0302020204030204" pitchFamily="34" charset="0"/>
+                <a:cs typeface="Calibri Light" panose="020F0302020204030204" pitchFamily="34" charset="0"/>
+              </a:rPr>
+              <a:t>definitions</a:t>
+            </a:r>
+          </a:p>
+          <a:p>
+            <a:r>
+              <a:rPr lang="de-DE" smtClean="0">
+                <a:solidFill>
+                  <a:srgbClr val="006600"/>
+                </a:solidFill>
+                <a:latin typeface="Calibri Light" panose="020F0302020204030204" pitchFamily="34" charset="0"/>
+                <a:cs typeface="Calibri Light" panose="020F0302020204030204" pitchFamily="34" charset="0"/>
+              </a:rPr>
               <a:t>Results</a:t>
             </a:r>
+            <a:endParaRPr lang="de-DE" smtClean="0">
+              <a:solidFill>
+                <a:srgbClr val="006600"/>
+              </a:solidFill>
+              <a:latin typeface="Calibri Light" panose="020F0302020204030204" pitchFamily="34" charset="0"/>
+              <a:cs typeface="Calibri Light" panose="020F0302020204030204" pitchFamily="34" charset="0"/>
+            </a:endParaRPr>
           </a:p>
           <a:p>
             <a:r>
@@ -24559,7 +25423,7 @@
                 <a:latin typeface="Calibri Light" panose="020F0302020204030204" pitchFamily="34" charset="0"/>
                 <a:cs typeface="Calibri Light" panose="020F0302020204030204" pitchFamily="34" charset="0"/>
               </a:rPr>
-              <a:t>RESOURCES</a:t>
+              <a:t>1. Resources</a:t>
             </a:r>
             <a:endParaRPr lang="de-DE">
               <a:solidFill>

</xml_diff>